<commit_message>
presentation: up to replica diversion on PAST paper.
</commit_message>
<xml_diff>
--- a/p2p/P2P Apps.pptx
+++ b/p2p/P2P Apps.pptx
@@ -5,7 +5,7 @@
     <p:sldMasterId id="2147483660" r:id="rId1"/>
   </p:sldMasterIdLst>
   <p:notesMasterIdLst>
-    <p:notesMasterId r:id="rId30"/>
+    <p:notesMasterId r:id="rId32"/>
   </p:notesMasterIdLst>
   <p:sldIdLst>
     <p:sldId id="256" r:id="rId2"/>
@@ -36,6 +36,8 @@
     <p:sldId id="282" r:id="rId27"/>
     <p:sldId id="283" r:id="rId28"/>
     <p:sldId id="284" r:id="rId29"/>
+    <p:sldId id="285" r:id="rId30"/>
+    <p:sldId id="286" r:id="rId31"/>
   </p:sldIdLst>
   <p:sldSz cx="9144000" cy="6858000" type="screen4x3"/>
   <p:notesSz cx="6858000" cy="9144000"/>
@@ -14606,6 +14608,32 @@
               <a:t>High system utilization (97.4%-99.7%)</a:t>
             </a:r>
           </a:p>
+          <a:p>
+            <a:r>
+              <a:rPr lang="en-US" dirty="0" smtClean="0"/>
+              <a:t>Numbers from NATLR web proxy trace</a:t>
+            </a:r>
+          </a:p>
+          <a:p>
+            <a:pPr lvl="1"/>
+            <a:r>
+              <a:rPr lang="en-US" dirty="0" smtClean="0"/>
+              <a:t>Full details in evaluation later</a:t>
+            </a:r>
+          </a:p>
+          <a:p>
+            <a:r>
+              <a:rPr lang="en-US" dirty="0" smtClean="0"/>
+              <a:t>Hosts modeled after corporate desktop environment</a:t>
+            </a:r>
+          </a:p>
+          <a:p>
+            <a:r>
+              <a:rPr lang="en-US" dirty="0" smtClean="0"/>
+              <a:t>What causes all the failures?</a:t>
+            </a:r>
+            <a:endParaRPr lang="en-US" dirty="0"/>
+          </a:p>
         </p:txBody>
       </p:sp>
     </p:spTree>
@@ -14653,6 +14681,10 @@
           <a:bodyPr/>
           <a:lstStyle/>
           <a:p>
+            <a:r>
+              <a:rPr lang="en-US" dirty="0" smtClean="0"/>
+              <a:t>The Problem</a:t>
+            </a:r>
             <a:endParaRPr lang="en-US" dirty="0"/>
           </a:p>
         </p:txBody>
@@ -14692,10 +14724,86 @@
         </p:nvSpPr>
         <p:spPr/>
         <p:txBody>
-          <a:bodyPr/>
-          <a:lstStyle/>
-          <a:p>
-            <a:endParaRPr lang="en-US"/>
+          <a:bodyPr>
+            <a:normAutofit lnSpcReduction="10000"/>
+          </a:bodyPr>
+          <a:lstStyle/>
+          <a:p>
+            <a:r>
+              <a:rPr lang="en-US" dirty="0" smtClean="0"/>
+              <a:t>Storage Imbalance</a:t>
+            </a:r>
+          </a:p>
+          <a:p>
+            <a:pPr lvl="1"/>
+            <a:r>
+              <a:rPr lang="en-US" dirty="0" smtClean="0"/>
+              <a:t>Why?</a:t>
+            </a:r>
+          </a:p>
+          <a:p>
+            <a:pPr lvl="0"/>
+            <a:r>
+              <a:rPr lang="en-US" dirty="0" smtClean="0"/>
+              <a:t>File assignment might be uneven</a:t>
+            </a:r>
+          </a:p>
+          <a:p>
+            <a:pPr lvl="1"/>
+            <a:r>
+              <a:rPr lang="en-US" dirty="0" smtClean="0"/>
+              <a:t>Despite hashing properties</a:t>
+            </a:r>
+          </a:p>
+          <a:p>
+            <a:pPr lvl="0"/>
+            <a:r>
+              <a:rPr lang="en-US" dirty="0" smtClean="0"/>
+              <a:t>Files are different sizes</a:t>
+            </a:r>
+          </a:p>
+          <a:p>
+            <a:pPr lvl="0"/>
+            <a:r>
+              <a:rPr lang="en-US" dirty="0" smtClean="0"/>
+              <a:t>Nodes have different capacities</a:t>
+            </a:r>
+          </a:p>
+          <a:p>
+            <a:pPr lvl="1"/>
+            <a:r>
+              <a:rPr lang="en-US" dirty="0" smtClean="0"/>
+              <a:t>Note:</a:t>
+            </a:r>
+            <a:r>
+              <a:rPr lang="en-US" baseline="0" dirty="0" smtClean="0"/>
+              <a:t> Pastry assumes order of 2 magnitude capacity difference</a:t>
+            </a:r>
+          </a:p>
+          <a:p>
+            <a:pPr lvl="1"/>
+            <a:r>
+              <a:rPr lang="en-US" dirty="0" smtClean="0"/>
+              <a:t>Too small, node rejected</a:t>
+            </a:r>
+          </a:p>
+          <a:p>
+            <a:pPr lvl="1"/>
+            <a:r>
+              <a:rPr lang="en-US" dirty="0" smtClean="0"/>
+              <a:t>Too large, node requested to rejoin as multiple nodes</a:t>
+            </a:r>
+          </a:p>
+          <a:p>
+            <a:pPr lvl="0"/>
+            <a:r>
+              <a:rPr lang="en-US" dirty="0" smtClean="0"/>
+              <a:t>Would imbalance</a:t>
+            </a:r>
+            <a:r>
+              <a:rPr lang="en-US" baseline="0" dirty="0" smtClean="0"/>
+              <a:t> be as much of a problem if the files were fragmented?</a:t>
+            </a:r>
           </a:p>
         </p:txBody>
       </p:sp>
@@ -14703,6 +14811,155 @@
     <p:extLst>
       <p:ext uri="{BB962C8B-B14F-4D97-AF65-F5344CB8AC3E}">
         <p14:creationId xmlns:p14="http://schemas.microsoft.com/office/powerpoint/2010/main" val="2664478949"/>
+      </p:ext>
+    </p:extLst>
+  </p:cSld>
+  <p:clrMapOvr>
+    <a:masterClrMapping/>
+  </p:clrMapOvr>
+</p:sld>
+</file>
+
+<file path=ppt/slides/slide29.xml><?xml version="1.0" encoding="utf-8"?>
+<p:sld xmlns:a="http://schemas.openxmlformats.org/drawingml/2006/main" xmlns:r="http://schemas.openxmlformats.org/officeDocument/2006/relationships" xmlns:p="http://schemas.openxmlformats.org/presentationml/2006/main">
+  <p:cSld>
+    <p:spTree>
+      <p:nvGrpSpPr>
+        <p:cNvPr id="1" name=""/>
+        <p:cNvGrpSpPr/>
+        <p:nvPr/>
+      </p:nvGrpSpPr>
+      <p:grpSpPr>
+        <a:xfrm>
+          <a:off x="0" y="0"/>
+          <a:ext cx="0" cy="0"/>
+          <a:chOff x="0" y="0"/>
+          <a:chExt cx="0" cy="0"/>
+        </a:xfrm>
+      </p:grpSpPr>
+      <p:sp>
+        <p:nvSpPr>
+          <p:cNvPr id="2" name="Title 1"/>
+          <p:cNvSpPr>
+            <a:spLocks noGrp="1"/>
+          </p:cNvSpPr>
+          <p:nvPr>
+            <p:ph type="title"/>
+          </p:nvPr>
+        </p:nvSpPr>
+        <p:spPr/>
+        <p:txBody>
+          <a:bodyPr/>
+          <a:lstStyle/>
+          <a:p>
+            <a:r>
+              <a:rPr lang="en-US" dirty="0" smtClean="0"/>
+              <a:t>The Solution:</a:t>
+            </a:r>
+            <a:r>
+              <a:rPr lang="en-US" baseline="0" dirty="0" smtClean="0"/>
+              <a:t> Storage Management</a:t>
+            </a:r>
+            <a:endParaRPr lang="en-US" dirty="0"/>
+          </a:p>
+        </p:txBody>
+      </p:sp>
+      <p:sp>
+        <p:nvSpPr>
+          <p:cNvPr id="3" name="Slide Number Placeholder 2"/>
+          <p:cNvSpPr>
+            <a:spLocks noGrp="1"/>
+          </p:cNvSpPr>
+          <p:nvPr>
+            <p:ph type="sldNum" sz="quarter" idx="12"/>
+          </p:nvPr>
+        </p:nvSpPr>
+        <p:spPr/>
+        <p:txBody>
+          <a:bodyPr/>
+          <a:lstStyle/>
+          <a:p>
+            <a:fld id="{7D5018C4-273E-49AF-93AB-259FCF9A742C}" type="slidenum">
+              <a:rPr lang="en-US" smtClean="0"/>
+              <a:t>29</a:t>
+            </a:fld>
+            <a:endParaRPr lang="en-US"/>
+          </a:p>
+        </p:txBody>
+      </p:sp>
+      <p:sp>
+        <p:nvSpPr>
+          <p:cNvPr id="4" name="Content Placeholder 3"/>
+          <p:cNvSpPr>
+            <a:spLocks noGrp="1"/>
+          </p:cNvSpPr>
+          <p:nvPr>
+            <p:ph sz="quarter" idx="1"/>
+          </p:nvPr>
+        </p:nvSpPr>
+        <p:spPr/>
+        <p:txBody>
+          <a:bodyPr/>
+          <a:lstStyle/>
+          <a:p>
+            <a:r>
+              <a:rPr lang="en-US" dirty="0" smtClean="0"/>
+              <a:t>Replica</a:t>
+            </a:r>
+            <a:r>
+              <a:rPr lang="en-US" baseline="0" dirty="0" smtClean="0"/>
+              <a:t> Diversion</a:t>
+            </a:r>
+          </a:p>
+          <a:p>
+            <a:pPr lvl="1"/>
+            <a:r>
+              <a:rPr lang="en-US" dirty="0" smtClean="0"/>
+              <a:t>Concept:</a:t>
+            </a:r>
+            <a:r>
+              <a:rPr lang="en-US" baseline="0" dirty="0" smtClean="0"/>
+              <a:t> Balance free space amongst nodes in a leaf set</a:t>
+            </a:r>
+          </a:p>
+          <a:p>
+            <a:pPr lvl="0"/>
+            <a:r>
+              <a:rPr lang="en-US" dirty="0" smtClean="0"/>
+              <a:t>File Diversion</a:t>
+            </a:r>
+          </a:p>
+          <a:p>
+            <a:pPr lvl="1"/>
+            <a:r>
+              <a:rPr lang="en-US" dirty="0" smtClean="0"/>
+              <a:t>Concept: If replica diversion fails, try</a:t>
+            </a:r>
+            <a:r>
+              <a:rPr lang="en-US" baseline="0" dirty="0" smtClean="0"/>
+              <a:t> elsewhere</a:t>
+            </a:r>
+          </a:p>
+          <a:p>
+            <a:pPr lvl="0"/>
+            <a:r>
+              <a:rPr lang="en-US" dirty="0" smtClean="0"/>
+              <a:t>Replication maintenance</a:t>
+            </a:r>
+          </a:p>
+          <a:p>
+            <a:pPr lvl="1"/>
+            <a:r>
+              <a:rPr lang="en-US" dirty="0" smtClean="0"/>
+              <a:t>How does PAST ensure sufficient replicas exist?</a:t>
+            </a:r>
+          </a:p>
+        </p:txBody>
+      </p:sp>
+    </p:spTree>
+    <p:extLst>
+      <p:ext uri="{BB962C8B-B14F-4D97-AF65-F5344CB8AC3E}">
+        <p14:creationId xmlns:p14="http://schemas.microsoft.com/office/powerpoint/2010/main" val="2004073815"/>
       </p:ext>
     </p:extLst>
   </p:cSld>
@@ -14862,6 +15119,149 @@
       </p:par>
     </p:tnLst>
   </p:timing>
+</p:sld>
+</file>
+
+<file path=ppt/slides/slide30.xml><?xml version="1.0" encoding="utf-8"?>
+<p:sld xmlns:a="http://schemas.openxmlformats.org/drawingml/2006/main" xmlns:r="http://schemas.openxmlformats.org/officeDocument/2006/relationships" xmlns:p="http://schemas.openxmlformats.org/presentationml/2006/main">
+  <p:cSld>
+    <p:spTree>
+      <p:nvGrpSpPr>
+        <p:cNvPr id="1" name=""/>
+        <p:cNvGrpSpPr/>
+        <p:nvPr/>
+      </p:nvGrpSpPr>
+      <p:grpSpPr>
+        <a:xfrm>
+          <a:off x="0" y="0"/>
+          <a:ext cx="0" cy="0"/>
+          <a:chOff x="0" y="0"/>
+          <a:chExt cx="0" cy="0"/>
+        </a:xfrm>
+      </p:grpSpPr>
+      <p:sp>
+        <p:nvSpPr>
+          <p:cNvPr id="2" name="Title 1"/>
+          <p:cNvSpPr>
+            <a:spLocks noGrp="1"/>
+          </p:cNvSpPr>
+          <p:nvPr>
+            <p:ph type="title"/>
+          </p:nvPr>
+        </p:nvSpPr>
+        <p:spPr/>
+        <p:txBody>
+          <a:bodyPr/>
+          <a:lstStyle/>
+          <a:p>
+            <a:r>
+              <a:rPr lang="en-US" dirty="0" smtClean="0"/>
+              <a:t>Replica Diversion</a:t>
+            </a:r>
+            <a:endParaRPr lang="en-US" dirty="0"/>
+          </a:p>
+        </p:txBody>
+      </p:sp>
+      <p:sp>
+        <p:nvSpPr>
+          <p:cNvPr id="3" name="Slide Number Placeholder 2"/>
+          <p:cNvSpPr>
+            <a:spLocks noGrp="1"/>
+          </p:cNvSpPr>
+          <p:nvPr>
+            <p:ph type="sldNum" sz="quarter" idx="12"/>
+          </p:nvPr>
+        </p:nvSpPr>
+        <p:spPr/>
+        <p:txBody>
+          <a:bodyPr/>
+          <a:lstStyle/>
+          <a:p>
+            <a:fld id="{7D5018C4-273E-49AF-93AB-259FCF9A742C}" type="slidenum">
+              <a:rPr lang="en-US" smtClean="0"/>
+              <a:t>30</a:t>
+            </a:fld>
+            <a:endParaRPr lang="en-US"/>
+          </a:p>
+        </p:txBody>
+      </p:sp>
+      <p:sp>
+        <p:nvSpPr>
+          <p:cNvPr id="4" name="Content Placeholder 3"/>
+          <p:cNvSpPr>
+            <a:spLocks noGrp="1"/>
+          </p:cNvSpPr>
+          <p:nvPr>
+            <p:ph sz="quarter" idx="1"/>
+          </p:nvPr>
+        </p:nvSpPr>
+        <p:spPr/>
+        <p:txBody>
+          <a:bodyPr/>
+          <a:lstStyle/>
+          <a:p>
+            <a:pPr marL="274320" marR="0" indent="-274320" algn="l" defTabSz="914400" rtl="0" eaLnBrk="1" fontAlgn="auto" latinLnBrk="0" hangingPunct="1">
+              <a:lnSpc>
+                <a:spcPct val="100000"/>
+              </a:lnSpc>
+              <a:spcBef>
+                <a:spcPct val="20000"/>
+              </a:spcBef>
+              <a:spcAft>
+                <a:spcPts val="0"/>
+              </a:spcAft>
+              <a:buClr>
+                <a:schemeClr val="accent1"/>
+              </a:buClr>
+              <a:buSzPct val="85000"/>
+              <a:buFont typeface="Wingdings 2"/>
+              <a:buChar char=""/>
+              <a:tabLst/>
+              <a:defRPr/>
+            </a:pPr>
+            <a:r>
+              <a:rPr kumimoji="0" lang="en-US" sz="2700" kern="1200" dirty="0" smtClean="0">
+                <a:solidFill>
+                  <a:schemeClr val="tx1"/>
+                </a:solidFill>
+                <a:effectLst/>
+                <a:latin typeface="+mn-lt"/>
+                <a:ea typeface="+mn-ea"/>
+                <a:cs typeface="+mn-cs"/>
+              </a:rPr>
+              <a:t>Concept:</a:t>
+            </a:r>
+            <a:r>
+              <a:rPr kumimoji="0" lang="en-US" sz="2700" kern="1200" baseline="0" dirty="0" smtClean="0">
+                <a:solidFill>
+                  <a:schemeClr val="tx1"/>
+                </a:solidFill>
+                <a:effectLst/>
+                <a:latin typeface="+mn-lt"/>
+                <a:ea typeface="+mn-ea"/>
+                <a:cs typeface="+mn-cs"/>
+              </a:rPr>
+              <a:t> Balance free space amongst nodes in a leaf set</a:t>
+            </a:r>
+            <a:endParaRPr lang="en-US" sz="2700" dirty="0" smtClean="0">
+              <a:effectLst/>
+            </a:endParaRPr>
+          </a:p>
+          <a:p>
+            <a:endParaRPr lang="en-US" dirty="0"/>
+          </a:p>
+        </p:txBody>
+      </p:sp>
+    </p:spTree>
+    <p:extLst>
+      <p:ext uri="{BB962C8B-B14F-4D97-AF65-F5344CB8AC3E}">
+        <p14:creationId xmlns:p14="http://schemas.microsoft.com/office/powerpoint/2010/main" val="2227525894"/>
+      </p:ext>
+    </p:extLst>
+  </p:cSld>
+  <p:clrMapOvr>
+    <a:masterClrMapping/>
+  </p:clrMapOvr>
 </p:sld>
 </file>
 

</xml_diff>

<commit_message>
presentation: finish replica diversion diagram walkthrough!! :D
</commit_message>
<xml_diff>
--- a/p2p/P2P Apps.pptx
+++ b/p2p/P2P Apps.pptx
@@ -2,10 +2,10 @@
 <file path=ppt/presentation.xml><?xml version="1.0" encoding="utf-8"?>
 <p:presentation xmlns:a="http://schemas.openxmlformats.org/drawingml/2006/main" xmlns:r="http://schemas.openxmlformats.org/officeDocument/2006/relationships" xmlns:p="http://schemas.openxmlformats.org/presentationml/2006/main" saveSubsetFonts="1">
   <p:sldMasterIdLst>
-    <p:sldMasterId id="2147483660" r:id="rId1"/>
+    <p:sldMasterId id="2147483684" r:id="rId1"/>
   </p:sldMasterIdLst>
   <p:notesMasterIdLst>
-    <p:notesMasterId r:id="rId34"/>
+    <p:notesMasterId r:id="rId35"/>
   </p:notesMasterIdLst>
   <p:sldIdLst>
     <p:sldId id="256" r:id="rId2"/>
@@ -38,8 +38,9 @@
     <p:sldId id="284" r:id="rId29"/>
     <p:sldId id="285" r:id="rId30"/>
     <p:sldId id="286" r:id="rId31"/>
-    <p:sldId id="287" r:id="rId32"/>
-    <p:sldId id="288" r:id="rId33"/>
+    <p:sldId id="291" r:id="rId32"/>
+    <p:sldId id="292" r:id="rId33"/>
+    <p:sldId id="293" r:id="rId34"/>
   </p:sldIdLst>
   <p:sldSz cx="9144000" cy="6858000" type="screen4x3"/>
   <p:notesSz cx="6858000" cy="9144000"/>
@@ -6099,17 +6100,17 @@
   </p:cSld>
   <p:clrMap bg1="lt1" tx1="dk1" bg2="lt2" tx2="dk2" accent1="accent1" accent2="accent2" accent3="accent3" accent4="accent4" accent5="accent5" accent6="accent6" hlink="hlink" folHlink="folHlink"/>
   <p:sldLayoutIdLst>
-    <p:sldLayoutId id="2147483661" r:id="rId1"/>
-    <p:sldLayoutId id="2147483662" r:id="rId2"/>
-    <p:sldLayoutId id="2147483663" r:id="rId3"/>
-    <p:sldLayoutId id="2147483664" r:id="rId4"/>
-    <p:sldLayoutId id="2147483665" r:id="rId5"/>
-    <p:sldLayoutId id="2147483666" r:id="rId6"/>
-    <p:sldLayoutId id="2147483667" r:id="rId7"/>
-    <p:sldLayoutId id="2147483668" r:id="rId8"/>
-    <p:sldLayoutId id="2147483669" r:id="rId9"/>
-    <p:sldLayoutId id="2147483670" r:id="rId10"/>
-    <p:sldLayoutId id="2147483671" r:id="rId11"/>
+    <p:sldLayoutId id="2147483685" r:id="rId1"/>
+    <p:sldLayoutId id="2147483686" r:id="rId2"/>
+    <p:sldLayoutId id="2147483687" r:id="rId3"/>
+    <p:sldLayoutId id="2147483688" r:id="rId4"/>
+    <p:sldLayoutId id="2147483689" r:id="rId5"/>
+    <p:sldLayoutId id="2147483690" r:id="rId6"/>
+    <p:sldLayoutId id="2147483691" r:id="rId7"/>
+    <p:sldLayoutId id="2147483692" r:id="rId8"/>
+    <p:sldLayoutId id="2147483693" r:id="rId9"/>
+    <p:sldLayoutId id="2147483694" r:id="rId10"/>
+    <p:sldLayoutId id="2147483695" r:id="rId11"/>
   </p:sldLayoutIdLst>
   <p:hf hdr="0" ftr="0" dt="0"/>
   <p:txStyles>
@@ -9194,7 +9195,9 @@
         </p:nvSpPr>
         <p:spPr/>
         <p:txBody>
-          <a:bodyPr/>
+          <a:bodyPr>
+            <a:normAutofit/>
+          </a:bodyPr>
           <a:lstStyle/>
           <a:p>
             <a:r>
@@ -9392,7 +9395,9 @@
         </p:nvSpPr>
         <p:spPr/>
         <p:txBody>
-          <a:bodyPr/>
+          <a:bodyPr>
+            <a:normAutofit/>
+          </a:bodyPr>
           <a:lstStyle/>
           <a:p>
             <a:r>
@@ -14416,7 +14421,9 @@
         </p:nvSpPr>
         <p:spPr/>
         <p:txBody>
-          <a:bodyPr/>
+          <a:bodyPr>
+            <a:normAutofit/>
+          </a:bodyPr>
           <a:lstStyle/>
           <a:p>
             <a:r>
@@ -14568,7 +14575,9 @@
         </p:nvSpPr>
         <p:spPr/>
         <p:txBody>
-          <a:bodyPr/>
+          <a:bodyPr>
+            <a:normAutofit/>
+          </a:bodyPr>
           <a:lstStyle/>
           <a:p>
             <a:r>
@@ -15046,7 +15055,9 @@
         </p:nvSpPr>
         <p:spPr/>
         <p:txBody>
-          <a:bodyPr/>
+          <a:bodyPr>
+            <a:normAutofit/>
+          </a:bodyPr>
           <a:lstStyle/>
           <a:p>
             <a:r>
@@ -17678,6 +17689,13 @@
   <p:clrMapOvr>
     <a:masterClrMapping/>
   </p:clrMapOvr>
+  <p:timing>
+    <p:tnLst>
+      <p:par>
+        <p:cTn id="1" dur="indefinite" restart="never" nodeType="tmRoot"/>
+      </p:par>
+    </p:tnLst>
+  </p:timing>
 </p:sld>
 </file>
 
@@ -17698,15 +17716,95 @@
           <a:chExt cx="0" cy="0"/>
         </a:xfrm>
       </p:grpSpPr>
+      <p:sp>
+        <p:nvSpPr>
+          <p:cNvPr id="2" name="Title 1"/>
+          <p:cNvSpPr>
+            <a:spLocks noGrp="1"/>
+          </p:cNvSpPr>
+          <p:nvPr>
+            <p:ph type="title"/>
+          </p:nvPr>
+        </p:nvSpPr>
+        <p:spPr/>
+        <p:txBody>
+          <a:bodyPr/>
+          <a:lstStyle/>
+          <a:p>
+            <a:r>
+              <a:rPr lang="en-US" dirty="0" smtClean="0"/>
+              <a:t>Replica Diversion</a:t>
+            </a:r>
+            <a:endParaRPr lang="en-US" dirty="0"/>
+          </a:p>
+        </p:txBody>
+      </p:sp>
+      <p:sp>
+        <p:nvSpPr>
+          <p:cNvPr id="3" name="Slide Number Placeholder 2"/>
+          <p:cNvSpPr>
+            <a:spLocks noGrp="1"/>
+          </p:cNvSpPr>
+          <p:nvPr>
+            <p:ph type="sldNum" sz="quarter" idx="12"/>
+          </p:nvPr>
+        </p:nvSpPr>
+        <p:spPr/>
+        <p:txBody>
+          <a:bodyPr/>
+          <a:lstStyle/>
+          <a:p>
+            <a:fld id="{7D5018C4-273E-49AF-93AB-259FCF9A742C}" type="slidenum">
+              <a:rPr lang="en-US" smtClean="0"/>
+              <a:t>31</a:t>
+            </a:fld>
+            <a:endParaRPr lang="en-US"/>
+          </a:p>
+        </p:txBody>
+      </p:sp>
+      <p:sp>
+        <p:nvSpPr>
+          <p:cNvPr id="4" name="Content Placeholder 3"/>
+          <p:cNvSpPr>
+            <a:spLocks noGrp="1"/>
+          </p:cNvSpPr>
+          <p:nvPr>
+            <p:ph sz="quarter" idx="1"/>
+          </p:nvPr>
+        </p:nvSpPr>
+        <p:spPr/>
+        <p:txBody>
+          <a:bodyPr/>
+          <a:lstStyle/>
+          <a:p>
+            <a:pPr lvl="0"/>
+            <a:r>
+              <a:rPr lang="en-US" dirty="0" smtClean="0"/>
+              <a:t>What if node ‘A’ can’t store the file?</a:t>
+            </a:r>
+          </a:p>
+          <a:p>
+            <a:pPr lvl="1"/>
+            <a:r>
+              <a:rPr lang="en-US" dirty="0" smtClean="0"/>
+              <a:t>Tries to find some node ‘B’ to store the</a:t>
+            </a:r>
+            <a:r>
+              <a:rPr lang="en-US" baseline="0" dirty="0" smtClean="0"/>
+              <a:t> files instead</a:t>
+            </a:r>
+          </a:p>
+        </p:txBody>
+      </p:sp>
       <p:cxnSp>
         <p:nvCxnSpPr>
-          <p:cNvPr id="62" name="Straight Connector 61"/>
+          <p:cNvPr id="5" name="Straight Connector 4"/>
           <p:cNvCxnSpPr/>
           <p:nvPr/>
         </p:nvCxnSpPr>
         <p:spPr>
           <a:xfrm flipH="1" flipV="1">
-            <a:off x="152400" y="3810000"/>
+            <a:off x="152400" y="4050268"/>
             <a:ext cx="8839200" cy="3048"/>
           </a:xfrm>
           <a:prstGeom prst="line">
@@ -17730,126 +17828,13 @@
       </p:cxnSp>
       <p:sp>
         <p:nvSpPr>
-          <p:cNvPr id="2" name="Title 1"/>
-          <p:cNvSpPr>
-            <a:spLocks noGrp="1"/>
-          </p:cNvSpPr>
-          <p:nvPr>
-            <p:ph type="title"/>
-          </p:nvPr>
-        </p:nvSpPr>
-        <p:spPr/>
-        <p:txBody>
-          <a:bodyPr/>
-          <a:lstStyle/>
-          <a:p>
-            <a:r>
-              <a:rPr lang="en-US" dirty="0" smtClean="0"/>
-              <a:t>Replica Diversion</a:t>
-            </a:r>
-            <a:endParaRPr lang="en-US" dirty="0"/>
-          </a:p>
-        </p:txBody>
-      </p:sp>
-      <p:sp>
-        <p:nvSpPr>
-          <p:cNvPr id="3" name="Slide Number Placeholder 2"/>
-          <p:cNvSpPr>
-            <a:spLocks noGrp="1"/>
-          </p:cNvSpPr>
-          <p:nvPr>
-            <p:ph type="sldNum" sz="quarter" idx="12"/>
-          </p:nvPr>
-        </p:nvSpPr>
-        <p:spPr/>
-        <p:txBody>
-          <a:bodyPr/>
-          <a:lstStyle/>
-          <a:p>
-            <a:fld id="{7D5018C4-273E-49AF-93AB-259FCF9A742C}" type="slidenum">
-              <a:rPr lang="en-US" smtClean="0"/>
-              <a:t>31</a:t>
-            </a:fld>
-            <a:endParaRPr lang="en-US"/>
-          </a:p>
-        </p:txBody>
-      </p:sp>
-      <p:sp>
-        <p:nvSpPr>
-          <p:cNvPr id="4" name="Content Placeholder 3"/>
-          <p:cNvSpPr>
-            <a:spLocks noGrp="1"/>
-          </p:cNvSpPr>
-          <p:nvPr>
-            <p:ph sz="quarter" idx="1"/>
-          </p:nvPr>
-        </p:nvSpPr>
-        <p:spPr/>
-        <p:txBody>
-          <a:bodyPr/>
-          <a:lstStyle/>
-          <a:p>
-            <a:pPr marL="274320" marR="0" indent="-274320" algn="l" defTabSz="914400" rtl="0" eaLnBrk="1" fontAlgn="auto" latinLnBrk="0" hangingPunct="1">
-              <a:lnSpc>
-                <a:spcPct val="100000"/>
-              </a:lnSpc>
-              <a:spcBef>
-                <a:spcPct val="20000"/>
-              </a:spcBef>
-              <a:spcAft>
-                <a:spcPts val="0"/>
-              </a:spcAft>
-              <a:buClr>
-                <a:schemeClr val="accent1"/>
-              </a:buClr>
-              <a:buSzPct val="85000"/>
-              <a:buFont typeface="Wingdings 2"/>
-              <a:buChar char=""/>
-              <a:tabLst/>
-              <a:defRPr/>
-            </a:pPr>
-            <a:r>
-              <a:rPr kumimoji="0" lang="en-US" sz="2700" kern="1200" dirty="0" smtClean="0">
-                <a:solidFill>
-                  <a:schemeClr val="tx1"/>
-                </a:solidFill>
-                <a:effectLst/>
-                <a:latin typeface="+mn-lt"/>
-                <a:ea typeface="+mn-ea"/>
-                <a:cs typeface="+mn-cs"/>
-              </a:rPr>
-              <a:t>What if node ‘A’ can’t store the file?</a:t>
-            </a:r>
-            <a:endParaRPr kumimoji="0" lang="en-US" sz="2200" kern="1200" baseline="0" dirty="0" smtClean="0">
-              <a:solidFill>
-                <a:schemeClr val="tx1"/>
-              </a:solidFill>
-              <a:effectLst/>
-              <a:latin typeface="+mn-lt"/>
-              <a:ea typeface="+mn-ea"/>
-              <a:cs typeface="+mn-cs"/>
-            </a:endParaRPr>
-          </a:p>
-          <a:p>
-            <a:r>
-              <a:rPr lang="en-US" dirty="0" smtClean="0"/>
-              <a:t>Consider insert request:</a:t>
-            </a:r>
-          </a:p>
-          <a:p>
-            <a:endParaRPr lang="en-US" dirty="0"/>
-          </a:p>
-        </p:txBody>
-      </p:sp>
-      <p:sp>
-        <p:nvSpPr>
-          <p:cNvPr id="47" name="Oval 46"/>
+          <p:cNvPr id="6" name="Oval 5"/>
           <p:cNvSpPr/>
           <p:nvPr/>
         </p:nvSpPr>
         <p:spPr>
           <a:xfrm>
-            <a:off x="3190807" y="3288027"/>
+            <a:off x="3190807" y="3528295"/>
             <a:ext cx="914400" cy="914400"/>
           </a:xfrm>
           <a:prstGeom prst="ellipse">
@@ -17886,13 +17871,13 @@
       </p:sp>
       <p:sp>
         <p:nvSpPr>
-          <p:cNvPr id="48" name="Oval 47"/>
+          <p:cNvPr id="7" name="Oval 6"/>
           <p:cNvSpPr/>
           <p:nvPr/>
         </p:nvSpPr>
         <p:spPr>
           <a:xfrm>
-            <a:off x="4219545" y="3288027"/>
+            <a:off x="4219545" y="3528295"/>
             <a:ext cx="914400" cy="914400"/>
           </a:xfrm>
           <a:prstGeom prst="ellipse">
@@ -17930,13 +17915,13 @@
       </p:sp>
       <p:sp>
         <p:nvSpPr>
-          <p:cNvPr id="49" name="Oval 48"/>
+          <p:cNvPr id="8" name="Oval 7"/>
           <p:cNvSpPr/>
           <p:nvPr/>
         </p:nvSpPr>
         <p:spPr>
           <a:xfrm>
-            <a:off x="5261499" y="3288027"/>
+            <a:off x="5261499" y="3528295"/>
             <a:ext cx="914400" cy="914400"/>
           </a:xfrm>
           <a:prstGeom prst="ellipse">
@@ -17970,13 +17955,13 @@
       </p:sp>
       <p:sp>
         <p:nvSpPr>
-          <p:cNvPr id="50" name="Oval 49"/>
+          <p:cNvPr id="9" name="Oval 8"/>
           <p:cNvSpPr/>
           <p:nvPr/>
         </p:nvSpPr>
         <p:spPr>
           <a:xfrm>
-            <a:off x="2154397" y="3288027"/>
+            <a:off x="2154397" y="3528295"/>
             <a:ext cx="914400" cy="914400"/>
           </a:xfrm>
           <a:prstGeom prst="ellipse">
@@ -18010,16 +17995,16 @@
       </p:sp>
       <p:cxnSp>
         <p:nvCxnSpPr>
-          <p:cNvPr id="52" name="Elbow Connector 51"/>
+          <p:cNvPr id="10" name="Elbow Connector 9"/>
           <p:cNvCxnSpPr>
-            <a:stCxn id="48" idx="0"/>
-            <a:endCxn id="47" idx="0"/>
+            <a:stCxn id="7" idx="0"/>
+            <a:endCxn id="6" idx="0"/>
           </p:cNvCxnSpPr>
           <p:nvPr/>
         </p:nvCxnSpPr>
         <p:spPr>
           <a:xfrm rot="16200000" flipV="1">
-            <a:off x="4162376" y="2773658"/>
+            <a:off x="4162376" y="3013926"/>
             <a:ext cx="12700" cy="1028738"/>
           </a:xfrm>
           <a:prstGeom prst="bentConnector3">
@@ -18048,16 +18033,16 @@
       </p:cxnSp>
       <p:cxnSp>
         <p:nvCxnSpPr>
-          <p:cNvPr id="53" name="Elbow Connector 52"/>
+          <p:cNvPr id="11" name="Elbow Connector 10"/>
           <p:cNvCxnSpPr>
-            <a:stCxn id="48" idx="0"/>
-            <a:endCxn id="50" idx="0"/>
+            <a:stCxn id="7" idx="0"/>
+            <a:endCxn id="9" idx="0"/>
           </p:cNvCxnSpPr>
           <p:nvPr/>
         </p:nvCxnSpPr>
         <p:spPr>
           <a:xfrm rot="16200000" flipV="1">
-            <a:off x="3644171" y="2255453"/>
+            <a:off x="3644171" y="2495721"/>
             <a:ext cx="12700" cy="2065148"/>
           </a:xfrm>
           <a:prstGeom prst="bentConnector3">
@@ -18086,16 +18071,16 @@
       </p:cxnSp>
       <p:cxnSp>
         <p:nvCxnSpPr>
-          <p:cNvPr id="56" name="Elbow Connector 55"/>
+          <p:cNvPr id="12" name="Elbow Connector 11"/>
           <p:cNvCxnSpPr>
-            <a:stCxn id="48" idx="0"/>
-            <a:endCxn id="49" idx="0"/>
+            <a:stCxn id="7" idx="0"/>
+            <a:endCxn id="8" idx="0"/>
           </p:cNvCxnSpPr>
           <p:nvPr/>
         </p:nvCxnSpPr>
         <p:spPr>
           <a:xfrm rot="5400000" flipH="1" flipV="1">
-            <a:off x="5197722" y="2767050"/>
+            <a:off x="5197722" y="3007318"/>
             <a:ext cx="12700" cy="1041954"/>
           </a:xfrm>
           <a:prstGeom prst="bentConnector3">
@@ -18124,13 +18109,13 @@
       </p:cxnSp>
       <p:sp>
         <p:nvSpPr>
-          <p:cNvPr id="67" name="Left Brace 66"/>
+          <p:cNvPr id="13" name="Left Brace 12"/>
           <p:cNvSpPr/>
           <p:nvPr/>
         </p:nvSpPr>
         <p:spPr>
           <a:xfrm rot="16200000">
-            <a:off x="3869236" y="2951137"/>
+            <a:off x="3869236" y="3191405"/>
             <a:ext cx="598174" cy="3100752"/>
           </a:xfrm>
           <a:prstGeom prst="leftBrace">
@@ -18162,13 +18147,13 @@
       </p:sp>
       <p:sp>
         <p:nvSpPr>
-          <p:cNvPr id="68" name="TextBox 67"/>
+          <p:cNvPr id="14" name="TextBox 13"/>
           <p:cNvSpPr txBox="1"/>
           <p:nvPr/>
         </p:nvSpPr>
         <p:spPr>
           <a:xfrm>
-            <a:off x="3810000" y="5105400"/>
+            <a:off x="3810000" y="5345668"/>
             <a:ext cx="587020" cy="369332"/>
           </a:xfrm>
           <a:prstGeom prst="rect">
@@ -18196,13 +18181,13 @@
       </p:sp>
       <p:sp>
         <p:nvSpPr>
-          <p:cNvPr id="69" name="Oval 68"/>
+          <p:cNvPr id="15" name="Oval 14"/>
           <p:cNvSpPr/>
           <p:nvPr/>
         </p:nvSpPr>
         <p:spPr>
           <a:xfrm>
-            <a:off x="1143000" y="3294377"/>
+            <a:off x="1143000" y="3534645"/>
             <a:ext cx="914400" cy="914400"/>
           </a:xfrm>
           <a:prstGeom prst="ellipse">
@@ -18239,13 +18224,13 @@
       </p:sp>
       <p:sp>
         <p:nvSpPr>
-          <p:cNvPr id="70" name="Oval 69"/>
+          <p:cNvPr id="16" name="Oval 15"/>
           <p:cNvSpPr/>
           <p:nvPr/>
         </p:nvSpPr>
         <p:spPr>
           <a:xfrm>
-            <a:off x="6324600" y="3294377"/>
+            <a:off x="6324600" y="3534645"/>
             <a:ext cx="914400" cy="914400"/>
           </a:xfrm>
           <a:prstGeom prst="ellipse">
@@ -18279,13 +18264,13 @@
       </p:sp>
       <p:sp>
         <p:nvSpPr>
-          <p:cNvPr id="71" name="Oval 70"/>
+          <p:cNvPr id="17" name="Oval 16"/>
           <p:cNvSpPr/>
           <p:nvPr/>
         </p:nvSpPr>
         <p:spPr>
           <a:xfrm>
-            <a:off x="7391400" y="3294377"/>
+            <a:off x="7391400" y="3534645"/>
             <a:ext cx="914400" cy="914400"/>
           </a:xfrm>
           <a:prstGeom prst="ellipse">
@@ -18321,16 +18306,83 @@
           </a:p>
         </p:txBody>
       </p:sp>
+      <p:sp>
+        <p:nvSpPr>
+          <p:cNvPr id="18" name="TextBox 17"/>
+          <p:cNvSpPr txBox="1"/>
+          <p:nvPr/>
+        </p:nvSpPr>
+        <p:spPr>
+          <a:xfrm>
+            <a:off x="469234" y="3521944"/>
+            <a:ext cx="433132" cy="461665"/>
+          </a:xfrm>
+          <a:prstGeom prst="rect">
+            <a:avLst/>
+          </a:prstGeom>
+          <a:noFill/>
+        </p:spPr>
+        <p:txBody>
+          <a:bodyPr wrap="none" rtlCol="0">
+            <a:spAutoFit/>
+          </a:bodyPr>
+          <a:lstStyle/>
+          <a:p>
+            <a:r>
+              <a:rPr lang="en-US" sz="2400" dirty="0" smtClean="0"/>
+              <a:t>…</a:t>
+            </a:r>
+            <a:endParaRPr lang="en-US" sz="2400" dirty="0"/>
+          </a:p>
+        </p:txBody>
+      </p:sp>
+      <p:sp>
+        <p:nvSpPr>
+          <p:cNvPr id="19" name="TextBox 18"/>
+          <p:cNvSpPr txBox="1"/>
+          <p:nvPr/>
+        </p:nvSpPr>
+        <p:spPr>
+          <a:xfrm>
+            <a:off x="8458200" y="3521943"/>
+            <a:ext cx="433132" cy="461665"/>
+          </a:xfrm>
+          <a:prstGeom prst="rect">
+            <a:avLst/>
+          </a:prstGeom>
+          <a:noFill/>
+        </p:spPr>
+        <p:txBody>
+          <a:bodyPr wrap="none" rtlCol="0">
+            <a:spAutoFit/>
+          </a:bodyPr>
+          <a:lstStyle/>
+          <a:p>
+            <a:r>
+              <a:rPr lang="en-US" sz="2400" dirty="0" smtClean="0"/>
+              <a:t>…</a:t>
+            </a:r>
+            <a:endParaRPr lang="en-US" sz="2400" dirty="0"/>
+          </a:p>
+        </p:txBody>
+      </p:sp>
     </p:spTree>
     <p:extLst>
       <p:ext uri="{BB962C8B-B14F-4D97-AF65-F5344CB8AC3E}">
-        <p14:creationId xmlns:p14="http://schemas.microsoft.com/office/powerpoint/2010/main" val="3579232705"/>
+        <p14:creationId xmlns:p14="http://schemas.microsoft.com/office/powerpoint/2010/main" val="952647413"/>
       </p:ext>
     </p:extLst>
   </p:cSld>
   <p:clrMapOvr>
     <a:masterClrMapping/>
   </p:clrMapOvr>
+  <p:timing>
+    <p:tnLst>
+      <p:par>
+        <p:cTn id="1" dur="indefinite" restart="never" nodeType="tmRoot"/>
+      </p:par>
+    </p:tnLst>
+  </p:timing>
 </p:sld>
 </file>
 
@@ -18412,2482 +18464,956 @@
           <a:bodyPr/>
           <a:lstStyle/>
           <a:p>
-            <a:pPr marL="274320" marR="0" indent="-274320" algn="l" defTabSz="914400" rtl="0" eaLnBrk="1" fontAlgn="auto" latinLnBrk="0" hangingPunct="1">
-              <a:lnSpc>
-                <a:spcPct val="100000"/>
-              </a:lnSpc>
-              <a:spcBef>
-                <a:spcPct val="20000"/>
-              </a:spcBef>
-              <a:spcAft>
-                <a:spcPts val="0"/>
-              </a:spcAft>
-              <a:buClr>
-                <a:schemeClr val="accent1"/>
-              </a:buClr>
-              <a:buSzPct val="85000"/>
-              <a:buFont typeface="Wingdings 2"/>
-              <a:buChar char=""/>
-              <a:tabLst/>
-              <a:defRPr/>
-            </a:pPr>
-            <a:r>
-              <a:rPr kumimoji="0" lang="en-US" sz="2700" kern="1200" dirty="0" smtClean="0">
-                <a:solidFill>
-                  <a:schemeClr val="tx1"/>
-                </a:solidFill>
-                <a:effectLst/>
-                <a:latin typeface="+mn-lt"/>
-                <a:ea typeface="+mn-ea"/>
-                <a:cs typeface="+mn-cs"/>
-              </a:rPr>
-              <a:t>Concept</a:t>
+            <a:pPr lvl="0"/>
+            <a:r>
+              <a:rPr lang="en-US" dirty="0" smtClean="0"/>
+              <a:t>How to pick node</a:t>
+            </a:r>
+            <a:r>
+              <a:rPr lang="en-US" baseline="0" dirty="0" smtClean="0"/>
+              <a:t> ‘B’?</a:t>
+            </a:r>
+          </a:p>
+          <a:p>
+            <a:pPr lvl="0"/>
+            <a:r>
+              <a:rPr lang="en-US" baseline="0" dirty="0" smtClean="0"/>
+              <a:t>Find the node with the most free space that:</a:t>
             </a:r>
           </a:p>
           <a:p>
             <a:pPr lvl="1"/>
             <a:r>
-              <a:rPr kumimoji="0" lang="en-US" sz="2200" kern="1200" baseline="0" dirty="0" smtClean="0">
-                <a:solidFill>
-                  <a:schemeClr val="tx1"/>
-                </a:solidFill>
-                <a:effectLst/>
-                <a:latin typeface="+mn-lt"/>
-                <a:ea typeface="+mn-ea"/>
-                <a:cs typeface="+mn-cs"/>
-              </a:rPr>
-              <a:t>Balance free space amongst nodes in a leaf set</a:t>
-            </a:r>
-          </a:p>
-          <a:p>
-            <a:r>
-              <a:rPr lang="en-US" dirty="0" smtClean="0"/>
-              <a:t>Consider insert request:</a:t>
-            </a:r>
-          </a:p>
-          <a:p>
-            <a:endParaRPr lang="en-US" dirty="0"/>
-          </a:p>
-        </p:txBody>
-      </p:sp>
-      <p:grpSp>
-        <p:nvGrpSpPr>
-          <p:cNvPr id="5" name="Group 45"/>
-          <p:cNvGrpSpPr>
-            <a:grpSpLocks noChangeAspect="1"/>
-          </p:cNvGrpSpPr>
-          <p:nvPr/>
-        </p:nvGrpSpPr>
-        <p:grpSpPr bwMode="auto">
-          <a:xfrm>
-            <a:off x="2731262" y="2867485"/>
-            <a:ext cx="3347514" cy="3291840"/>
-            <a:chOff x="352" y="1120"/>
-            <a:chExt cx="2886" cy="2838"/>
-          </a:xfrm>
-        </p:grpSpPr>
-        <p:sp>
-          <p:nvSpPr>
-            <p:cNvPr id="6" name="Oval 3"/>
-            <p:cNvSpPr>
-              <a:spLocks noChangeArrowheads="1"/>
-            </p:cNvSpPr>
-            <p:nvPr/>
-          </p:nvSpPr>
-          <p:spPr bwMode="auto">
-            <a:xfrm>
-              <a:off x="400" y="1168"/>
-              <a:ext cx="2784" cy="2736"/>
-            </a:xfrm>
-            <a:prstGeom prst="ellipse">
-              <a:avLst/>
-            </a:prstGeom>
-            <a:noFill/>
-            <a:ln w="15875">
-              <a:solidFill>
-                <a:schemeClr val="tx1"/>
-              </a:solidFill>
-              <a:round/>
-              <a:headEnd/>
-              <a:tailEnd/>
-            </a:ln>
-            <a:effectLst/>
-            <a:extLst>
-              <a:ext uri="{909E8E84-426E-40DD-AFC4-6F175D3DCCD1}">
-                <a14:hiddenFill xmlns:a14="http://schemas.microsoft.com/office/drawing/2010/main">
-                  <a:solidFill>
-                    <a:schemeClr val="accent1"/>
-                  </a:solidFill>
-                </a14:hiddenFill>
-              </a:ext>
-              <a:ext uri="{AF507438-7753-43E0-B8FC-AC1667EBCBE1}">
-                <a14:hiddenEffects xmlns:a14="http://schemas.microsoft.com/office/drawing/2010/main">
-                  <a:effectLst>
-                    <a:outerShdw dist="35921" dir="2700000" algn="ctr" rotWithShape="0">
-                      <a:schemeClr val="bg2"/>
-                    </a:outerShdw>
-                  </a:effectLst>
-                </a14:hiddenEffects>
-              </a:ext>
-            </a:extLst>
-          </p:spPr>
-          <p:txBody>
-            <a:bodyPr wrap="none" anchor="ctr"/>
-            <a:lstStyle/>
-            <a:p>
-              <a:endParaRPr lang="en-US"/>
-            </a:p>
-          </p:txBody>
-        </p:sp>
-        <p:pic>
-          <p:nvPicPr>
-            <p:cNvPr id="7" name="Picture 4"/>
-            <p:cNvPicPr>
-              <a:picLocks noChangeArrowheads="1"/>
-            </p:cNvPicPr>
-            <p:nvPr/>
-          </p:nvPicPr>
-          <p:blipFill>
-            <a:blip r:embed="rId2" cstate="print">
-              <a:extLst>
-                <a:ext uri="{28A0092B-C50C-407E-A947-70E740481C1C}">
-                  <a14:useLocalDpi xmlns:a14="http://schemas.microsoft.com/office/drawing/2010/main" val="0"/>
-                </a:ext>
-              </a:extLst>
-            </a:blip>
-            <a:srcRect/>
-            <a:stretch>
-              <a:fillRect/>
-            </a:stretch>
-          </p:blipFill>
-          <p:spPr bwMode="auto">
-            <a:xfrm>
-              <a:off x="3136" y="2368"/>
-              <a:ext cx="102" cy="102"/>
-            </a:xfrm>
-            <a:prstGeom prst="rect">
-              <a:avLst/>
-            </a:prstGeom>
-            <a:noFill/>
-            <a:ln>
-              <a:noFill/>
-            </a:ln>
-            <a:effectLst/>
-            <a:extLst>
-              <a:ext uri="{909E8E84-426E-40DD-AFC4-6F175D3DCCD1}">
-                <a14:hiddenFill xmlns:a14="http://schemas.microsoft.com/office/drawing/2010/main">
-                  <a:solidFill>
-                    <a:schemeClr val="accent1"/>
-                  </a:solidFill>
-                </a14:hiddenFill>
-              </a:ext>
-              <a:ext uri="{91240B29-F687-4F45-9708-019B960494DF}">
-                <a14:hiddenLine xmlns:a14="http://schemas.microsoft.com/office/drawing/2010/main" w="9525">
-                  <a:solidFill>
-                    <a:schemeClr val="tx1"/>
-                  </a:solidFill>
-                  <a:miter lim="800000"/>
-                  <a:headEnd/>
-                  <a:tailEnd/>
-                </a14:hiddenLine>
-              </a:ext>
-              <a:ext uri="{AF507438-7753-43E0-B8FC-AC1667EBCBE1}">
-                <a14:hiddenEffects xmlns:a14="http://schemas.microsoft.com/office/drawing/2010/main">
-                  <a:effectLst>
-                    <a:outerShdw dist="35921" dir="2700000" algn="ctr" rotWithShape="0">
-                      <a:schemeClr val="bg2"/>
-                    </a:outerShdw>
-                  </a:effectLst>
-                </a14:hiddenEffects>
-              </a:ext>
-            </a:extLst>
-          </p:spPr>
-        </p:pic>
-        <p:pic>
-          <p:nvPicPr>
-            <p:cNvPr id="8" name="Picture 5"/>
-            <p:cNvPicPr>
-              <a:picLocks noChangeArrowheads="1"/>
-            </p:cNvPicPr>
-            <p:nvPr/>
-          </p:nvPicPr>
-          <p:blipFill>
-            <a:blip r:embed="rId2" cstate="print">
-              <a:extLst>
-                <a:ext uri="{28A0092B-C50C-407E-A947-70E740481C1C}">
-                  <a14:useLocalDpi xmlns:a14="http://schemas.microsoft.com/office/drawing/2010/main" val="0"/>
-                </a:ext>
-              </a:extLst>
-            </a:blip>
-            <a:srcRect/>
-            <a:stretch>
-              <a:fillRect/>
-            </a:stretch>
-          </p:blipFill>
-          <p:spPr bwMode="auto">
-            <a:xfrm>
-              <a:off x="3088" y="2128"/>
-              <a:ext cx="102" cy="102"/>
-            </a:xfrm>
-            <a:prstGeom prst="rect">
-              <a:avLst/>
-            </a:prstGeom>
-            <a:noFill/>
-            <a:ln>
-              <a:noFill/>
-            </a:ln>
-            <a:effectLst/>
-            <a:extLst>
-              <a:ext uri="{909E8E84-426E-40DD-AFC4-6F175D3DCCD1}">
-                <a14:hiddenFill xmlns:a14="http://schemas.microsoft.com/office/drawing/2010/main">
-                  <a:solidFill>
-                    <a:schemeClr val="accent1"/>
-                  </a:solidFill>
-                </a14:hiddenFill>
-              </a:ext>
-              <a:ext uri="{91240B29-F687-4F45-9708-019B960494DF}">
-                <a14:hiddenLine xmlns:a14="http://schemas.microsoft.com/office/drawing/2010/main" w="9525">
-                  <a:solidFill>
-                    <a:schemeClr val="tx1"/>
-                  </a:solidFill>
-                  <a:miter lim="800000"/>
-                  <a:headEnd/>
-                  <a:tailEnd/>
-                </a14:hiddenLine>
-              </a:ext>
-              <a:ext uri="{AF507438-7753-43E0-B8FC-AC1667EBCBE1}">
-                <a14:hiddenEffects xmlns:a14="http://schemas.microsoft.com/office/drawing/2010/main">
-                  <a:effectLst>
-                    <a:outerShdw dist="35921" dir="2700000" algn="ctr" rotWithShape="0">
-                      <a:schemeClr val="bg2"/>
-                    </a:outerShdw>
-                  </a:effectLst>
-                </a14:hiddenEffects>
-              </a:ext>
-            </a:extLst>
-          </p:spPr>
-        </p:pic>
-        <p:pic>
-          <p:nvPicPr>
-            <p:cNvPr id="9" name="Picture 6"/>
-            <p:cNvPicPr>
-              <a:picLocks noChangeArrowheads="1"/>
-            </p:cNvPicPr>
-            <p:nvPr/>
-          </p:nvPicPr>
-          <p:blipFill>
-            <a:blip r:embed="rId2" cstate="print">
-              <a:extLst>
-                <a:ext uri="{28A0092B-C50C-407E-A947-70E740481C1C}">
-                  <a14:useLocalDpi xmlns:a14="http://schemas.microsoft.com/office/drawing/2010/main" val="0"/>
-                </a:ext>
-              </a:extLst>
-            </a:blip>
-            <a:srcRect/>
-            <a:stretch>
-              <a:fillRect/>
-            </a:stretch>
-          </p:blipFill>
-          <p:spPr bwMode="auto">
-            <a:xfrm>
-              <a:off x="2944" y="1792"/>
-              <a:ext cx="102" cy="102"/>
-            </a:xfrm>
-            <a:prstGeom prst="rect">
-              <a:avLst/>
-            </a:prstGeom>
-            <a:noFill/>
-            <a:ln>
-              <a:noFill/>
-            </a:ln>
-            <a:effectLst/>
-            <a:extLst>
-              <a:ext uri="{909E8E84-426E-40DD-AFC4-6F175D3DCCD1}">
-                <a14:hiddenFill xmlns:a14="http://schemas.microsoft.com/office/drawing/2010/main">
-                  <a:solidFill>
-                    <a:schemeClr val="accent1"/>
-                  </a:solidFill>
-                </a14:hiddenFill>
-              </a:ext>
-              <a:ext uri="{91240B29-F687-4F45-9708-019B960494DF}">
-                <a14:hiddenLine xmlns:a14="http://schemas.microsoft.com/office/drawing/2010/main" w="9525">
-                  <a:solidFill>
-                    <a:schemeClr val="tx1"/>
-                  </a:solidFill>
-                  <a:miter lim="800000"/>
-                  <a:headEnd/>
-                  <a:tailEnd/>
-                </a14:hiddenLine>
-              </a:ext>
-              <a:ext uri="{AF507438-7753-43E0-B8FC-AC1667EBCBE1}">
-                <a14:hiddenEffects xmlns:a14="http://schemas.microsoft.com/office/drawing/2010/main">
-                  <a:effectLst>
-                    <a:outerShdw dist="35921" dir="2700000" algn="ctr" rotWithShape="0">
-                      <a:schemeClr val="bg2"/>
-                    </a:outerShdw>
-                  </a:effectLst>
-                </a14:hiddenEffects>
-              </a:ext>
-            </a:extLst>
-          </p:spPr>
-        </p:pic>
-        <p:pic>
-          <p:nvPicPr>
-            <p:cNvPr id="10" name="Picture 7"/>
-            <p:cNvPicPr>
-              <a:picLocks noChangeArrowheads="1"/>
-            </p:cNvPicPr>
-            <p:nvPr/>
-          </p:nvPicPr>
-          <p:blipFill>
-            <a:blip r:embed="rId2" cstate="print">
-              <a:extLst>
-                <a:ext uri="{28A0092B-C50C-407E-A947-70E740481C1C}">
-                  <a14:useLocalDpi xmlns:a14="http://schemas.microsoft.com/office/drawing/2010/main" val="0"/>
-                </a:ext>
-              </a:extLst>
-            </a:blip>
-            <a:srcRect/>
-            <a:stretch>
-              <a:fillRect/>
-            </a:stretch>
-          </p:blipFill>
-          <p:spPr bwMode="auto">
-            <a:xfrm>
-              <a:off x="3040" y="3040"/>
-              <a:ext cx="102" cy="102"/>
-            </a:xfrm>
-            <a:prstGeom prst="rect">
-              <a:avLst/>
-            </a:prstGeom>
-            <a:noFill/>
-            <a:ln>
-              <a:noFill/>
-            </a:ln>
-            <a:effectLst/>
-            <a:extLst>
-              <a:ext uri="{909E8E84-426E-40DD-AFC4-6F175D3DCCD1}">
-                <a14:hiddenFill xmlns:a14="http://schemas.microsoft.com/office/drawing/2010/main">
-                  <a:solidFill>
-                    <a:schemeClr val="accent1"/>
-                  </a:solidFill>
-                </a14:hiddenFill>
-              </a:ext>
-              <a:ext uri="{91240B29-F687-4F45-9708-019B960494DF}">
-                <a14:hiddenLine xmlns:a14="http://schemas.microsoft.com/office/drawing/2010/main" w="9525">
-                  <a:solidFill>
-                    <a:schemeClr val="tx1"/>
-                  </a:solidFill>
-                  <a:miter lim="800000"/>
-                  <a:headEnd/>
-                  <a:tailEnd/>
-                </a14:hiddenLine>
-              </a:ext>
-              <a:ext uri="{AF507438-7753-43E0-B8FC-AC1667EBCBE1}">
-                <a14:hiddenEffects xmlns:a14="http://schemas.microsoft.com/office/drawing/2010/main">
-                  <a:effectLst>
-                    <a:outerShdw dist="35921" dir="2700000" algn="ctr" rotWithShape="0">
-                      <a:schemeClr val="bg2"/>
-                    </a:outerShdw>
-                  </a:effectLst>
-                </a14:hiddenEffects>
-              </a:ext>
-            </a:extLst>
-          </p:spPr>
-        </p:pic>
-        <p:pic>
-          <p:nvPicPr>
-            <p:cNvPr id="11" name="Picture 8"/>
-            <p:cNvPicPr>
-              <a:picLocks noChangeArrowheads="1"/>
-            </p:cNvPicPr>
-            <p:nvPr/>
-          </p:nvPicPr>
-          <p:blipFill>
-            <a:blip r:embed="rId2" cstate="print">
-              <a:extLst>
-                <a:ext uri="{28A0092B-C50C-407E-A947-70E740481C1C}">
-                  <a14:useLocalDpi xmlns:a14="http://schemas.microsoft.com/office/drawing/2010/main" val="0"/>
-                </a:ext>
-              </a:extLst>
-            </a:blip>
-            <a:srcRect/>
-            <a:stretch>
-              <a:fillRect/>
-            </a:stretch>
-          </p:blipFill>
-          <p:spPr bwMode="auto">
-            <a:xfrm>
-              <a:off x="2752" y="3424"/>
-              <a:ext cx="102" cy="102"/>
-            </a:xfrm>
-            <a:prstGeom prst="rect">
-              <a:avLst/>
-            </a:prstGeom>
-            <a:noFill/>
-            <a:ln>
-              <a:noFill/>
-            </a:ln>
-            <a:effectLst/>
-            <a:extLst>
-              <a:ext uri="{909E8E84-426E-40DD-AFC4-6F175D3DCCD1}">
-                <a14:hiddenFill xmlns:a14="http://schemas.microsoft.com/office/drawing/2010/main">
-                  <a:solidFill>
-                    <a:schemeClr val="accent1"/>
-                  </a:solidFill>
-                </a14:hiddenFill>
-              </a:ext>
-              <a:ext uri="{91240B29-F687-4F45-9708-019B960494DF}">
-                <a14:hiddenLine xmlns:a14="http://schemas.microsoft.com/office/drawing/2010/main" w="9525">
-                  <a:solidFill>
-                    <a:schemeClr val="tx1"/>
-                  </a:solidFill>
-                  <a:miter lim="800000"/>
-                  <a:headEnd/>
-                  <a:tailEnd/>
-                </a14:hiddenLine>
-              </a:ext>
-              <a:ext uri="{AF507438-7753-43E0-B8FC-AC1667EBCBE1}">
-                <a14:hiddenEffects xmlns:a14="http://schemas.microsoft.com/office/drawing/2010/main">
-                  <a:effectLst>
-                    <a:outerShdw dist="35921" dir="2700000" algn="ctr" rotWithShape="0">
-                      <a:schemeClr val="bg2"/>
-                    </a:outerShdw>
-                  </a:effectLst>
-                </a14:hiddenEffects>
-              </a:ext>
-            </a:extLst>
-          </p:spPr>
-        </p:pic>
-        <p:pic>
-          <p:nvPicPr>
-            <p:cNvPr id="12" name="Picture 9"/>
-            <p:cNvPicPr>
-              <a:picLocks noChangeArrowheads="1"/>
-            </p:cNvPicPr>
-            <p:nvPr/>
-          </p:nvPicPr>
-          <p:blipFill>
-            <a:blip r:embed="rId2" cstate="print">
-              <a:extLst>
-                <a:ext uri="{28A0092B-C50C-407E-A947-70E740481C1C}">
-                  <a14:useLocalDpi xmlns:a14="http://schemas.microsoft.com/office/drawing/2010/main" val="0"/>
-                </a:ext>
-              </a:extLst>
-            </a:blip>
-            <a:srcRect/>
-            <a:stretch>
-              <a:fillRect/>
-            </a:stretch>
-          </p:blipFill>
-          <p:spPr bwMode="auto">
-            <a:xfrm>
-              <a:off x="496" y="1936"/>
-              <a:ext cx="102" cy="102"/>
-            </a:xfrm>
-            <a:prstGeom prst="rect">
-              <a:avLst/>
-            </a:prstGeom>
-            <a:noFill/>
-            <a:ln>
-              <a:noFill/>
-            </a:ln>
-            <a:effectLst/>
-            <a:extLst>
-              <a:ext uri="{909E8E84-426E-40DD-AFC4-6F175D3DCCD1}">
-                <a14:hiddenFill xmlns:a14="http://schemas.microsoft.com/office/drawing/2010/main">
-                  <a:solidFill>
-                    <a:schemeClr val="accent1"/>
-                  </a:solidFill>
-                </a14:hiddenFill>
-              </a:ext>
-              <a:ext uri="{91240B29-F687-4F45-9708-019B960494DF}">
-                <a14:hiddenLine xmlns:a14="http://schemas.microsoft.com/office/drawing/2010/main" w="9525">
-                  <a:solidFill>
-                    <a:schemeClr val="tx1"/>
-                  </a:solidFill>
-                  <a:miter lim="800000"/>
-                  <a:headEnd/>
-                  <a:tailEnd/>
-                </a14:hiddenLine>
-              </a:ext>
-              <a:ext uri="{AF507438-7753-43E0-B8FC-AC1667EBCBE1}">
-                <a14:hiddenEffects xmlns:a14="http://schemas.microsoft.com/office/drawing/2010/main">
-                  <a:effectLst>
-                    <a:outerShdw dist="35921" dir="2700000" algn="ctr" rotWithShape="0">
-                      <a:schemeClr val="bg2"/>
-                    </a:outerShdw>
-                  </a:effectLst>
-                </a14:hiddenEffects>
-              </a:ext>
-            </a:extLst>
-          </p:spPr>
-        </p:pic>
-        <p:pic>
-          <p:nvPicPr>
-            <p:cNvPr id="13" name="Picture 10"/>
-            <p:cNvPicPr>
-              <a:picLocks noChangeArrowheads="1"/>
-            </p:cNvPicPr>
-            <p:nvPr/>
-          </p:nvPicPr>
-          <p:blipFill>
-            <a:blip r:embed="rId2" cstate="print">
-              <a:extLst>
-                <a:ext uri="{28A0092B-C50C-407E-A947-70E740481C1C}">
-                  <a14:useLocalDpi xmlns:a14="http://schemas.microsoft.com/office/drawing/2010/main" val="0"/>
-                </a:ext>
-              </a:extLst>
-            </a:blip>
-            <a:srcRect/>
-            <a:stretch>
-              <a:fillRect/>
-            </a:stretch>
-          </p:blipFill>
-          <p:spPr bwMode="auto">
-            <a:xfrm>
-              <a:off x="448" y="2944"/>
-              <a:ext cx="102" cy="102"/>
-            </a:xfrm>
-            <a:prstGeom prst="rect">
-              <a:avLst/>
-            </a:prstGeom>
-            <a:noFill/>
-            <a:ln>
-              <a:noFill/>
-            </a:ln>
-            <a:effectLst/>
-            <a:extLst>
-              <a:ext uri="{909E8E84-426E-40DD-AFC4-6F175D3DCCD1}">
-                <a14:hiddenFill xmlns:a14="http://schemas.microsoft.com/office/drawing/2010/main">
-                  <a:solidFill>
-                    <a:schemeClr val="accent1"/>
-                  </a:solidFill>
-                </a14:hiddenFill>
-              </a:ext>
-              <a:ext uri="{91240B29-F687-4F45-9708-019B960494DF}">
-                <a14:hiddenLine xmlns:a14="http://schemas.microsoft.com/office/drawing/2010/main" w="9525">
-                  <a:solidFill>
-                    <a:schemeClr val="tx1"/>
-                  </a:solidFill>
-                  <a:miter lim="800000"/>
-                  <a:headEnd/>
-                  <a:tailEnd/>
-                </a14:hiddenLine>
-              </a:ext>
-              <a:ext uri="{AF507438-7753-43E0-B8FC-AC1667EBCBE1}">
-                <a14:hiddenEffects xmlns:a14="http://schemas.microsoft.com/office/drawing/2010/main">
-                  <a:effectLst>
-                    <a:outerShdw dist="35921" dir="2700000" algn="ctr" rotWithShape="0">
-                      <a:schemeClr val="bg2"/>
-                    </a:outerShdw>
-                  </a:effectLst>
-                </a14:hiddenEffects>
-              </a:ext>
-            </a:extLst>
-          </p:spPr>
-        </p:pic>
-        <p:pic>
-          <p:nvPicPr>
-            <p:cNvPr id="14" name="Picture 11"/>
-            <p:cNvPicPr>
-              <a:picLocks noChangeArrowheads="1"/>
-            </p:cNvPicPr>
-            <p:nvPr/>
-          </p:nvPicPr>
-          <p:blipFill>
-            <a:blip r:embed="rId2" cstate="print">
-              <a:extLst>
-                <a:ext uri="{28A0092B-C50C-407E-A947-70E740481C1C}">
-                  <a14:useLocalDpi xmlns:a14="http://schemas.microsoft.com/office/drawing/2010/main" val="0"/>
-                </a:ext>
-              </a:extLst>
-            </a:blip>
-            <a:srcRect/>
-            <a:stretch>
-              <a:fillRect/>
-            </a:stretch>
-          </p:blipFill>
-          <p:spPr bwMode="auto">
-            <a:xfrm>
-              <a:off x="688" y="1648"/>
-              <a:ext cx="102" cy="102"/>
-            </a:xfrm>
-            <a:prstGeom prst="rect">
-              <a:avLst/>
-            </a:prstGeom>
-            <a:noFill/>
-            <a:ln>
-              <a:noFill/>
-            </a:ln>
-            <a:effectLst/>
-            <a:extLst>
-              <a:ext uri="{909E8E84-426E-40DD-AFC4-6F175D3DCCD1}">
-                <a14:hiddenFill xmlns:a14="http://schemas.microsoft.com/office/drawing/2010/main">
-                  <a:solidFill>
-                    <a:schemeClr val="accent1"/>
-                  </a:solidFill>
-                </a14:hiddenFill>
-              </a:ext>
-              <a:ext uri="{91240B29-F687-4F45-9708-019B960494DF}">
-                <a14:hiddenLine xmlns:a14="http://schemas.microsoft.com/office/drawing/2010/main" w="9525">
-                  <a:solidFill>
-                    <a:schemeClr val="tx1"/>
-                  </a:solidFill>
-                  <a:miter lim="800000"/>
-                  <a:headEnd/>
-                  <a:tailEnd/>
-                </a14:hiddenLine>
-              </a:ext>
-              <a:ext uri="{AF507438-7753-43E0-B8FC-AC1667EBCBE1}">
-                <a14:hiddenEffects xmlns:a14="http://schemas.microsoft.com/office/drawing/2010/main">
-                  <a:effectLst>
-                    <a:outerShdw dist="35921" dir="2700000" algn="ctr" rotWithShape="0">
-                      <a:schemeClr val="bg2"/>
-                    </a:outerShdw>
-                  </a:effectLst>
-                </a14:hiddenEffects>
-              </a:ext>
-            </a:extLst>
-          </p:spPr>
-        </p:pic>
-        <p:pic>
-          <p:nvPicPr>
-            <p:cNvPr id="15" name="Picture 12"/>
-            <p:cNvPicPr>
-              <a:picLocks noChangeArrowheads="1"/>
-            </p:cNvPicPr>
-            <p:nvPr/>
-          </p:nvPicPr>
-          <p:blipFill>
-            <a:blip r:embed="rId2" cstate="print">
-              <a:extLst>
-                <a:ext uri="{28A0092B-C50C-407E-A947-70E740481C1C}">
-                  <a14:useLocalDpi xmlns:a14="http://schemas.microsoft.com/office/drawing/2010/main" val="0"/>
-                </a:ext>
-              </a:extLst>
-            </a:blip>
-            <a:srcRect/>
-            <a:stretch>
-              <a:fillRect/>
-            </a:stretch>
-          </p:blipFill>
-          <p:spPr bwMode="auto">
-            <a:xfrm>
-              <a:off x="1216" y="1264"/>
-              <a:ext cx="102" cy="102"/>
-            </a:xfrm>
-            <a:prstGeom prst="rect">
-              <a:avLst/>
-            </a:prstGeom>
-            <a:noFill/>
-            <a:ln>
-              <a:noFill/>
-            </a:ln>
-            <a:effectLst/>
-            <a:extLst>
-              <a:ext uri="{909E8E84-426E-40DD-AFC4-6F175D3DCCD1}">
-                <a14:hiddenFill xmlns:a14="http://schemas.microsoft.com/office/drawing/2010/main">
-                  <a:solidFill>
-                    <a:schemeClr val="accent1"/>
-                  </a:solidFill>
-                </a14:hiddenFill>
-              </a:ext>
-              <a:ext uri="{91240B29-F687-4F45-9708-019B960494DF}">
-                <a14:hiddenLine xmlns:a14="http://schemas.microsoft.com/office/drawing/2010/main" w="9525">
-                  <a:solidFill>
-                    <a:schemeClr val="tx1"/>
-                  </a:solidFill>
-                  <a:miter lim="800000"/>
-                  <a:headEnd/>
-                  <a:tailEnd/>
-                </a14:hiddenLine>
-              </a:ext>
-              <a:ext uri="{AF507438-7753-43E0-B8FC-AC1667EBCBE1}">
-                <a14:hiddenEffects xmlns:a14="http://schemas.microsoft.com/office/drawing/2010/main">
-                  <a:effectLst>
-                    <a:outerShdw dist="35921" dir="2700000" algn="ctr" rotWithShape="0">
-                      <a:schemeClr val="bg2"/>
-                    </a:outerShdw>
-                  </a:effectLst>
-                </a14:hiddenEffects>
-              </a:ext>
-            </a:extLst>
-          </p:spPr>
-        </p:pic>
-        <p:pic>
-          <p:nvPicPr>
-            <p:cNvPr id="16" name="Picture 13"/>
-            <p:cNvPicPr>
-              <a:picLocks noChangeArrowheads="1"/>
-            </p:cNvPicPr>
-            <p:nvPr/>
-          </p:nvPicPr>
-          <p:blipFill>
-            <a:blip r:embed="rId2" cstate="print">
-              <a:extLst>
-                <a:ext uri="{28A0092B-C50C-407E-A947-70E740481C1C}">
-                  <a14:useLocalDpi xmlns:a14="http://schemas.microsoft.com/office/drawing/2010/main" val="0"/>
-                </a:ext>
-              </a:extLst>
-            </a:blip>
-            <a:srcRect/>
-            <a:stretch>
-              <a:fillRect/>
-            </a:stretch>
-          </p:blipFill>
-          <p:spPr bwMode="auto">
-            <a:xfrm>
-              <a:off x="1696" y="3856"/>
-              <a:ext cx="102" cy="102"/>
-            </a:xfrm>
-            <a:prstGeom prst="rect">
-              <a:avLst/>
-            </a:prstGeom>
-            <a:noFill/>
-            <a:ln>
-              <a:noFill/>
-            </a:ln>
-            <a:effectLst/>
-            <a:extLst>
-              <a:ext uri="{909E8E84-426E-40DD-AFC4-6F175D3DCCD1}">
-                <a14:hiddenFill xmlns:a14="http://schemas.microsoft.com/office/drawing/2010/main">
-                  <a:solidFill>
-                    <a:schemeClr val="accent1"/>
-                  </a:solidFill>
-                </a14:hiddenFill>
-              </a:ext>
-              <a:ext uri="{91240B29-F687-4F45-9708-019B960494DF}">
-                <a14:hiddenLine xmlns:a14="http://schemas.microsoft.com/office/drawing/2010/main" w="9525">
-                  <a:solidFill>
-                    <a:schemeClr val="tx1"/>
-                  </a:solidFill>
-                  <a:miter lim="800000"/>
-                  <a:headEnd/>
-                  <a:tailEnd/>
-                </a14:hiddenLine>
-              </a:ext>
-              <a:ext uri="{AF507438-7753-43E0-B8FC-AC1667EBCBE1}">
-                <a14:hiddenEffects xmlns:a14="http://schemas.microsoft.com/office/drawing/2010/main">
-                  <a:effectLst>
-                    <a:outerShdw dist="35921" dir="2700000" algn="ctr" rotWithShape="0">
-                      <a:schemeClr val="bg2"/>
-                    </a:outerShdw>
-                  </a:effectLst>
-                </a14:hiddenEffects>
-              </a:ext>
-            </a:extLst>
-          </p:spPr>
-        </p:pic>
-        <p:pic>
-          <p:nvPicPr>
-            <p:cNvPr id="17" name="Picture 14"/>
-            <p:cNvPicPr>
-              <a:picLocks noChangeArrowheads="1"/>
-            </p:cNvPicPr>
-            <p:nvPr/>
-          </p:nvPicPr>
-          <p:blipFill>
-            <a:blip r:embed="rId2" cstate="print">
-              <a:extLst>
-                <a:ext uri="{28A0092B-C50C-407E-A947-70E740481C1C}">
-                  <a14:useLocalDpi xmlns:a14="http://schemas.microsoft.com/office/drawing/2010/main" val="0"/>
-                </a:ext>
-              </a:extLst>
-            </a:blip>
-            <a:srcRect/>
-            <a:stretch>
-              <a:fillRect/>
-            </a:stretch>
-          </p:blipFill>
-          <p:spPr bwMode="auto">
-            <a:xfrm>
-              <a:off x="2128" y="1168"/>
-              <a:ext cx="102" cy="102"/>
-            </a:xfrm>
-            <a:prstGeom prst="rect">
-              <a:avLst/>
-            </a:prstGeom>
-            <a:noFill/>
-            <a:ln>
-              <a:noFill/>
-            </a:ln>
-            <a:effectLst/>
-            <a:extLst>
-              <a:ext uri="{909E8E84-426E-40DD-AFC4-6F175D3DCCD1}">
-                <a14:hiddenFill xmlns:a14="http://schemas.microsoft.com/office/drawing/2010/main">
-                  <a:solidFill>
-                    <a:schemeClr val="accent1"/>
-                  </a:solidFill>
-                </a14:hiddenFill>
-              </a:ext>
-              <a:ext uri="{91240B29-F687-4F45-9708-019B960494DF}">
-                <a14:hiddenLine xmlns:a14="http://schemas.microsoft.com/office/drawing/2010/main" w="9525">
-                  <a:solidFill>
-                    <a:schemeClr val="tx1"/>
-                  </a:solidFill>
-                  <a:miter lim="800000"/>
-                  <a:headEnd/>
-                  <a:tailEnd/>
-                </a14:hiddenLine>
-              </a:ext>
-              <a:ext uri="{AF507438-7753-43E0-B8FC-AC1667EBCBE1}">
-                <a14:hiddenEffects xmlns:a14="http://schemas.microsoft.com/office/drawing/2010/main">
-                  <a:effectLst>
-                    <a:outerShdw dist="35921" dir="2700000" algn="ctr" rotWithShape="0">
-                      <a:schemeClr val="bg2"/>
-                    </a:outerShdw>
-                  </a:effectLst>
-                </a14:hiddenEffects>
-              </a:ext>
-            </a:extLst>
-          </p:spPr>
-        </p:pic>
-        <p:pic>
-          <p:nvPicPr>
-            <p:cNvPr id="18" name="Picture 15"/>
-            <p:cNvPicPr>
-              <a:picLocks noChangeArrowheads="1"/>
-            </p:cNvPicPr>
-            <p:nvPr/>
-          </p:nvPicPr>
-          <p:blipFill>
-            <a:blip r:embed="rId2" cstate="print">
-              <a:extLst>
-                <a:ext uri="{28A0092B-C50C-407E-A947-70E740481C1C}">
-                  <a14:useLocalDpi xmlns:a14="http://schemas.microsoft.com/office/drawing/2010/main" val="0"/>
-                </a:ext>
-              </a:extLst>
-            </a:blip>
-            <a:srcRect/>
-            <a:stretch>
-              <a:fillRect/>
-            </a:stretch>
-          </p:blipFill>
-          <p:spPr bwMode="auto">
-            <a:xfrm>
-              <a:off x="832" y="1504"/>
-              <a:ext cx="102" cy="102"/>
-            </a:xfrm>
-            <a:prstGeom prst="rect">
-              <a:avLst/>
-            </a:prstGeom>
-            <a:noFill/>
-            <a:ln>
-              <a:noFill/>
-            </a:ln>
-            <a:effectLst/>
-            <a:extLst>
-              <a:ext uri="{909E8E84-426E-40DD-AFC4-6F175D3DCCD1}">
-                <a14:hiddenFill xmlns:a14="http://schemas.microsoft.com/office/drawing/2010/main">
-                  <a:solidFill>
-                    <a:schemeClr val="accent1"/>
-                  </a:solidFill>
-                </a14:hiddenFill>
-              </a:ext>
-              <a:ext uri="{91240B29-F687-4F45-9708-019B960494DF}">
-                <a14:hiddenLine xmlns:a14="http://schemas.microsoft.com/office/drawing/2010/main" w="9525">
-                  <a:solidFill>
-                    <a:schemeClr val="tx1"/>
-                  </a:solidFill>
-                  <a:miter lim="800000"/>
-                  <a:headEnd/>
-                  <a:tailEnd/>
-                </a14:hiddenLine>
-              </a:ext>
-              <a:ext uri="{AF507438-7753-43E0-B8FC-AC1667EBCBE1}">
-                <a14:hiddenEffects xmlns:a14="http://schemas.microsoft.com/office/drawing/2010/main">
-                  <a:effectLst>
-                    <a:outerShdw dist="35921" dir="2700000" algn="ctr" rotWithShape="0">
-                      <a:schemeClr val="bg2"/>
-                    </a:outerShdw>
-                  </a:effectLst>
-                </a14:hiddenEffects>
-              </a:ext>
-            </a:extLst>
-          </p:spPr>
-        </p:pic>
-        <p:pic>
-          <p:nvPicPr>
-            <p:cNvPr id="19" name="Picture 16"/>
-            <p:cNvPicPr>
-              <a:picLocks noChangeArrowheads="1"/>
-            </p:cNvPicPr>
-            <p:nvPr/>
-          </p:nvPicPr>
-          <p:blipFill>
-            <a:blip r:embed="rId2" cstate="print">
-              <a:extLst>
-                <a:ext uri="{28A0092B-C50C-407E-A947-70E740481C1C}">
-                  <a14:useLocalDpi xmlns:a14="http://schemas.microsoft.com/office/drawing/2010/main" val="0"/>
-                </a:ext>
-              </a:extLst>
-            </a:blip>
-            <a:srcRect/>
-            <a:stretch>
-              <a:fillRect/>
-            </a:stretch>
-          </p:blipFill>
-          <p:spPr bwMode="auto">
-            <a:xfrm>
-              <a:off x="352" y="2608"/>
-              <a:ext cx="102" cy="102"/>
-            </a:xfrm>
-            <a:prstGeom prst="rect">
-              <a:avLst/>
-            </a:prstGeom>
-            <a:noFill/>
-            <a:ln>
-              <a:noFill/>
-            </a:ln>
-            <a:effectLst/>
-            <a:extLst>
-              <a:ext uri="{909E8E84-426E-40DD-AFC4-6F175D3DCCD1}">
-                <a14:hiddenFill xmlns:a14="http://schemas.microsoft.com/office/drawing/2010/main">
-                  <a:solidFill>
-                    <a:schemeClr val="accent1"/>
-                  </a:solidFill>
-                </a14:hiddenFill>
-              </a:ext>
-              <a:ext uri="{91240B29-F687-4F45-9708-019B960494DF}">
-                <a14:hiddenLine xmlns:a14="http://schemas.microsoft.com/office/drawing/2010/main" w="9525">
-                  <a:solidFill>
-                    <a:schemeClr val="tx1"/>
-                  </a:solidFill>
-                  <a:miter lim="800000"/>
-                  <a:headEnd/>
-                  <a:tailEnd/>
-                </a14:hiddenLine>
-              </a:ext>
-              <a:ext uri="{AF507438-7753-43E0-B8FC-AC1667EBCBE1}">
-                <a14:hiddenEffects xmlns:a14="http://schemas.microsoft.com/office/drawing/2010/main">
-                  <a:effectLst>
-                    <a:outerShdw dist="35921" dir="2700000" algn="ctr" rotWithShape="0">
-                      <a:schemeClr val="bg2"/>
-                    </a:outerShdw>
-                  </a:effectLst>
-                </a14:hiddenEffects>
-              </a:ext>
-            </a:extLst>
-          </p:spPr>
-        </p:pic>
-        <p:pic>
-          <p:nvPicPr>
-            <p:cNvPr id="20" name="Picture 17"/>
-            <p:cNvPicPr>
-              <a:picLocks noChangeArrowheads="1"/>
-            </p:cNvPicPr>
-            <p:nvPr/>
-          </p:nvPicPr>
-          <p:blipFill>
-            <a:blip r:embed="rId2" cstate="print">
-              <a:extLst>
-                <a:ext uri="{28A0092B-C50C-407E-A947-70E740481C1C}">
-                  <a14:useLocalDpi xmlns:a14="http://schemas.microsoft.com/office/drawing/2010/main" val="0"/>
-                </a:ext>
-              </a:extLst>
-            </a:blip>
-            <a:srcRect/>
-            <a:stretch>
-              <a:fillRect/>
-            </a:stretch>
-          </p:blipFill>
-          <p:spPr bwMode="auto">
-            <a:xfrm>
-              <a:off x="1258" y="3772"/>
-              <a:ext cx="102" cy="102"/>
-            </a:xfrm>
-            <a:prstGeom prst="rect">
-              <a:avLst/>
-            </a:prstGeom>
-            <a:noFill/>
-            <a:ln>
-              <a:noFill/>
-            </a:ln>
-            <a:effectLst/>
-            <a:extLst>
-              <a:ext uri="{909E8E84-426E-40DD-AFC4-6F175D3DCCD1}">
-                <a14:hiddenFill xmlns:a14="http://schemas.microsoft.com/office/drawing/2010/main">
-                  <a:solidFill>
-                    <a:schemeClr val="accent1"/>
-                  </a:solidFill>
-                </a14:hiddenFill>
-              </a:ext>
-              <a:ext uri="{91240B29-F687-4F45-9708-019B960494DF}">
-                <a14:hiddenLine xmlns:a14="http://schemas.microsoft.com/office/drawing/2010/main" w="9525">
-                  <a:solidFill>
-                    <a:schemeClr val="tx1"/>
-                  </a:solidFill>
-                  <a:miter lim="800000"/>
-                  <a:headEnd/>
-                  <a:tailEnd/>
-                </a14:hiddenLine>
-              </a:ext>
-              <a:ext uri="{AF507438-7753-43E0-B8FC-AC1667EBCBE1}">
-                <a14:hiddenEffects xmlns:a14="http://schemas.microsoft.com/office/drawing/2010/main">
-                  <a:effectLst>
-                    <a:outerShdw dist="35921" dir="2700000" algn="ctr" rotWithShape="0">
-                      <a:schemeClr val="bg2"/>
-                    </a:outerShdw>
-                  </a:effectLst>
-                </a14:hiddenEffects>
-              </a:ext>
-            </a:extLst>
-          </p:spPr>
-        </p:pic>
-        <p:pic>
-          <p:nvPicPr>
-            <p:cNvPr id="21" name="Picture 18"/>
-            <p:cNvPicPr>
-              <a:picLocks noChangeArrowheads="1"/>
-            </p:cNvPicPr>
-            <p:nvPr/>
-          </p:nvPicPr>
-          <p:blipFill>
-            <a:blip r:embed="rId2" cstate="print">
-              <a:extLst>
-                <a:ext uri="{28A0092B-C50C-407E-A947-70E740481C1C}">
-                  <a14:useLocalDpi xmlns:a14="http://schemas.microsoft.com/office/drawing/2010/main" val="0"/>
-                </a:ext>
-              </a:extLst>
-            </a:blip>
-            <a:srcRect/>
-            <a:stretch>
-              <a:fillRect/>
-            </a:stretch>
-          </p:blipFill>
-          <p:spPr bwMode="auto">
-            <a:xfrm>
-              <a:off x="544" y="3184"/>
-              <a:ext cx="102" cy="102"/>
-            </a:xfrm>
-            <a:prstGeom prst="rect">
-              <a:avLst/>
-            </a:prstGeom>
-            <a:noFill/>
-            <a:ln>
-              <a:noFill/>
-            </a:ln>
-            <a:effectLst/>
-            <a:extLst>
-              <a:ext uri="{909E8E84-426E-40DD-AFC4-6F175D3DCCD1}">
-                <a14:hiddenFill xmlns:a14="http://schemas.microsoft.com/office/drawing/2010/main">
-                  <a:solidFill>
-                    <a:schemeClr val="accent1"/>
-                  </a:solidFill>
-                </a14:hiddenFill>
-              </a:ext>
-              <a:ext uri="{91240B29-F687-4F45-9708-019B960494DF}">
-                <a14:hiddenLine xmlns:a14="http://schemas.microsoft.com/office/drawing/2010/main" w="9525">
-                  <a:solidFill>
-                    <a:schemeClr val="tx1"/>
-                  </a:solidFill>
-                  <a:miter lim="800000"/>
-                  <a:headEnd/>
-                  <a:tailEnd/>
-                </a14:hiddenLine>
-              </a:ext>
-              <a:ext uri="{AF507438-7753-43E0-B8FC-AC1667EBCBE1}">
-                <a14:hiddenEffects xmlns:a14="http://schemas.microsoft.com/office/drawing/2010/main">
-                  <a:effectLst>
-                    <a:outerShdw dist="35921" dir="2700000" algn="ctr" rotWithShape="0">
-                      <a:schemeClr val="bg2"/>
-                    </a:outerShdw>
-                  </a:effectLst>
-                </a14:hiddenEffects>
-              </a:ext>
-            </a:extLst>
-          </p:spPr>
-        </p:pic>
-        <p:pic>
-          <p:nvPicPr>
-            <p:cNvPr id="22" name="Picture 19"/>
-            <p:cNvPicPr>
-              <a:picLocks noChangeArrowheads="1"/>
-            </p:cNvPicPr>
-            <p:nvPr/>
-          </p:nvPicPr>
-          <p:blipFill>
-            <a:blip r:embed="rId2" cstate="print">
-              <a:extLst>
-                <a:ext uri="{28A0092B-C50C-407E-A947-70E740481C1C}">
-                  <a14:useLocalDpi xmlns:a14="http://schemas.microsoft.com/office/drawing/2010/main" val="0"/>
-                </a:ext>
-              </a:extLst>
-            </a:blip>
-            <a:srcRect/>
-            <a:stretch>
-              <a:fillRect/>
-            </a:stretch>
-          </p:blipFill>
-          <p:spPr bwMode="auto">
-            <a:xfrm>
-              <a:off x="1120" y="3712"/>
-              <a:ext cx="102" cy="102"/>
-            </a:xfrm>
-            <a:prstGeom prst="rect">
-              <a:avLst/>
-            </a:prstGeom>
-            <a:noFill/>
-            <a:ln>
-              <a:noFill/>
-            </a:ln>
-            <a:effectLst/>
-            <a:extLst>
-              <a:ext uri="{909E8E84-426E-40DD-AFC4-6F175D3DCCD1}">
-                <a14:hiddenFill xmlns:a14="http://schemas.microsoft.com/office/drawing/2010/main">
-                  <a:solidFill>
-                    <a:schemeClr val="accent1"/>
-                  </a:solidFill>
-                </a14:hiddenFill>
-              </a:ext>
-              <a:ext uri="{91240B29-F687-4F45-9708-019B960494DF}">
-                <a14:hiddenLine xmlns:a14="http://schemas.microsoft.com/office/drawing/2010/main" w="9525">
-                  <a:solidFill>
-                    <a:schemeClr val="tx1"/>
-                  </a:solidFill>
-                  <a:miter lim="800000"/>
-                  <a:headEnd/>
-                  <a:tailEnd/>
-                </a14:hiddenLine>
-              </a:ext>
-              <a:ext uri="{AF507438-7753-43E0-B8FC-AC1667EBCBE1}">
-                <a14:hiddenEffects xmlns:a14="http://schemas.microsoft.com/office/drawing/2010/main">
-                  <a:effectLst>
-                    <a:outerShdw dist="35921" dir="2700000" algn="ctr" rotWithShape="0">
-                      <a:schemeClr val="bg2"/>
-                    </a:outerShdw>
-                  </a:effectLst>
-                </a14:hiddenEffects>
-              </a:ext>
-            </a:extLst>
-          </p:spPr>
-        </p:pic>
-        <p:pic>
-          <p:nvPicPr>
-            <p:cNvPr id="23" name="Picture 20"/>
-            <p:cNvPicPr>
-              <a:picLocks noChangeArrowheads="1"/>
-            </p:cNvPicPr>
-            <p:nvPr/>
-          </p:nvPicPr>
-          <p:blipFill>
-            <a:blip r:embed="rId2" cstate="print">
-              <a:extLst>
-                <a:ext uri="{28A0092B-C50C-407E-A947-70E740481C1C}">
-                  <a14:useLocalDpi xmlns:a14="http://schemas.microsoft.com/office/drawing/2010/main" val="0"/>
-                </a:ext>
-              </a:extLst>
-            </a:blip>
-            <a:srcRect/>
-            <a:stretch>
-              <a:fillRect/>
-            </a:stretch>
-          </p:blipFill>
-          <p:spPr bwMode="auto">
-            <a:xfrm>
-              <a:off x="2560" y="3616"/>
-              <a:ext cx="102" cy="102"/>
-            </a:xfrm>
-            <a:prstGeom prst="rect">
-              <a:avLst/>
-            </a:prstGeom>
-            <a:noFill/>
-            <a:ln>
-              <a:noFill/>
-            </a:ln>
-            <a:effectLst/>
-            <a:extLst>
-              <a:ext uri="{909E8E84-426E-40DD-AFC4-6F175D3DCCD1}">
-                <a14:hiddenFill xmlns:a14="http://schemas.microsoft.com/office/drawing/2010/main">
-                  <a:solidFill>
-                    <a:schemeClr val="accent1"/>
-                  </a:solidFill>
-                </a14:hiddenFill>
-              </a:ext>
-              <a:ext uri="{91240B29-F687-4F45-9708-019B960494DF}">
-                <a14:hiddenLine xmlns:a14="http://schemas.microsoft.com/office/drawing/2010/main" w="9525">
-                  <a:solidFill>
-                    <a:schemeClr val="tx1"/>
-                  </a:solidFill>
-                  <a:miter lim="800000"/>
-                  <a:headEnd/>
-                  <a:tailEnd/>
-                </a14:hiddenLine>
-              </a:ext>
-              <a:ext uri="{AF507438-7753-43E0-B8FC-AC1667EBCBE1}">
-                <a14:hiddenEffects xmlns:a14="http://schemas.microsoft.com/office/drawing/2010/main">
-                  <a:effectLst>
-                    <a:outerShdw dist="35921" dir="2700000" algn="ctr" rotWithShape="0">
-                      <a:schemeClr val="bg2"/>
-                    </a:outerShdw>
-                  </a:effectLst>
-                </a14:hiddenEffects>
-              </a:ext>
-            </a:extLst>
-          </p:spPr>
-        </p:pic>
-        <p:pic>
-          <p:nvPicPr>
-            <p:cNvPr id="24" name="Picture 21"/>
-            <p:cNvPicPr>
-              <a:picLocks noChangeArrowheads="1"/>
-            </p:cNvPicPr>
-            <p:nvPr/>
-          </p:nvPicPr>
-          <p:blipFill>
-            <a:blip r:embed="rId2" cstate="print">
-              <a:extLst>
-                <a:ext uri="{28A0092B-C50C-407E-A947-70E740481C1C}">
-                  <a14:useLocalDpi xmlns:a14="http://schemas.microsoft.com/office/drawing/2010/main" val="0"/>
-                </a:ext>
-              </a:extLst>
-            </a:blip>
-            <a:srcRect/>
-            <a:stretch>
-              <a:fillRect/>
-            </a:stretch>
-          </p:blipFill>
-          <p:spPr bwMode="auto">
-            <a:xfrm>
-              <a:off x="1456" y="1168"/>
-              <a:ext cx="102" cy="102"/>
-            </a:xfrm>
-            <a:prstGeom prst="rect">
-              <a:avLst/>
-            </a:prstGeom>
-            <a:noFill/>
-            <a:ln>
-              <a:noFill/>
-            </a:ln>
-            <a:effectLst/>
-            <a:extLst>
-              <a:ext uri="{909E8E84-426E-40DD-AFC4-6F175D3DCCD1}">
-                <a14:hiddenFill xmlns:a14="http://schemas.microsoft.com/office/drawing/2010/main">
-                  <a:solidFill>
-                    <a:schemeClr val="accent1"/>
-                  </a:solidFill>
-                </a14:hiddenFill>
-              </a:ext>
-              <a:ext uri="{91240B29-F687-4F45-9708-019B960494DF}">
-                <a14:hiddenLine xmlns:a14="http://schemas.microsoft.com/office/drawing/2010/main" w="9525">
-                  <a:solidFill>
-                    <a:schemeClr val="tx1"/>
-                  </a:solidFill>
-                  <a:miter lim="800000"/>
-                  <a:headEnd/>
-                  <a:tailEnd/>
-                </a14:hiddenLine>
-              </a:ext>
-              <a:ext uri="{AF507438-7753-43E0-B8FC-AC1667EBCBE1}">
-                <a14:hiddenEffects xmlns:a14="http://schemas.microsoft.com/office/drawing/2010/main">
-                  <a:effectLst>
-                    <a:outerShdw dist="35921" dir="2700000" algn="ctr" rotWithShape="0">
-                      <a:schemeClr val="bg2"/>
-                    </a:outerShdw>
-                  </a:effectLst>
-                </a14:hiddenEffects>
-              </a:ext>
-            </a:extLst>
-          </p:spPr>
-        </p:pic>
-        <p:pic>
-          <p:nvPicPr>
-            <p:cNvPr id="25" name="Picture 22"/>
-            <p:cNvPicPr>
-              <a:picLocks noChangeArrowheads="1"/>
-            </p:cNvPicPr>
-            <p:nvPr/>
-          </p:nvPicPr>
-          <p:blipFill>
-            <a:blip r:embed="rId2" cstate="print">
-              <a:extLst>
-                <a:ext uri="{28A0092B-C50C-407E-A947-70E740481C1C}">
-                  <a14:useLocalDpi xmlns:a14="http://schemas.microsoft.com/office/drawing/2010/main" val="0"/>
-                </a:ext>
-              </a:extLst>
-            </a:blip>
-            <a:srcRect/>
-            <a:stretch>
-              <a:fillRect/>
-            </a:stretch>
-          </p:blipFill>
-          <p:spPr bwMode="auto">
-            <a:xfrm>
-              <a:off x="2528" y="1367"/>
-              <a:ext cx="102" cy="102"/>
-            </a:xfrm>
-            <a:prstGeom prst="rect">
-              <a:avLst/>
-            </a:prstGeom>
-            <a:noFill/>
-            <a:ln>
-              <a:noFill/>
-            </a:ln>
-            <a:effectLst/>
-            <a:extLst>
-              <a:ext uri="{909E8E84-426E-40DD-AFC4-6F175D3DCCD1}">
-                <a14:hiddenFill xmlns:a14="http://schemas.microsoft.com/office/drawing/2010/main">
-                  <a:solidFill>
-                    <a:schemeClr val="accent1"/>
-                  </a:solidFill>
-                </a14:hiddenFill>
-              </a:ext>
-              <a:ext uri="{91240B29-F687-4F45-9708-019B960494DF}">
-                <a14:hiddenLine xmlns:a14="http://schemas.microsoft.com/office/drawing/2010/main" w="9525">
-                  <a:solidFill>
-                    <a:schemeClr val="tx1"/>
-                  </a:solidFill>
-                  <a:miter lim="800000"/>
-                  <a:headEnd/>
-                  <a:tailEnd/>
-                </a14:hiddenLine>
-              </a:ext>
-              <a:ext uri="{AF507438-7753-43E0-B8FC-AC1667EBCBE1}">
-                <a14:hiddenEffects xmlns:a14="http://schemas.microsoft.com/office/drawing/2010/main">
-                  <a:effectLst>
-                    <a:outerShdw dist="35921" dir="2700000" algn="ctr" rotWithShape="0">
-                      <a:schemeClr val="bg2"/>
-                    </a:outerShdw>
-                  </a:effectLst>
-                </a14:hiddenEffects>
-              </a:ext>
-            </a:extLst>
-          </p:spPr>
-        </p:pic>
-        <p:pic>
-          <p:nvPicPr>
-            <p:cNvPr id="26" name="Picture 23"/>
-            <p:cNvPicPr>
-              <a:picLocks noChangeArrowheads="1"/>
-            </p:cNvPicPr>
-            <p:nvPr/>
-          </p:nvPicPr>
-          <p:blipFill>
-            <a:blip r:embed="rId2" cstate="print">
-              <a:extLst>
-                <a:ext uri="{28A0092B-C50C-407E-A947-70E740481C1C}">
-                  <a14:useLocalDpi xmlns:a14="http://schemas.microsoft.com/office/drawing/2010/main" val="0"/>
-                </a:ext>
-              </a:extLst>
-            </a:blip>
-            <a:srcRect/>
-            <a:stretch>
-              <a:fillRect/>
-            </a:stretch>
-          </p:blipFill>
-          <p:spPr bwMode="auto">
-            <a:xfrm>
-              <a:off x="400" y="2176"/>
-              <a:ext cx="102" cy="102"/>
-            </a:xfrm>
-            <a:prstGeom prst="rect">
-              <a:avLst/>
-            </a:prstGeom>
-            <a:noFill/>
-            <a:ln>
-              <a:noFill/>
-            </a:ln>
-            <a:effectLst/>
-            <a:extLst>
-              <a:ext uri="{909E8E84-426E-40DD-AFC4-6F175D3DCCD1}">
-                <a14:hiddenFill xmlns:a14="http://schemas.microsoft.com/office/drawing/2010/main">
-                  <a:solidFill>
-                    <a:schemeClr val="accent1"/>
-                  </a:solidFill>
-                </a14:hiddenFill>
-              </a:ext>
-              <a:ext uri="{91240B29-F687-4F45-9708-019B960494DF}">
-                <a14:hiddenLine xmlns:a14="http://schemas.microsoft.com/office/drawing/2010/main" w="9525">
-                  <a:solidFill>
-                    <a:schemeClr val="tx1"/>
-                  </a:solidFill>
-                  <a:miter lim="800000"/>
-                  <a:headEnd/>
-                  <a:tailEnd/>
-                </a14:hiddenLine>
-              </a:ext>
-              <a:ext uri="{AF507438-7753-43E0-B8FC-AC1667EBCBE1}">
-                <a14:hiddenEffects xmlns:a14="http://schemas.microsoft.com/office/drawing/2010/main">
-                  <a:effectLst>
-                    <a:outerShdw dist="35921" dir="2700000" algn="ctr" rotWithShape="0">
-                      <a:schemeClr val="bg2"/>
-                    </a:outerShdw>
-                  </a:effectLst>
-                </a14:hiddenEffects>
-              </a:ext>
-            </a:extLst>
-          </p:spPr>
-        </p:pic>
-        <p:pic>
-          <p:nvPicPr>
-            <p:cNvPr id="27" name="Picture 24"/>
-            <p:cNvPicPr>
-              <a:picLocks noChangeArrowheads="1"/>
-            </p:cNvPicPr>
-            <p:nvPr/>
-          </p:nvPicPr>
-          <p:blipFill>
-            <a:blip r:embed="rId2" cstate="print">
-              <a:extLst>
-                <a:ext uri="{28A0092B-C50C-407E-A947-70E740481C1C}">
-                  <a14:useLocalDpi xmlns:a14="http://schemas.microsoft.com/office/drawing/2010/main" val="0"/>
-                </a:ext>
-              </a:extLst>
-            </a:blip>
-            <a:srcRect/>
-            <a:stretch>
-              <a:fillRect/>
-            </a:stretch>
-          </p:blipFill>
-          <p:spPr bwMode="auto">
-            <a:xfrm>
-              <a:off x="2896" y="3280"/>
-              <a:ext cx="102" cy="102"/>
-            </a:xfrm>
-            <a:prstGeom prst="rect">
-              <a:avLst/>
-            </a:prstGeom>
-            <a:noFill/>
-            <a:ln>
-              <a:noFill/>
-            </a:ln>
-            <a:effectLst/>
-            <a:extLst>
-              <a:ext uri="{909E8E84-426E-40DD-AFC4-6F175D3DCCD1}">
-                <a14:hiddenFill xmlns:a14="http://schemas.microsoft.com/office/drawing/2010/main">
-                  <a:solidFill>
-                    <a:schemeClr val="accent1"/>
-                  </a:solidFill>
-                </a14:hiddenFill>
-              </a:ext>
-              <a:ext uri="{91240B29-F687-4F45-9708-019B960494DF}">
-                <a14:hiddenLine xmlns:a14="http://schemas.microsoft.com/office/drawing/2010/main" w="9525">
-                  <a:solidFill>
-                    <a:schemeClr val="tx1"/>
-                  </a:solidFill>
-                  <a:miter lim="800000"/>
-                  <a:headEnd/>
-                  <a:tailEnd/>
-                </a14:hiddenLine>
-              </a:ext>
-              <a:ext uri="{AF507438-7753-43E0-B8FC-AC1667EBCBE1}">
-                <a14:hiddenEffects xmlns:a14="http://schemas.microsoft.com/office/drawing/2010/main">
-                  <a:effectLst>
-                    <a:outerShdw dist="35921" dir="2700000" algn="ctr" rotWithShape="0">
-                      <a:schemeClr val="bg2"/>
-                    </a:outerShdw>
-                  </a:effectLst>
-                </a14:hiddenEffects>
-              </a:ext>
-            </a:extLst>
-          </p:spPr>
-        </p:pic>
-        <p:pic>
-          <p:nvPicPr>
-            <p:cNvPr id="28" name="Picture 25"/>
-            <p:cNvPicPr>
-              <a:picLocks noChangeArrowheads="1"/>
-            </p:cNvPicPr>
-            <p:nvPr/>
-          </p:nvPicPr>
-          <p:blipFill>
-            <a:blip r:embed="rId2" cstate="print">
-              <a:extLst>
-                <a:ext uri="{28A0092B-C50C-407E-A947-70E740481C1C}">
-                  <a14:useLocalDpi xmlns:a14="http://schemas.microsoft.com/office/drawing/2010/main" val="0"/>
-                </a:ext>
-              </a:extLst>
-            </a:blip>
-            <a:srcRect/>
-            <a:stretch>
-              <a:fillRect/>
-            </a:stretch>
-          </p:blipFill>
-          <p:spPr bwMode="auto">
-            <a:xfrm>
-              <a:off x="2272" y="3760"/>
-              <a:ext cx="102" cy="102"/>
-            </a:xfrm>
-            <a:prstGeom prst="rect">
-              <a:avLst/>
-            </a:prstGeom>
-            <a:noFill/>
-            <a:ln>
-              <a:noFill/>
-            </a:ln>
-            <a:effectLst/>
-            <a:extLst>
-              <a:ext uri="{909E8E84-426E-40DD-AFC4-6F175D3DCCD1}">
-                <a14:hiddenFill xmlns:a14="http://schemas.microsoft.com/office/drawing/2010/main">
-                  <a:solidFill>
-                    <a:schemeClr val="accent1"/>
-                  </a:solidFill>
-                </a14:hiddenFill>
-              </a:ext>
-              <a:ext uri="{91240B29-F687-4F45-9708-019B960494DF}">
-                <a14:hiddenLine xmlns:a14="http://schemas.microsoft.com/office/drawing/2010/main" w="9525">
-                  <a:solidFill>
-                    <a:schemeClr val="tx1"/>
-                  </a:solidFill>
-                  <a:miter lim="800000"/>
-                  <a:headEnd/>
-                  <a:tailEnd/>
-                </a14:hiddenLine>
-              </a:ext>
-              <a:ext uri="{AF507438-7753-43E0-B8FC-AC1667EBCBE1}">
-                <a14:hiddenEffects xmlns:a14="http://schemas.microsoft.com/office/drawing/2010/main">
-                  <a:effectLst>
-                    <a:outerShdw dist="35921" dir="2700000" algn="ctr" rotWithShape="0">
-                      <a:schemeClr val="bg2"/>
-                    </a:outerShdw>
-                  </a:effectLst>
-                </a14:hiddenEffects>
-              </a:ext>
-            </a:extLst>
-          </p:spPr>
-        </p:pic>
-        <p:pic>
-          <p:nvPicPr>
-            <p:cNvPr id="29" name="Picture 26"/>
-            <p:cNvPicPr>
-              <a:picLocks noChangeArrowheads="1"/>
-            </p:cNvPicPr>
-            <p:nvPr/>
-          </p:nvPicPr>
-          <p:blipFill>
-            <a:blip r:embed="rId2" cstate="print">
-              <a:extLst>
-                <a:ext uri="{28A0092B-C50C-407E-A947-70E740481C1C}">
-                  <a14:useLocalDpi xmlns:a14="http://schemas.microsoft.com/office/drawing/2010/main" val="0"/>
-                </a:ext>
-              </a:extLst>
-            </a:blip>
-            <a:srcRect/>
-            <a:stretch>
-              <a:fillRect/>
-            </a:stretch>
-          </p:blipFill>
-          <p:spPr bwMode="auto">
-            <a:xfrm>
-              <a:off x="976" y="3616"/>
-              <a:ext cx="102" cy="102"/>
-            </a:xfrm>
-            <a:prstGeom prst="rect">
-              <a:avLst/>
-            </a:prstGeom>
-            <a:noFill/>
-            <a:ln>
-              <a:noFill/>
-            </a:ln>
-            <a:effectLst/>
-            <a:extLst>
-              <a:ext uri="{909E8E84-426E-40DD-AFC4-6F175D3DCCD1}">
-                <a14:hiddenFill xmlns:a14="http://schemas.microsoft.com/office/drawing/2010/main">
-                  <a:solidFill>
-                    <a:schemeClr val="accent1"/>
-                  </a:solidFill>
-                </a14:hiddenFill>
-              </a:ext>
-              <a:ext uri="{91240B29-F687-4F45-9708-019B960494DF}">
-                <a14:hiddenLine xmlns:a14="http://schemas.microsoft.com/office/drawing/2010/main" w="9525">
-                  <a:solidFill>
-                    <a:schemeClr val="tx1"/>
-                  </a:solidFill>
-                  <a:miter lim="800000"/>
-                  <a:headEnd/>
-                  <a:tailEnd/>
-                </a14:hiddenLine>
-              </a:ext>
-              <a:ext uri="{AF507438-7753-43E0-B8FC-AC1667EBCBE1}">
-                <a14:hiddenEffects xmlns:a14="http://schemas.microsoft.com/office/drawing/2010/main">
-                  <a:effectLst>
-                    <a:outerShdw dist="35921" dir="2700000" algn="ctr" rotWithShape="0">
-                      <a:schemeClr val="bg2"/>
-                    </a:outerShdw>
-                  </a:effectLst>
-                </a14:hiddenEffects>
-              </a:ext>
-            </a:extLst>
-          </p:spPr>
-        </p:pic>
-        <p:sp>
-          <p:nvSpPr>
-            <p:cNvPr id="30" name="Line 28"/>
-            <p:cNvSpPr>
-              <a:spLocks noChangeShapeType="1"/>
-            </p:cNvSpPr>
-            <p:nvPr/>
-          </p:nvSpPr>
-          <p:spPr bwMode="auto">
-            <a:xfrm flipH="1">
-              <a:off x="2528" y="1685"/>
-              <a:ext cx="336" cy="192"/>
-            </a:xfrm>
-            <a:prstGeom prst="line">
-              <a:avLst/>
-            </a:prstGeom>
-            <a:noFill/>
-            <a:ln w="28575">
-              <a:solidFill>
-                <a:srgbClr val="FF0000"/>
-              </a:solidFill>
-              <a:round/>
-              <a:headEnd type="triangle" w="med" len="med"/>
-              <a:tailEnd type="none" w="med" len="lg"/>
-            </a:ln>
-            <a:effectLst/>
-            <a:extLst>
-              <a:ext uri="{909E8E84-426E-40DD-AFC4-6F175D3DCCD1}">
-                <a14:hiddenFill xmlns:a14="http://schemas.microsoft.com/office/drawing/2010/main">
-                  <a:noFill/>
-                </a14:hiddenFill>
-              </a:ext>
-              <a:ext uri="{AF507438-7753-43E0-B8FC-AC1667EBCBE1}">
-                <a14:hiddenEffects xmlns:a14="http://schemas.microsoft.com/office/drawing/2010/main">
-                  <a:effectLst>
-                    <a:outerShdw dist="35921" dir="2700000" algn="ctr" rotWithShape="0">
-                      <a:schemeClr val="bg2"/>
-                    </a:outerShdw>
-                  </a:effectLst>
-                </a14:hiddenEffects>
-              </a:ext>
-            </a:extLst>
-          </p:spPr>
-          <p:txBody>
-            <a:bodyPr wrap="none" anchor="ctr"/>
-            <a:lstStyle/>
-            <a:p>
-              <a:endParaRPr lang="en-US"/>
-            </a:p>
-          </p:txBody>
-        </p:sp>
-        <p:sp>
-          <p:nvSpPr>
-            <p:cNvPr id="31" name="Text Box 29"/>
-            <p:cNvSpPr txBox="1">
-              <a:spLocks noChangeArrowheads="1"/>
-            </p:cNvSpPr>
-            <p:nvPr/>
-          </p:nvSpPr>
-          <p:spPr bwMode="auto">
-            <a:xfrm>
-              <a:off x="1929" y="1936"/>
-              <a:ext cx="601" cy="327"/>
-            </a:xfrm>
-            <a:prstGeom prst="rect">
-              <a:avLst/>
-            </a:prstGeom>
-            <a:noFill/>
-            <a:ln>
-              <a:noFill/>
-            </a:ln>
-            <a:effectLst/>
-            <a:extLst>
-              <a:ext uri="{909E8E84-426E-40DD-AFC4-6F175D3DCCD1}">
-                <a14:hiddenFill xmlns:a14="http://schemas.microsoft.com/office/drawing/2010/main">
-                  <a:solidFill>
-                    <a:srgbClr val="FF0000"/>
-                  </a:solidFill>
-                </a14:hiddenFill>
-              </a:ext>
-              <a:ext uri="{91240B29-F687-4F45-9708-019B960494DF}">
-                <a14:hiddenLine xmlns:a14="http://schemas.microsoft.com/office/drawing/2010/main" w="9525">
-                  <a:solidFill>
-                    <a:schemeClr val="tx1"/>
-                  </a:solidFill>
-                  <a:miter lim="800000"/>
-                  <a:headEnd/>
-                  <a:tailEnd/>
-                </a14:hiddenLine>
-              </a:ext>
-              <a:ext uri="{AF507438-7753-43E0-B8FC-AC1667EBCBE1}">
-                <a14:hiddenEffects xmlns:a14="http://schemas.microsoft.com/office/drawing/2010/main">
-                  <a:effectLst>
-                    <a:outerShdw dist="35921" dir="2700000" algn="ctr" rotWithShape="0">
-                      <a:schemeClr val="bg2"/>
-                    </a:outerShdw>
-                  </a:effectLst>
-                </a14:hiddenEffects>
-              </a:ext>
-            </a:extLst>
-          </p:spPr>
-          <p:txBody>
-            <a:bodyPr wrap="none" anchor="ctr">
-              <a:spAutoFit/>
-            </a:bodyPr>
-            <a:lstStyle/>
-            <a:p>
-              <a:pPr eaLnBrk="0" hangingPunct="0"/>
-              <a:r>
-                <a:rPr lang="en-US" sz="2800" dirty="0" err="1">
-                  <a:solidFill>
-                    <a:srgbClr val="F74209"/>
-                  </a:solidFill>
-                </a:rPr>
-                <a:t>fileId</a:t>
-              </a:r>
-              <a:endParaRPr lang="en-US" sz="3600" dirty="0"/>
-            </a:p>
-          </p:txBody>
-        </p:sp>
-        <p:cxnSp>
-          <p:nvCxnSpPr>
-            <p:cNvPr id="32" name="AutoShape 31"/>
-            <p:cNvCxnSpPr>
-              <a:cxnSpLocks noChangeShapeType="1"/>
-              <a:stCxn id="29" idx="0"/>
-              <a:endCxn id="10" idx="1"/>
-            </p:cNvCxnSpPr>
-            <p:nvPr/>
-          </p:nvCxnSpPr>
-          <p:spPr bwMode="auto">
-            <a:xfrm rot="16200000">
-              <a:off x="1771" y="2347"/>
-              <a:ext cx="525" cy="2013"/>
-            </a:xfrm>
-            <a:prstGeom prst="curvedConnector2">
-              <a:avLst/>
-            </a:prstGeom>
-            <a:noFill/>
-            <a:ln w="25400">
-              <a:solidFill>
-                <a:srgbClr val="00FF00"/>
-              </a:solidFill>
-              <a:round/>
-              <a:headEnd/>
-              <a:tailEnd type="triangle" w="med" len="med"/>
-            </a:ln>
-            <a:effectLst/>
-            <a:extLst>
-              <a:ext uri="{909E8E84-426E-40DD-AFC4-6F175D3DCCD1}">
-                <a14:hiddenFill xmlns:a14="http://schemas.microsoft.com/office/drawing/2010/main">
-                  <a:noFill/>
-                </a14:hiddenFill>
-              </a:ext>
-              <a:ext uri="{AF507438-7753-43E0-B8FC-AC1667EBCBE1}">
-                <a14:hiddenEffects xmlns:a14="http://schemas.microsoft.com/office/drawing/2010/main">
-                  <a:effectLst>
-                    <a:outerShdw dist="35921" dir="2700000" algn="ctr" rotWithShape="0">
-                      <a:schemeClr val="bg2"/>
-                    </a:outerShdw>
-                  </a:effectLst>
-                </a14:hiddenEffects>
-              </a:ext>
-            </a:extLst>
-          </p:spPr>
-        </p:cxnSp>
-        <p:pic>
-          <p:nvPicPr>
-            <p:cNvPr id="33" name="Picture 32"/>
-            <p:cNvPicPr>
-              <a:picLocks noChangeArrowheads="1"/>
-            </p:cNvPicPr>
-            <p:nvPr/>
-          </p:nvPicPr>
-          <p:blipFill>
-            <a:blip r:embed="rId2" cstate="print">
-              <a:extLst>
-                <a:ext uri="{28A0092B-C50C-407E-A947-70E740481C1C}">
-                  <a14:useLocalDpi xmlns:a14="http://schemas.microsoft.com/office/drawing/2010/main" val="0"/>
-                </a:ext>
-              </a:extLst>
-            </a:blip>
-            <a:srcRect/>
-            <a:stretch>
-              <a:fillRect/>
-            </a:stretch>
-          </p:blipFill>
-          <p:spPr bwMode="auto">
-            <a:xfrm>
-              <a:off x="3136" y="2800"/>
-              <a:ext cx="102" cy="102"/>
-            </a:xfrm>
-            <a:prstGeom prst="rect">
-              <a:avLst/>
-            </a:prstGeom>
-            <a:noFill/>
-            <a:ln>
-              <a:noFill/>
-            </a:ln>
-            <a:effectLst/>
-            <a:extLst>
-              <a:ext uri="{909E8E84-426E-40DD-AFC4-6F175D3DCCD1}">
-                <a14:hiddenFill xmlns:a14="http://schemas.microsoft.com/office/drawing/2010/main">
-                  <a:solidFill>
-                    <a:schemeClr val="accent1"/>
-                  </a:solidFill>
-                </a14:hiddenFill>
-              </a:ext>
-              <a:ext uri="{91240B29-F687-4F45-9708-019B960494DF}">
-                <a14:hiddenLine xmlns:a14="http://schemas.microsoft.com/office/drawing/2010/main" w="9525">
-                  <a:solidFill>
-                    <a:schemeClr val="tx1"/>
-                  </a:solidFill>
-                  <a:miter lim="800000"/>
-                  <a:headEnd/>
-                  <a:tailEnd/>
-                </a14:hiddenLine>
-              </a:ext>
-              <a:ext uri="{AF507438-7753-43E0-B8FC-AC1667EBCBE1}">
-                <a14:hiddenEffects xmlns:a14="http://schemas.microsoft.com/office/drawing/2010/main">
-                  <a:effectLst>
-                    <a:outerShdw dist="35921" dir="2700000" algn="ctr" rotWithShape="0">
-                      <a:schemeClr val="bg2"/>
-                    </a:outerShdw>
-                  </a:effectLst>
-                </a14:hiddenEffects>
-              </a:ext>
-            </a:extLst>
-          </p:spPr>
-        </p:pic>
-        <p:pic>
-          <p:nvPicPr>
-            <p:cNvPr id="34" name="Picture 33"/>
-            <p:cNvPicPr>
-              <a:picLocks noChangeArrowheads="1"/>
-            </p:cNvPicPr>
-            <p:nvPr/>
-          </p:nvPicPr>
-          <p:blipFill>
-            <a:blip r:embed="rId2" cstate="print">
-              <a:extLst>
-                <a:ext uri="{28A0092B-C50C-407E-A947-70E740481C1C}">
-                  <a14:useLocalDpi xmlns:a14="http://schemas.microsoft.com/office/drawing/2010/main" val="0"/>
-                </a:ext>
-              </a:extLst>
-            </a:blip>
-            <a:srcRect/>
-            <a:stretch>
-              <a:fillRect/>
-            </a:stretch>
-          </p:blipFill>
-          <p:spPr bwMode="auto">
-            <a:xfrm>
-              <a:off x="2656" y="1456"/>
-              <a:ext cx="102" cy="102"/>
-            </a:xfrm>
-            <a:prstGeom prst="rect">
-              <a:avLst/>
-            </a:prstGeom>
-            <a:noFill/>
-            <a:ln>
-              <a:noFill/>
-            </a:ln>
-            <a:effectLst/>
-            <a:extLst>
-              <a:ext uri="{909E8E84-426E-40DD-AFC4-6F175D3DCCD1}">
-                <a14:hiddenFill xmlns:a14="http://schemas.microsoft.com/office/drawing/2010/main">
-                  <a:solidFill>
-                    <a:schemeClr val="accent1"/>
-                  </a:solidFill>
-                </a14:hiddenFill>
-              </a:ext>
-              <a:ext uri="{91240B29-F687-4F45-9708-019B960494DF}">
-                <a14:hiddenLine xmlns:a14="http://schemas.microsoft.com/office/drawing/2010/main" w="9525">
-                  <a:solidFill>
-                    <a:schemeClr val="tx1"/>
-                  </a:solidFill>
-                  <a:miter lim="800000"/>
-                  <a:headEnd/>
-                  <a:tailEnd/>
-                </a14:hiddenLine>
-              </a:ext>
-              <a:ext uri="{AF507438-7753-43E0-B8FC-AC1667EBCBE1}">
-                <a14:hiddenEffects xmlns:a14="http://schemas.microsoft.com/office/drawing/2010/main">
-                  <a:effectLst>
-                    <a:outerShdw dist="35921" dir="2700000" algn="ctr" rotWithShape="0">
-                      <a:schemeClr val="bg2"/>
-                    </a:outerShdw>
-                  </a:effectLst>
-                </a14:hiddenEffects>
-              </a:ext>
-            </a:extLst>
-          </p:spPr>
-        </p:pic>
-        <p:pic>
-          <p:nvPicPr>
-            <p:cNvPr id="35" name="Picture 34"/>
-            <p:cNvPicPr>
-              <a:picLocks noChangeArrowheads="1"/>
-            </p:cNvPicPr>
-            <p:nvPr/>
-          </p:nvPicPr>
-          <p:blipFill>
-            <a:blip r:embed="rId2" cstate="print">
-              <a:extLst>
-                <a:ext uri="{28A0092B-C50C-407E-A947-70E740481C1C}">
-                  <a14:useLocalDpi xmlns:a14="http://schemas.microsoft.com/office/drawing/2010/main" val="0"/>
-                </a:ext>
-              </a:extLst>
-            </a:blip>
-            <a:srcRect/>
-            <a:stretch>
-              <a:fillRect/>
-            </a:stretch>
-          </p:blipFill>
-          <p:spPr bwMode="auto">
-            <a:xfrm>
-              <a:off x="832" y="3520"/>
-              <a:ext cx="102" cy="102"/>
-            </a:xfrm>
-            <a:prstGeom prst="rect">
-              <a:avLst/>
-            </a:prstGeom>
-            <a:noFill/>
-            <a:ln>
-              <a:noFill/>
-            </a:ln>
-            <a:effectLst/>
-            <a:extLst>
-              <a:ext uri="{909E8E84-426E-40DD-AFC4-6F175D3DCCD1}">
-                <a14:hiddenFill xmlns:a14="http://schemas.microsoft.com/office/drawing/2010/main">
-                  <a:solidFill>
-                    <a:schemeClr val="accent1"/>
-                  </a:solidFill>
-                </a14:hiddenFill>
-              </a:ext>
-              <a:ext uri="{91240B29-F687-4F45-9708-019B960494DF}">
-                <a14:hiddenLine xmlns:a14="http://schemas.microsoft.com/office/drawing/2010/main" w="9525">
-                  <a:solidFill>
-                    <a:schemeClr val="tx1"/>
-                  </a:solidFill>
-                  <a:miter lim="800000"/>
-                  <a:headEnd/>
-                  <a:tailEnd/>
-                </a14:hiddenLine>
-              </a:ext>
-              <a:ext uri="{AF507438-7753-43E0-B8FC-AC1667EBCBE1}">
-                <a14:hiddenEffects xmlns:a14="http://schemas.microsoft.com/office/drawing/2010/main">
-                  <a:effectLst>
-                    <a:outerShdw dist="35921" dir="2700000" algn="ctr" rotWithShape="0">
-                      <a:schemeClr val="bg2"/>
-                    </a:outerShdw>
-                  </a:effectLst>
-                </a14:hiddenEffects>
-              </a:ext>
-            </a:extLst>
-          </p:spPr>
-        </p:pic>
-        <p:pic>
-          <p:nvPicPr>
-            <p:cNvPr id="36" name="Picture 35"/>
-            <p:cNvPicPr>
-              <a:picLocks noChangeArrowheads="1"/>
-            </p:cNvPicPr>
-            <p:nvPr/>
-          </p:nvPicPr>
-          <p:blipFill>
-            <a:blip r:embed="rId2" cstate="print">
-              <a:extLst>
-                <a:ext uri="{28A0092B-C50C-407E-A947-70E740481C1C}">
-                  <a14:useLocalDpi xmlns:a14="http://schemas.microsoft.com/office/drawing/2010/main" val="0"/>
-                </a:ext>
-              </a:extLst>
-            </a:blip>
-            <a:srcRect/>
-            <a:stretch>
-              <a:fillRect/>
-            </a:stretch>
-          </p:blipFill>
-          <p:spPr bwMode="auto">
-            <a:xfrm>
-              <a:off x="1648" y="1120"/>
-              <a:ext cx="102" cy="102"/>
-            </a:xfrm>
-            <a:prstGeom prst="rect">
-              <a:avLst/>
-            </a:prstGeom>
-            <a:noFill/>
-            <a:ln>
-              <a:noFill/>
-            </a:ln>
-            <a:effectLst/>
-            <a:extLst>
-              <a:ext uri="{909E8E84-426E-40DD-AFC4-6F175D3DCCD1}">
-                <a14:hiddenFill xmlns:a14="http://schemas.microsoft.com/office/drawing/2010/main">
-                  <a:solidFill>
-                    <a:schemeClr val="accent1"/>
-                  </a:solidFill>
-                </a14:hiddenFill>
-              </a:ext>
-              <a:ext uri="{91240B29-F687-4F45-9708-019B960494DF}">
-                <a14:hiddenLine xmlns:a14="http://schemas.microsoft.com/office/drawing/2010/main" w="9525">
-                  <a:solidFill>
-                    <a:schemeClr val="tx1"/>
-                  </a:solidFill>
-                  <a:miter lim="800000"/>
-                  <a:headEnd/>
-                  <a:tailEnd/>
-                </a14:hiddenLine>
-              </a:ext>
-              <a:ext uri="{AF507438-7753-43E0-B8FC-AC1667EBCBE1}">
-                <a14:hiddenEffects xmlns:a14="http://schemas.microsoft.com/office/drawing/2010/main">
-                  <a:effectLst>
-                    <a:outerShdw dist="35921" dir="2700000" algn="ctr" rotWithShape="0">
-                      <a:schemeClr val="bg2"/>
-                    </a:outerShdw>
-                  </a:effectLst>
-                </a14:hiddenEffects>
-              </a:ext>
-            </a:extLst>
-          </p:spPr>
-        </p:pic>
-        <p:cxnSp>
-          <p:nvCxnSpPr>
-            <p:cNvPr id="37" name="AutoShape 36"/>
-            <p:cNvCxnSpPr>
-              <a:cxnSpLocks noChangeShapeType="1"/>
-              <a:stCxn id="10" idx="1"/>
-              <a:endCxn id="7" idx="1"/>
-            </p:cNvCxnSpPr>
-            <p:nvPr/>
-          </p:nvCxnSpPr>
-          <p:spPr bwMode="auto">
-            <a:xfrm rot="10800000" flipH="1">
-              <a:off x="3040" y="2419"/>
-              <a:ext cx="96" cy="672"/>
-            </a:xfrm>
-            <a:prstGeom prst="curvedConnector3">
-              <a:avLst>
-                <a:gd name="adj1" fmla="val -150000"/>
-              </a:avLst>
-            </a:prstGeom>
-            <a:noFill/>
-            <a:ln w="25400">
-              <a:solidFill>
-                <a:srgbClr val="00FF00"/>
-              </a:solidFill>
-              <a:round/>
-              <a:headEnd/>
-              <a:tailEnd type="triangle" w="med" len="med"/>
-            </a:ln>
-            <a:effectLst/>
-            <a:extLst>
-              <a:ext uri="{909E8E84-426E-40DD-AFC4-6F175D3DCCD1}">
-                <a14:hiddenFill xmlns:a14="http://schemas.microsoft.com/office/drawing/2010/main">
-                  <a:noFill/>
-                </a14:hiddenFill>
-              </a:ext>
-              <a:ext uri="{AF507438-7753-43E0-B8FC-AC1667EBCBE1}">
-                <a14:hiddenEffects xmlns:a14="http://schemas.microsoft.com/office/drawing/2010/main">
-                  <a:effectLst>
-                    <a:outerShdw dist="35921" dir="2700000" algn="ctr" rotWithShape="0">
-                      <a:schemeClr val="bg2"/>
-                    </a:outerShdw>
-                  </a:effectLst>
-                </a14:hiddenEffects>
-              </a:ext>
-            </a:extLst>
-          </p:spPr>
-        </p:cxnSp>
-        <p:cxnSp>
-          <p:nvCxnSpPr>
-            <p:cNvPr id="38" name="AutoShape 37"/>
-            <p:cNvCxnSpPr>
-              <a:cxnSpLocks noChangeShapeType="1"/>
-              <a:stCxn id="7" idx="1"/>
-              <a:endCxn id="9" idx="1"/>
-            </p:cNvCxnSpPr>
-            <p:nvPr/>
-          </p:nvCxnSpPr>
-          <p:spPr bwMode="auto">
-            <a:xfrm rot="10800000">
-              <a:off x="2944" y="1843"/>
-              <a:ext cx="192" cy="576"/>
-            </a:xfrm>
-            <a:prstGeom prst="curvedConnector3">
-              <a:avLst>
-                <a:gd name="adj1" fmla="val 175000"/>
-              </a:avLst>
-            </a:prstGeom>
-            <a:noFill/>
-            <a:ln w="25400">
-              <a:solidFill>
-                <a:srgbClr val="00FF00"/>
-              </a:solidFill>
-              <a:round/>
-              <a:headEnd/>
-              <a:tailEnd type="triangle" w="med" len="med"/>
-            </a:ln>
-            <a:effectLst/>
-            <a:extLst>
-              <a:ext uri="{909E8E84-426E-40DD-AFC4-6F175D3DCCD1}">
-                <a14:hiddenFill xmlns:a14="http://schemas.microsoft.com/office/drawing/2010/main">
-                  <a:noFill/>
-                </a14:hiddenFill>
-              </a:ext>
-              <a:ext uri="{AF507438-7753-43E0-B8FC-AC1667EBCBE1}">
-                <a14:hiddenEffects xmlns:a14="http://schemas.microsoft.com/office/drawing/2010/main">
-                  <a:effectLst>
-                    <a:outerShdw dist="35921" dir="2700000" algn="ctr" rotWithShape="0">
-                      <a:schemeClr val="bg2"/>
-                    </a:outerShdw>
-                  </a:effectLst>
-                </a14:hiddenEffects>
-              </a:ext>
-            </a:extLst>
-          </p:spPr>
-        </p:cxnSp>
-        <p:cxnSp>
-          <p:nvCxnSpPr>
-            <p:cNvPr id="39" name="AutoShape 38"/>
-            <p:cNvCxnSpPr>
-              <a:cxnSpLocks noChangeShapeType="1"/>
-              <a:stCxn id="9" idx="3"/>
-              <a:endCxn id="8" idx="3"/>
-            </p:cNvCxnSpPr>
-            <p:nvPr/>
-          </p:nvCxnSpPr>
-          <p:spPr bwMode="auto">
-            <a:xfrm>
-              <a:off x="3046" y="1843"/>
-              <a:ext cx="144" cy="336"/>
-            </a:xfrm>
-            <a:prstGeom prst="curvedConnector3">
-              <a:avLst>
-                <a:gd name="adj1" fmla="val 200000"/>
-              </a:avLst>
-            </a:prstGeom>
-            <a:noFill/>
-            <a:ln w="25400">
-              <a:solidFill>
-                <a:srgbClr val="00FF00"/>
-              </a:solidFill>
-              <a:round/>
-              <a:headEnd/>
-              <a:tailEnd type="triangle" w="med" len="med"/>
-            </a:ln>
-            <a:effectLst/>
-            <a:extLst>
-              <a:ext uri="{909E8E84-426E-40DD-AFC4-6F175D3DCCD1}">
-                <a14:hiddenFill xmlns:a14="http://schemas.microsoft.com/office/drawing/2010/main">
-                  <a:noFill/>
-                </a14:hiddenFill>
-              </a:ext>
-              <a:ext uri="{AF507438-7753-43E0-B8FC-AC1667EBCBE1}">
-                <a14:hiddenEffects xmlns:a14="http://schemas.microsoft.com/office/drawing/2010/main">
-                  <a:effectLst>
-                    <a:outerShdw dist="35921" dir="2700000" algn="ctr" rotWithShape="0">
-                      <a:schemeClr val="bg2"/>
-                    </a:outerShdw>
-                  </a:effectLst>
-                </a14:hiddenEffects>
-              </a:ext>
-            </a:extLst>
-          </p:spPr>
-        </p:cxnSp>
-        <p:cxnSp>
-          <p:nvCxnSpPr>
-            <p:cNvPr id="40" name="AutoShape 39"/>
-            <p:cNvCxnSpPr>
-              <a:cxnSpLocks noChangeShapeType="1"/>
-              <a:stCxn id="9" idx="3"/>
-              <a:endCxn id="25" idx="0"/>
-            </p:cNvCxnSpPr>
-            <p:nvPr/>
-          </p:nvCxnSpPr>
-          <p:spPr bwMode="auto">
-            <a:xfrm flipH="1" flipV="1">
-              <a:off x="2579" y="1367"/>
-              <a:ext cx="467" cy="476"/>
-            </a:xfrm>
-            <a:prstGeom prst="curvedConnector4">
-              <a:avLst>
-                <a:gd name="adj1" fmla="val -30833"/>
-                <a:gd name="adj2" fmla="val 130250"/>
-              </a:avLst>
-            </a:prstGeom>
-            <a:noFill/>
-            <a:ln w="25400">
-              <a:solidFill>
-                <a:srgbClr val="00FF00"/>
-              </a:solidFill>
-              <a:round/>
-              <a:headEnd/>
-              <a:tailEnd type="triangle" w="med" len="med"/>
-            </a:ln>
-            <a:effectLst/>
-            <a:extLst>
-              <a:ext uri="{909E8E84-426E-40DD-AFC4-6F175D3DCCD1}">
-                <a14:hiddenFill xmlns:a14="http://schemas.microsoft.com/office/drawing/2010/main">
-                  <a:noFill/>
-                </a14:hiddenFill>
-              </a:ext>
-              <a:ext uri="{AF507438-7753-43E0-B8FC-AC1667EBCBE1}">
-                <a14:hiddenEffects xmlns:a14="http://schemas.microsoft.com/office/drawing/2010/main">
-                  <a:effectLst>
-                    <a:outerShdw dist="35921" dir="2700000" algn="ctr" rotWithShape="0">
-                      <a:schemeClr val="bg2"/>
-                    </a:outerShdw>
-                  </a:effectLst>
-                </a14:hiddenEffects>
-              </a:ext>
-            </a:extLst>
-          </p:spPr>
-        </p:cxnSp>
-        <p:cxnSp>
-          <p:nvCxnSpPr>
-            <p:cNvPr id="41" name="AutoShape 40"/>
-            <p:cNvCxnSpPr>
-              <a:cxnSpLocks noChangeShapeType="1"/>
-              <a:stCxn id="9" idx="3"/>
-              <a:endCxn id="34" idx="3"/>
-            </p:cNvCxnSpPr>
-            <p:nvPr/>
-          </p:nvCxnSpPr>
-          <p:spPr bwMode="auto">
-            <a:xfrm flipH="1" flipV="1">
-              <a:off x="2758" y="1507"/>
-              <a:ext cx="288" cy="336"/>
-            </a:xfrm>
-            <a:prstGeom prst="curvedConnector3">
-              <a:avLst>
-                <a:gd name="adj1" fmla="val -50000"/>
-              </a:avLst>
-            </a:prstGeom>
-            <a:noFill/>
-            <a:ln w="25400">
-              <a:solidFill>
-                <a:srgbClr val="00FF00"/>
-              </a:solidFill>
-              <a:round/>
-              <a:headEnd/>
-              <a:tailEnd type="triangle" w="med" len="med"/>
-            </a:ln>
-            <a:effectLst/>
-            <a:extLst>
-              <a:ext uri="{909E8E84-426E-40DD-AFC4-6F175D3DCCD1}">
-                <a14:hiddenFill xmlns:a14="http://schemas.microsoft.com/office/drawing/2010/main">
-                  <a:noFill/>
-                </a14:hiddenFill>
-              </a:ext>
-              <a:ext uri="{AF507438-7753-43E0-B8FC-AC1667EBCBE1}">
-                <a14:hiddenEffects xmlns:a14="http://schemas.microsoft.com/office/drawing/2010/main">
-                  <a:effectLst>
-                    <a:outerShdw dist="35921" dir="2700000" algn="ctr" rotWithShape="0">
-                      <a:schemeClr val="bg2"/>
-                    </a:outerShdw>
-                  </a:effectLst>
-                </a14:hiddenEffects>
-              </a:ext>
-            </a:extLst>
-          </p:spPr>
-        </p:cxnSp>
-        <p:sp>
-          <p:nvSpPr>
-            <p:cNvPr id="42" name="Text Box 41"/>
-            <p:cNvSpPr txBox="1">
-              <a:spLocks noChangeArrowheads="1"/>
-            </p:cNvSpPr>
-            <p:nvPr/>
-          </p:nvSpPr>
-          <p:spPr bwMode="auto">
-            <a:xfrm>
-              <a:off x="882" y="2520"/>
-              <a:ext cx="1218" cy="823"/>
-            </a:xfrm>
-            <a:prstGeom prst="rect">
-              <a:avLst/>
-            </a:prstGeom>
-            <a:noFill/>
-            <a:ln>
-              <a:noFill/>
-            </a:ln>
-            <a:effectLst/>
-            <a:extLst>
-              <a:ext uri="{909E8E84-426E-40DD-AFC4-6F175D3DCCD1}">
-                <a14:hiddenFill xmlns:a14="http://schemas.microsoft.com/office/drawing/2010/main">
-                  <a:solidFill>
-                    <a:srgbClr val="FFFFFF"/>
-                  </a:solidFill>
-                </a14:hiddenFill>
-              </a:ext>
-              <a:ext uri="{91240B29-F687-4F45-9708-019B960494DF}">
-                <a14:hiddenLine xmlns:a14="http://schemas.microsoft.com/office/drawing/2010/main" w="9525">
-                  <a:solidFill>
-                    <a:schemeClr val="tx1"/>
-                  </a:solidFill>
-                  <a:miter lim="800000"/>
-                  <a:headEnd/>
-                  <a:tailEnd/>
-                </a14:hiddenLine>
-              </a:ext>
-              <a:ext uri="{AF507438-7753-43E0-B8FC-AC1667EBCBE1}">
-                <a14:hiddenEffects xmlns:a14="http://schemas.microsoft.com/office/drawing/2010/main">
-                  <a:effectLst>
-                    <a:outerShdw dist="35921" dir="2700000" algn="ctr" rotWithShape="0">
-                      <a:schemeClr val="bg2"/>
-                    </a:outerShdw>
-                  </a:effectLst>
-                </a14:hiddenEffects>
-              </a:ext>
-            </a:extLst>
-          </p:spPr>
-          <p:txBody>
-            <a:bodyPr anchor="ctr">
-              <a:spAutoFit/>
-            </a:bodyPr>
-            <a:lstStyle/>
-            <a:p>
-              <a:pPr eaLnBrk="0" hangingPunct="0"/>
-              <a:r>
-                <a:rPr lang="en-US" sz="2800" dirty="0">
-                  <a:solidFill>
-                    <a:schemeClr val="bg2">
-                      <a:lumMod val="10000"/>
-                    </a:schemeClr>
-                  </a:solidFill>
-                </a:rPr>
-                <a:t>Insert </a:t>
-              </a:r>
-              <a:r>
-                <a:rPr lang="en-US" sz="2800" i="1" dirty="0" err="1">
-                  <a:solidFill>
-                    <a:schemeClr val="bg2">
-                      <a:lumMod val="10000"/>
-                    </a:schemeClr>
-                  </a:solidFill>
-                </a:rPr>
-                <a:t>fileId</a:t>
-              </a:r>
-              <a:endParaRPr lang="en-US" sz="3600" dirty="0">
-                <a:solidFill>
-                  <a:schemeClr val="bg2">
-                    <a:lumMod val="10000"/>
-                  </a:schemeClr>
-                </a:solidFill>
-              </a:endParaRPr>
-            </a:p>
-          </p:txBody>
-        </p:sp>
-        <p:sp>
-          <p:nvSpPr>
-            <p:cNvPr id="43" name="Rectangle 42"/>
-            <p:cNvSpPr>
-              <a:spLocks noChangeArrowheads="1"/>
-            </p:cNvSpPr>
-            <p:nvPr/>
-          </p:nvSpPr>
-          <p:spPr bwMode="auto">
-            <a:xfrm rot="-1786743">
-              <a:off x="2692" y="1176"/>
-              <a:ext cx="308" cy="1170"/>
-            </a:xfrm>
-            <a:prstGeom prst="rect">
-              <a:avLst/>
-            </a:prstGeom>
-            <a:noFill/>
-            <a:ln w="25400">
-              <a:solidFill>
-                <a:schemeClr val="tx1"/>
-              </a:solidFill>
-              <a:miter lim="800000"/>
-              <a:headEnd/>
-              <a:tailEnd/>
-            </a:ln>
-            <a:effectLst/>
-            <a:extLst>
-              <a:ext uri="{909E8E84-426E-40DD-AFC4-6F175D3DCCD1}">
-                <a14:hiddenFill xmlns:a14="http://schemas.microsoft.com/office/drawing/2010/main">
-                  <a:solidFill>
-                    <a:srgbClr val="FFFFFF"/>
-                  </a:solidFill>
-                </a14:hiddenFill>
-              </a:ext>
-              <a:ext uri="{AF507438-7753-43E0-B8FC-AC1667EBCBE1}">
-                <a14:hiddenEffects xmlns:a14="http://schemas.microsoft.com/office/drawing/2010/main">
-                  <a:effectLst>
-                    <a:outerShdw dist="35921" dir="2700000" algn="ctr" rotWithShape="0">
-                      <a:schemeClr val="bg2"/>
-                    </a:outerShdw>
-                  </a:effectLst>
-                </a14:hiddenEffects>
-              </a:ext>
-            </a:extLst>
-          </p:spPr>
-          <p:txBody>
-            <a:bodyPr wrap="none" anchor="ctr"/>
-            <a:lstStyle/>
-            <a:p>
-              <a:endParaRPr lang="en-US"/>
-            </a:p>
-          </p:txBody>
-        </p:sp>
-        <p:sp>
-          <p:nvSpPr>
-            <p:cNvPr id="44" name="Text Box 43"/>
-            <p:cNvSpPr txBox="1">
-              <a:spLocks noChangeArrowheads="1"/>
-            </p:cNvSpPr>
-            <p:nvPr/>
-          </p:nvSpPr>
-          <p:spPr bwMode="auto">
-            <a:xfrm>
-              <a:off x="1925" y="1367"/>
-              <a:ext cx="512" cy="294"/>
-            </a:xfrm>
-            <a:prstGeom prst="rect">
-              <a:avLst/>
-            </a:prstGeom>
-            <a:noFill/>
-            <a:ln w="9525">
-              <a:solidFill>
-                <a:schemeClr val="tx1"/>
-              </a:solidFill>
-              <a:miter lim="800000"/>
-              <a:headEnd/>
-              <a:tailEnd/>
-            </a:ln>
-            <a:effectLst/>
-            <a:extLst>
-              <a:ext uri="{909E8E84-426E-40DD-AFC4-6F175D3DCCD1}">
-                <a14:hiddenFill xmlns:a14="http://schemas.microsoft.com/office/drawing/2010/main">
-                  <a:solidFill>
-                    <a:schemeClr val="accent1"/>
-                  </a:solidFill>
-                </a14:hiddenFill>
-              </a:ext>
-              <a:ext uri="{AF507438-7753-43E0-B8FC-AC1667EBCBE1}">
-                <a14:hiddenEffects xmlns:a14="http://schemas.microsoft.com/office/drawing/2010/main">
-                  <a:effectLst>
-                    <a:outerShdw dist="35921" dir="2700000" algn="ctr" rotWithShape="0">
-                      <a:schemeClr val="bg2"/>
-                    </a:outerShdw>
-                  </a:effectLst>
-                </a14:hiddenEffects>
-              </a:ext>
-            </a:extLst>
-          </p:spPr>
-          <p:txBody>
-            <a:bodyPr>
-              <a:spAutoFit/>
-            </a:bodyPr>
-            <a:lstStyle/>
-            <a:p>
-              <a:pPr eaLnBrk="0" hangingPunct="0">
-                <a:spcBef>
-                  <a:spcPct val="50000"/>
-                </a:spcBef>
-              </a:pPr>
-              <a:r>
-                <a:rPr lang="en-GB" dirty="0"/>
-                <a:t>k=4</a:t>
-              </a:r>
-            </a:p>
-          </p:txBody>
-        </p:sp>
-      </p:grpSp>
+              <a:rPr lang="en-US" dirty="0" smtClean="0"/>
+              <a:t>Is in the leaf</a:t>
+            </a:r>
+            <a:r>
+              <a:rPr lang="en-US" baseline="0" dirty="0" smtClean="0"/>
+              <a:t> set of ‘A’</a:t>
+            </a:r>
+          </a:p>
+          <a:p>
+            <a:pPr lvl="1"/>
+            <a:r>
+              <a:rPr lang="en-US" baseline="0" dirty="0" smtClean="0"/>
+              <a:t>Is not be one of the original k-closest</a:t>
+            </a:r>
+          </a:p>
+          <a:p>
+            <a:pPr lvl="1"/>
+            <a:r>
+              <a:rPr lang="en-US" baseline="0" dirty="0" smtClean="0"/>
+              <a:t>Does not already have the file</a:t>
+            </a:r>
+          </a:p>
+          <a:p>
+            <a:pPr lvl="0"/>
+            <a:r>
+              <a:rPr lang="en-US" baseline="0" dirty="0" smtClean="0"/>
+              <a:t>Store pointer to ‘B’ in ‘A’</a:t>
+            </a:r>
+          </a:p>
+        </p:txBody>
+      </p:sp>
     </p:spTree>
     <p:extLst>
       <p:ext uri="{BB962C8B-B14F-4D97-AF65-F5344CB8AC3E}">
-        <p14:creationId xmlns:p14="http://schemas.microsoft.com/office/powerpoint/2010/main" val="2535629486"/>
+        <p14:creationId xmlns:p14="http://schemas.microsoft.com/office/powerpoint/2010/main" val="2969086461"/>
       </p:ext>
     </p:extLst>
   </p:cSld>
   <p:clrMapOvr>
     <a:masterClrMapping/>
   </p:clrMapOvr>
+  <p:timing>
+    <p:tnLst>
+      <p:par>
+        <p:cTn id="1" dur="indefinite" restart="never" nodeType="tmRoot"/>
+      </p:par>
+    </p:tnLst>
+  </p:timing>
+</p:sld>
+</file>
+
+<file path=ppt/slides/slide33.xml><?xml version="1.0" encoding="utf-8"?>
+<p:sld xmlns:a="http://schemas.openxmlformats.org/drawingml/2006/main" xmlns:r="http://schemas.openxmlformats.org/officeDocument/2006/relationships" xmlns:p="http://schemas.openxmlformats.org/presentationml/2006/main">
+  <p:cSld>
+    <p:spTree>
+      <p:nvGrpSpPr>
+        <p:cNvPr id="1" name=""/>
+        <p:cNvGrpSpPr/>
+        <p:nvPr/>
+      </p:nvGrpSpPr>
+      <p:grpSpPr>
+        <a:xfrm>
+          <a:off x="0" y="0"/>
+          <a:ext cx="0" cy="0"/>
+          <a:chOff x="0" y="0"/>
+          <a:chExt cx="0" cy="0"/>
+        </a:xfrm>
+      </p:grpSpPr>
+      <p:sp>
+        <p:nvSpPr>
+          <p:cNvPr id="2" name="Title 1"/>
+          <p:cNvSpPr>
+            <a:spLocks noGrp="1"/>
+          </p:cNvSpPr>
+          <p:nvPr>
+            <p:ph type="title"/>
+          </p:nvPr>
+        </p:nvSpPr>
+        <p:spPr/>
+        <p:txBody>
+          <a:bodyPr/>
+          <a:lstStyle/>
+          <a:p>
+            <a:r>
+              <a:rPr lang="en-US" dirty="0" smtClean="0"/>
+              <a:t>Replica Diversion</a:t>
+            </a:r>
+            <a:endParaRPr lang="en-US" dirty="0"/>
+          </a:p>
+        </p:txBody>
+      </p:sp>
+      <p:sp>
+        <p:nvSpPr>
+          <p:cNvPr id="3" name="Slide Number Placeholder 2"/>
+          <p:cNvSpPr>
+            <a:spLocks noGrp="1"/>
+          </p:cNvSpPr>
+          <p:nvPr>
+            <p:ph type="sldNum" sz="quarter" idx="12"/>
+          </p:nvPr>
+        </p:nvSpPr>
+        <p:spPr/>
+        <p:txBody>
+          <a:bodyPr/>
+          <a:lstStyle/>
+          <a:p>
+            <a:fld id="{7D5018C4-273E-49AF-93AB-259FCF9A742C}" type="slidenum">
+              <a:rPr lang="en-US" smtClean="0"/>
+              <a:t>33</a:t>
+            </a:fld>
+            <a:endParaRPr lang="en-US"/>
+          </a:p>
+        </p:txBody>
+      </p:sp>
+      <p:sp>
+        <p:nvSpPr>
+          <p:cNvPr id="4" name="Content Placeholder 3"/>
+          <p:cNvSpPr>
+            <a:spLocks noGrp="1"/>
+          </p:cNvSpPr>
+          <p:nvPr>
+            <p:ph sz="quarter" idx="1"/>
+          </p:nvPr>
+        </p:nvSpPr>
+        <p:spPr/>
+        <p:txBody>
+          <a:bodyPr/>
+          <a:lstStyle/>
+          <a:p>
+            <a:pPr lvl="0"/>
+            <a:r>
+              <a:rPr lang="en-US" dirty="0" smtClean="0"/>
+              <a:t>What if ‘A’ fails?</a:t>
+            </a:r>
+          </a:p>
+          <a:p>
+            <a:pPr lvl="1"/>
+            <a:r>
+              <a:rPr lang="en-US" dirty="0" smtClean="0"/>
+              <a:t>Pointer doubles chance of losing copy stored at ‘B’</a:t>
+            </a:r>
+          </a:p>
+          <a:p>
+            <a:r>
+              <a:rPr lang="en-US" dirty="0" smtClean="0"/>
+              <a:t>Store pointer in C as well!</a:t>
+            </a:r>
+          </a:p>
+        </p:txBody>
+      </p:sp>
+      <p:cxnSp>
+        <p:nvCxnSpPr>
+          <p:cNvPr id="5" name="Straight Connector 4"/>
+          <p:cNvCxnSpPr/>
+          <p:nvPr/>
+        </p:nvCxnSpPr>
+        <p:spPr>
+          <a:xfrm flipH="1" flipV="1">
+            <a:off x="152400" y="4050268"/>
+            <a:ext cx="8839200" cy="3048"/>
+          </a:xfrm>
+          <a:prstGeom prst="line">
+            <a:avLst/>
+          </a:prstGeom>
+        </p:spPr>
+        <p:style>
+          <a:lnRef idx="3">
+            <a:schemeClr val="dk1"/>
+          </a:lnRef>
+          <a:fillRef idx="0">
+            <a:schemeClr val="dk1"/>
+          </a:fillRef>
+          <a:effectRef idx="2">
+            <a:schemeClr val="dk1"/>
+          </a:effectRef>
+          <a:fontRef idx="minor">
+            <a:schemeClr val="tx1"/>
+          </a:fontRef>
+        </p:style>
+      </p:cxnSp>
+      <p:sp>
+        <p:nvSpPr>
+          <p:cNvPr id="6" name="Oval 5"/>
+          <p:cNvSpPr/>
+          <p:nvPr/>
+        </p:nvSpPr>
+        <p:spPr>
+          <a:xfrm>
+            <a:off x="3190807" y="3528295"/>
+            <a:ext cx="914400" cy="914400"/>
+          </a:xfrm>
+          <a:prstGeom prst="ellipse">
+            <a:avLst/>
+          </a:prstGeom>
+        </p:spPr>
+        <p:style>
+          <a:lnRef idx="2">
+            <a:schemeClr val="accent1">
+              <a:shade val="50000"/>
+            </a:schemeClr>
+          </a:lnRef>
+          <a:fillRef idx="1">
+            <a:schemeClr val="accent1"/>
+          </a:fillRef>
+          <a:effectRef idx="0">
+            <a:schemeClr val="accent1"/>
+          </a:effectRef>
+          <a:fontRef idx="minor">
+            <a:schemeClr val="lt1"/>
+          </a:fontRef>
+        </p:style>
+        <p:txBody>
+          <a:bodyPr rtlCol="0" anchor="ctr"/>
+          <a:lstStyle/>
+          <a:p>
+            <a:pPr algn="ctr"/>
+            <a:r>
+              <a:rPr lang="en-US" dirty="0"/>
+              <a:t>A</a:t>
+            </a:r>
+          </a:p>
+        </p:txBody>
+      </p:sp>
+      <p:sp>
+        <p:nvSpPr>
+          <p:cNvPr id="7" name="Oval 6"/>
+          <p:cNvSpPr/>
+          <p:nvPr/>
+        </p:nvSpPr>
+        <p:spPr>
+          <a:xfrm>
+            <a:off x="4219545" y="3528295"/>
+            <a:ext cx="914400" cy="914400"/>
+          </a:xfrm>
+          <a:prstGeom prst="ellipse">
+            <a:avLst/>
+          </a:prstGeom>
+        </p:spPr>
+        <p:style>
+          <a:lnRef idx="2">
+            <a:schemeClr val="accent1">
+              <a:shade val="50000"/>
+            </a:schemeClr>
+          </a:lnRef>
+          <a:fillRef idx="1">
+            <a:schemeClr val="accent1"/>
+          </a:fillRef>
+          <a:effectRef idx="0">
+            <a:schemeClr val="accent1"/>
+          </a:effectRef>
+          <a:fontRef idx="minor">
+            <a:schemeClr val="lt1"/>
+          </a:fontRef>
+        </p:style>
+        <p:txBody>
+          <a:bodyPr rtlCol="0" anchor="ctr"/>
+          <a:lstStyle/>
+          <a:p>
+            <a:pPr algn="ctr"/>
+            <a:r>
+              <a:rPr lang="en-US" dirty="0" smtClean="0"/>
+              <a:t>N</a:t>
+            </a:r>
+            <a:endParaRPr lang="en-US" dirty="0"/>
+          </a:p>
+        </p:txBody>
+      </p:sp>
+      <p:sp>
+        <p:nvSpPr>
+          <p:cNvPr id="8" name="Oval 7"/>
+          <p:cNvSpPr/>
+          <p:nvPr/>
+        </p:nvSpPr>
+        <p:spPr>
+          <a:xfrm>
+            <a:off x="5261499" y="3528295"/>
+            <a:ext cx="914400" cy="914400"/>
+          </a:xfrm>
+          <a:prstGeom prst="ellipse">
+            <a:avLst/>
+          </a:prstGeom>
+        </p:spPr>
+        <p:style>
+          <a:lnRef idx="2">
+            <a:schemeClr val="accent1">
+              <a:shade val="50000"/>
+            </a:schemeClr>
+          </a:lnRef>
+          <a:fillRef idx="1">
+            <a:schemeClr val="accent1"/>
+          </a:fillRef>
+          <a:effectRef idx="0">
+            <a:schemeClr val="accent1"/>
+          </a:effectRef>
+          <a:fontRef idx="minor">
+            <a:schemeClr val="lt1"/>
+          </a:fontRef>
+        </p:style>
+        <p:txBody>
+          <a:bodyPr rtlCol="0" anchor="ctr"/>
+          <a:lstStyle/>
+          <a:p>
+            <a:pPr algn="ctr"/>
+            <a:endParaRPr lang="en-US" dirty="0"/>
+          </a:p>
+        </p:txBody>
+      </p:sp>
+      <p:sp>
+        <p:nvSpPr>
+          <p:cNvPr id="9" name="Oval 8"/>
+          <p:cNvSpPr/>
+          <p:nvPr/>
+        </p:nvSpPr>
+        <p:spPr>
+          <a:xfrm>
+            <a:off x="2154397" y="3528295"/>
+            <a:ext cx="914400" cy="914400"/>
+          </a:xfrm>
+          <a:prstGeom prst="ellipse">
+            <a:avLst/>
+          </a:prstGeom>
+        </p:spPr>
+        <p:style>
+          <a:lnRef idx="2">
+            <a:schemeClr val="accent1">
+              <a:shade val="50000"/>
+            </a:schemeClr>
+          </a:lnRef>
+          <a:fillRef idx="1">
+            <a:schemeClr val="accent1"/>
+          </a:fillRef>
+          <a:effectRef idx="0">
+            <a:schemeClr val="accent1"/>
+          </a:effectRef>
+          <a:fontRef idx="minor">
+            <a:schemeClr val="lt1"/>
+          </a:fontRef>
+        </p:style>
+        <p:txBody>
+          <a:bodyPr rtlCol="0" anchor="ctr"/>
+          <a:lstStyle/>
+          <a:p>
+            <a:pPr algn="ctr"/>
+            <a:endParaRPr lang="en-US" dirty="0"/>
+          </a:p>
+        </p:txBody>
+      </p:sp>
+      <p:cxnSp>
+        <p:nvCxnSpPr>
+          <p:cNvPr id="10" name="Elbow Connector 9"/>
+          <p:cNvCxnSpPr>
+            <a:stCxn id="7" idx="0"/>
+            <a:endCxn id="6" idx="0"/>
+          </p:cNvCxnSpPr>
+          <p:nvPr/>
+        </p:nvCxnSpPr>
+        <p:spPr>
+          <a:xfrm rot="16200000" flipV="1">
+            <a:off x="4162376" y="3013926"/>
+            <a:ext cx="12700" cy="1028738"/>
+          </a:xfrm>
+          <a:prstGeom prst="bentConnector3">
+            <a:avLst>
+              <a:gd name="adj1" fmla="val 1800000"/>
+            </a:avLst>
+          </a:prstGeom>
+          <a:ln>
+            <a:tailEnd type="arrow"/>
+          </a:ln>
+        </p:spPr>
+        <p:style>
+          <a:lnRef idx="3">
+            <a:schemeClr val="accent5"/>
+          </a:lnRef>
+          <a:fillRef idx="0">
+            <a:schemeClr val="accent5"/>
+          </a:fillRef>
+          <a:effectRef idx="2">
+            <a:schemeClr val="accent5"/>
+          </a:effectRef>
+          <a:fontRef idx="minor">
+            <a:schemeClr val="tx1"/>
+          </a:fontRef>
+        </p:style>
+      </p:cxnSp>
+      <p:cxnSp>
+        <p:nvCxnSpPr>
+          <p:cNvPr id="11" name="Elbow Connector 10"/>
+          <p:cNvCxnSpPr>
+            <a:stCxn id="7" idx="0"/>
+            <a:endCxn id="9" idx="0"/>
+          </p:cNvCxnSpPr>
+          <p:nvPr/>
+        </p:nvCxnSpPr>
+        <p:spPr>
+          <a:xfrm rot="16200000" flipV="1">
+            <a:off x="3644171" y="2495721"/>
+            <a:ext cx="12700" cy="2065148"/>
+          </a:xfrm>
+          <a:prstGeom prst="bentConnector3">
+            <a:avLst>
+              <a:gd name="adj1" fmla="val 3407764"/>
+            </a:avLst>
+          </a:prstGeom>
+          <a:ln>
+            <a:tailEnd type="arrow"/>
+          </a:ln>
+        </p:spPr>
+        <p:style>
+          <a:lnRef idx="3">
+            <a:schemeClr val="accent5"/>
+          </a:lnRef>
+          <a:fillRef idx="0">
+            <a:schemeClr val="accent5"/>
+          </a:fillRef>
+          <a:effectRef idx="2">
+            <a:schemeClr val="accent5"/>
+          </a:effectRef>
+          <a:fontRef idx="minor">
+            <a:schemeClr val="tx1"/>
+          </a:fontRef>
+        </p:style>
+      </p:cxnSp>
+      <p:cxnSp>
+        <p:nvCxnSpPr>
+          <p:cNvPr id="12" name="Elbow Connector 11"/>
+          <p:cNvCxnSpPr>
+            <a:stCxn id="7" idx="0"/>
+            <a:endCxn id="8" idx="0"/>
+          </p:cNvCxnSpPr>
+          <p:nvPr/>
+        </p:nvCxnSpPr>
+        <p:spPr>
+          <a:xfrm rot="5400000" flipH="1" flipV="1">
+            <a:off x="5197722" y="3007318"/>
+            <a:ext cx="12700" cy="1041954"/>
+          </a:xfrm>
+          <a:prstGeom prst="bentConnector3">
+            <a:avLst>
+              <a:gd name="adj1" fmla="val 2429126"/>
+            </a:avLst>
+          </a:prstGeom>
+          <a:ln>
+            <a:tailEnd type="arrow"/>
+          </a:ln>
+        </p:spPr>
+        <p:style>
+          <a:lnRef idx="3">
+            <a:schemeClr val="accent5"/>
+          </a:lnRef>
+          <a:fillRef idx="0">
+            <a:schemeClr val="accent5"/>
+          </a:fillRef>
+          <a:effectRef idx="2">
+            <a:schemeClr val="accent5"/>
+          </a:effectRef>
+          <a:fontRef idx="minor">
+            <a:schemeClr val="tx1"/>
+          </a:fontRef>
+        </p:style>
+      </p:cxnSp>
+      <p:sp>
+        <p:nvSpPr>
+          <p:cNvPr id="13" name="Left Brace 12"/>
+          <p:cNvSpPr/>
+          <p:nvPr/>
+        </p:nvSpPr>
+        <p:spPr>
+          <a:xfrm rot="16200000">
+            <a:off x="3869236" y="3191405"/>
+            <a:ext cx="598174" cy="3100752"/>
+          </a:xfrm>
+          <a:prstGeom prst="leftBrace">
+            <a:avLst/>
+          </a:prstGeom>
+        </p:spPr>
+        <p:style>
+          <a:lnRef idx="3">
+            <a:schemeClr val="accent2"/>
+          </a:lnRef>
+          <a:fillRef idx="0">
+            <a:schemeClr val="accent2"/>
+          </a:fillRef>
+          <a:effectRef idx="2">
+            <a:schemeClr val="accent2"/>
+          </a:effectRef>
+          <a:fontRef idx="minor">
+            <a:schemeClr val="tx1"/>
+          </a:fontRef>
+        </p:style>
+        <p:txBody>
+          <a:bodyPr rtlCol="0" anchor="ctr"/>
+          <a:lstStyle/>
+          <a:p>
+            <a:pPr algn="ctr"/>
+            <a:endParaRPr lang="en-US"/>
+          </a:p>
+        </p:txBody>
+      </p:sp>
+      <p:sp>
+        <p:nvSpPr>
+          <p:cNvPr id="14" name="TextBox 13"/>
+          <p:cNvSpPr txBox="1"/>
+          <p:nvPr/>
+        </p:nvSpPr>
+        <p:spPr>
+          <a:xfrm>
+            <a:off x="3810000" y="5345668"/>
+            <a:ext cx="587020" cy="369332"/>
+          </a:xfrm>
+          <a:prstGeom prst="rect">
+            <a:avLst/>
+          </a:prstGeom>
+          <a:noFill/>
+        </p:spPr>
+        <p:txBody>
+          <a:bodyPr wrap="none" rtlCol="0">
+            <a:spAutoFit/>
+          </a:bodyPr>
+          <a:lstStyle/>
+          <a:p>
+            <a:r>
+              <a:rPr lang="en-US" dirty="0"/>
+              <a:t>k</a:t>
+            </a:r>
+            <a:r>
+              <a:rPr lang="en-US" dirty="0" smtClean="0"/>
+              <a:t>=4</a:t>
+            </a:r>
+            <a:endParaRPr lang="en-US" dirty="0"/>
+          </a:p>
+        </p:txBody>
+      </p:sp>
+      <p:sp>
+        <p:nvSpPr>
+          <p:cNvPr id="15" name="Oval 14"/>
+          <p:cNvSpPr/>
+          <p:nvPr/>
+        </p:nvSpPr>
+        <p:spPr>
+          <a:xfrm>
+            <a:off x="1143000" y="3534645"/>
+            <a:ext cx="914400" cy="914400"/>
+          </a:xfrm>
+          <a:prstGeom prst="ellipse">
+            <a:avLst/>
+          </a:prstGeom>
+        </p:spPr>
+        <p:style>
+          <a:lnRef idx="2">
+            <a:schemeClr val="accent1">
+              <a:shade val="50000"/>
+            </a:schemeClr>
+          </a:lnRef>
+          <a:fillRef idx="1">
+            <a:schemeClr val="accent1"/>
+          </a:fillRef>
+          <a:effectRef idx="0">
+            <a:schemeClr val="accent1"/>
+          </a:effectRef>
+          <a:fontRef idx="minor">
+            <a:schemeClr val="lt1"/>
+          </a:fontRef>
+        </p:style>
+        <p:txBody>
+          <a:bodyPr rtlCol="0" anchor="ctr"/>
+          <a:lstStyle/>
+          <a:p>
+            <a:pPr algn="ctr"/>
+            <a:r>
+              <a:rPr lang="en-US" dirty="0" smtClean="0"/>
+              <a:t>C</a:t>
+            </a:r>
+          </a:p>
+        </p:txBody>
+      </p:sp>
+      <p:sp>
+        <p:nvSpPr>
+          <p:cNvPr id="16" name="Oval 15"/>
+          <p:cNvSpPr/>
+          <p:nvPr/>
+        </p:nvSpPr>
+        <p:spPr>
+          <a:xfrm>
+            <a:off x="6324600" y="3534645"/>
+            <a:ext cx="914400" cy="914400"/>
+          </a:xfrm>
+          <a:prstGeom prst="ellipse">
+            <a:avLst/>
+          </a:prstGeom>
+        </p:spPr>
+        <p:style>
+          <a:lnRef idx="2">
+            <a:schemeClr val="accent1">
+              <a:shade val="50000"/>
+            </a:schemeClr>
+          </a:lnRef>
+          <a:fillRef idx="1">
+            <a:schemeClr val="accent1"/>
+          </a:fillRef>
+          <a:effectRef idx="0">
+            <a:schemeClr val="accent1"/>
+          </a:effectRef>
+          <a:fontRef idx="minor">
+            <a:schemeClr val="lt1"/>
+          </a:fontRef>
+        </p:style>
+        <p:txBody>
+          <a:bodyPr rtlCol="0" anchor="ctr"/>
+          <a:lstStyle/>
+          <a:p>
+            <a:pPr algn="ctr"/>
+            <a:endParaRPr lang="en-US" dirty="0"/>
+          </a:p>
+        </p:txBody>
+      </p:sp>
+      <p:sp>
+        <p:nvSpPr>
+          <p:cNvPr id="17" name="Oval 16"/>
+          <p:cNvSpPr/>
+          <p:nvPr/>
+        </p:nvSpPr>
+        <p:spPr>
+          <a:xfrm>
+            <a:off x="7391400" y="3534645"/>
+            <a:ext cx="914400" cy="914400"/>
+          </a:xfrm>
+          <a:prstGeom prst="ellipse">
+            <a:avLst/>
+          </a:prstGeom>
+        </p:spPr>
+        <p:style>
+          <a:lnRef idx="2">
+            <a:schemeClr val="accent1">
+              <a:shade val="50000"/>
+            </a:schemeClr>
+          </a:lnRef>
+          <a:fillRef idx="1">
+            <a:schemeClr val="accent1"/>
+          </a:fillRef>
+          <a:effectRef idx="0">
+            <a:schemeClr val="accent1"/>
+          </a:effectRef>
+          <a:fontRef idx="minor">
+            <a:schemeClr val="lt1"/>
+          </a:fontRef>
+        </p:style>
+        <p:txBody>
+          <a:bodyPr rtlCol="0" anchor="ctr"/>
+          <a:lstStyle/>
+          <a:p>
+            <a:pPr algn="ctr"/>
+            <a:r>
+              <a:rPr lang="en-US" dirty="0" smtClean="0"/>
+              <a:t>B</a:t>
+            </a:r>
+            <a:endParaRPr lang="en-US" dirty="0"/>
+          </a:p>
+        </p:txBody>
+      </p:sp>
+      <p:sp>
+        <p:nvSpPr>
+          <p:cNvPr id="18" name="TextBox 17"/>
+          <p:cNvSpPr txBox="1"/>
+          <p:nvPr/>
+        </p:nvSpPr>
+        <p:spPr>
+          <a:xfrm>
+            <a:off x="469234" y="3521944"/>
+            <a:ext cx="433132" cy="461665"/>
+          </a:xfrm>
+          <a:prstGeom prst="rect">
+            <a:avLst/>
+          </a:prstGeom>
+          <a:noFill/>
+        </p:spPr>
+        <p:txBody>
+          <a:bodyPr wrap="none" rtlCol="0">
+            <a:spAutoFit/>
+          </a:bodyPr>
+          <a:lstStyle/>
+          <a:p>
+            <a:r>
+              <a:rPr lang="en-US" sz="2400" dirty="0" smtClean="0"/>
+              <a:t>…</a:t>
+            </a:r>
+            <a:endParaRPr lang="en-US" sz="2400" dirty="0"/>
+          </a:p>
+        </p:txBody>
+      </p:sp>
+      <p:sp>
+        <p:nvSpPr>
+          <p:cNvPr id="19" name="TextBox 18"/>
+          <p:cNvSpPr txBox="1"/>
+          <p:nvPr/>
+        </p:nvSpPr>
+        <p:spPr>
+          <a:xfrm>
+            <a:off x="8458200" y="3521943"/>
+            <a:ext cx="433132" cy="461665"/>
+          </a:xfrm>
+          <a:prstGeom prst="rect">
+            <a:avLst/>
+          </a:prstGeom>
+          <a:noFill/>
+        </p:spPr>
+        <p:txBody>
+          <a:bodyPr wrap="none" rtlCol="0">
+            <a:spAutoFit/>
+          </a:bodyPr>
+          <a:lstStyle/>
+          <a:p>
+            <a:r>
+              <a:rPr lang="en-US" sz="2400" dirty="0" smtClean="0"/>
+              <a:t>…</a:t>
+            </a:r>
+            <a:endParaRPr lang="en-US" sz="2400" dirty="0"/>
+          </a:p>
+        </p:txBody>
+      </p:sp>
+      <p:cxnSp>
+        <p:nvCxnSpPr>
+          <p:cNvPr id="21" name="Elbow Connector 20"/>
+          <p:cNvCxnSpPr>
+            <a:stCxn id="6" idx="4"/>
+            <a:endCxn id="17" idx="4"/>
+          </p:cNvCxnSpPr>
+          <p:nvPr/>
+        </p:nvCxnSpPr>
+        <p:spPr>
+          <a:xfrm rot="16200000" flipH="1">
+            <a:off x="5745128" y="2345573"/>
+            <a:ext cx="6350" cy="4200593"/>
+          </a:xfrm>
+          <a:prstGeom prst="bentConnector3">
+            <a:avLst>
+              <a:gd name="adj1" fmla="val 2861102"/>
+            </a:avLst>
+          </a:prstGeom>
+          <a:ln>
+            <a:tailEnd type="arrow"/>
+          </a:ln>
+        </p:spPr>
+        <p:style>
+          <a:lnRef idx="3">
+            <a:schemeClr val="accent1"/>
+          </a:lnRef>
+          <a:fillRef idx="0">
+            <a:schemeClr val="accent1"/>
+          </a:fillRef>
+          <a:effectRef idx="2">
+            <a:schemeClr val="accent1"/>
+          </a:effectRef>
+          <a:fontRef idx="minor">
+            <a:schemeClr val="tx1"/>
+          </a:fontRef>
+        </p:style>
+      </p:cxnSp>
+      <p:cxnSp>
+        <p:nvCxnSpPr>
+          <p:cNvPr id="24" name="Elbow Connector 23"/>
+          <p:cNvCxnSpPr>
+            <a:stCxn id="15" idx="4"/>
+            <a:endCxn id="17" idx="4"/>
+          </p:cNvCxnSpPr>
+          <p:nvPr/>
+        </p:nvCxnSpPr>
+        <p:spPr>
+          <a:xfrm rot="16200000" flipH="1">
+            <a:off x="4724400" y="1324845"/>
+            <a:ext cx="12700" cy="6248400"/>
+          </a:xfrm>
+          <a:prstGeom prst="bentConnector3">
+            <a:avLst>
+              <a:gd name="adj1" fmla="val 3337866"/>
+            </a:avLst>
+          </a:prstGeom>
+          <a:ln>
+            <a:tailEnd type="arrow"/>
+          </a:ln>
+        </p:spPr>
+        <p:style>
+          <a:lnRef idx="3">
+            <a:schemeClr val="accent1"/>
+          </a:lnRef>
+          <a:fillRef idx="0">
+            <a:schemeClr val="accent1"/>
+          </a:fillRef>
+          <a:effectRef idx="2">
+            <a:schemeClr val="accent1"/>
+          </a:effectRef>
+          <a:fontRef idx="minor">
+            <a:schemeClr val="tx1"/>
+          </a:fontRef>
+        </p:style>
+      </p:cxnSp>
+    </p:spTree>
+    <p:extLst>
+      <p:ext uri="{BB962C8B-B14F-4D97-AF65-F5344CB8AC3E}">
+        <p14:creationId xmlns:p14="http://schemas.microsoft.com/office/powerpoint/2010/main" val="3158278417"/>
+      </p:ext>
+    </p:extLst>
+  </p:cSld>
+  <p:clrMapOvr>
+    <a:masterClrMapping/>
+  </p:clrMapOvr>
+  <p:timing>
+    <p:tnLst>
+      <p:par>
+        <p:cTn id="1" dur="indefinite" restart="never" nodeType="tmRoot">
+          <p:childTnLst>
+            <p:seq concurrent="1" nextAc="seek">
+              <p:cTn id="2" dur="indefinite" nodeType="mainSeq">
+                <p:childTnLst>
+                  <p:par>
+                    <p:cTn id="3" fill="hold">
+                      <p:stCondLst>
+                        <p:cond delay="indefinite"/>
+                      </p:stCondLst>
+                      <p:childTnLst>
+                        <p:par>
+                          <p:cTn id="4" fill="hold">
+                            <p:stCondLst>
+                              <p:cond delay="0"/>
+                            </p:stCondLst>
+                            <p:childTnLst>
+                              <p:par>
+                                <p:cTn id="5" presetID="1" presetClass="entr" presetSubtype="0" fill="hold" nodeType="clickEffect">
+                                  <p:stCondLst>
+                                    <p:cond delay="0"/>
+                                  </p:stCondLst>
+                                  <p:childTnLst>
+                                    <p:set>
+                                      <p:cBhvr>
+                                        <p:cTn id="6" dur="1" fill="hold">
+                                          <p:stCondLst>
+                                            <p:cond delay="0"/>
+                                          </p:stCondLst>
+                                        </p:cTn>
+                                        <p:tgtEl>
+                                          <p:spTgt spid="4">
+                                            <p:txEl>
+                                              <p:pRg st="2" end="2"/>
+                                            </p:txEl>
+                                          </p:spTgt>
+                                        </p:tgtEl>
+                                        <p:attrNameLst>
+                                          <p:attrName>style.visibility</p:attrName>
+                                        </p:attrNameLst>
+                                      </p:cBhvr>
+                                      <p:to>
+                                        <p:strVal val="visible"/>
+                                      </p:to>
+                                    </p:set>
+                                  </p:childTnLst>
+                                </p:cTn>
+                              </p:par>
+                            </p:childTnLst>
+                          </p:cTn>
+                        </p:par>
+                      </p:childTnLst>
+                    </p:cTn>
+                  </p:par>
+                  <p:par>
+                    <p:cTn id="7" fill="hold">
+                      <p:stCondLst>
+                        <p:cond delay="indefinite"/>
+                      </p:stCondLst>
+                      <p:childTnLst>
+                        <p:par>
+                          <p:cTn id="8" fill="hold">
+                            <p:stCondLst>
+                              <p:cond delay="0"/>
+                            </p:stCondLst>
+                            <p:childTnLst>
+                              <p:par>
+                                <p:cTn id="9" presetID="1" presetClass="entr" presetSubtype="0" fill="hold" nodeType="clickEffect">
+                                  <p:stCondLst>
+                                    <p:cond delay="0"/>
+                                  </p:stCondLst>
+                                  <p:childTnLst>
+                                    <p:set>
+                                      <p:cBhvr>
+                                        <p:cTn id="10" dur="1" fill="hold">
+                                          <p:stCondLst>
+                                            <p:cond delay="0"/>
+                                          </p:stCondLst>
+                                        </p:cTn>
+                                        <p:tgtEl>
+                                          <p:spTgt spid="24"/>
+                                        </p:tgtEl>
+                                        <p:attrNameLst>
+                                          <p:attrName>style.visibility</p:attrName>
+                                        </p:attrNameLst>
+                                      </p:cBhvr>
+                                      <p:to>
+                                        <p:strVal val="visible"/>
+                                      </p:to>
+                                    </p:set>
+                                  </p:childTnLst>
+                                </p:cTn>
+                              </p:par>
+                            </p:childTnLst>
+                          </p:cTn>
+                        </p:par>
+                      </p:childTnLst>
+                    </p:cTn>
+                  </p:par>
+                </p:childTnLst>
+              </p:cTn>
+              <p:prevCondLst>
+                <p:cond evt="onPrev" delay="0">
+                  <p:tgtEl>
+                    <p:sldTgt/>
+                  </p:tgtEl>
+                </p:cond>
+              </p:prevCondLst>
+              <p:nextCondLst>
+                <p:cond evt="onNext" delay="0">
+                  <p:tgtEl>
+                    <p:sldTgt/>
+                  </p:tgtEl>
+                </p:cond>
+              </p:nextCondLst>
+            </p:seq>
+          </p:childTnLst>
+        </p:cTn>
+      </p:par>
+    </p:tnLst>
+  </p:timing>
 </p:sld>
 </file>
 

</xml_diff>

<commit_message>
presentation: replica diversion done, file diversion done?
</commit_message>
<xml_diff>
--- a/p2p/P2P Apps.pptx
+++ b/p2p/P2P Apps.pptx
@@ -5,7 +5,7 @@
     <p:sldMasterId id="2147483684" r:id="rId1"/>
   </p:sldMasterIdLst>
   <p:notesMasterIdLst>
-    <p:notesMasterId r:id="rId35"/>
+    <p:notesMasterId r:id="rId37"/>
   </p:notesMasterIdLst>
   <p:sldIdLst>
     <p:sldId id="256" r:id="rId2"/>
@@ -41,6 +41,8 @@
     <p:sldId id="291" r:id="rId32"/>
     <p:sldId id="292" r:id="rId33"/>
     <p:sldId id="293" r:id="rId34"/>
+    <p:sldId id="294" r:id="rId35"/>
+    <p:sldId id="295" r:id="rId36"/>
   </p:sldIdLst>
   <p:sldSz cx="9144000" cy="6858000" type="screen4x3"/>
   <p:notesSz cx="6858000" cy="9144000"/>
@@ -19411,6 +19413,1428 @@
             </p:seq>
           </p:childTnLst>
         </p:cTn>
+      </p:par>
+    </p:tnLst>
+  </p:timing>
+</p:sld>
+</file>
+
+<file path=ppt/slides/slide34.xml><?xml version="1.0" encoding="utf-8"?>
+<p:sld xmlns:a="http://schemas.openxmlformats.org/drawingml/2006/main" xmlns:r="http://schemas.openxmlformats.org/officeDocument/2006/relationships" xmlns:p="http://schemas.openxmlformats.org/presentationml/2006/main">
+  <p:cSld>
+    <p:spTree>
+      <p:nvGrpSpPr>
+        <p:cNvPr id="1" name=""/>
+        <p:cNvGrpSpPr/>
+        <p:nvPr/>
+      </p:nvGrpSpPr>
+      <p:grpSpPr>
+        <a:xfrm>
+          <a:off x="0" y="0"/>
+          <a:ext cx="0" cy="0"/>
+          <a:chOff x="0" y="0"/>
+          <a:chExt cx="0" cy="0"/>
+        </a:xfrm>
+      </p:grpSpPr>
+      <p:sp>
+        <p:nvSpPr>
+          <p:cNvPr id="2" name="Title 1"/>
+          <p:cNvSpPr>
+            <a:spLocks noGrp="1"/>
+          </p:cNvSpPr>
+          <p:nvPr>
+            <p:ph type="title"/>
+          </p:nvPr>
+        </p:nvSpPr>
+        <p:spPr/>
+        <p:txBody>
+          <a:bodyPr/>
+          <a:lstStyle/>
+          <a:p>
+            <a:r>
+              <a:rPr lang="en-US" dirty="0" smtClean="0"/>
+              <a:t>Replica Diversion</a:t>
+            </a:r>
+            <a:endParaRPr lang="en-US" dirty="0"/>
+          </a:p>
+        </p:txBody>
+      </p:sp>
+      <p:sp>
+        <p:nvSpPr>
+          <p:cNvPr id="3" name="Slide Number Placeholder 2"/>
+          <p:cNvSpPr>
+            <a:spLocks noGrp="1"/>
+          </p:cNvSpPr>
+          <p:nvPr>
+            <p:ph type="sldNum" sz="quarter" idx="12"/>
+          </p:nvPr>
+        </p:nvSpPr>
+        <p:spPr/>
+        <p:txBody>
+          <a:bodyPr/>
+          <a:lstStyle/>
+          <a:p>
+            <a:fld id="{7D5018C4-273E-49AF-93AB-259FCF9A742C}" type="slidenum">
+              <a:rPr lang="en-US" smtClean="0"/>
+              <a:t>34</a:t>
+            </a:fld>
+            <a:endParaRPr lang="en-US"/>
+          </a:p>
+        </p:txBody>
+      </p:sp>
+      <p:sp>
+        <p:nvSpPr>
+          <p:cNvPr id="4" name="Content Placeholder 3"/>
+          <p:cNvSpPr>
+            <a:spLocks noGrp="1"/>
+          </p:cNvSpPr>
+          <p:nvPr>
+            <p:ph sz="quarter" idx="1"/>
+          </p:nvPr>
+        </p:nvSpPr>
+        <p:spPr/>
+        <p:txBody>
+          <a:bodyPr/>
+          <a:lstStyle/>
+          <a:p>
+            <a:pPr lvl="0"/>
+            <a:r>
+              <a:rPr lang="en-US" dirty="0" smtClean="0"/>
+              <a:t>Diversion metric:</a:t>
+            </a:r>
+          </a:p>
+          <a:p>
+            <a:pPr lvl="1"/>
+            <a:r>
+              <a:rPr lang="en-US" dirty="0" smtClean="0"/>
+              <a:t>(file size) / (free space) &gt; t ?</a:t>
+            </a:r>
+          </a:p>
+          <a:p>
+            <a:pPr lvl="1"/>
+            <a:r>
+              <a:rPr lang="en-US" dirty="0" smtClean="0"/>
+              <a:t>‘t’ is system parameter</a:t>
+            </a:r>
+          </a:p>
+        </p:txBody>
+      </p:sp>
+      <p:cxnSp>
+        <p:nvCxnSpPr>
+          <p:cNvPr id="5" name="Straight Connector 4"/>
+          <p:cNvCxnSpPr/>
+          <p:nvPr/>
+        </p:nvCxnSpPr>
+        <p:spPr>
+          <a:xfrm flipH="1" flipV="1">
+            <a:off x="152400" y="4050268"/>
+            <a:ext cx="8839200" cy="3048"/>
+          </a:xfrm>
+          <a:prstGeom prst="line">
+            <a:avLst/>
+          </a:prstGeom>
+        </p:spPr>
+        <p:style>
+          <a:lnRef idx="3">
+            <a:schemeClr val="dk1"/>
+          </a:lnRef>
+          <a:fillRef idx="0">
+            <a:schemeClr val="dk1"/>
+          </a:fillRef>
+          <a:effectRef idx="2">
+            <a:schemeClr val="dk1"/>
+          </a:effectRef>
+          <a:fontRef idx="minor">
+            <a:schemeClr val="tx1"/>
+          </a:fontRef>
+        </p:style>
+      </p:cxnSp>
+      <p:sp>
+        <p:nvSpPr>
+          <p:cNvPr id="6" name="Oval 5"/>
+          <p:cNvSpPr/>
+          <p:nvPr/>
+        </p:nvSpPr>
+        <p:spPr>
+          <a:xfrm>
+            <a:off x="3190807" y="3528295"/>
+            <a:ext cx="914400" cy="914400"/>
+          </a:xfrm>
+          <a:prstGeom prst="ellipse">
+            <a:avLst/>
+          </a:prstGeom>
+        </p:spPr>
+        <p:style>
+          <a:lnRef idx="2">
+            <a:schemeClr val="accent1">
+              <a:shade val="50000"/>
+            </a:schemeClr>
+          </a:lnRef>
+          <a:fillRef idx="1">
+            <a:schemeClr val="accent1"/>
+          </a:fillRef>
+          <a:effectRef idx="0">
+            <a:schemeClr val="accent1"/>
+          </a:effectRef>
+          <a:fontRef idx="minor">
+            <a:schemeClr val="lt1"/>
+          </a:fontRef>
+        </p:style>
+        <p:txBody>
+          <a:bodyPr rtlCol="0" anchor="ctr"/>
+          <a:lstStyle/>
+          <a:p>
+            <a:pPr algn="ctr"/>
+            <a:r>
+              <a:rPr lang="en-US" dirty="0"/>
+              <a:t>A</a:t>
+            </a:r>
+          </a:p>
+        </p:txBody>
+      </p:sp>
+      <p:sp>
+        <p:nvSpPr>
+          <p:cNvPr id="7" name="Oval 6"/>
+          <p:cNvSpPr/>
+          <p:nvPr/>
+        </p:nvSpPr>
+        <p:spPr>
+          <a:xfrm>
+            <a:off x="4219545" y="3528295"/>
+            <a:ext cx="914400" cy="914400"/>
+          </a:xfrm>
+          <a:prstGeom prst="ellipse">
+            <a:avLst/>
+          </a:prstGeom>
+        </p:spPr>
+        <p:style>
+          <a:lnRef idx="2">
+            <a:schemeClr val="accent1">
+              <a:shade val="50000"/>
+            </a:schemeClr>
+          </a:lnRef>
+          <a:fillRef idx="1">
+            <a:schemeClr val="accent1"/>
+          </a:fillRef>
+          <a:effectRef idx="0">
+            <a:schemeClr val="accent1"/>
+          </a:effectRef>
+          <a:fontRef idx="minor">
+            <a:schemeClr val="lt1"/>
+          </a:fontRef>
+        </p:style>
+        <p:txBody>
+          <a:bodyPr rtlCol="0" anchor="ctr"/>
+          <a:lstStyle/>
+          <a:p>
+            <a:pPr algn="ctr"/>
+            <a:r>
+              <a:rPr lang="en-US" dirty="0" smtClean="0"/>
+              <a:t>N</a:t>
+            </a:r>
+            <a:endParaRPr lang="en-US" dirty="0"/>
+          </a:p>
+        </p:txBody>
+      </p:sp>
+      <p:sp>
+        <p:nvSpPr>
+          <p:cNvPr id="8" name="Oval 7"/>
+          <p:cNvSpPr/>
+          <p:nvPr/>
+        </p:nvSpPr>
+        <p:spPr>
+          <a:xfrm>
+            <a:off x="5261499" y="3528295"/>
+            <a:ext cx="914400" cy="914400"/>
+          </a:xfrm>
+          <a:prstGeom prst="ellipse">
+            <a:avLst/>
+          </a:prstGeom>
+        </p:spPr>
+        <p:style>
+          <a:lnRef idx="2">
+            <a:schemeClr val="accent1">
+              <a:shade val="50000"/>
+            </a:schemeClr>
+          </a:lnRef>
+          <a:fillRef idx="1">
+            <a:schemeClr val="accent1"/>
+          </a:fillRef>
+          <a:effectRef idx="0">
+            <a:schemeClr val="accent1"/>
+          </a:effectRef>
+          <a:fontRef idx="minor">
+            <a:schemeClr val="lt1"/>
+          </a:fontRef>
+        </p:style>
+        <p:txBody>
+          <a:bodyPr rtlCol="0" anchor="ctr"/>
+          <a:lstStyle/>
+          <a:p>
+            <a:pPr algn="ctr"/>
+            <a:endParaRPr lang="en-US" dirty="0"/>
+          </a:p>
+        </p:txBody>
+      </p:sp>
+      <p:sp>
+        <p:nvSpPr>
+          <p:cNvPr id="9" name="Oval 8"/>
+          <p:cNvSpPr/>
+          <p:nvPr/>
+        </p:nvSpPr>
+        <p:spPr>
+          <a:xfrm>
+            <a:off x="2154397" y="3528295"/>
+            <a:ext cx="914400" cy="914400"/>
+          </a:xfrm>
+          <a:prstGeom prst="ellipse">
+            <a:avLst/>
+          </a:prstGeom>
+        </p:spPr>
+        <p:style>
+          <a:lnRef idx="2">
+            <a:schemeClr val="accent1">
+              <a:shade val="50000"/>
+            </a:schemeClr>
+          </a:lnRef>
+          <a:fillRef idx="1">
+            <a:schemeClr val="accent1"/>
+          </a:fillRef>
+          <a:effectRef idx="0">
+            <a:schemeClr val="accent1"/>
+          </a:effectRef>
+          <a:fontRef idx="minor">
+            <a:schemeClr val="lt1"/>
+          </a:fontRef>
+        </p:style>
+        <p:txBody>
+          <a:bodyPr rtlCol="0" anchor="ctr"/>
+          <a:lstStyle/>
+          <a:p>
+            <a:pPr algn="ctr"/>
+            <a:endParaRPr lang="en-US" dirty="0"/>
+          </a:p>
+        </p:txBody>
+      </p:sp>
+      <p:cxnSp>
+        <p:nvCxnSpPr>
+          <p:cNvPr id="10" name="Elbow Connector 9"/>
+          <p:cNvCxnSpPr>
+            <a:stCxn id="7" idx="0"/>
+            <a:endCxn id="6" idx="0"/>
+          </p:cNvCxnSpPr>
+          <p:nvPr/>
+        </p:nvCxnSpPr>
+        <p:spPr>
+          <a:xfrm rot="16200000" flipV="1">
+            <a:off x="4162376" y="3013926"/>
+            <a:ext cx="12700" cy="1028738"/>
+          </a:xfrm>
+          <a:prstGeom prst="bentConnector3">
+            <a:avLst>
+              <a:gd name="adj1" fmla="val 1800000"/>
+            </a:avLst>
+          </a:prstGeom>
+          <a:ln>
+            <a:tailEnd type="arrow"/>
+          </a:ln>
+        </p:spPr>
+        <p:style>
+          <a:lnRef idx="3">
+            <a:schemeClr val="accent5"/>
+          </a:lnRef>
+          <a:fillRef idx="0">
+            <a:schemeClr val="accent5"/>
+          </a:fillRef>
+          <a:effectRef idx="2">
+            <a:schemeClr val="accent5"/>
+          </a:effectRef>
+          <a:fontRef idx="minor">
+            <a:schemeClr val="tx1"/>
+          </a:fontRef>
+        </p:style>
+      </p:cxnSp>
+      <p:cxnSp>
+        <p:nvCxnSpPr>
+          <p:cNvPr id="11" name="Elbow Connector 10"/>
+          <p:cNvCxnSpPr>
+            <a:stCxn id="7" idx="0"/>
+            <a:endCxn id="9" idx="0"/>
+          </p:cNvCxnSpPr>
+          <p:nvPr/>
+        </p:nvCxnSpPr>
+        <p:spPr>
+          <a:xfrm rot="16200000" flipV="1">
+            <a:off x="3644171" y="2495721"/>
+            <a:ext cx="12700" cy="2065148"/>
+          </a:xfrm>
+          <a:prstGeom prst="bentConnector3">
+            <a:avLst>
+              <a:gd name="adj1" fmla="val 3407764"/>
+            </a:avLst>
+          </a:prstGeom>
+          <a:ln>
+            <a:tailEnd type="arrow"/>
+          </a:ln>
+        </p:spPr>
+        <p:style>
+          <a:lnRef idx="3">
+            <a:schemeClr val="accent5"/>
+          </a:lnRef>
+          <a:fillRef idx="0">
+            <a:schemeClr val="accent5"/>
+          </a:fillRef>
+          <a:effectRef idx="2">
+            <a:schemeClr val="accent5"/>
+          </a:effectRef>
+          <a:fontRef idx="minor">
+            <a:schemeClr val="tx1"/>
+          </a:fontRef>
+        </p:style>
+      </p:cxnSp>
+      <p:cxnSp>
+        <p:nvCxnSpPr>
+          <p:cNvPr id="12" name="Elbow Connector 11"/>
+          <p:cNvCxnSpPr>
+            <a:stCxn id="7" idx="0"/>
+            <a:endCxn id="8" idx="0"/>
+          </p:cNvCxnSpPr>
+          <p:nvPr/>
+        </p:nvCxnSpPr>
+        <p:spPr>
+          <a:xfrm rot="5400000" flipH="1" flipV="1">
+            <a:off x="5197722" y="3007318"/>
+            <a:ext cx="12700" cy="1041954"/>
+          </a:xfrm>
+          <a:prstGeom prst="bentConnector3">
+            <a:avLst>
+              <a:gd name="adj1" fmla="val 2429126"/>
+            </a:avLst>
+          </a:prstGeom>
+          <a:ln>
+            <a:tailEnd type="arrow"/>
+          </a:ln>
+        </p:spPr>
+        <p:style>
+          <a:lnRef idx="3">
+            <a:schemeClr val="accent5"/>
+          </a:lnRef>
+          <a:fillRef idx="0">
+            <a:schemeClr val="accent5"/>
+          </a:fillRef>
+          <a:effectRef idx="2">
+            <a:schemeClr val="accent5"/>
+          </a:effectRef>
+          <a:fontRef idx="minor">
+            <a:schemeClr val="tx1"/>
+          </a:fontRef>
+        </p:style>
+      </p:cxnSp>
+      <p:sp>
+        <p:nvSpPr>
+          <p:cNvPr id="13" name="Left Brace 12"/>
+          <p:cNvSpPr/>
+          <p:nvPr/>
+        </p:nvSpPr>
+        <p:spPr>
+          <a:xfrm rot="16200000">
+            <a:off x="3869236" y="3191405"/>
+            <a:ext cx="598174" cy="3100752"/>
+          </a:xfrm>
+          <a:prstGeom prst="leftBrace">
+            <a:avLst/>
+          </a:prstGeom>
+        </p:spPr>
+        <p:style>
+          <a:lnRef idx="3">
+            <a:schemeClr val="accent2"/>
+          </a:lnRef>
+          <a:fillRef idx="0">
+            <a:schemeClr val="accent2"/>
+          </a:fillRef>
+          <a:effectRef idx="2">
+            <a:schemeClr val="accent2"/>
+          </a:effectRef>
+          <a:fontRef idx="minor">
+            <a:schemeClr val="tx1"/>
+          </a:fontRef>
+        </p:style>
+        <p:txBody>
+          <a:bodyPr rtlCol="0" anchor="ctr"/>
+          <a:lstStyle/>
+          <a:p>
+            <a:pPr algn="ctr"/>
+            <a:endParaRPr lang="en-US"/>
+          </a:p>
+        </p:txBody>
+      </p:sp>
+      <p:sp>
+        <p:nvSpPr>
+          <p:cNvPr id="14" name="TextBox 13"/>
+          <p:cNvSpPr txBox="1"/>
+          <p:nvPr/>
+        </p:nvSpPr>
+        <p:spPr>
+          <a:xfrm>
+            <a:off x="3810000" y="5345668"/>
+            <a:ext cx="587020" cy="369332"/>
+          </a:xfrm>
+          <a:prstGeom prst="rect">
+            <a:avLst/>
+          </a:prstGeom>
+          <a:noFill/>
+        </p:spPr>
+        <p:txBody>
+          <a:bodyPr wrap="none" rtlCol="0">
+            <a:spAutoFit/>
+          </a:bodyPr>
+          <a:lstStyle/>
+          <a:p>
+            <a:r>
+              <a:rPr lang="en-US" dirty="0"/>
+              <a:t>k</a:t>
+            </a:r>
+            <a:r>
+              <a:rPr lang="en-US" dirty="0" smtClean="0"/>
+              <a:t>=4</a:t>
+            </a:r>
+            <a:endParaRPr lang="en-US" dirty="0"/>
+          </a:p>
+        </p:txBody>
+      </p:sp>
+      <p:sp>
+        <p:nvSpPr>
+          <p:cNvPr id="15" name="Oval 14"/>
+          <p:cNvSpPr/>
+          <p:nvPr/>
+        </p:nvSpPr>
+        <p:spPr>
+          <a:xfrm>
+            <a:off x="1143000" y="3534645"/>
+            <a:ext cx="914400" cy="914400"/>
+          </a:xfrm>
+          <a:prstGeom prst="ellipse">
+            <a:avLst/>
+          </a:prstGeom>
+        </p:spPr>
+        <p:style>
+          <a:lnRef idx="2">
+            <a:schemeClr val="accent1">
+              <a:shade val="50000"/>
+            </a:schemeClr>
+          </a:lnRef>
+          <a:fillRef idx="1">
+            <a:schemeClr val="accent1"/>
+          </a:fillRef>
+          <a:effectRef idx="0">
+            <a:schemeClr val="accent1"/>
+          </a:effectRef>
+          <a:fontRef idx="minor">
+            <a:schemeClr val="lt1"/>
+          </a:fontRef>
+        </p:style>
+        <p:txBody>
+          <a:bodyPr rtlCol="0" anchor="ctr"/>
+          <a:lstStyle/>
+          <a:p>
+            <a:pPr algn="ctr"/>
+            <a:r>
+              <a:rPr lang="en-US" dirty="0" smtClean="0"/>
+              <a:t>C</a:t>
+            </a:r>
+          </a:p>
+        </p:txBody>
+      </p:sp>
+      <p:sp>
+        <p:nvSpPr>
+          <p:cNvPr id="16" name="Oval 15"/>
+          <p:cNvSpPr/>
+          <p:nvPr/>
+        </p:nvSpPr>
+        <p:spPr>
+          <a:xfrm>
+            <a:off x="6324600" y="3534645"/>
+            <a:ext cx="914400" cy="914400"/>
+          </a:xfrm>
+          <a:prstGeom prst="ellipse">
+            <a:avLst/>
+          </a:prstGeom>
+        </p:spPr>
+        <p:style>
+          <a:lnRef idx="2">
+            <a:schemeClr val="accent1">
+              <a:shade val="50000"/>
+            </a:schemeClr>
+          </a:lnRef>
+          <a:fillRef idx="1">
+            <a:schemeClr val="accent1"/>
+          </a:fillRef>
+          <a:effectRef idx="0">
+            <a:schemeClr val="accent1"/>
+          </a:effectRef>
+          <a:fontRef idx="minor">
+            <a:schemeClr val="lt1"/>
+          </a:fontRef>
+        </p:style>
+        <p:txBody>
+          <a:bodyPr rtlCol="0" anchor="ctr"/>
+          <a:lstStyle/>
+          <a:p>
+            <a:pPr algn="ctr"/>
+            <a:endParaRPr lang="en-US" dirty="0"/>
+          </a:p>
+        </p:txBody>
+      </p:sp>
+      <p:sp>
+        <p:nvSpPr>
+          <p:cNvPr id="17" name="Oval 16"/>
+          <p:cNvSpPr/>
+          <p:nvPr/>
+        </p:nvSpPr>
+        <p:spPr>
+          <a:xfrm>
+            <a:off x="7391400" y="3534645"/>
+            <a:ext cx="914400" cy="914400"/>
+          </a:xfrm>
+          <a:prstGeom prst="ellipse">
+            <a:avLst/>
+          </a:prstGeom>
+        </p:spPr>
+        <p:style>
+          <a:lnRef idx="2">
+            <a:schemeClr val="accent1">
+              <a:shade val="50000"/>
+            </a:schemeClr>
+          </a:lnRef>
+          <a:fillRef idx="1">
+            <a:schemeClr val="accent1"/>
+          </a:fillRef>
+          <a:effectRef idx="0">
+            <a:schemeClr val="accent1"/>
+          </a:effectRef>
+          <a:fontRef idx="minor">
+            <a:schemeClr val="lt1"/>
+          </a:fontRef>
+        </p:style>
+        <p:txBody>
+          <a:bodyPr rtlCol="0" anchor="ctr"/>
+          <a:lstStyle/>
+          <a:p>
+            <a:pPr algn="ctr"/>
+            <a:r>
+              <a:rPr lang="en-US" dirty="0" smtClean="0"/>
+              <a:t>B</a:t>
+            </a:r>
+            <a:endParaRPr lang="en-US" dirty="0"/>
+          </a:p>
+        </p:txBody>
+      </p:sp>
+      <p:sp>
+        <p:nvSpPr>
+          <p:cNvPr id="18" name="TextBox 17"/>
+          <p:cNvSpPr txBox="1"/>
+          <p:nvPr/>
+        </p:nvSpPr>
+        <p:spPr>
+          <a:xfrm>
+            <a:off x="469234" y="3521944"/>
+            <a:ext cx="433132" cy="461665"/>
+          </a:xfrm>
+          <a:prstGeom prst="rect">
+            <a:avLst/>
+          </a:prstGeom>
+          <a:noFill/>
+        </p:spPr>
+        <p:txBody>
+          <a:bodyPr wrap="none" rtlCol="0">
+            <a:spAutoFit/>
+          </a:bodyPr>
+          <a:lstStyle/>
+          <a:p>
+            <a:r>
+              <a:rPr lang="en-US" sz="2400" dirty="0" smtClean="0"/>
+              <a:t>…</a:t>
+            </a:r>
+            <a:endParaRPr lang="en-US" sz="2400" dirty="0"/>
+          </a:p>
+        </p:txBody>
+      </p:sp>
+      <p:sp>
+        <p:nvSpPr>
+          <p:cNvPr id="19" name="TextBox 18"/>
+          <p:cNvSpPr txBox="1"/>
+          <p:nvPr/>
+        </p:nvSpPr>
+        <p:spPr>
+          <a:xfrm>
+            <a:off x="8458200" y="3521943"/>
+            <a:ext cx="433132" cy="461665"/>
+          </a:xfrm>
+          <a:prstGeom prst="rect">
+            <a:avLst/>
+          </a:prstGeom>
+          <a:noFill/>
+        </p:spPr>
+        <p:txBody>
+          <a:bodyPr wrap="none" rtlCol="0">
+            <a:spAutoFit/>
+          </a:bodyPr>
+          <a:lstStyle/>
+          <a:p>
+            <a:r>
+              <a:rPr lang="en-US" sz="2400" dirty="0" smtClean="0"/>
+              <a:t>…</a:t>
+            </a:r>
+            <a:endParaRPr lang="en-US" sz="2400" dirty="0"/>
+          </a:p>
+        </p:txBody>
+      </p:sp>
+      <p:cxnSp>
+        <p:nvCxnSpPr>
+          <p:cNvPr id="21" name="Elbow Connector 20"/>
+          <p:cNvCxnSpPr>
+            <a:stCxn id="6" idx="4"/>
+            <a:endCxn id="17" idx="4"/>
+          </p:cNvCxnSpPr>
+          <p:nvPr/>
+        </p:nvCxnSpPr>
+        <p:spPr>
+          <a:xfrm rot="16200000" flipH="1">
+            <a:off x="5745128" y="2345573"/>
+            <a:ext cx="6350" cy="4200593"/>
+          </a:xfrm>
+          <a:prstGeom prst="bentConnector3">
+            <a:avLst>
+              <a:gd name="adj1" fmla="val 2861102"/>
+            </a:avLst>
+          </a:prstGeom>
+          <a:ln>
+            <a:tailEnd type="arrow"/>
+          </a:ln>
+        </p:spPr>
+        <p:style>
+          <a:lnRef idx="3">
+            <a:schemeClr val="accent1"/>
+          </a:lnRef>
+          <a:fillRef idx="0">
+            <a:schemeClr val="accent1"/>
+          </a:fillRef>
+          <a:effectRef idx="2">
+            <a:schemeClr val="accent1"/>
+          </a:effectRef>
+          <a:fontRef idx="minor">
+            <a:schemeClr val="tx1"/>
+          </a:fontRef>
+        </p:style>
+      </p:cxnSp>
+      <p:cxnSp>
+        <p:nvCxnSpPr>
+          <p:cNvPr id="24" name="Elbow Connector 23"/>
+          <p:cNvCxnSpPr>
+            <a:stCxn id="15" idx="4"/>
+            <a:endCxn id="17" idx="4"/>
+          </p:cNvCxnSpPr>
+          <p:nvPr/>
+        </p:nvCxnSpPr>
+        <p:spPr>
+          <a:xfrm rot="16200000" flipH="1">
+            <a:off x="4724400" y="1324845"/>
+            <a:ext cx="12700" cy="6248400"/>
+          </a:xfrm>
+          <a:prstGeom prst="bentConnector3">
+            <a:avLst>
+              <a:gd name="adj1" fmla="val 3337866"/>
+            </a:avLst>
+          </a:prstGeom>
+          <a:ln>
+            <a:tailEnd type="arrow"/>
+          </a:ln>
+        </p:spPr>
+        <p:style>
+          <a:lnRef idx="3">
+            <a:schemeClr val="accent1"/>
+          </a:lnRef>
+          <a:fillRef idx="0">
+            <a:schemeClr val="accent1"/>
+          </a:fillRef>
+          <a:effectRef idx="2">
+            <a:schemeClr val="accent1"/>
+          </a:effectRef>
+          <a:fontRef idx="minor">
+            <a:schemeClr val="tx1"/>
+          </a:fontRef>
+        </p:style>
+      </p:cxnSp>
+      <p:sp>
+        <p:nvSpPr>
+          <p:cNvPr id="20" name="Cloud 19"/>
+          <p:cNvSpPr/>
+          <p:nvPr/>
+        </p:nvSpPr>
+        <p:spPr>
+          <a:xfrm>
+            <a:off x="2154396" y="2674308"/>
+            <a:ext cx="2874803" cy="1078468"/>
+          </a:xfrm>
+          <a:prstGeom prst="cloud">
+            <a:avLst/>
+          </a:prstGeom>
+        </p:spPr>
+        <p:style>
+          <a:lnRef idx="1">
+            <a:schemeClr val="accent1"/>
+          </a:lnRef>
+          <a:fillRef idx="2">
+            <a:schemeClr val="accent1"/>
+          </a:fillRef>
+          <a:effectRef idx="1">
+            <a:schemeClr val="accent1"/>
+          </a:effectRef>
+          <a:fontRef idx="minor">
+            <a:schemeClr val="dk1"/>
+          </a:fontRef>
+        </p:style>
+        <p:txBody>
+          <a:bodyPr rtlCol="0" anchor="ctr"/>
+          <a:lstStyle/>
+          <a:p>
+            <a:pPr algn="ctr"/>
+            <a:r>
+              <a:rPr lang="en-US" sz="1400" dirty="0" smtClean="0"/>
+              <a:t>Size / space &gt; </a:t>
+            </a:r>
+            <a:r>
+              <a:rPr lang="en-US" sz="1400" dirty="0" err="1" smtClean="0"/>
+              <a:t>t_pri</a:t>
+            </a:r>
+            <a:r>
+              <a:rPr lang="en-US" sz="1400" dirty="0"/>
+              <a:t> </a:t>
+            </a:r>
+            <a:r>
+              <a:rPr lang="en-US" sz="1400" dirty="0" smtClean="0"/>
+              <a:t>?</a:t>
+            </a:r>
+            <a:endParaRPr lang="en-US" sz="1400" dirty="0"/>
+          </a:p>
+        </p:txBody>
+      </p:sp>
+      <p:sp>
+        <p:nvSpPr>
+          <p:cNvPr id="23" name="Cloud 22"/>
+          <p:cNvSpPr/>
+          <p:nvPr/>
+        </p:nvSpPr>
+        <p:spPr>
+          <a:xfrm>
+            <a:off x="6116797" y="2674308"/>
+            <a:ext cx="2874803" cy="1078468"/>
+          </a:xfrm>
+          <a:prstGeom prst="cloud">
+            <a:avLst/>
+          </a:prstGeom>
+        </p:spPr>
+        <p:style>
+          <a:lnRef idx="1">
+            <a:schemeClr val="accent1"/>
+          </a:lnRef>
+          <a:fillRef idx="2">
+            <a:schemeClr val="accent1"/>
+          </a:fillRef>
+          <a:effectRef idx="1">
+            <a:schemeClr val="accent1"/>
+          </a:effectRef>
+          <a:fontRef idx="minor">
+            <a:schemeClr val="dk1"/>
+          </a:fontRef>
+        </p:style>
+        <p:txBody>
+          <a:bodyPr rtlCol="0" anchor="ctr"/>
+          <a:lstStyle/>
+          <a:p>
+            <a:pPr algn="ctr"/>
+            <a:r>
+              <a:rPr lang="en-US" sz="1400" dirty="0" smtClean="0"/>
+              <a:t>Size / space &gt; </a:t>
+            </a:r>
+            <a:r>
+              <a:rPr lang="en-US" sz="1400" dirty="0" err="1" smtClean="0"/>
+              <a:t>t_div</a:t>
+            </a:r>
+            <a:r>
+              <a:rPr lang="en-US" sz="1400" dirty="0" smtClean="0"/>
+              <a:t> ?</a:t>
+            </a:r>
+            <a:endParaRPr lang="en-US" sz="1400" dirty="0"/>
+          </a:p>
+        </p:txBody>
+      </p:sp>
+      <p:sp>
+        <p:nvSpPr>
+          <p:cNvPr id="22" name="TextBox 21"/>
+          <p:cNvSpPr txBox="1"/>
+          <p:nvPr/>
+        </p:nvSpPr>
+        <p:spPr>
+          <a:xfrm>
+            <a:off x="469233" y="5913099"/>
+            <a:ext cx="8422099" cy="369332"/>
+          </a:xfrm>
+          <a:prstGeom prst="rect">
+            <a:avLst/>
+          </a:prstGeom>
+          <a:noFill/>
+        </p:spPr>
+        <p:txBody>
+          <a:bodyPr wrap="square" rtlCol="0">
+            <a:spAutoFit/>
+          </a:bodyPr>
+          <a:lstStyle/>
+          <a:p>
+            <a:r>
+              <a:rPr lang="en-US" dirty="0" err="1" smtClean="0"/>
+              <a:t>t_pri</a:t>
+            </a:r>
+            <a:r>
+              <a:rPr lang="en-US" dirty="0" smtClean="0"/>
+              <a:t> &gt; </a:t>
+            </a:r>
+            <a:r>
+              <a:rPr lang="en-US" dirty="0" err="1" smtClean="0"/>
+              <a:t>t_div</a:t>
+            </a:r>
+            <a:r>
+              <a:rPr lang="en-US" dirty="0" smtClean="0"/>
+              <a:t>, prioritize primary replicas at a node over storing diverted files</a:t>
+            </a:r>
+            <a:endParaRPr lang="en-US" dirty="0"/>
+          </a:p>
+        </p:txBody>
+      </p:sp>
+      <p:sp>
+        <p:nvSpPr>
+          <p:cNvPr id="26" name="Oval 25"/>
+          <p:cNvSpPr/>
+          <p:nvPr/>
+        </p:nvSpPr>
+        <p:spPr>
+          <a:xfrm>
+            <a:off x="6007766" y="2135195"/>
+            <a:ext cx="2667000" cy="2156693"/>
+          </a:xfrm>
+          <a:prstGeom prst="ellipse">
+            <a:avLst/>
+          </a:prstGeom>
+          <a:noFill/>
+          <a:ln w="76200">
+            <a:solidFill>
+              <a:schemeClr val="accent1">
+                <a:lumMod val="75000"/>
+              </a:schemeClr>
+            </a:solidFill>
+            <a:prstDash val="solid"/>
+          </a:ln>
+        </p:spPr>
+        <p:style>
+          <a:lnRef idx="2">
+            <a:schemeClr val="accent1">
+              <a:shade val="50000"/>
+            </a:schemeClr>
+          </a:lnRef>
+          <a:fillRef idx="1">
+            <a:schemeClr val="accent1"/>
+          </a:fillRef>
+          <a:effectRef idx="0">
+            <a:schemeClr val="accent1"/>
+          </a:effectRef>
+          <a:fontRef idx="minor">
+            <a:schemeClr val="lt1"/>
+          </a:fontRef>
+        </p:style>
+        <p:txBody>
+          <a:bodyPr rtlCol="0" anchor="ctr"/>
+          <a:lstStyle/>
+          <a:p>
+            <a:pPr algn="ctr"/>
+            <a:endParaRPr lang="en-US"/>
+          </a:p>
+        </p:txBody>
+      </p:sp>
+      <p:sp>
+        <p:nvSpPr>
+          <p:cNvPr id="27" name="TextBox 26"/>
+          <p:cNvSpPr txBox="1"/>
+          <p:nvPr/>
+        </p:nvSpPr>
+        <p:spPr>
+          <a:xfrm>
+            <a:off x="5718698" y="1600200"/>
+            <a:ext cx="3337773" cy="369332"/>
+          </a:xfrm>
+          <a:prstGeom prst="rect">
+            <a:avLst/>
+          </a:prstGeom>
+          <a:noFill/>
+        </p:spPr>
+        <p:txBody>
+          <a:bodyPr wrap="none" rtlCol="0">
+            <a:spAutoFit/>
+          </a:bodyPr>
+          <a:lstStyle/>
+          <a:p>
+            <a:r>
+              <a:rPr lang="en-US" dirty="0" smtClean="0"/>
+              <a:t>What if ‘B’ can’t store it either?</a:t>
+            </a:r>
+            <a:endParaRPr lang="en-US" dirty="0"/>
+          </a:p>
+        </p:txBody>
+      </p:sp>
+    </p:spTree>
+    <p:extLst>
+      <p:ext uri="{BB962C8B-B14F-4D97-AF65-F5344CB8AC3E}">
+        <p14:creationId xmlns:p14="http://schemas.microsoft.com/office/powerpoint/2010/main" val="2414449345"/>
+      </p:ext>
+    </p:extLst>
+  </p:cSld>
+  <p:clrMapOvr>
+    <a:masterClrMapping/>
+  </p:clrMapOvr>
+  <p:timing>
+    <p:tnLst>
+      <p:par>
+        <p:cTn id="1" dur="indefinite" restart="never" nodeType="tmRoot">
+          <p:childTnLst>
+            <p:seq concurrent="1" nextAc="seek">
+              <p:cTn id="2" dur="indefinite" nodeType="mainSeq">
+                <p:childTnLst>
+                  <p:par>
+                    <p:cTn id="3" fill="hold">
+                      <p:stCondLst>
+                        <p:cond delay="indefinite"/>
+                      </p:stCondLst>
+                      <p:childTnLst>
+                        <p:par>
+                          <p:cTn id="4" fill="hold">
+                            <p:stCondLst>
+                              <p:cond delay="0"/>
+                            </p:stCondLst>
+                            <p:childTnLst>
+                              <p:par>
+                                <p:cTn id="5" presetID="1" presetClass="entr" presetSubtype="0" fill="hold" grpId="0" nodeType="clickEffect">
+                                  <p:stCondLst>
+                                    <p:cond delay="0"/>
+                                  </p:stCondLst>
+                                  <p:childTnLst>
+                                    <p:set>
+                                      <p:cBhvr>
+                                        <p:cTn id="6" dur="1" fill="hold">
+                                          <p:stCondLst>
+                                            <p:cond delay="0"/>
+                                          </p:stCondLst>
+                                        </p:cTn>
+                                        <p:tgtEl>
+                                          <p:spTgt spid="20"/>
+                                        </p:tgtEl>
+                                        <p:attrNameLst>
+                                          <p:attrName>style.visibility</p:attrName>
+                                        </p:attrNameLst>
+                                      </p:cBhvr>
+                                      <p:to>
+                                        <p:strVal val="visible"/>
+                                      </p:to>
+                                    </p:set>
+                                  </p:childTnLst>
+                                </p:cTn>
+                              </p:par>
+                            </p:childTnLst>
+                          </p:cTn>
+                        </p:par>
+                      </p:childTnLst>
+                    </p:cTn>
+                  </p:par>
+                  <p:par>
+                    <p:cTn id="7" fill="hold">
+                      <p:stCondLst>
+                        <p:cond delay="indefinite"/>
+                      </p:stCondLst>
+                      <p:childTnLst>
+                        <p:par>
+                          <p:cTn id="8" fill="hold">
+                            <p:stCondLst>
+                              <p:cond delay="0"/>
+                            </p:stCondLst>
+                            <p:childTnLst>
+                              <p:par>
+                                <p:cTn id="9" presetID="1" presetClass="entr" presetSubtype="0" fill="hold" grpId="0" nodeType="clickEffect">
+                                  <p:stCondLst>
+                                    <p:cond delay="0"/>
+                                  </p:stCondLst>
+                                  <p:childTnLst>
+                                    <p:set>
+                                      <p:cBhvr>
+                                        <p:cTn id="10" dur="1" fill="hold">
+                                          <p:stCondLst>
+                                            <p:cond delay="0"/>
+                                          </p:stCondLst>
+                                        </p:cTn>
+                                        <p:tgtEl>
+                                          <p:spTgt spid="23"/>
+                                        </p:tgtEl>
+                                        <p:attrNameLst>
+                                          <p:attrName>style.visibility</p:attrName>
+                                        </p:attrNameLst>
+                                      </p:cBhvr>
+                                      <p:to>
+                                        <p:strVal val="visible"/>
+                                      </p:to>
+                                    </p:set>
+                                  </p:childTnLst>
+                                </p:cTn>
+                              </p:par>
+                            </p:childTnLst>
+                          </p:cTn>
+                        </p:par>
+                      </p:childTnLst>
+                    </p:cTn>
+                  </p:par>
+                  <p:par>
+                    <p:cTn id="11" fill="hold">
+                      <p:stCondLst>
+                        <p:cond delay="indefinite"/>
+                      </p:stCondLst>
+                      <p:childTnLst>
+                        <p:par>
+                          <p:cTn id="12" fill="hold">
+                            <p:stCondLst>
+                              <p:cond delay="0"/>
+                            </p:stCondLst>
+                            <p:childTnLst>
+                              <p:par>
+                                <p:cTn id="13" presetID="1" presetClass="entr" presetSubtype="0" fill="hold" grpId="0" nodeType="clickEffect">
+                                  <p:stCondLst>
+                                    <p:cond delay="0"/>
+                                  </p:stCondLst>
+                                  <p:childTnLst>
+                                    <p:set>
+                                      <p:cBhvr>
+                                        <p:cTn id="14" dur="1" fill="hold">
+                                          <p:stCondLst>
+                                            <p:cond delay="0"/>
+                                          </p:stCondLst>
+                                        </p:cTn>
+                                        <p:tgtEl>
+                                          <p:spTgt spid="22"/>
+                                        </p:tgtEl>
+                                        <p:attrNameLst>
+                                          <p:attrName>style.visibility</p:attrName>
+                                        </p:attrNameLst>
+                                      </p:cBhvr>
+                                      <p:to>
+                                        <p:strVal val="visible"/>
+                                      </p:to>
+                                    </p:set>
+                                  </p:childTnLst>
+                                </p:cTn>
+                              </p:par>
+                            </p:childTnLst>
+                          </p:cTn>
+                        </p:par>
+                      </p:childTnLst>
+                    </p:cTn>
+                  </p:par>
+                  <p:par>
+                    <p:cTn id="15" fill="hold">
+                      <p:stCondLst>
+                        <p:cond delay="indefinite"/>
+                      </p:stCondLst>
+                      <p:childTnLst>
+                        <p:par>
+                          <p:cTn id="16" fill="hold">
+                            <p:stCondLst>
+                              <p:cond delay="0"/>
+                            </p:stCondLst>
+                            <p:childTnLst>
+                              <p:par>
+                                <p:cTn id="17" presetID="1" presetClass="entr" presetSubtype="0" fill="hold" grpId="0" nodeType="clickEffect">
+                                  <p:stCondLst>
+                                    <p:cond delay="0"/>
+                                  </p:stCondLst>
+                                  <p:childTnLst>
+                                    <p:set>
+                                      <p:cBhvr>
+                                        <p:cTn id="18" dur="1" fill="hold">
+                                          <p:stCondLst>
+                                            <p:cond delay="0"/>
+                                          </p:stCondLst>
+                                        </p:cTn>
+                                        <p:tgtEl>
+                                          <p:spTgt spid="27"/>
+                                        </p:tgtEl>
+                                        <p:attrNameLst>
+                                          <p:attrName>style.visibility</p:attrName>
+                                        </p:attrNameLst>
+                                      </p:cBhvr>
+                                      <p:to>
+                                        <p:strVal val="visible"/>
+                                      </p:to>
+                                    </p:set>
+                                  </p:childTnLst>
+                                </p:cTn>
+                              </p:par>
+                              <p:par>
+                                <p:cTn id="19" presetID="1" presetClass="entr" presetSubtype="0" fill="hold" grpId="0" nodeType="withEffect">
+                                  <p:stCondLst>
+                                    <p:cond delay="0"/>
+                                  </p:stCondLst>
+                                  <p:childTnLst>
+                                    <p:set>
+                                      <p:cBhvr>
+                                        <p:cTn id="20" dur="1" fill="hold">
+                                          <p:stCondLst>
+                                            <p:cond delay="0"/>
+                                          </p:stCondLst>
+                                        </p:cTn>
+                                        <p:tgtEl>
+                                          <p:spTgt spid="26"/>
+                                        </p:tgtEl>
+                                        <p:attrNameLst>
+                                          <p:attrName>style.visibility</p:attrName>
+                                        </p:attrNameLst>
+                                      </p:cBhvr>
+                                      <p:to>
+                                        <p:strVal val="visible"/>
+                                      </p:to>
+                                    </p:set>
+                                  </p:childTnLst>
+                                </p:cTn>
+                              </p:par>
+                            </p:childTnLst>
+                          </p:cTn>
+                        </p:par>
+                      </p:childTnLst>
+                    </p:cTn>
+                  </p:par>
+                </p:childTnLst>
+              </p:cTn>
+              <p:prevCondLst>
+                <p:cond evt="onPrev" delay="0">
+                  <p:tgtEl>
+                    <p:sldTgt/>
+                  </p:tgtEl>
+                </p:cond>
+              </p:prevCondLst>
+              <p:nextCondLst>
+                <p:cond evt="onNext" delay="0">
+                  <p:tgtEl>
+                    <p:sldTgt/>
+                  </p:tgtEl>
+                </p:cond>
+              </p:nextCondLst>
+            </p:seq>
+          </p:childTnLst>
+        </p:cTn>
+      </p:par>
+    </p:tnLst>
+    <p:bldLst>
+      <p:bldP spid="20" grpId="0" animBg="1"/>
+      <p:bldP spid="23" grpId="0" animBg="1"/>
+      <p:bldP spid="22" grpId="0"/>
+      <p:bldP spid="26" grpId="0" animBg="1"/>
+      <p:bldP spid="27" grpId="0"/>
+    </p:bldLst>
+  </p:timing>
+</p:sld>
+</file>
+
+<file path=ppt/slides/slide35.xml><?xml version="1.0" encoding="utf-8"?>
+<p:sld xmlns:a="http://schemas.openxmlformats.org/drawingml/2006/main" xmlns:r="http://schemas.openxmlformats.org/officeDocument/2006/relationships" xmlns:p="http://schemas.openxmlformats.org/presentationml/2006/main">
+  <p:cSld>
+    <p:spTree>
+      <p:nvGrpSpPr>
+        <p:cNvPr id="1" name=""/>
+        <p:cNvGrpSpPr/>
+        <p:nvPr/>
+      </p:nvGrpSpPr>
+      <p:grpSpPr>
+        <a:xfrm>
+          <a:off x="0" y="0"/>
+          <a:ext cx="0" cy="0"/>
+          <a:chOff x="0" y="0"/>
+          <a:chExt cx="0" cy="0"/>
+        </a:xfrm>
+      </p:grpSpPr>
+      <p:sp>
+        <p:nvSpPr>
+          <p:cNvPr id="2" name="Title 1"/>
+          <p:cNvSpPr>
+            <a:spLocks noGrp="1"/>
+          </p:cNvSpPr>
+          <p:nvPr>
+            <p:ph type="title"/>
+          </p:nvPr>
+        </p:nvSpPr>
+        <p:spPr/>
+        <p:txBody>
+          <a:bodyPr/>
+          <a:lstStyle/>
+          <a:p>
+            <a:r>
+              <a:rPr lang="en-US" dirty="0" smtClean="0"/>
+              <a:t>File Diversion</a:t>
+            </a:r>
+            <a:endParaRPr lang="en-US" dirty="0"/>
+          </a:p>
+        </p:txBody>
+      </p:sp>
+      <p:sp>
+        <p:nvSpPr>
+          <p:cNvPr id="3" name="Slide Number Placeholder 2"/>
+          <p:cNvSpPr>
+            <a:spLocks noGrp="1"/>
+          </p:cNvSpPr>
+          <p:nvPr>
+            <p:ph type="sldNum" sz="quarter" idx="12"/>
+          </p:nvPr>
+        </p:nvSpPr>
+        <p:spPr/>
+        <p:txBody>
+          <a:bodyPr/>
+          <a:lstStyle/>
+          <a:p>
+            <a:fld id="{7D5018C4-273E-49AF-93AB-259FCF9A742C}" type="slidenum">
+              <a:rPr lang="en-US" smtClean="0"/>
+              <a:t>35</a:t>
+            </a:fld>
+            <a:endParaRPr lang="en-US"/>
+          </a:p>
+        </p:txBody>
+      </p:sp>
+      <p:sp>
+        <p:nvSpPr>
+          <p:cNvPr id="4" name="Content Placeholder 3"/>
+          <p:cNvSpPr>
+            <a:spLocks noGrp="1"/>
+          </p:cNvSpPr>
+          <p:nvPr>
+            <p:ph sz="quarter" idx="1"/>
+          </p:nvPr>
+        </p:nvSpPr>
+        <p:spPr/>
+        <p:txBody>
+          <a:bodyPr>
+            <a:normAutofit lnSpcReduction="10000"/>
+          </a:bodyPr>
+          <a:lstStyle/>
+          <a:p>
+            <a:r>
+              <a:rPr lang="en-US" dirty="0" smtClean="0"/>
+              <a:t>What if ‘B’ cannot store the file either?</a:t>
+            </a:r>
+          </a:p>
+          <a:p>
+            <a:pPr lvl="1"/>
+            <a:r>
+              <a:rPr lang="en-US" dirty="0" smtClean="0"/>
+              <a:t>Due to threshold</a:t>
+            </a:r>
+          </a:p>
+          <a:p>
+            <a:pPr lvl="0"/>
+            <a:r>
+              <a:rPr lang="en-US" dirty="0" smtClean="0"/>
+              <a:t>Concept:</a:t>
+            </a:r>
+          </a:p>
+          <a:p>
+            <a:pPr lvl="1"/>
+            <a:r>
+              <a:rPr lang="en-US" dirty="0" smtClean="0"/>
+              <a:t>That portion of the ring is overloaded</a:t>
+            </a:r>
+          </a:p>
+          <a:p>
+            <a:pPr lvl="1"/>
+            <a:r>
+              <a:rPr lang="en-US" dirty="0" smtClean="0"/>
+              <a:t>Try elsewhere!</a:t>
+            </a:r>
+          </a:p>
+          <a:p>
+            <a:pPr lvl="0"/>
+            <a:r>
+              <a:rPr lang="en-US" dirty="0" smtClean="0"/>
+              <a:t>Recall: </a:t>
+            </a:r>
+            <a:r>
+              <a:rPr lang="en-US" dirty="0" err="1" smtClean="0"/>
+              <a:t>fileID</a:t>
+            </a:r>
+            <a:r>
+              <a:rPr lang="en-US" dirty="0" smtClean="0"/>
+              <a:t> is result of hash</a:t>
+            </a:r>
+          </a:p>
+          <a:p>
+            <a:pPr lvl="1"/>
+            <a:r>
+              <a:rPr lang="en-US" dirty="0" smtClean="0"/>
+              <a:t>…Including random salt</a:t>
+            </a:r>
+          </a:p>
+          <a:p>
+            <a:pPr lvl="0"/>
+            <a:r>
+              <a:rPr lang="en-US" dirty="0" smtClean="0"/>
+              <a:t>Solution: Create</a:t>
+            </a:r>
+            <a:r>
+              <a:rPr lang="en-US" baseline="0" dirty="0" smtClean="0"/>
+              <a:t> new salt, therefore new hash</a:t>
+            </a:r>
+          </a:p>
+          <a:p>
+            <a:pPr lvl="0"/>
+            <a:r>
+              <a:rPr lang="en-US" baseline="0" dirty="0" smtClean="0"/>
+              <a:t>Try again, up to three times!</a:t>
+            </a:r>
+          </a:p>
+          <a:p>
+            <a:pPr lvl="0"/>
+            <a:r>
+              <a:rPr lang="en-US" baseline="0" dirty="0" smtClean="0"/>
+              <a:t>If still fails, system cannot accommodate the file</a:t>
+            </a:r>
+          </a:p>
+          <a:p>
+            <a:pPr lvl="1"/>
+            <a:r>
+              <a:rPr lang="en-US" dirty="0" smtClean="0"/>
+              <a:t>Application may choose to fragment file</a:t>
+            </a:r>
+            <a:r>
+              <a:rPr lang="en-US" baseline="0" dirty="0" smtClean="0"/>
+              <a:t> and try again</a:t>
+            </a:r>
+            <a:endParaRPr lang="en-US" dirty="0"/>
+          </a:p>
+        </p:txBody>
+      </p:sp>
+    </p:spTree>
+    <p:extLst>
+      <p:ext uri="{BB962C8B-B14F-4D97-AF65-F5344CB8AC3E}">
+        <p14:creationId xmlns:p14="http://schemas.microsoft.com/office/powerpoint/2010/main" val="25238780"/>
+      </p:ext>
+    </p:extLst>
+  </p:cSld>
+  <p:clrMapOvr>
+    <a:masterClrMapping/>
+  </p:clrMapOvr>
+  <p:timing>
+    <p:tnLst>
+      <p:par>
+        <p:cTn id="1" dur="indefinite" restart="never" nodeType="tmRoot"/>
       </p:par>
     </p:tnLst>
   </p:timing>

</xml_diff>

<commit_message>
presentation: all of PAST except evaluation.
</commit_message>
<xml_diff>
--- a/p2p/P2P Apps.pptx
+++ b/p2p/P2P Apps.pptx
@@ -5,7 +5,7 @@
     <p:sldMasterId id="2147483684" r:id="rId1"/>
   </p:sldMasterIdLst>
   <p:notesMasterIdLst>
-    <p:notesMasterId r:id="rId39"/>
+    <p:notesMasterId r:id="rId43"/>
   </p:notesMasterIdLst>
   <p:sldIdLst>
     <p:sldId id="256" r:id="rId2"/>
@@ -45,6 +45,10 @@
     <p:sldId id="295" r:id="rId36"/>
     <p:sldId id="299" r:id="rId37"/>
     <p:sldId id="300" r:id="rId38"/>
+    <p:sldId id="301" r:id="rId39"/>
+    <p:sldId id="302" r:id="rId40"/>
+    <p:sldId id="303" r:id="rId41"/>
+    <p:sldId id="304" r:id="rId42"/>
   </p:sldIdLst>
   <p:sldSz cx="9144000" cy="6858000" type="screen4x3"/>
   <p:notesSz cx="6858000" cy="9144000"/>
@@ -21992,7 +21996,6 @@
               <a:rPr lang="en-US" dirty="0" smtClean="0"/>
               <a:t>Should file owner be notified somehow?</a:t>
             </a:r>
-            <a:endParaRPr lang="en-US" dirty="0"/>
           </a:p>
         </p:txBody>
       </p:sp>
@@ -22000,6 +22003,325 @@
     <p:extLst>
       <p:ext uri="{BB962C8B-B14F-4D97-AF65-F5344CB8AC3E}">
         <p14:creationId xmlns:p14="http://schemas.microsoft.com/office/powerpoint/2010/main" val="620775633"/>
+      </p:ext>
+    </p:extLst>
+  </p:cSld>
+  <p:clrMapOvr>
+    <a:masterClrMapping/>
+  </p:clrMapOvr>
+  <p:timing>
+    <p:tnLst>
+      <p:par>
+        <p:cTn id="1" dur="indefinite" restart="never" nodeType="tmRoot"/>
+      </p:par>
+    </p:tnLst>
+  </p:timing>
+</p:sld>
+</file>
+
+<file path=ppt/slides/slide38.xml><?xml version="1.0" encoding="utf-8"?>
+<p:sld xmlns:a="http://schemas.openxmlformats.org/drawingml/2006/main" xmlns:r="http://schemas.openxmlformats.org/officeDocument/2006/relationships" xmlns:p="http://schemas.openxmlformats.org/presentationml/2006/main">
+  <p:cSld>
+    <p:spTree>
+      <p:nvGrpSpPr>
+        <p:cNvPr id="1" name=""/>
+        <p:cNvGrpSpPr/>
+        <p:nvPr/>
+      </p:nvGrpSpPr>
+      <p:grpSpPr>
+        <a:xfrm>
+          <a:off x="0" y="0"/>
+          <a:ext cx="0" cy="0"/>
+          <a:chOff x="0" y="0"/>
+          <a:chExt cx="0" cy="0"/>
+        </a:xfrm>
+      </p:grpSpPr>
+      <p:sp>
+        <p:nvSpPr>
+          <p:cNvPr id="2" name="Title 1"/>
+          <p:cNvSpPr>
+            <a:spLocks noGrp="1"/>
+          </p:cNvSpPr>
+          <p:nvPr>
+            <p:ph type="title"/>
+          </p:nvPr>
+        </p:nvSpPr>
+        <p:spPr/>
+        <p:txBody>
+          <a:bodyPr/>
+          <a:lstStyle/>
+          <a:p>
+            <a:r>
+              <a:rPr lang="en-US" dirty="0" smtClean="0"/>
+              <a:t>Caching</a:t>
+            </a:r>
+            <a:endParaRPr lang="en-US" dirty="0"/>
+          </a:p>
+        </p:txBody>
+      </p:sp>
+      <p:sp>
+        <p:nvSpPr>
+          <p:cNvPr id="3" name="Slide Number Placeholder 2"/>
+          <p:cNvSpPr>
+            <a:spLocks noGrp="1"/>
+          </p:cNvSpPr>
+          <p:nvPr>
+            <p:ph type="sldNum" sz="quarter" idx="12"/>
+          </p:nvPr>
+        </p:nvSpPr>
+        <p:spPr/>
+        <p:txBody>
+          <a:bodyPr/>
+          <a:lstStyle/>
+          <a:p>
+            <a:fld id="{7D5018C4-273E-49AF-93AB-259FCF9A742C}" type="slidenum">
+              <a:rPr lang="en-US" smtClean="0"/>
+              <a:t>38</a:t>
+            </a:fld>
+            <a:endParaRPr lang="en-US"/>
+          </a:p>
+        </p:txBody>
+      </p:sp>
+      <p:sp>
+        <p:nvSpPr>
+          <p:cNvPr id="4" name="Content Placeholder 3"/>
+          <p:cNvSpPr>
+            <a:spLocks noGrp="1"/>
+          </p:cNvSpPr>
+          <p:nvPr>
+            <p:ph sz="quarter" idx="1"/>
+          </p:nvPr>
+        </p:nvSpPr>
+        <p:spPr/>
+        <p:txBody>
+          <a:bodyPr/>
+          <a:lstStyle/>
+          <a:p>
+            <a:r>
+              <a:rPr lang="en-US" dirty="0" smtClean="0"/>
+              <a:t>Concept:</a:t>
+            </a:r>
+          </a:p>
+          <a:p>
+            <a:pPr lvl="1"/>
+            <a:r>
+              <a:rPr lang="en-US" dirty="0" smtClean="0"/>
+              <a:t>As requests</a:t>
+            </a:r>
+            <a:r>
+              <a:rPr lang="en-US" baseline="0" dirty="0" smtClean="0"/>
+              <a:t> are routed, cache files locally</a:t>
+            </a:r>
+            <a:endParaRPr lang="en-US" dirty="0" smtClean="0"/>
+          </a:p>
+          <a:p>
+            <a:r>
+              <a:rPr lang="en-US" dirty="0" smtClean="0"/>
+              <a:t>Popular files cached</a:t>
+            </a:r>
+          </a:p>
+          <a:p>
+            <a:pPr lvl="1"/>
+            <a:r>
+              <a:rPr lang="en-US" dirty="0" smtClean="0"/>
+              <a:t>Make use of unused space</a:t>
+            </a:r>
+          </a:p>
+          <a:p>
+            <a:r>
+              <a:rPr lang="en-US" dirty="0" smtClean="0"/>
+              <a:t>Cache Policy: </a:t>
+            </a:r>
+            <a:r>
+              <a:rPr lang="en-US" dirty="0" err="1" smtClean="0"/>
+              <a:t>GreeyDual</a:t>
+            </a:r>
+            <a:r>
+              <a:rPr lang="en-US" dirty="0" smtClean="0"/>
+              <a:t>-Size (GD-S)</a:t>
+            </a:r>
+          </a:p>
+          <a:p>
+            <a:pPr lvl="1"/>
+            <a:r>
+              <a:rPr lang="en-US" dirty="0" smtClean="0"/>
+              <a:t>Weighted entries: (# cache hits) / (file size)</a:t>
+            </a:r>
+          </a:p>
+          <a:p>
+            <a:r>
+              <a:rPr lang="en-US" dirty="0" smtClean="0"/>
+              <a:t>Discussion:</a:t>
+            </a:r>
+          </a:p>
+          <a:p>
+            <a:pPr lvl="1"/>
+            <a:r>
+              <a:rPr lang="en-US" dirty="0" smtClean="0"/>
+              <a:t>Is this a good cache policy?</a:t>
+            </a:r>
+          </a:p>
+        </p:txBody>
+      </p:sp>
+    </p:spTree>
+    <p:extLst>
+      <p:ext uri="{BB962C8B-B14F-4D97-AF65-F5344CB8AC3E}">
+        <p14:creationId xmlns:p14="http://schemas.microsoft.com/office/powerpoint/2010/main" val="1522456516"/>
+      </p:ext>
+    </p:extLst>
+  </p:cSld>
+  <p:clrMapOvr>
+    <a:masterClrMapping/>
+  </p:clrMapOvr>
+  <p:timing>
+    <p:tnLst>
+      <p:par>
+        <p:cTn id="1" dur="indefinite" restart="never" nodeType="tmRoot"/>
+      </p:par>
+    </p:tnLst>
+  </p:timing>
+</p:sld>
+</file>
+
+<file path=ppt/slides/slide39.xml><?xml version="1.0" encoding="utf-8"?>
+<p:sld xmlns:a="http://schemas.openxmlformats.org/drawingml/2006/main" xmlns:r="http://schemas.openxmlformats.org/officeDocument/2006/relationships" xmlns:p="http://schemas.openxmlformats.org/presentationml/2006/main">
+  <p:cSld>
+    <p:spTree>
+      <p:nvGrpSpPr>
+        <p:cNvPr id="1" name=""/>
+        <p:cNvGrpSpPr/>
+        <p:nvPr/>
+      </p:nvGrpSpPr>
+      <p:grpSpPr>
+        <a:xfrm>
+          <a:off x="0" y="0"/>
+          <a:ext cx="0" cy="0"/>
+          <a:chOff x="0" y="0"/>
+          <a:chExt cx="0" cy="0"/>
+        </a:xfrm>
+      </p:grpSpPr>
+      <p:sp>
+        <p:nvSpPr>
+          <p:cNvPr id="2" name="Title 1"/>
+          <p:cNvSpPr>
+            <a:spLocks noGrp="1"/>
+          </p:cNvSpPr>
+          <p:nvPr>
+            <p:ph type="title"/>
+          </p:nvPr>
+        </p:nvSpPr>
+        <p:spPr/>
+        <p:txBody>
+          <a:bodyPr/>
+          <a:lstStyle/>
+          <a:p>
+            <a:r>
+              <a:rPr lang="en-US" dirty="0" smtClean="0"/>
+              <a:t>Security</a:t>
+            </a:r>
+            <a:endParaRPr lang="en-US" dirty="0"/>
+          </a:p>
+        </p:txBody>
+      </p:sp>
+      <p:sp>
+        <p:nvSpPr>
+          <p:cNvPr id="3" name="Slide Number Placeholder 2"/>
+          <p:cNvSpPr>
+            <a:spLocks noGrp="1"/>
+          </p:cNvSpPr>
+          <p:nvPr>
+            <p:ph type="sldNum" sz="quarter" idx="12"/>
+          </p:nvPr>
+        </p:nvSpPr>
+        <p:spPr/>
+        <p:txBody>
+          <a:bodyPr/>
+          <a:lstStyle/>
+          <a:p>
+            <a:fld id="{7D5018C4-273E-49AF-93AB-259FCF9A742C}" type="slidenum">
+              <a:rPr lang="en-US" smtClean="0"/>
+              <a:t>39</a:t>
+            </a:fld>
+            <a:endParaRPr lang="en-US"/>
+          </a:p>
+        </p:txBody>
+      </p:sp>
+      <p:sp>
+        <p:nvSpPr>
+          <p:cNvPr id="4" name="Content Placeholder 3"/>
+          <p:cNvSpPr>
+            <a:spLocks noGrp="1"/>
+          </p:cNvSpPr>
+          <p:nvPr>
+            <p:ph sz="quarter" idx="1"/>
+          </p:nvPr>
+        </p:nvSpPr>
+        <p:spPr/>
+        <p:txBody>
+          <a:bodyPr/>
+          <a:lstStyle/>
+          <a:p>
+            <a:r>
+              <a:rPr lang="en-US" dirty="0" smtClean="0"/>
+              <a:t>Public/private</a:t>
+            </a:r>
+            <a:r>
+              <a:rPr lang="en-US" baseline="0" dirty="0" smtClean="0"/>
+              <a:t> key encryption</a:t>
+            </a:r>
+          </a:p>
+          <a:p>
+            <a:pPr lvl="1"/>
+            <a:r>
+              <a:rPr lang="en-US" dirty="0" smtClean="0"/>
+              <a:t>Smartcards</a:t>
+            </a:r>
+          </a:p>
+          <a:p>
+            <a:pPr lvl="0"/>
+            <a:r>
+              <a:rPr lang="en-US" dirty="0" smtClean="0"/>
+              <a:t>Insert,</a:t>
+            </a:r>
+            <a:r>
+              <a:rPr lang="en-US" baseline="0" dirty="0" smtClean="0"/>
+              <a:t> reclaim requests signed</a:t>
+            </a:r>
+          </a:p>
+          <a:p>
+            <a:pPr lvl="0"/>
+            <a:r>
+              <a:rPr lang="en-US" baseline="0" dirty="0" smtClean="0"/>
+              <a:t>Lookup requests not protected</a:t>
+            </a:r>
+          </a:p>
+          <a:p>
+            <a:pPr lvl="1"/>
+            <a:r>
+              <a:rPr lang="en-US" baseline="0" dirty="0" smtClean="0"/>
+              <a:t>Clients can give PAST an encrypted file to fix this</a:t>
+            </a:r>
+          </a:p>
+          <a:p>
+            <a:pPr lvl="0"/>
+            <a:r>
+              <a:rPr lang="en-US" baseline="0" dirty="0" smtClean="0"/>
+              <a:t>Randomized routing (Pastry)</a:t>
+            </a:r>
+          </a:p>
+          <a:p>
+            <a:pPr lvl="0"/>
+            <a:r>
+              <a:rPr lang="en-US" baseline="0" dirty="0" smtClean="0"/>
+              <a:t>Storage quotas</a:t>
+            </a:r>
+          </a:p>
+        </p:txBody>
+      </p:sp>
+    </p:spTree>
+    <p:extLst>
+      <p:ext uri="{BB962C8B-B14F-4D97-AF65-F5344CB8AC3E}">
+        <p14:creationId xmlns:p14="http://schemas.microsoft.com/office/powerpoint/2010/main" val="1798497688"/>
       </p:ext>
     </p:extLst>
   </p:cSld>
@@ -22169,6 +22491,294 @@
     <p:extLst>
       <p:ext uri="{BB962C8B-B14F-4D97-AF65-F5344CB8AC3E}">
         <p14:creationId xmlns:p14="http://schemas.microsoft.com/office/powerpoint/2010/main" val="20142514"/>
+      </p:ext>
+    </p:extLst>
+  </p:cSld>
+  <p:clrMapOvr>
+    <a:masterClrMapping/>
+  </p:clrMapOvr>
+  <p:timing>
+    <p:tnLst>
+      <p:par>
+        <p:cTn id="1" dur="indefinite" restart="never" nodeType="tmRoot"/>
+      </p:par>
+    </p:tnLst>
+  </p:timing>
+</p:sld>
+</file>
+
+<file path=ppt/slides/slide40.xml><?xml version="1.0" encoding="utf-8"?>
+<p:sld xmlns:a="http://schemas.openxmlformats.org/drawingml/2006/main" xmlns:r="http://schemas.openxmlformats.org/officeDocument/2006/relationships" xmlns:p="http://schemas.openxmlformats.org/presentationml/2006/main">
+  <p:cSld>
+    <p:spTree>
+      <p:nvGrpSpPr>
+        <p:cNvPr id="1" name=""/>
+        <p:cNvGrpSpPr/>
+        <p:nvPr/>
+      </p:nvGrpSpPr>
+      <p:grpSpPr>
+        <a:xfrm>
+          <a:off x="0" y="0"/>
+          <a:ext cx="0" cy="0"/>
+          <a:chOff x="0" y="0"/>
+          <a:chExt cx="0" cy="0"/>
+        </a:xfrm>
+      </p:grpSpPr>
+      <p:sp>
+        <p:nvSpPr>
+          <p:cNvPr id="2" name="Title 1"/>
+          <p:cNvSpPr>
+            <a:spLocks noGrp="1"/>
+          </p:cNvSpPr>
+          <p:nvPr>
+            <p:ph type="title"/>
+          </p:nvPr>
+        </p:nvSpPr>
+        <p:spPr/>
+        <p:txBody>
+          <a:bodyPr/>
+          <a:lstStyle/>
+          <a:p>
+            <a:r>
+              <a:rPr lang="en-US" dirty="0" smtClean="0"/>
+              <a:t>Evaluation</a:t>
+            </a:r>
+            <a:endParaRPr lang="en-US" dirty="0"/>
+          </a:p>
+        </p:txBody>
+      </p:sp>
+      <p:sp>
+        <p:nvSpPr>
+          <p:cNvPr id="3" name="Slide Number Placeholder 2"/>
+          <p:cNvSpPr>
+            <a:spLocks noGrp="1"/>
+          </p:cNvSpPr>
+          <p:nvPr>
+            <p:ph type="sldNum" sz="quarter" idx="12"/>
+          </p:nvPr>
+        </p:nvSpPr>
+        <p:spPr/>
+        <p:txBody>
+          <a:bodyPr/>
+          <a:lstStyle/>
+          <a:p>
+            <a:fld id="{7D5018C4-273E-49AF-93AB-259FCF9A742C}" type="slidenum">
+              <a:rPr lang="en-US" smtClean="0"/>
+              <a:t>40</a:t>
+            </a:fld>
+            <a:endParaRPr lang="en-US"/>
+          </a:p>
+        </p:txBody>
+      </p:sp>
+      <p:sp>
+        <p:nvSpPr>
+          <p:cNvPr id="4" name="Content Placeholder 3"/>
+          <p:cNvSpPr>
+            <a:spLocks noGrp="1"/>
+          </p:cNvSpPr>
+          <p:nvPr>
+            <p:ph sz="quarter" idx="1"/>
+          </p:nvPr>
+        </p:nvSpPr>
+        <p:spPr/>
+        <p:txBody>
+          <a:bodyPr/>
+          <a:lstStyle/>
+          <a:p>
+            <a:endParaRPr lang="en-US"/>
+          </a:p>
+        </p:txBody>
+      </p:sp>
+    </p:spTree>
+    <p:extLst>
+      <p:ext uri="{BB962C8B-B14F-4D97-AF65-F5344CB8AC3E}">
+        <p14:creationId xmlns:p14="http://schemas.microsoft.com/office/powerpoint/2010/main" val="132497707"/>
+      </p:ext>
+    </p:extLst>
+  </p:cSld>
+  <p:clrMapOvr>
+    <a:masterClrMapping/>
+  </p:clrMapOvr>
+  <p:timing>
+    <p:tnLst>
+      <p:par>
+        <p:cTn id="1" dur="indefinite" restart="never" nodeType="tmRoot"/>
+      </p:par>
+    </p:tnLst>
+  </p:timing>
+</p:sld>
+</file>
+
+<file path=ppt/slides/slide41.xml><?xml version="1.0" encoding="utf-8"?>
+<p:sld xmlns:a="http://schemas.openxmlformats.org/drawingml/2006/main" xmlns:r="http://schemas.openxmlformats.org/officeDocument/2006/relationships" xmlns:p="http://schemas.openxmlformats.org/presentationml/2006/main">
+  <p:cSld>
+    <p:spTree>
+      <p:nvGrpSpPr>
+        <p:cNvPr id="1" name=""/>
+        <p:cNvGrpSpPr/>
+        <p:nvPr/>
+      </p:nvGrpSpPr>
+      <p:grpSpPr>
+        <a:xfrm>
+          <a:off x="0" y="0"/>
+          <a:ext cx="0" cy="0"/>
+          <a:chOff x="0" y="0"/>
+          <a:chExt cx="0" cy="0"/>
+        </a:xfrm>
+      </p:grpSpPr>
+      <p:sp>
+        <p:nvSpPr>
+          <p:cNvPr id="2" name="Title 1"/>
+          <p:cNvSpPr>
+            <a:spLocks noGrp="1"/>
+          </p:cNvSpPr>
+          <p:nvPr>
+            <p:ph type="title"/>
+          </p:nvPr>
+        </p:nvSpPr>
+        <p:spPr/>
+        <p:txBody>
+          <a:bodyPr/>
+          <a:lstStyle/>
+          <a:p>
+            <a:r>
+              <a:rPr lang="en-US" dirty="0" smtClean="0"/>
+              <a:t>Discussion</a:t>
+            </a:r>
+            <a:endParaRPr lang="en-US" dirty="0"/>
+          </a:p>
+        </p:txBody>
+      </p:sp>
+      <p:sp>
+        <p:nvSpPr>
+          <p:cNvPr id="3" name="Slide Number Placeholder 2"/>
+          <p:cNvSpPr>
+            <a:spLocks noGrp="1"/>
+          </p:cNvSpPr>
+          <p:nvPr>
+            <p:ph type="sldNum" sz="quarter" idx="12"/>
+          </p:nvPr>
+        </p:nvSpPr>
+        <p:spPr/>
+        <p:txBody>
+          <a:bodyPr/>
+          <a:lstStyle/>
+          <a:p>
+            <a:fld id="{7D5018C4-273E-49AF-93AB-259FCF9A742C}" type="slidenum">
+              <a:rPr lang="en-US" smtClean="0"/>
+              <a:t>41</a:t>
+            </a:fld>
+            <a:endParaRPr lang="en-US"/>
+          </a:p>
+        </p:txBody>
+      </p:sp>
+      <p:sp>
+        <p:nvSpPr>
+          <p:cNvPr id="4" name="Content Placeholder 3"/>
+          <p:cNvSpPr>
+            <a:spLocks noGrp="1"/>
+          </p:cNvSpPr>
+          <p:nvPr>
+            <p:ph sz="quarter" idx="1"/>
+          </p:nvPr>
+        </p:nvSpPr>
+        <p:spPr/>
+        <p:txBody>
+          <a:bodyPr/>
+          <a:lstStyle/>
+          <a:p>
+            <a:r>
+              <a:rPr lang="en-US" dirty="0" smtClean="0"/>
+              <a:t>Block storage </a:t>
+            </a:r>
+            <a:r>
+              <a:rPr lang="en-US" dirty="0" err="1" smtClean="0"/>
+              <a:t>vs</a:t>
+            </a:r>
+            <a:r>
+              <a:rPr lang="en-US" dirty="0" smtClean="0"/>
+              <a:t> file storage?</a:t>
+            </a:r>
+          </a:p>
+          <a:p>
+            <a:pPr lvl="0"/>
+            <a:r>
+              <a:rPr lang="en-US" dirty="0" smtClean="0"/>
+              <a:t>Replace the threshold</a:t>
+            </a:r>
+            <a:r>
+              <a:rPr lang="en-US" baseline="0" dirty="0" smtClean="0"/>
+              <a:t> metric?</a:t>
+            </a:r>
+          </a:p>
+          <a:p>
+            <a:pPr lvl="1"/>
+            <a:r>
+              <a:rPr lang="en-US" dirty="0" smtClean="0"/>
+              <a:t>(file size)/(</a:t>
+            </a:r>
+            <a:r>
+              <a:rPr lang="en-US" dirty="0" err="1" smtClean="0"/>
+              <a:t>freespace</a:t>
+            </a:r>
+            <a:r>
+              <a:rPr lang="en-US" dirty="0" smtClean="0"/>
+              <a:t>) &gt; t</a:t>
+            </a:r>
+          </a:p>
+          <a:p>
+            <a:pPr lvl="0"/>
+            <a:r>
+              <a:rPr lang="en-US" dirty="0" smtClean="0"/>
+              <a:t>Would you use PAST? What for?</a:t>
+            </a:r>
+          </a:p>
+          <a:p>
+            <a:pPr lvl="0"/>
+            <a:r>
+              <a:rPr lang="en-US" dirty="0" smtClean="0"/>
+              <a:t>Is P2P right solution for PAST?</a:t>
+            </a:r>
+          </a:p>
+          <a:p>
+            <a:pPr lvl="1"/>
+            <a:r>
+              <a:rPr lang="en-US" dirty="0" smtClean="0"/>
+              <a:t>For backup in general?</a:t>
+            </a:r>
+          </a:p>
+          <a:p>
+            <a:pPr lvl="0"/>
+            <a:r>
+              <a:rPr lang="en-US" dirty="0" smtClean="0"/>
+              <a:t>Economically</a:t>
+            </a:r>
+            <a:r>
+              <a:rPr lang="en-US" baseline="0" dirty="0" smtClean="0"/>
+              <a:t> sound?</a:t>
+            </a:r>
+          </a:p>
+          <a:p>
+            <a:pPr lvl="1"/>
+            <a:r>
+              <a:rPr lang="en-US" baseline="0" dirty="0" smtClean="0"/>
+              <a:t>Compared to tape drives, compared to cloud storage</a:t>
+            </a:r>
+          </a:p>
+          <a:p>
+            <a:pPr lvl="0"/>
+            <a:r>
+              <a:rPr lang="en-US" baseline="0" dirty="0" smtClean="0"/>
+              <a:t>Resilience to churn?</a:t>
+            </a:r>
+            <a:endParaRPr lang="en-US" dirty="0" smtClean="0"/>
+          </a:p>
+        </p:txBody>
+      </p:sp>
+    </p:spTree>
+    <p:extLst>
+      <p:ext uri="{BB962C8B-B14F-4D97-AF65-F5344CB8AC3E}">
+        <p14:creationId xmlns:p14="http://schemas.microsoft.com/office/powerpoint/2010/main" val="2160574676"/>
       </p:ext>
     </p:extLst>
   </p:cSld>

</xml_diff>

<commit_message>
presentation: introduce evaluation, experiment details
</commit_message>
<xml_diff>
--- a/p2p/P2P Apps.pptx
+++ b/p2p/P2P Apps.pptx
@@ -5,7 +5,7 @@
     <p:sldMasterId id="2147483684" r:id="rId1"/>
   </p:sldMasterIdLst>
   <p:notesMasterIdLst>
-    <p:notesMasterId r:id="rId43"/>
+    <p:notesMasterId r:id="rId44"/>
   </p:notesMasterIdLst>
   <p:sldIdLst>
     <p:sldId id="256" r:id="rId2"/>
@@ -48,7 +48,8 @@
     <p:sldId id="301" r:id="rId39"/>
     <p:sldId id="302" r:id="rId40"/>
     <p:sldId id="303" r:id="rId41"/>
-    <p:sldId id="304" r:id="rId42"/>
+    <p:sldId id="305" r:id="rId42"/>
+    <p:sldId id="304" r:id="rId43"/>
   </p:sldIdLst>
   <p:sldSz cx="9144000" cy="6858000" type="screen4x3"/>
   <p:notesSz cx="6858000" cy="9144000"/>
@@ -22585,7 +22586,112 @@
           <a:bodyPr/>
           <a:lstStyle/>
           <a:p>
-            <a:endParaRPr lang="en-US"/>
+            <a:r>
+              <a:rPr lang="en-US" dirty="0" smtClean="0"/>
+              <a:t>Two workloads tested</a:t>
+            </a:r>
+          </a:p>
+          <a:p>
+            <a:r>
+              <a:rPr lang="en-US" dirty="0" smtClean="0"/>
+              <a:t>Web proxy trace</a:t>
+            </a:r>
+            <a:r>
+              <a:rPr lang="en-US" baseline="0" dirty="0" smtClean="0"/>
+              <a:t> from NLANR</a:t>
+            </a:r>
+          </a:p>
+          <a:p>
+            <a:pPr lvl="1"/>
+            <a:r>
+              <a:rPr lang="en-US" dirty="0" smtClean="0"/>
+              <a:t>1.8million unique URLS</a:t>
+            </a:r>
+          </a:p>
+          <a:p>
+            <a:pPr lvl="1"/>
+            <a:r>
+              <a:rPr lang="en-US" baseline="0" dirty="0" smtClean="0"/>
+              <a:t>18.7 GB content, mean 10.5kB,</a:t>
+            </a:r>
+            <a:r>
+              <a:rPr lang="en-US" dirty="0" smtClean="0"/>
+              <a:t> median 1.3kB, [0B,138MB]</a:t>
+            </a:r>
+            <a:endParaRPr lang="en-US" baseline="0" dirty="0" smtClean="0"/>
+          </a:p>
+          <a:p>
+            <a:r>
+              <a:rPr lang="en-US" baseline="0" dirty="0" err="1" smtClean="0"/>
+              <a:t>Filesystem</a:t>
+            </a:r>
+            <a:r>
+              <a:rPr lang="en-US" baseline="0" dirty="0" smtClean="0"/>
+              <a:t> (combination of </a:t>
+            </a:r>
+            <a:r>
+              <a:rPr lang="en-US" baseline="0" dirty="0" err="1" smtClean="0"/>
+              <a:t>filesystems</a:t>
+            </a:r>
+            <a:r>
+              <a:rPr lang="en-US" baseline="0" dirty="0" smtClean="0"/>
+              <a:t> authors had)</a:t>
+            </a:r>
+          </a:p>
+          <a:p>
+            <a:pPr lvl="1"/>
+            <a:r>
+              <a:rPr lang="en-US" dirty="0" smtClean="0"/>
+              <a:t>2.02million files</a:t>
+            </a:r>
+          </a:p>
+          <a:p>
+            <a:pPr lvl="1"/>
+            <a:r>
+              <a:rPr lang="en-US" baseline="0" dirty="0" smtClean="0"/>
+              <a:t>166.6GB, mean 88.2kB, median 4.5kB,</a:t>
+            </a:r>
+            <a:r>
+              <a:rPr lang="en-US" dirty="0"/>
+              <a:t> </a:t>
+            </a:r>
+            <a:r>
+              <a:rPr lang="en-US" baseline="0" dirty="0" smtClean="0"/>
+              <a:t>[0,2.7GB]</a:t>
+            </a:r>
+          </a:p>
+          <a:p>
+            <a:r>
+              <a:rPr lang="en-US" baseline="0" dirty="0" smtClean="0"/>
+              <a:t>2250</a:t>
+            </a:r>
+            <a:r>
+              <a:rPr lang="en-US" dirty="0" smtClean="0"/>
+              <a:t> Past nodes, k=5</a:t>
+            </a:r>
+          </a:p>
+          <a:p>
+            <a:pPr lvl="1"/>
+            <a:r>
+              <a:rPr lang="en-US" baseline="0" dirty="0" smtClean="0"/>
+              <a:t>Node</a:t>
+            </a:r>
+            <a:r>
+              <a:rPr lang="en-US" dirty="0" smtClean="0"/>
+              <a:t> capacities modeled after corporate network desktops</a:t>
+            </a:r>
+          </a:p>
+          <a:p>
+            <a:pPr lvl="1"/>
+            <a:r>
+              <a:rPr lang="en-US" baseline="0" dirty="0" smtClean="0"/>
+              <a:t>Truncated</a:t>
+            </a:r>
+            <a:r>
+              <a:rPr lang="en-US" dirty="0" smtClean="0"/>
+              <a:t> normal distribution, mean +- 1 standard deviation</a:t>
+            </a:r>
+            <a:endParaRPr lang="en-US" baseline="0" dirty="0" smtClean="0"/>
           </a:p>
         </p:txBody>
       </p:sp>
@@ -22643,7 +22749,7 @@
           <a:p>
             <a:r>
               <a:rPr lang="en-US" dirty="0" smtClean="0"/>
-              <a:t>Discussion</a:t>
+              <a:t>Evaluation</a:t>
             </a:r>
             <a:endParaRPr lang="en-US" dirty="0"/>
           </a:p>
@@ -22667,6 +22773,108 @@
             <a:fld id="{7D5018C4-273E-49AF-93AB-259FCF9A742C}" type="slidenum">
               <a:rPr lang="en-US" smtClean="0"/>
               <a:t>41</a:t>
+            </a:fld>
+            <a:endParaRPr lang="en-US"/>
+          </a:p>
+        </p:txBody>
+      </p:sp>
+      <p:sp>
+        <p:nvSpPr>
+          <p:cNvPr id="4" name="Content Placeholder 3"/>
+          <p:cNvSpPr>
+            <a:spLocks noGrp="1"/>
+          </p:cNvSpPr>
+          <p:nvPr>
+            <p:ph sz="quarter" idx="1"/>
+          </p:nvPr>
+        </p:nvSpPr>
+        <p:spPr/>
+        <p:txBody>
+          <a:bodyPr/>
+          <a:lstStyle/>
+          <a:p>
+            <a:endParaRPr lang="en-US"/>
+          </a:p>
+        </p:txBody>
+      </p:sp>
+    </p:spTree>
+    <p:extLst>
+      <p:ext uri="{BB962C8B-B14F-4D97-AF65-F5344CB8AC3E}">
+        <p14:creationId xmlns:p14="http://schemas.microsoft.com/office/powerpoint/2010/main" val="2471613814"/>
+      </p:ext>
+    </p:extLst>
+  </p:cSld>
+  <p:clrMapOvr>
+    <a:masterClrMapping/>
+  </p:clrMapOvr>
+  <p:timing>
+    <p:tnLst>
+      <p:par>
+        <p:cTn id="1" dur="indefinite" restart="never" nodeType="tmRoot"/>
+      </p:par>
+    </p:tnLst>
+  </p:timing>
+</p:sld>
+</file>
+
+<file path=ppt/slides/slide42.xml><?xml version="1.0" encoding="utf-8"?>
+<p:sld xmlns:a="http://schemas.openxmlformats.org/drawingml/2006/main" xmlns:r="http://schemas.openxmlformats.org/officeDocument/2006/relationships" xmlns:p="http://schemas.openxmlformats.org/presentationml/2006/main">
+  <p:cSld>
+    <p:spTree>
+      <p:nvGrpSpPr>
+        <p:cNvPr id="1" name=""/>
+        <p:cNvGrpSpPr/>
+        <p:nvPr/>
+      </p:nvGrpSpPr>
+      <p:grpSpPr>
+        <a:xfrm>
+          <a:off x="0" y="0"/>
+          <a:ext cx="0" cy="0"/>
+          <a:chOff x="0" y="0"/>
+          <a:chExt cx="0" cy="0"/>
+        </a:xfrm>
+      </p:grpSpPr>
+      <p:sp>
+        <p:nvSpPr>
+          <p:cNvPr id="2" name="Title 1"/>
+          <p:cNvSpPr>
+            <a:spLocks noGrp="1"/>
+          </p:cNvSpPr>
+          <p:nvPr>
+            <p:ph type="title"/>
+          </p:nvPr>
+        </p:nvSpPr>
+        <p:spPr/>
+        <p:txBody>
+          <a:bodyPr/>
+          <a:lstStyle/>
+          <a:p>
+            <a:r>
+              <a:rPr lang="en-US" dirty="0" smtClean="0"/>
+              <a:t>Discussion</a:t>
+            </a:r>
+            <a:endParaRPr lang="en-US" dirty="0"/>
+          </a:p>
+        </p:txBody>
+      </p:sp>
+      <p:sp>
+        <p:nvSpPr>
+          <p:cNvPr id="3" name="Slide Number Placeholder 2"/>
+          <p:cNvSpPr>
+            <a:spLocks noGrp="1"/>
+          </p:cNvSpPr>
+          <p:nvPr>
+            <p:ph type="sldNum" sz="quarter" idx="12"/>
+          </p:nvPr>
+        </p:nvSpPr>
+        <p:spPr/>
+        <p:txBody>
+          <a:bodyPr/>
+          <a:lstStyle/>
+          <a:p>
+            <a:fld id="{7D5018C4-273E-49AF-93AB-259FCF9A742C}" type="slidenum">
+              <a:rPr lang="en-US" smtClean="0"/>
+              <a:t>42</a:t>
             </a:fld>
             <a:endParaRPr lang="en-US"/>
           </a:p>

</xml_diff>

<commit_message>
presentation: first 5 slides of evaluation.
</commit_message>
<xml_diff>
--- a/p2p/P2P Apps.pptx
+++ b/p2p/P2P Apps.pptx
@@ -5,7 +5,7 @@
     <p:sldMasterId id="2147483684" r:id="rId1"/>
   </p:sldMasterIdLst>
   <p:notesMasterIdLst>
-    <p:notesMasterId r:id="rId44"/>
+    <p:notesMasterId r:id="rId48"/>
   </p:notesMasterIdLst>
   <p:sldIdLst>
     <p:sldId id="256" r:id="rId2"/>
@@ -49,7 +49,11 @@
     <p:sldId id="302" r:id="rId40"/>
     <p:sldId id="303" r:id="rId41"/>
     <p:sldId id="305" r:id="rId42"/>
-    <p:sldId id="304" r:id="rId43"/>
+    <p:sldId id="306" r:id="rId43"/>
+    <p:sldId id="307" r:id="rId44"/>
+    <p:sldId id="308" r:id="rId45"/>
+    <p:sldId id="309" r:id="rId46"/>
+    <p:sldId id="304" r:id="rId47"/>
   </p:sldIdLst>
   <p:sldSz cx="9144000" cy="6858000" type="screen4x3"/>
   <p:notesSz cx="6858000" cy="9144000"/>
@@ -499,6 +503,90 @@
     </a:lvl9pPr>
   </p:notesStyle>
 </p:notesMaster>
+</file>
+
+<file path=ppt/notesSlides/notesSlide1.xml><?xml version="1.0" encoding="utf-8"?>
+<p:notes xmlns:a="http://schemas.openxmlformats.org/drawingml/2006/main" xmlns:r="http://schemas.openxmlformats.org/officeDocument/2006/relationships" xmlns:p="http://schemas.openxmlformats.org/presentationml/2006/main">
+  <p:cSld>
+    <p:spTree>
+      <p:nvGrpSpPr>
+        <p:cNvPr id="1" name=""/>
+        <p:cNvGrpSpPr/>
+        <p:nvPr/>
+      </p:nvGrpSpPr>
+      <p:grpSpPr>
+        <a:xfrm>
+          <a:off x="0" y="0"/>
+          <a:ext cx="0" cy="0"/>
+          <a:chOff x="0" y="0"/>
+          <a:chExt cx="0" cy="0"/>
+        </a:xfrm>
+      </p:grpSpPr>
+      <p:sp>
+        <p:nvSpPr>
+          <p:cNvPr id="2" name="Slide Image Placeholder 1"/>
+          <p:cNvSpPr>
+            <a:spLocks noGrp="1" noRot="1" noChangeAspect="1"/>
+          </p:cNvSpPr>
+          <p:nvPr>
+            <p:ph type="sldImg"/>
+          </p:nvPr>
+        </p:nvSpPr>
+        <p:spPr/>
+      </p:sp>
+      <p:sp>
+        <p:nvSpPr>
+          <p:cNvPr id="3" name="Notes Placeholder 2"/>
+          <p:cNvSpPr>
+            <a:spLocks noGrp="1"/>
+          </p:cNvSpPr>
+          <p:nvPr>
+            <p:ph type="body" idx="1"/>
+          </p:nvPr>
+        </p:nvSpPr>
+        <p:spPr/>
+        <p:txBody>
+          <a:bodyPr/>
+          <a:lstStyle/>
+          <a:p>
+            <a:endParaRPr lang="en-US" dirty="0"/>
+          </a:p>
+        </p:txBody>
+      </p:sp>
+      <p:sp>
+        <p:nvSpPr>
+          <p:cNvPr id="4" name="Slide Number Placeholder 3"/>
+          <p:cNvSpPr>
+            <a:spLocks noGrp="1"/>
+          </p:cNvSpPr>
+          <p:nvPr>
+            <p:ph type="sldNum" sz="quarter" idx="10"/>
+          </p:nvPr>
+        </p:nvSpPr>
+        <p:spPr/>
+        <p:txBody>
+          <a:bodyPr/>
+          <a:lstStyle/>
+          <a:p>
+            <a:fld id="{20F4DCCB-8299-4676-8AAC-8F701426849A}" type="slidenum">
+              <a:rPr lang="en-US" smtClean="0"/>
+              <a:t>42</a:t>
+            </a:fld>
+            <a:endParaRPr lang="en-US"/>
+          </a:p>
+        </p:txBody>
+      </p:sp>
+    </p:spTree>
+    <p:extLst>
+      <p:ext uri="{BB962C8B-B14F-4D97-AF65-F5344CB8AC3E}">
+        <p14:creationId xmlns:p14="http://schemas.microsoft.com/office/powerpoint/2010/main" val="1823423832"/>
+      </p:ext>
+    </p:extLst>
+  </p:cSld>
+  <p:clrMapOvr>
+    <a:masterClrMapping/>
+  </p:clrMapOvr>
+</p:notes>
 </file>
 
 <file path=ppt/slideLayouts/slideLayout1.xml><?xml version="1.0" encoding="utf-8"?>
@@ -22749,7 +22837,7 @@
           <a:p>
             <a:r>
               <a:rPr lang="en-US" dirty="0" smtClean="0"/>
-              <a:t>Evaluation</a:t>
+              <a:t>Evaluation (1)</a:t>
             </a:r>
             <a:endParaRPr lang="en-US" dirty="0"/>
           </a:p>
@@ -22778,25 +22866,136 @@
           </a:p>
         </p:txBody>
       </p:sp>
-      <p:sp>
-        <p:nvSpPr>
-          <p:cNvPr id="4" name="Content Placeholder 3"/>
-          <p:cNvSpPr>
-            <a:spLocks noGrp="1"/>
-          </p:cNvSpPr>
+      <p:pic>
+        <p:nvPicPr>
+          <p:cNvPr id="1027" name="Picture 3"/>
+          <p:cNvPicPr>
+            <a:picLocks noChangeAspect="1" noChangeArrowheads="1"/>
+          </p:cNvPicPr>
+          <p:nvPr/>
+        </p:nvPicPr>
+        <p:blipFill>
+          <a:blip r:embed="rId2">
+            <a:extLst>
+              <a:ext uri="{28A0092B-C50C-407E-A947-70E740481C1C}">
+                <a14:useLocalDpi xmlns:a14="http://schemas.microsoft.com/office/drawing/2010/main" val="0"/>
+              </a:ext>
+            </a:extLst>
+          </a:blip>
+          <a:srcRect/>
+          <a:stretch>
+            <a:fillRect/>
+          </a:stretch>
+        </p:blipFill>
+        <p:spPr bwMode="auto">
+          <a:xfrm>
+            <a:off x="228600" y="1447800"/>
+            <a:ext cx="4619625" cy="2286000"/>
+          </a:xfrm>
+          <a:prstGeom prst="rect">
+            <a:avLst/>
+          </a:prstGeom>
+          <a:noFill/>
+          <a:ln>
+            <a:noFill/>
+          </a:ln>
+          <a:effectLst/>
+          <a:extLst>
+            <a:ext uri="{909E8E84-426E-40DD-AFC4-6F175D3DCCD1}">
+              <a14:hiddenFill xmlns:a14="http://schemas.microsoft.com/office/drawing/2010/main">
+                <a:solidFill>
+                  <a:schemeClr val="accent1"/>
+                </a:solidFill>
+              </a14:hiddenFill>
+            </a:ext>
+            <a:ext uri="{91240B29-F687-4F45-9708-019B960494DF}">
+              <a14:hiddenLine xmlns:a14="http://schemas.microsoft.com/office/drawing/2010/main" w="9525">
+                <a:solidFill>
+                  <a:schemeClr val="tx1"/>
+                </a:solidFill>
+                <a:miter lim="800000"/>
+                <a:headEnd/>
+                <a:tailEnd/>
+              </a14:hiddenLine>
+            </a:ext>
+            <a:ext uri="{AF507438-7753-43E0-B8FC-AC1667EBCBE1}">
+              <a14:hiddenEffects xmlns:a14="http://schemas.microsoft.com/office/drawing/2010/main">
+                <a:effectLst>
+                  <a:outerShdw dist="35921" dir="2700000" algn="ctr" rotWithShape="0">
+                    <a:schemeClr val="bg2"/>
+                  </a:outerShdw>
+                </a:effectLst>
+              </a14:hiddenEffects>
+            </a:ext>
+          </a:extLst>
+        </p:spPr>
+      </p:pic>
+      <p:pic>
+        <p:nvPicPr>
+          <p:cNvPr id="1028" name="Picture 4"/>
+          <p:cNvPicPr>
+            <a:picLocks noGrp="1" noChangeAspect="1" noChangeArrowheads="1"/>
+          </p:cNvPicPr>
           <p:nvPr>
             <p:ph sz="quarter" idx="1"/>
           </p:nvPr>
-        </p:nvSpPr>
-        <p:spPr/>
-        <p:txBody>
-          <a:bodyPr/>
-          <a:lstStyle/>
-          <a:p>
-            <a:endParaRPr lang="en-US"/>
-          </a:p>
-        </p:txBody>
-      </p:sp>
+        </p:nvPicPr>
+        <p:blipFill>
+          <a:blip r:embed="rId3">
+            <a:extLst>
+              <a:ext uri="{28A0092B-C50C-407E-A947-70E740481C1C}">
+                <a14:useLocalDpi xmlns:a14="http://schemas.microsoft.com/office/drawing/2010/main" val="0"/>
+              </a:ext>
+            </a:extLst>
+          </a:blip>
+          <a:srcRect/>
+          <a:stretch>
+            <a:fillRect/>
+          </a:stretch>
+        </p:blipFill>
+        <p:spPr bwMode="auto">
+          <a:xfrm>
+            <a:off x="4267200" y="3429000"/>
+            <a:ext cx="4533900" cy="3162300"/>
+          </a:xfrm>
+          <a:prstGeom prst="rect">
+            <a:avLst/>
+          </a:prstGeom>
+          <a:noFill/>
+          <a:ln>
+            <a:noFill/>
+          </a:ln>
+          <a:effectLst/>
+          <a:extLst>
+            <a:ext uri="{909E8E84-426E-40DD-AFC4-6F175D3DCCD1}">
+              <a14:hiddenFill xmlns:a14="http://schemas.microsoft.com/office/drawing/2010/main">
+                <a:solidFill>
+                  <a:schemeClr val="accent1"/>
+                </a:solidFill>
+              </a14:hiddenFill>
+            </a:ext>
+            <a:ext uri="{91240B29-F687-4F45-9708-019B960494DF}">
+              <a14:hiddenLine xmlns:a14="http://schemas.microsoft.com/office/drawing/2010/main" w="9525">
+                <a:solidFill>
+                  <a:schemeClr val="tx1"/>
+                </a:solidFill>
+                <a:miter lim="800000"/>
+                <a:headEnd/>
+                <a:tailEnd/>
+              </a14:hiddenLine>
+            </a:ext>
+            <a:ext uri="{AF507438-7753-43E0-B8FC-AC1667EBCBE1}">
+              <a14:hiddenEffects xmlns:a14="http://schemas.microsoft.com/office/drawing/2010/main">
+                <a:effectLst>
+                  <a:outerShdw dist="35921" dir="2700000" algn="ctr" rotWithShape="0">
+                    <a:schemeClr val="bg2"/>
+                  </a:outerShdw>
+                </a:effectLst>
+              </a14:hiddenEffects>
+            </a:ext>
+          </a:extLst>
+        </p:spPr>
+      </p:pic>
     </p:spTree>
     <p:extLst>
       <p:ext uri="{BB962C8B-B14F-4D97-AF65-F5344CB8AC3E}">
@@ -22851,7 +23050,7 @@
           <a:p>
             <a:r>
               <a:rPr lang="en-US" dirty="0" smtClean="0"/>
-              <a:t>Discussion</a:t>
+              <a:t>Evaluation (2)</a:t>
             </a:r>
             <a:endParaRPr lang="en-US" dirty="0"/>
           </a:p>
@@ -22875,6 +23074,1239 @@
             <a:fld id="{7D5018C4-273E-49AF-93AB-259FCF9A742C}" type="slidenum">
               <a:rPr lang="en-US" smtClean="0"/>
               <a:t>42</a:t>
+            </a:fld>
+            <a:endParaRPr lang="en-US"/>
+          </a:p>
+        </p:txBody>
+      </p:sp>
+      <p:sp>
+        <p:nvSpPr>
+          <p:cNvPr id="5" name="Text Placeholder 4"/>
+          <p:cNvSpPr>
+            <a:spLocks noGrp="1"/>
+          </p:cNvSpPr>
+          <p:nvPr>
+            <p:ph type="body" idx="4294967295"/>
+          </p:nvPr>
+        </p:nvSpPr>
+        <p:spPr>
+          <a:xfrm>
+            <a:off x="76200" y="3743325"/>
+            <a:ext cx="8534400" cy="1752600"/>
+          </a:xfrm>
+        </p:spPr>
+        <p:txBody>
+          <a:bodyPr>
+            <a:normAutofit fontScale="92500" lnSpcReduction="20000"/>
+          </a:bodyPr>
+          <a:lstStyle/>
+          <a:p>
+            <a:pPr marL="274320" lvl="1" indent="0">
+              <a:buNone/>
+            </a:pPr>
+            <a:r>
+              <a:rPr lang="en-US" dirty="0"/>
+              <a:t>	</a:t>
+            </a:r>
+            <a:endParaRPr lang="en-US" dirty="0" smtClean="0"/>
+          </a:p>
+          <a:p>
+            <a:r>
+              <a:rPr lang="en-US" dirty="0" smtClean="0"/>
+              <a:t>As </a:t>
+            </a:r>
+            <a:r>
+              <a:rPr lang="en-US" dirty="0" err="1" smtClean="0"/>
+              <a:t>t_pri</a:t>
+            </a:r>
+            <a:r>
+              <a:rPr lang="en-US" dirty="0" smtClean="0"/>
+              <a:t> increases:</a:t>
+            </a:r>
+          </a:p>
+          <a:p>
+            <a:pPr lvl="1"/>
+            <a:r>
+              <a:rPr lang="en-US" dirty="0" smtClean="0"/>
+              <a:t>More </a:t>
+            </a:r>
+            <a:r>
+              <a:rPr lang="en-US" dirty="0"/>
+              <a:t>utilization</a:t>
+            </a:r>
+          </a:p>
+          <a:p>
+            <a:pPr lvl="1"/>
+            <a:r>
+              <a:rPr lang="en-US" dirty="0"/>
+              <a:t>More failures</a:t>
+            </a:r>
+          </a:p>
+          <a:p>
+            <a:pPr lvl="1"/>
+            <a:r>
+              <a:rPr lang="en-US" dirty="0"/>
+              <a:t>Why?</a:t>
+            </a:r>
+          </a:p>
+          <a:p>
+            <a:endParaRPr lang="en-US" baseline="0" dirty="0" smtClean="0"/>
+          </a:p>
+        </p:txBody>
+      </p:sp>
+      <p:pic>
+        <p:nvPicPr>
+          <p:cNvPr id="2052" name="Picture 4"/>
+          <p:cNvPicPr>
+            <a:picLocks noChangeAspect="1" noChangeArrowheads="1"/>
+          </p:cNvPicPr>
+          <p:nvPr/>
+        </p:nvPicPr>
+        <p:blipFill>
+          <a:blip r:embed="rId3">
+            <a:extLst>
+              <a:ext uri="{28A0092B-C50C-407E-A947-70E740481C1C}">
+                <a14:useLocalDpi xmlns:a14="http://schemas.microsoft.com/office/drawing/2010/main" val="0"/>
+              </a:ext>
+            </a:extLst>
+          </a:blip>
+          <a:srcRect/>
+          <a:stretch>
+            <a:fillRect/>
+          </a:stretch>
+        </p:blipFill>
+        <p:spPr bwMode="auto">
+          <a:xfrm>
+            <a:off x="4584290" y="2743200"/>
+            <a:ext cx="4429125" cy="3752850"/>
+          </a:xfrm>
+          <a:prstGeom prst="rect">
+            <a:avLst/>
+          </a:prstGeom>
+          <a:noFill/>
+          <a:ln>
+            <a:noFill/>
+          </a:ln>
+          <a:effectLst/>
+          <a:extLst>
+            <a:ext uri="{909E8E84-426E-40DD-AFC4-6F175D3DCCD1}">
+              <a14:hiddenFill xmlns:a14="http://schemas.microsoft.com/office/drawing/2010/main">
+                <a:solidFill>
+                  <a:schemeClr val="accent1"/>
+                </a:solidFill>
+              </a14:hiddenFill>
+            </a:ext>
+            <a:ext uri="{91240B29-F687-4F45-9708-019B960494DF}">
+              <a14:hiddenLine xmlns:a14="http://schemas.microsoft.com/office/drawing/2010/main" w="9525">
+                <a:solidFill>
+                  <a:schemeClr val="tx1"/>
+                </a:solidFill>
+                <a:miter lim="800000"/>
+                <a:headEnd/>
+                <a:tailEnd/>
+              </a14:hiddenLine>
+            </a:ext>
+            <a:ext uri="{AF507438-7753-43E0-B8FC-AC1667EBCBE1}">
+              <a14:hiddenEffects xmlns:a14="http://schemas.microsoft.com/office/drawing/2010/main">
+                <a:effectLst>
+                  <a:outerShdw dist="35921" dir="2700000" algn="ctr" rotWithShape="0">
+                    <a:schemeClr val="bg2"/>
+                  </a:outerShdw>
+                </a:effectLst>
+              </a14:hiddenEffects>
+            </a:ext>
+          </a:extLst>
+        </p:spPr>
+      </p:pic>
+      <p:pic>
+        <p:nvPicPr>
+          <p:cNvPr id="2050" name="Picture 2"/>
+          <p:cNvPicPr>
+            <a:picLocks noGrp="1" noChangeAspect="1" noChangeArrowheads="1"/>
+          </p:cNvPicPr>
+          <p:nvPr>
+            <p:ph sz="quarter" idx="1"/>
+          </p:nvPr>
+        </p:nvPicPr>
+        <p:blipFill>
+          <a:blip r:embed="rId4">
+            <a:extLst>
+              <a:ext uri="{28A0092B-C50C-407E-A947-70E740481C1C}">
+                <a14:useLocalDpi xmlns:a14="http://schemas.microsoft.com/office/drawing/2010/main" val="0"/>
+              </a:ext>
+            </a:extLst>
+          </a:blip>
+          <a:srcRect/>
+          <a:stretch>
+            <a:fillRect/>
+          </a:stretch>
+        </p:blipFill>
+        <p:spPr bwMode="auto">
+          <a:xfrm>
+            <a:off x="228600" y="1447800"/>
+            <a:ext cx="4648200" cy="1971675"/>
+          </a:xfrm>
+          <a:prstGeom prst="rect">
+            <a:avLst/>
+          </a:prstGeom>
+          <a:noFill/>
+          <a:ln>
+            <a:noFill/>
+          </a:ln>
+          <a:effectLst/>
+          <a:extLst>
+            <a:ext uri="{909E8E84-426E-40DD-AFC4-6F175D3DCCD1}">
+              <a14:hiddenFill xmlns:a14="http://schemas.microsoft.com/office/drawing/2010/main">
+                <a:solidFill>
+                  <a:schemeClr val="accent1"/>
+                </a:solidFill>
+              </a14:hiddenFill>
+            </a:ext>
+            <a:ext uri="{91240B29-F687-4F45-9708-019B960494DF}">
+              <a14:hiddenLine xmlns:a14="http://schemas.microsoft.com/office/drawing/2010/main" w="9525">
+                <a:solidFill>
+                  <a:schemeClr val="tx1"/>
+                </a:solidFill>
+                <a:miter lim="800000"/>
+                <a:headEnd/>
+                <a:tailEnd/>
+              </a14:hiddenLine>
+            </a:ext>
+            <a:ext uri="{AF507438-7753-43E0-B8FC-AC1667EBCBE1}">
+              <a14:hiddenEffects xmlns:a14="http://schemas.microsoft.com/office/drawing/2010/main">
+                <a:effectLst>
+                  <a:outerShdw dist="35921" dir="2700000" algn="ctr" rotWithShape="0">
+                    <a:schemeClr val="bg2"/>
+                  </a:outerShdw>
+                </a:effectLst>
+              </a14:hiddenEffects>
+            </a:ext>
+          </a:extLst>
+        </p:spPr>
+      </p:pic>
+    </p:spTree>
+    <p:extLst>
+      <p:ext uri="{BB962C8B-B14F-4D97-AF65-F5344CB8AC3E}">
+        <p14:creationId xmlns:p14="http://schemas.microsoft.com/office/powerpoint/2010/main" val="3239293255"/>
+      </p:ext>
+    </p:extLst>
+  </p:cSld>
+  <p:clrMapOvr>
+    <a:masterClrMapping/>
+  </p:clrMapOvr>
+  <p:timing>
+    <p:tnLst>
+      <p:par>
+        <p:cTn id="1" dur="indefinite" restart="never" nodeType="tmRoot"/>
+      </p:par>
+    </p:tnLst>
+  </p:timing>
+</p:sld>
+</file>
+
+<file path=ppt/slides/slide43.xml><?xml version="1.0" encoding="utf-8"?>
+<p:sld xmlns:a="http://schemas.openxmlformats.org/drawingml/2006/main" xmlns:r="http://schemas.openxmlformats.org/officeDocument/2006/relationships" xmlns:p="http://schemas.openxmlformats.org/presentationml/2006/main">
+  <p:cSld>
+    <p:spTree>
+      <p:nvGrpSpPr>
+        <p:cNvPr id="1" name=""/>
+        <p:cNvGrpSpPr/>
+        <p:nvPr/>
+      </p:nvGrpSpPr>
+      <p:grpSpPr>
+        <a:xfrm>
+          <a:off x="0" y="0"/>
+          <a:ext cx="0" cy="0"/>
+          <a:chOff x="0" y="0"/>
+          <a:chExt cx="0" cy="0"/>
+        </a:xfrm>
+      </p:grpSpPr>
+      <p:sp>
+        <p:nvSpPr>
+          <p:cNvPr id="2" name="Title 1"/>
+          <p:cNvSpPr>
+            <a:spLocks noGrp="1"/>
+          </p:cNvSpPr>
+          <p:nvPr>
+            <p:ph type="title"/>
+          </p:nvPr>
+        </p:nvSpPr>
+        <p:spPr/>
+        <p:txBody>
+          <a:bodyPr/>
+          <a:lstStyle/>
+          <a:p>
+            <a:r>
+              <a:rPr lang="en-US" dirty="0" smtClean="0"/>
+              <a:t>Evaluation (3)</a:t>
+            </a:r>
+            <a:endParaRPr lang="en-US" dirty="0"/>
+          </a:p>
+        </p:txBody>
+      </p:sp>
+      <p:sp>
+        <p:nvSpPr>
+          <p:cNvPr id="3" name="Slide Number Placeholder 2"/>
+          <p:cNvSpPr>
+            <a:spLocks noGrp="1"/>
+          </p:cNvSpPr>
+          <p:nvPr>
+            <p:ph type="sldNum" sz="quarter" idx="12"/>
+          </p:nvPr>
+        </p:nvSpPr>
+        <p:spPr/>
+        <p:txBody>
+          <a:bodyPr/>
+          <a:lstStyle/>
+          <a:p>
+            <a:fld id="{7D5018C4-273E-49AF-93AB-259FCF9A742C}" type="slidenum">
+              <a:rPr lang="en-US" smtClean="0"/>
+              <a:t>43</a:t>
+            </a:fld>
+            <a:endParaRPr lang="en-US"/>
+          </a:p>
+        </p:txBody>
+      </p:sp>
+      <p:pic>
+        <p:nvPicPr>
+          <p:cNvPr id="3075" name="Picture 3"/>
+          <p:cNvPicPr>
+            <a:picLocks noChangeAspect="1" noChangeArrowheads="1"/>
+          </p:cNvPicPr>
+          <p:nvPr/>
+        </p:nvPicPr>
+        <p:blipFill>
+          <a:blip r:embed="rId2">
+            <a:extLst>
+              <a:ext uri="{28A0092B-C50C-407E-A947-70E740481C1C}">
+                <a14:useLocalDpi xmlns:a14="http://schemas.microsoft.com/office/drawing/2010/main" val="0"/>
+              </a:ext>
+            </a:extLst>
+          </a:blip>
+          <a:srcRect/>
+          <a:stretch>
+            <a:fillRect/>
+          </a:stretch>
+        </p:blipFill>
+        <p:spPr bwMode="auto">
+          <a:xfrm>
+            <a:off x="4572000" y="2971800"/>
+            <a:ext cx="4467225" cy="3686175"/>
+          </a:xfrm>
+          <a:prstGeom prst="rect">
+            <a:avLst/>
+          </a:prstGeom>
+          <a:noFill/>
+          <a:ln>
+            <a:noFill/>
+          </a:ln>
+          <a:effectLst/>
+          <a:extLst>
+            <a:ext uri="{909E8E84-426E-40DD-AFC4-6F175D3DCCD1}">
+              <a14:hiddenFill xmlns:a14="http://schemas.microsoft.com/office/drawing/2010/main">
+                <a:solidFill>
+                  <a:schemeClr val="accent1"/>
+                </a:solidFill>
+              </a14:hiddenFill>
+            </a:ext>
+            <a:ext uri="{91240B29-F687-4F45-9708-019B960494DF}">
+              <a14:hiddenLine xmlns:a14="http://schemas.microsoft.com/office/drawing/2010/main" w="9525">
+                <a:solidFill>
+                  <a:schemeClr val="tx1"/>
+                </a:solidFill>
+                <a:miter lim="800000"/>
+                <a:headEnd/>
+                <a:tailEnd/>
+              </a14:hiddenLine>
+            </a:ext>
+            <a:ext uri="{AF507438-7753-43E0-B8FC-AC1667EBCBE1}">
+              <a14:hiddenEffects xmlns:a14="http://schemas.microsoft.com/office/drawing/2010/main">
+                <a:effectLst>
+                  <a:outerShdw dist="35921" dir="2700000" algn="ctr" rotWithShape="0">
+                    <a:schemeClr val="bg2"/>
+                  </a:outerShdw>
+                </a:effectLst>
+              </a14:hiddenEffects>
+            </a:ext>
+          </a:extLst>
+        </p:spPr>
+      </p:pic>
+      <p:pic>
+        <p:nvPicPr>
+          <p:cNvPr id="3074" name="Picture 2"/>
+          <p:cNvPicPr>
+            <a:picLocks noGrp="1" noChangeAspect="1" noChangeArrowheads="1"/>
+          </p:cNvPicPr>
+          <p:nvPr>
+            <p:ph sz="quarter" idx="1"/>
+          </p:nvPr>
+        </p:nvPicPr>
+        <p:blipFill>
+          <a:blip r:embed="rId3">
+            <a:extLst>
+              <a:ext uri="{28A0092B-C50C-407E-A947-70E740481C1C}">
+                <a14:useLocalDpi xmlns:a14="http://schemas.microsoft.com/office/drawing/2010/main" val="0"/>
+              </a:ext>
+            </a:extLst>
+          </a:blip>
+          <a:srcRect/>
+          <a:stretch>
+            <a:fillRect/>
+          </a:stretch>
+        </p:blipFill>
+        <p:spPr bwMode="auto">
+          <a:xfrm>
+            <a:off x="304800" y="1524000"/>
+            <a:ext cx="4552950" cy="2038350"/>
+          </a:xfrm>
+          <a:prstGeom prst="rect">
+            <a:avLst/>
+          </a:prstGeom>
+          <a:noFill/>
+          <a:ln>
+            <a:noFill/>
+          </a:ln>
+          <a:effectLst/>
+          <a:extLst>
+            <a:ext uri="{909E8E84-426E-40DD-AFC4-6F175D3DCCD1}">
+              <a14:hiddenFill xmlns:a14="http://schemas.microsoft.com/office/drawing/2010/main">
+                <a:solidFill>
+                  <a:schemeClr val="accent1"/>
+                </a:solidFill>
+              </a14:hiddenFill>
+            </a:ext>
+            <a:ext uri="{91240B29-F687-4F45-9708-019B960494DF}">
+              <a14:hiddenLine xmlns:a14="http://schemas.microsoft.com/office/drawing/2010/main" w="9525">
+                <a:solidFill>
+                  <a:schemeClr val="tx1"/>
+                </a:solidFill>
+                <a:miter lim="800000"/>
+                <a:headEnd/>
+                <a:tailEnd/>
+              </a14:hiddenLine>
+            </a:ext>
+            <a:ext uri="{AF507438-7753-43E0-B8FC-AC1667EBCBE1}">
+              <a14:hiddenEffects xmlns:a14="http://schemas.microsoft.com/office/drawing/2010/main">
+                <a:effectLst>
+                  <a:outerShdw dist="35921" dir="2700000" algn="ctr" rotWithShape="0">
+                    <a:schemeClr val="bg2"/>
+                  </a:outerShdw>
+                </a:effectLst>
+              </a14:hiddenEffects>
+            </a:ext>
+          </a:extLst>
+        </p:spPr>
+      </p:pic>
+      <p:sp>
+        <p:nvSpPr>
+          <p:cNvPr id="5" name="Text Placeholder 4"/>
+          <p:cNvSpPr>
+            <a:spLocks noGrp="1"/>
+          </p:cNvSpPr>
+          <p:nvPr>
+            <p:ph type="body" idx="4294967295"/>
+          </p:nvPr>
+        </p:nvSpPr>
+        <p:spPr>
+          <a:xfrm>
+            <a:off x="304800" y="3657600"/>
+            <a:ext cx="4191000" cy="2878787"/>
+          </a:xfrm>
+        </p:spPr>
+        <p:txBody>
+          <a:bodyPr/>
+          <a:lstStyle/>
+          <a:p>
+            <a:r>
+              <a:rPr lang="en-US" dirty="0" smtClean="0"/>
+              <a:t>As</a:t>
+            </a:r>
+            <a:r>
+              <a:rPr lang="en-US" baseline="0" dirty="0" smtClean="0"/>
+              <a:t> </a:t>
+            </a:r>
+            <a:r>
+              <a:rPr lang="en-US" baseline="0" dirty="0" err="1" smtClean="0"/>
+              <a:t>t_div</a:t>
+            </a:r>
+            <a:r>
+              <a:rPr lang="en-US" baseline="0" dirty="0" smtClean="0"/>
+              <a:t> increases:</a:t>
+            </a:r>
+          </a:p>
+          <a:p>
+            <a:pPr lvl="1"/>
+            <a:r>
+              <a:rPr lang="en-US" dirty="0" smtClean="0"/>
+              <a:t>More failures</a:t>
+            </a:r>
+          </a:p>
+          <a:p>
+            <a:pPr lvl="1"/>
+            <a:r>
+              <a:rPr lang="en-US" dirty="0" smtClean="0"/>
+              <a:t>More utilization</a:t>
+            </a:r>
+          </a:p>
+          <a:p>
+            <a:pPr lvl="1"/>
+            <a:r>
+              <a:rPr lang="en-US" dirty="0" smtClean="0"/>
+              <a:t>Why?</a:t>
+            </a:r>
+            <a:endParaRPr lang="en-US" dirty="0"/>
+          </a:p>
+        </p:txBody>
+      </p:sp>
+    </p:spTree>
+    <p:extLst>
+      <p:ext uri="{BB962C8B-B14F-4D97-AF65-F5344CB8AC3E}">
+        <p14:creationId xmlns:p14="http://schemas.microsoft.com/office/powerpoint/2010/main" val="2602111604"/>
+      </p:ext>
+    </p:extLst>
+  </p:cSld>
+  <p:clrMapOvr>
+    <a:masterClrMapping/>
+  </p:clrMapOvr>
+  <p:timing>
+    <p:tnLst>
+      <p:par>
+        <p:cTn id="1" dur="indefinite" restart="never" nodeType="tmRoot"/>
+      </p:par>
+    </p:tnLst>
+  </p:timing>
+</p:sld>
+</file>
+
+<file path=ppt/slides/slide44.xml><?xml version="1.0" encoding="utf-8"?>
+<p:sld xmlns:a="http://schemas.openxmlformats.org/drawingml/2006/main" xmlns:r="http://schemas.openxmlformats.org/officeDocument/2006/relationships" xmlns:p="http://schemas.openxmlformats.org/presentationml/2006/main">
+  <p:cSld>
+    <p:spTree>
+      <p:nvGrpSpPr>
+        <p:cNvPr id="1" name=""/>
+        <p:cNvGrpSpPr/>
+        <p:nvPr/>
+      </p:nvGrpSpPr>
+      <p:grpSpPr>
+        <a:xfrm>
+          <a:off x="0" y="0"/>
+          <a:ext cx="0" cy="0"/>
+          <a:chOff x="0" y="0"/>
+          <a:chExt cx="0" cy="0"/>
+        </a:xfrm>
+      </p:grpSpPr>
+      <p:sp>
+        <p:nvSpPr>
+          <p:cNvPr id="2" name="Title 1"/>
+          <p:cNvSpPr>
+            <a:spLocks noGrp="1"/>
+          </p:cNvSpPr>
+          <p:nvPr>
+            <p:ph type="title"/>
+          </p:nvPr>
+        </p:nvSpPr>
+        <p:spPr/>
+        <p:txBody>
+          <a:bodyPr/>
+          <a:lstStyle/>
+          <a:p>
+            <a:r>
+              <a:rPr lang="en-US" dirty="0" smtClean="0"/>
+              <a:t>Evaluation (4)</a:t>
+            </a:r>
+            <a:endParaRPr lang="en-US" dirty="0"/>
+          </a:p>
+        </p:txBody>
+      </p:sp>
+      <p:sp>
+        <p:nvSpPr>
+          <p:cNvPr id="3" name="Slide Number Placeholder 2"/>
+          <p:cNvSpPr>
+            <a:spLocks noGrp="1"/>
+          </p:cNvSpPr>
+          <p:nvPr>
+            <p:ph type="sldNum" sz="quarter" idx="12"/>
+          </p:nvPr>
+        </p:nvSpPr>
+        <p:spPr/>
+        <p:txBody>
+          <a:bodyPr/>
+          <a:lstStyle/>
+          <a:p>
+            <a:fld id="{7D5018C4-273E-49AF-93AB-259FCF9A742C}" type="slidenum">
+              <a:rPr lang="en-US" smtClean="0"/>
+              <a:t>44</a:t>
+            </a:fld>
+            <a:endParaRPr lang="en-US"/>
+          </a:p>
+        </p:txBody>
+      </p:sp>
+      <p:sp>
+        <p:nvSpPr>
+          <p:cNvPr id="4" name="Content Placeholder 3"/>
+          <p:cNvSpPr>
+            <a:spLocks noGrp="1"/>
+          </p:cNvSpPr>
+          <p:nvPr>
+            <p:ph sz="quarter" idx="1"/>
+          </p:nvPr>
+        </p:nvSpPr>
+        <p:spPr/>
+        <p:txBody>
+          <a:bodyPr/>
+          <a:lstStyle/>
+          <a:p>
+            <a:endParaRPr lang="en-US" dirty="0"/>
+          </a:p>
+        </p:txBody>
+      </p:sp>
+      <p:pic>
+        <p:nvPicPr>
+          <p:cNvPr id="4098" name="Picture 2"/>
+          <p:cNvPicPr>
+            <a:picLocks noChangeAspect="1" noChangeArrowheads="1"/>
+          </p:cNvPicPr>
+          <p:nvPr/>
+        </p:nvPicPr>
+        <p:blipFill>
+          <a:blip r:embed="rId2">
+            <a:extLst>
+              <a:ext uri="{28A0092B-C50C-407E-A947-70E740481C1C}">
+                <a14:useLocalDpi xmlns:a14="http://schemas.microsoft.com/office/drawing/2010/main" val="0"/>
+              </a:ext>
+            </a:extLst>
+          </a:blip>
+          <a:srcRect/>
+          <a:stretch>
+            <a:fillRect/>
+          </a:stretch>
+        </p:blipFill>
+        <p:spPr bwMode="auto">
+          <a:xfrm>
+            <a:off x="152400" y="2008239"/>
+            <a:ext cx="4572000" cy="3657600"/>
+          </a:xfrm>
+          <a:prstGeom prst="rect">
+            <a:avLst/>
+          </a:prstGeom>
+          <a:noFill/>
+          <a:ln>
+            <a:noFill/>
+          </a:ln>
+          <a:effectLst/>
+          <a:extLst>
+            <a:ext uri="{909E8E84-426E-40DD-AFC4-6F175D3DCCD1}">
+              <a14:hiddenFill xmlns:a14="http://schemas.microsoft.com/office/drawing/2010/main">
+                <a:solidFill>
+                  <a:schemeClr val="accent1"/>
+                </a:solidFill>
+              </a14:hiddenFill>
+            </a:ext>
+            <a:ext uri="{91240B29-F687-4F45-9708-019B960494DF}">
+              <a14:hiddenLine xmlns:a14="http://schemas.microsoft.com/office/drawing/2010/main" w="9525">
+                <a:solidFill>
+                  <a:schemeClr val="tx1"/>
+                </a:solidFill>
+                <a:miter lim="800000"/>
+                <a:headEnd/>
+                <a:tailEnd/>
+              </a14:hiddenLine>
+            </a:ext>
+            <a:ext uri="{AF507438-7753-43E0-B8FC-AC1667EBCBE1}">
+              <a14:hiddenEffects xmlns:a14="http://schemas.microsoft.com/office/drawing/2010/main">
+                <a:effectLst>
+                  <a:outerShdw dist="35921" dir="2700000" algn="ctr" rotWithShape="0">
+                    <a:schemeClr val="bg2"/>
+                  </a:outerShdw>
+                </a:effectLst>
+              </a14:hiddenEffects>
+            </a:ext>
+          </a:extLst>
+        </p:spPr>
+      </p:pic>
+      <p:pic>
+        <p:nvPicPr>
+          <p:cNvPr id="4099" name="Picture 3"/>
+          <p:cNvPicPr>
+            <a:picLocks noChangeAspect="1" noChangeArrowheads="1"/>
+          </p:cNvPicPr>
+          <p:nvPr/>
+        </p:nvPicPr>
+        <p:blipFill>
+          <a:blip r:embed="rId3">
+            <a:extLst>
+              <a:ext uri="{28A0092B-C50C-407E-A947-70E740481C1C}">
+                <a14:useLocalDpi xmlns:a14="http://schemas.microsoft.com/office/drawing/2010/main" val="0"/>
+              </a:ext>
+            </a:extLst>
+          </a:blip>
+          <a:srcRect/>
+          <a:stretch>
+            <a:fillRect/>
+          </a:stretch>
+        </p:blipFill>
+        <p:spPr bwMode="auto">
+          <a:xfrm>
+            <a:off x="4744065" y="2419350"/>
+            <a:ext cx="4476750" cy="3219450"/>
+          </a:xfrm>
+          <a:prstGeom prst="rect">
+            <a:avLst/>
+          </a:prstGeom>
+          <a:noFill/>
+          <a:ln>
+            <a:noFill/>
+          </a:ln>
+          <a:effectLst/>
+          <a:extLst>
+            <a:ext uri="{909E8E84-426E-40DD-AFC4-6F175D3DCCD1}">
+              <a14:hiddenFill xmlns:a14="http://schemas.microsoft.com/office/drawing/2010/main">
+                <a:solidFill>
+                  <a:schemeClr val="accent1"/>
+                </a:solidFill>
+              </a14:hiddenFill>
+            </a:ext>
+            <a:ext uri="{91240B29-F687-4F45-9708-019B960494DF}">
+              <a14:hiddenLine xmlns:a14="http://schemas.microsoft.com/office/drawing/2010/main" w="9525">
+                <a:solidFill>
+                  <a:schemeClr val="tx1"/>
+                </a:solidFill>
+                <a:miter lim="800000"/>
+                <a:headEnd/>
+                <a:tailEnd/>
+              </a14:hiddenLine>
+            </a:ext>
+            <a:ext uri="{AF507438-7753-43E0-B8FC-AC1667EBCBE1}">
+              <a14:hiddenEffects xmlns:a14="http://schemas.microsoft.com/office/drawing/2010/main">
+                <a:effectLst>
+                  <a:outerShdw dist="35921" dir="2700000" algn="ctr" rotWithShape="0">
+                    <a:schemeClr val="bg2"/>
+                  </a:outerShdw>
+                </a:effectLst>
+              </a14:hiddenEffects>
+            </a:ext>
+          </a:extLst>
+        </p:spPr>
+      </p:pic>
+    </p:spTree>
+    <p:extLst>
+      <p:ext uri="{BB962C8B-B14F-4D97-AF65-F5344CB8AC3E}">
+        <p14:creationId xmlns:p14="http://schemas.microsoft.com/office/powerpoint/2010/main" val="3928367736"/>
+      </p:ext>
+    </p:extLst>
+  </p:cSld>
+  <p:clrMapOvr>
+    <a:masterClrMapping/>
+  </p:clrMapOvr>
+  <p:timing>
+    <p:tnLst>
+      <p:par>
+        <p:cTn id="1" dur="indefinite" restart="never" nodeType="tmRoot"/>
+      </p:par>
+    </p:tnLst>
+  </p:timing>
+</p:sld>
+</file>
+
+<file path=ppt/slides/slide45.xml><?xml version="1.0" encoding="utf-8"?>
+<p:sld xmlns:a="http://schemas.openxmlformats.org/drawingml/2006/main" xmlns:r="http://schemas.openxmlformats.org/officeDocument/2006/relationships" xmlns:p="http://schemas.openxmlformats.org/presentationml/2006/main">
+  <p:cSld>
+    <p:spTree>
+      <p:nvGrpSpPr>
+        <p:cNvPr id="1" name=""/>
+        <p:cNvGrpSpPr/>
+        <p:nvPr/>
+      </p:nvGrpSpPr>
+      <p:grpSpPr>
+        <a:xfrm>
+          <a:off x="0" y="0"/>
+          <a:ext cx="0" cy="0"/>
+          <a:chOff x="0" y="0"/>
+          <a:chExt cx="0" cy="0"/>
+        </a:xfrm>
+      </p:grpSpPr>
+      <p:sp>
+        <p:nvSpPr>
+          <p:cNvPr id="2" name="Title 1"/>
+          <p:cNvSpPr>
+            <a:spLocks noGrp="1"/>
+          </p:cNvSpPr>
+          <p:nvPr>
+            <p:ph type="title"/>
+          </p:nvPr>
+        </p:nvSpPr>
+        <p:spPr/>
+        <p:txBody>
+          <a:bodyPr/>
+          <a:lstStyle/>
+          <a:p>
+            <a:r>
+              <a:rPr lang="en-US" dirty="0" smtClean="0"/>
+              <a:t>Evaluation (5)</a:t>
+            </a:r>
+            <a:endParaRPr lang="en-US" dirty="0"/>
+          </a:p>
+        </p:txBody>
+      </p:sp>
+      <p:sp>
+        <p:nvSpPr>
+          <p:cNvPr id="3" name="Slide Number Placeholder 2"/>
+          <p:cNvSpPr>
+            <a:spLocks noGrp="1"/>
+          </p:cNvSpPr>
+          <p:nvPr>
+            <p:ph type="sldNum" sz="quarter" idx="12"/>
+          </p:nvPr>
+        </p:nvSpPr>
+        <p:spPr/>
+        <p:txBody>
+          <a:bodyPr/>
+          <a:lstStyle/>
+          <a:p>
+            <a:fld id="{7D5018C4-273E-49AF-93AB-259FCF9A742C}" type="slidenum">
+              <a:rPr lang="en-US" smtClean="0"/>
+              <a:t>45</a:t>
+            </a:fld>
+            <a:endParaRPr lang="en-US"/>
+          </a:p>
+        </p:txBody>
+      </p:sp>
+      <p:sp>
+        <p:nvSpPr>
+          <p:cNvPr id="4" name="Content Placeholder 3"/>
+          <p:cNvSpPr>
+            <a:spLocks noGrp="1"/>
+          </p:cNvSpPr>
+          <p:nvPr>
+            <p:ph sz="quarter" idx="1"/>
+          </p:nvPr>
+        </p:nvSpPr>
+        <p:spPr/>
+        <p:txBody>
+          <a:bodyPr/>
+          <a:lstStyle/>
+          <a:p>
+            <a:r>
+              <a:rPr lang="en-US" dirty="0" smtClean="0"/>
+              <a:t>As system utilization increases:</a:t>
+            </a:r>
+          </a:p>
+          <a:p>
+            <a:pPr lvl="1"/>
+            <a:r>
+              <a:rPr lang="en-US" dirty="0" smtClean="0"/>
+              <a:t>More failures</a:t>
+            </a:r>
+          </a:p>
+          <a:p>
+            <a:pPr lvl="1"/>
+            <a:r>
+              <a:rPr lang="en-US" dirty="0" smtClean="0"/>
+              <a:t>Smaller files fail more</a:t>
+            </a:r>
+            <a:endParaRPr lang="en-US" dirty="0"/>
+          </a:p>
+        </p:txBody>
+      </p:sp>
+      <p:pic>
+        <p:nvPicPr>
+          <p:cNvPr id="5122" name="Picture 2"/>
+          <p:cNvPicPr>
+            <a:picLocks noChangeAspect="1" noChangeArrowheads="1"/>
+          </p:cNvPicPr>
+          <p:nvPr/>
+        </p:nvPicPr>
+        <p:blipFill>
+          <a:blip r:embed="rId2">
+            <a:extLst>
+              <a:ext uri="{28A0092B-C50C-407E-A947-70E740481C1C}">
+                <a14:useLocalDpi xmlns:a14="http://schemas.microsoft.com/office/drawing/2010/main" val="0"/>
+              </a:ext>
+            </a:extLst>
+          </a:blip>
+          <a:srcRect/>
+          <a:stretch>
+            <a:fillRect/>
+          </a:stretch>
+        </p:blipFill>
+        <p:spPr bwMode="auto">
+          <a:xfrm>
+            <a:off x="2438400" y="2895600"/>
+            <a:ext cx="4495800" cy="3629025"/>
+          </a:xfrm>
+          <a:prstGeom prst="rect">
+            <a:avLst/>
+          </a:prstGeom>
+          <a:noFill/>
+          <a:ln>
+            <a:noFill/>
+          </a:ln>
+          <a:effectLst/>
+          <a:extLst>
+            <a:ext uri="{909E8E84-426E-40DD-AFC4-6F175D3DCCD1}">
+              <a14:hiddenFill xmlns:a14="http://schemas.microsoft.com/office/drawing/2010/main">
+                <a:solidFill>
+                  <a:schemeClr val="accent1"/>
+                </a:solidFill>
+              </a14:hiddenFill>
+            </a:ext>
+            <a:ext uri="{91240B29-F687-4F45-9708-019B960494DF}">
+              <a14:hiddenLine xmlns:a14="http://schemas.microsoft.com/office/drawing/2010/main" w="9525">
+                <a:solidFill>
+                  <a:schemeClr val="tx1"/>
+                </a:solidFill>
+                <a:miter lim="800000"/>
+                <a:headEnd/>
+                <a:tailEnd/>
+              </a14:hiddenLine>
+            </a:ext>
+            <a:ext uri="{AF507438-7753-43E0-B8FC-AC1667EBCBE1}">
+              <a14:hiddenEffects xmlns:a14="http://schemas.microsoft.com/office/drawing/2010/main">
+                <a:effectLst>
+                  <a:outerShdw dist="35921" dir="2700000" algn="ctr" rotWithShape="0">
+                    <a:schemeClr val="bg2"/>
+                  </a:outerShdw>
+                </a:effectLst>
+              </a14:hiddenEffects>
+            </a:ext>
+          </a:extLst>
+        </p:spPr>
+      </p:pic>
+      <p:sp>
+        <p:nvSpPr>
+          <p:cNvPr id="6" name="Oval 5"/>
+          <p:cNvSpPr/>
+          <p:nvPr/>
+        </p:nvSpPr>
+        <p:spPr>
+          <a:xfrm>
+            <a:off x="3733800" y="2819400"/>
+            <a:ext cx="1752600" cy="685800"/>
+          </a:xfrm>
+          <a:prstGeom prst="ellipse">
+            <a:avLst/>
+          </a:prstGeom>
+          <a:noFill/>
+          <a:ln w="76200">
+            <a:solidFill>
+              <a:schemeClr val="accent1"/>
+            </a:solidFill>
+          </a:ln>
+        </p:spPr>
+        <p:style>
+          <a:lnRef idx="3">
+            <a:schemeClr val="lt1"/>
+          </a:lnRef>
+          <a:fillRef idx="1">
+            <a:schemeClr val="accent1"/>
+          </a:fillRef>
+          <a:effectRef idx="1">
+            <a:schemeClr val="accent1"/>
+          </a:effectRef>
+          <a:fontRef idx="minor">
+            <a:schemeClr val="lt1"/>
+          </a:fontRef>
+        </p:style>
+        <p:txBody>
+          <a:bodyPr rtlCol="0" anchor="ctr"/>
+          <a:lstStyle/>
+          <a:p>
+            <a:pPr algn="ctr"/>
+            <a:endParaRPr lang="en-US"/>
+          </a:p>
+        </p:txBody>
+      </p:sp>
+      <p:cxnSp>
+        <p:nvCxnSpPr>
+          <p:cNvPr id="8" name="Straight Arrow Connector 7"/>
+          <p:cNvCxnSpPr/>
+          <p:nvPr/>
+        </p:nvCxnSpPr>
+        <p:spPr>
+          <a:xfrm flipV="1">
+            <a:off x="5334000" y="2667000"/>
+            <a:ext cx="762000" cy="228600"/>
+          </a:xfrm>
+          <a:prstGeom prst="straightConnector1">
+            <a:avLst/>
+          </a:prstGeom>
+          <a:ln>
+            <a:tailEnd type="arrow"/>
+          </a:ln>
+        </p:spPr>
+        <p:style>
+          <a:lnRef idx="3">
+            <a:schemeClr val="accent1"/>
+          </a:lnRef>
+          <a:fillRef idx="0">
+            <a:schemeClr val="accent1"/>
+          </a:fillRef>
+          <a:effectRef idx="2">
+            <a:schemeClr val="accent1"/>
+          </a:effectRef>
+          <a:fontRef idx="minor">
+            <a:schemeClr val="tx1"/>
+          </a:fontRef>
+        </p:style>
+      </p:cxnSp>
+      <p:sp>
+        <p:nvSpPr>
+          <p:cNvPr id="9" name="TextBox 8"/>
+          <p:cNvSpPr txBox="1"/>
+          <p:nvPr/>
+        </p:nvSpPr>
+        <p:spPr>
+          <a:xfrm>
+            <a:off x="6096000" y="2438400"/>
+            <a:ext cx="2010487" cy="369332"/>
+          </a:xfrm>
+          <a:prstGeom prst="rect">
+            <a:avLst/>
+          </a:prstGeom>
+          <a:noFill/>
+        </p:spPr>
+        <p:txBody>
+          <a:bodyPr wrap="none" rtlCol="0">
+            <a:spAutoFit/>
+          </a:bodyPr>
+          <a:lstStyle/>
+          <a:p>
+            <a:r>
+              <a:rPr lang="en-US" dirty="0" smtClean="0"/>
+              <a:t>What causes this?</a:t>
+            </a:r>
+            <a:endParaRPr lang="en-US" dirty="0"/>
+          </a:p>
+        </p:txBody>
+      </p:sp>
+    </p:spTree>
+    <p:extLst>
+      <p:ext uri="{BB962C8B-B14F-4D97-AF65-F5344CB8AC3E}">
+        <p14:creationId xmlns:p14="http://schemas.microsoft.com/office/powerpoint/2010/main" val="4195572335"/>
+      </p:ext>
+    </p:extLst>
+  </p:cSld>
+  <p:clrMapOvr>
+    <a:masterClrMapping/>
+  </p:clrMapOvr>
+  <p:timing>
+    <p:tnLst>
+      <p:par>
+        <p:cTn id="1" dur="indefinite" restart="never" nodeType="tmRoot">
+          <p:childTnLst>
+            <p:seq concurrent="1" nextAc="seek">
+              <p:cTn id="2" dur="indefinite" nodeType="mainSeq">
+                <p:childTnLst>
+                  <p:par>
+                    <p:cTn id="3" fill="hold">
+                      <p:stCondLst>
+                        <p:cond delay="indefinite"/>
+                      </p:stCondLst>
+                      <p:childTnLst>
+                        <p:par>
+                          <p:cTn id="4" fill="hold">
+                            <p:stCondLst>
+                              <p:cond delay="0"/>
+                            </p:stCondLst>
+                            <p:childTnLst>
+                              <p:par>
+                                <p:cTn id="5" presetID="10" presetClass="entr" presetSubtype="0" fill="hold" grpId="0" nodeType="clickEffect">
+                                  <p:stCondLst>
+                                    <p:cond delay="0"/>
+                                  </p:stCondLst>
+                                  <p:childTnLst>
+                                    <p:set>
+                                      <p:cBhvr>
+                                        <p:cTn id="6" dur="1" fill="hold">
+                                          <p:stCondLst>
+                                            <p:cond delay="0"/>
+                                          </p:stCondLst>
+                                        </p:cTn>
+                                        <p:tgtEl>
+                                          <p:spTgt spid="9"/>
+                                        </p:tgtEl>
+                                        <p:attrNameLst>
+                                          <p:attrName>style.visibility</p:attrName>
+                                        </p:attrNameLst>
+                                      </p:cBhvr>
+                                      <p:to>
+                                        <p:strVal val="visible"/>
+                                      </p:to>
+                                    </p:set>
+                                    <p:animEffect transition="in" filter="fade">
+                                      <p:cBhvr>
+                                        <p:cTn id="7" dur="500"/>
+                                        <p:tgtEl>
+                                          <p:spTgt spid="9"/>
+                                        </p:tgtEl>
+                                      </p:cBhvr>
+                                    </p:animEffect>
+                                  </p:childTnLst>
+                                </p:cTn>
+                              </p:par>
+                              <p:par>
+                                <p:cTn id="8" presetID="10" presetClass="entr" presetSubtype="0" fill="hold" nodeType="withEffect">
+                                  <p:stCondLst>
+                                    <p:cond delay="0"/>
+                                  </p:stCondLst>
+                                  <p:childTnLst>
+                                    <p:set>
+                                      <p:cBhvr>
+                                        <p:cTn id="9" dur="1" fill="hold">
+                                          <p:stCondLst>
+                                            <p:cond delay="0"/>
+                                          </p:stCondLst>
+                                        </p:cTn>
+                                        <p:tgtEl>
+                                          <p:spTgt spid="8"/>
+                                        </p:tgtEl>
+                                        <p:attrNameLst>
+                                          <p:attrName>style.visibility</p:attrName>
+                                        </p:attrNameLst>
+                                      </p:cBhvr>
+                                      <p:to>
+                                        <p:strVal val="visible"/>
+                                      </p:to>
+                                    </p:set>
+                                    <p:animEffect transition="in" filter="fade">
+                                      <p:cBhvr>
+                                        <p:cTn id="10" dur="500"/>
+                                        <p:tgtEl>
+                                          <p:spTgt spid="8"/>
+                                        </p:tgtEl>
+                                      </p:cBhvr>
+                                    </p:animEffect>
+                                  </p:childTnLst>
+                                </p:cTn>
+                              </p:par>
+                              <p:par>
+                                <p:cTn id="11" presetID="10" presetClass="entr" presetSubtype="0" fill="hold" grpId="0" nodeType="withEffect">
+                                  <p:stCondLst>
+                                    <p:cond delay="0"/>
+                                  </p:stCondLst>
+                                  <p:childTnLst>
+                                    <p:set>
+                                      <p:cBhvr>
+                                        <p:cTn id="12" dur="1" fill="hold">
+                                          <p:stCondLst>
+                                            <p:cond delay="0"/>
+                                          </p:stCondLst>
+                                        </p:cTn>
+                                        <p:tgtEl>
+                                          <p:spTgt spid="6"/>
+                                        </p:tgtEl>
+                                        <p:attrNameLst>
+                                          <p:attrName>style.visibility</p:attrName>
+                                        </p:attrNameLst>
+                                      </p:cBhvr>
+                                      <p:to>
+                                        <p:strVal val="visible"/>
+                                      </p:to>
+                                    </p:set>
+                                    <p:animEffect transition="in" filter="fade">
+                                      <p:cBhvr>
+                                        <p:cTn id="13" dur="500"/>
+                                        <p:tgtEl>
+                                          <p:spTgt spid="6"/>
+                                        </p:tgtEl>
+                                      </p:cBhvr>
+                                    </p:animEffect>
+                                  </p:childTnLst>
+                                </p:cTn>
+                              </p:par>
+                            </p:childTnLst>
+                          </p:cTn>
+                        </p:par>
+                      </p:childTnLst>
+                    </p:cTn>
+                  </p:par>
+                </p:childTnLst>
+              </p:cTn>
+              <p:prevCondLst>
+                <p:cond evt="onPrev" delay="0">
+                  <p:tgtEl>
+                    <p:sldTgt/>
+                  </p:tgtEl>
+                </p:cond>
+              </p:prevCondLst>
+              <p:nextCondLst>
+                <p:cond evt="onNext" delay="0">
+                  <p:tgtEl>
+                    <p:sldTgt/>
+                  </p:tgtEl>
+                </p:cond>
+              </p:nextCondLst>
+            </p:seq>
+          </p:childTnLst>
+        </p:cTn>
+      </p:par>
+    </p:tnLst>
+    <p:bldLst>
+      <p:bldP spid="6" grpId="0" animBg="1"/>
+      <p:bldP spid="9" grpId="0"/>
+    </p:bldLst>
+  </p:timing>
+</p:sld>
+</file>
+
+<file path=ppt/slides/slide46.xml><?xml version="1.0" encoding="utf-8"?>
+<p:sld xmlns:a="http://schemas.openxmlformats.org/drawingml/2006/main" xmlns:r="http://schemas.openxmlformats.org/officeDocument/2006/relationships" xmlns:p="http://schemas.openxmlformats.org/presentationml/2006/main">
+  <p:cSld>
+    <p:spTree>
+      <p:nvGrpSpPr>
+        <p:cNvPr id="1" name=""/>
+        <p:cNvGrpSpPr/>
+        <p:nvPr/>
+      </p:nvGrpSpPr>
+      <p:grpSpPr>
+        <a:xfrm>
+          <a:off x="0" y="0"/>
+          <a:ext cx="0" cy="0"/>
+          <a:chOff x="0" y="0"/>
+          <a:chExt cx="0" cy="0"/>
+        </a:xfrm>
+      </p:grpSpPr>
+      <p:sp>
+        <p:nvSpPr>
+          <p:cNvPr id="2" name="Title 1"/>
+          <p:cNvSpPr>
+            <a:spLocks noGrp="1"/>
+          </p:cNvSpPr>
+          <p:nvPr>
+            <p:ph type="title"/>
+          </p:nvPr>
+        </p:nvSpPr>
+        <p:spPr/>
+        <p:txBody>
+          <a:bodyPr/>
+          <a:lstStyle/>
+          <a:p>
+            <a:r>
+              <a:rPr lang="en-US" dirty="0" smtClean="0"/>
+              <a:t>Discussion</a:t>
+            </a:r>
+            <a:endParaRPr lang="en-US" dirty="0"/>
+          </a:p>
+        </p:txBody>
+      </p:sp>
+      <p:sp>
+        <p:nvSpPr>
+          <p:cNvPr id="3" name="Slide Number Placeholder 2"/>
+          <p:cNvSpPr>
+            <a:spLocks noGrp="1"/>
+          </p:cNvSpPr>
+          <p:nvPr>
+            <p:ph type="sldNum" sz="quarter" idx="12"/>
+          </p:nvPr>
+        </p:nvSpPr>
+        <p:spPr/>
+        <p:txBody>
+          <a:bodyPr/>
+          <a:lstStyle/>
+          <a:p>
+            <a:fld id="{7D5018C4-273E-49AF-93AB-259FCF9A742C}" type="slidenum">
+              <a:rPr lang="en-US" smtClean="0"/>
+              <a:t>46</a:t>
             </a:fld>
             <a:endParaRPr lang="en-US"/>
           </a:p>

</xml_diff>

<commit_message>
presentation: finish evaluation, PAST tenatively done.
</commit_message>
<xml_diff>
--- a/p2p/P2P Apps.pptx
+++ b/p2p/P2P Apps.pptx
@@ -5,7 +5,7 @@
     <p:sldMasterId id="2147483684" r:id="rId1"/>
   </p:sldMasterIdLst>
   <p:notesMasterIdLst>
-    <p:notesMasterId r:id="rId48"/>
+    <p:notesMasterId r:id="rId50"/>
   </p:notesMasterIdLst>
   <p:sldIdLst>
     <p:sldId id="256" r:id="rId2"/>
@@ -53,7 +53,9 @@
     <p:sldId id="307" r:id="rId44"/>
     <p:sldId id="308" r:id="rId45"/>
     <p:sldId id="309" r:id="rId46"/>
-    <p:sldId id="304" r:id="rId47"/>
+    <p:sldId id="310" r:id="rId47"/>
+    <p:sldId id="311" r:id="rId48"/>
+    <p:sldId id="304" r:id="rId49"/>
   </p:sldIdLst>
   <p:sldSz cx="9144000" cy="6858000" type="screen4x3"/>
   <p:notesSz cx="6858000" cy="9144000"/>
@@ -24283,7 +24285,7 @@
           <a:p>
             <a:r>
               <a:rPr lang="en-US" dirty="0" smtClean="0"/>
-              <a:t>Discussion</a:t>
+              <a:t>Evaluation (6)</a:t>
             </a:r>
             <a:endParaRPr lang="en-US" dirty="0"/>
           </a:p>
@@ -24307,6 +24309,616 @@
             <a:fld id="{7D5018C4-273E-49AF-93AB-259FCF9A742C}" type="slidenum">
               <a:rPr lang="en-US" smtClean="0"/>
               <a:t>46</a:t>
+            </a:fld>
+            <a:endParaRPr lang="en-US"/>
+          </a:p>
+        </p:txBody>
+      </p:sp>
+      <p:sp>
+        <p:nvSpPr>
+          <p:cNvPr id="4" name="Content Placeholder 3"/>
+          <p:cNvSpPr>
+            <a:spLocks noGrp="1"/>
+          </p:cNvSpPr>
+          <p:nvPr>
+            <p:ph sz="quarter" idx="1"/>
+          </p:nvPr>
+        </p:nvSpPr>
+        <p:spPr/>
+        <p:txBody>
+          <a:bodyPr/>
+          <a:lstStyle/>
+          <a:p>
+            <a:r>
+              <a:rPr lang="en-US" dirty="0" smtClean="0"/>
+              <a:t>As system utilization increases:</a:t>
+            </a:r>
+          </a:p>
+          <a:p>
+            <a:pPr lvl="1"/>
+            <a:r>
+              <a:rPr lang="en-US" dirty="0" smtClean="0"/>
+              <a:t>More failures</a:t>
+            </a:r>
+          </a:p>
+          <a:p>
+            <a:pPr lvl="1"/>
+            <a:r>
+              <a:rPr lang="en-US" dirty="0" smtClean="0"/>
+              <a:t>Smaller files fail more</a:t>
+            </a:r>
+          </a:p>
+        </p:txBody>
+      </p:sp>
+      <p:pic>
+        <p:nvPicPr>
+          <p:cNvPr id="6147" name="Picture 3"/>
+          <p:cNvPicPr>
+            <a:picLocks noChangeAspect="1" noChangeArrowheads="1"/>
+          </p:cNvPicPr>
+          <p:nvPr/>
+        </p:nvPicPr>
+        <p:blipFill>
+          <a:blip r:embed="rId2">
+            <a:extLst>
+              <a:ext uri="{28A0092B-C50C-407E-A947-70E740481C1C}">
+                <a14:useLocalDpi xmlns:a14="http://schemas.microsoft.com/office/drawing/2010/main" val="0"/>
+              </a:ext>
+            </a:extLst>
+          </a:blip>
+          <a:srcRect/>
+          <a:stretch>
+            <a:fillRect/>
+          </a:stretch>
+        </p:blipFill>
+        <p:spPr bwMode="auto">
+          <a:xfrm>
+            <a:off x="2209799" y="2895600"/>
+            <a:ext cx="4619625" cy="3543300"/>
+          </a:xfrm>
+          <a:prstGeom prst="rect">
+            <a:avLst/>
+          </a:prstGeom>
+          <a:noFill/>
+          <a:ln>
+            <a:noFill/>
+          </a:ln>
+          <a:effectLst/>
+          <a:extLst>
+            <a:ext uri="{909E8E84-426E-40DD-AFC4-6F175D3DCCD1}">
+              <a14:hiddenFill xmlns:a14="http://schemas.microsoft.com/office/drawing/2010/main">
+                <a:solidFill>
+                  <a:schemeClr val="accent1"/>
+                </a:solidFill>
+              </a14:hiddenFill>
+            </a:ext>
+            <a:ext uri="{91240B29-F687-4F45-9708-019B960494DF}">
+              <a14:hiddenLine xmlns:a14="http://schemas.microsoft.com/office/drawing/2010/main" w="9525">
+                <a:solidFill>
+                  <a:schemeClr val="tx1"/>
+                </a:solidFill>
+                <a:miter lim="800000"/>
+                <a:headEnd/>
+                <a:tailEnd/>
+              </a14:hiddenLine>
+            </a:ext>
+            <a:ext uri="{AF507438-7753-43E0-B8FC-AC1667EBCBE1}">
+              <a14:hiddenEffects xmlns:a14="http://schemas.microsoft.com/office/drawing/2010/main">
+                <a:effectLst>
+                  <a:outerShdw dist="35921" dir="2700000" algn="ctr" rotWithShape="0">
+                    <a:schemeClr val="bg2"/>
+                  </a:outerShdw>
+                </a:effectLst>
+              </a14:hiddenEffects>
+            </a:ext>
+          </a:extLst>
+        </p:spPr>
+      </p:pic>
+      <p:sp>
+        <p:nvSpPr>
+          <p:cNvPr id="6" name="Oval 5"/>
+          <p:cNvSpPr/>
+          <p:nvPr/>
+        </p:nvSpPr>
+        <p:spPr>
+          <a:xfrm>
+            <a:off x="2209799" y="4876800"/>
+            <a:ext cx="1752600" cy="685800"/>
+          </a:xfrm>
+          <a:prstGeom prst="ellipse">
+            <a:avLst/>
+          </a:prstGeom>
+          <a:noFill/>
+          <a:ln w="76200">
+            <a:solidFill>
+              <a:schemeClr val="accent1"/>
+            </a:solidFill>
+          </a:ln>
+        </p:spPr>
+        <p:style>
+          <a:lnRef idx="3">
+            <a:schemeClr val="lt1"/>
+          </a:lnRef>
+          <a:fillRef idx="1">
+            <a:schemeClr val="accent1"/>
+          </a:fillRef>
+          <a:effectRef idx="1">
+            <a:schemeClr val="accent1"/>
+          </a:effectRef>
+          <a:fontRef idx="minor">
+            <a:schemeClr val="lt1"/>
+          </a:fontRef>
+        </p:style>
+        <p:txBody>
+          <a:bodyPr rtlCol="0" anchor="ctr"/>
+          <a:lstStyle/>
+          <a:p>
+            <a:pPr algn="ctr"/>
+            <a:endParaRPr lang="en-US"/>
+          </a:p>
+        </p:txBody>
+      </p:sp>
+      <p:cxnSp>
+        <p:nvCxnSpPr>
+          <p:cNvPr id="8" name="Straight Arrow Connector 7"/>
+          <p:cNvCxnSpPr/>
+          <p:nvPr/>
+        </p:nvCxnSpPr>
+        <p:spPr>
+          <a:xfrm flipH="1" flipV="1">
+            <a:off x="1791810" y="4643761"/>
+            <a:ext cx="494190" cy="309239"/>
+          </a:xfrm>
+          <a:prstGeom prst="straightConnector1">
+            <a:avLst/>
+          </a:prstGeom>
+          <a:ln>
+            <a:tailEnd type="arrow"/>
+          </a:ln>
+        </p:spPr>
+        <p:style>
+          <a:lnRef idx="3">
+            <a:schemeClr val="accent1"/>
+          </a:lnRef>
+          <a:fillRef idx="0">
+            <a:schemeClr val="accent1"/>
+          </a:fillRef>
+          <a:effectRef idx="2">
+            <a:schemeClr val="accent1"/>
+          </a:effectRef>
+          <a:fontRef idx="minor">
+            <a:schemeClr val="tx1"/>
+          </a:fontRef>
+        </p:style>
+      </p:cxnSp>
+      <p:sp>
+        <p:nvSpPr>
+          <p:cNvPr id="9" name="TextBox 8"/>
+          <p:cNvSpPr txBox="1"/>
+          <p:nvPr/>
+        </p:nvSpPr>
+        <p:spPr>
+          <a:xfrm>
+            <a:off x="222246" y="4274429"/>
+            <a:ext cx="2010487" cy="369332"/>
+          </a:xfrm>
+          <a:prstGeom prst="rect">
+            <a:avLst/>
+          </a:prstGeom>
+          <a:noFill/>
+        </p:spPr>
+        <p:txBody>
+          <a:bodyPr wrap="none" rtlCol="0">
+            <a:spAutoFit/>
+          </a:bodyPr>
+          <a:lstStyle/>
+          <a:p>
+            <a:r>
+              <a:rPr lang="en-US" dirty="0" smtClean="0"/>
+              <a:t>What causes this?</a:t>
+            </a:r>
+            <a:endParaRPr lang="en-US" dirty="0"/>
+          </a:p>
+        </p:txBody>
+      </p:sp>
+    </p:spTree>
+    <p:extLst>
+      <p:ext uri="{BB962C8B-B14F-4D97-AF65-F5344CB8AC3E}">
+        <p14:creationId xmlns:p14="http://schemas.microsoft.com/office/powerpoint/2010/main" val="2874560121"/>
+      </p:ext>
+    </p:extLst>
+  </p:cSld>
+  <p:clrMapOvr>
+    <a:masterClrMapping/>
+  </p:clrMapOvr>
+  <p:timing>
+    <p:tnLst>
+      <p:par>
+        <p:cTn id="1" dur="indefinite" restart="never" nodeType="tmRoot">
+          <p:childTnLst>
+            <p:seq concurrent="1" nextAc="seek">
+              <p:cTn id="2" dur="indefinite" nodeType="mainSeq">
+                <p:childTnLst>
+                  <p:par>
+                    <p:cTn id="3" fill="hold">
+                      <p:stCondLst>
+                        <p:cond delay="indefinite"/>
+                      </p:stCondLst>
+                      <p:childTnLst>
+                        <p:par>
+                          <p:cTn id="4" fill="hold">
+                            <p:stCondLst>
+                              <p:cond delay="0"/>
+                            </p:stCondLst>
+                            <p:childTnLst>
+                              <p:par>
+                                <p:cTn id="5" presetID="10" presetClass="entr" presetSubtype="0" fill="hold" grpId="0" nodeType="clickEffect">
+                                  <p:stCondLst>
+                                    <p:cond delay="0"/>
+                                  </p:stCondLst>
+                                  <p:childTnLst>
+                                    <p:set>
+                                      <p:cBhvr>
+                                        <p:cTn id="6" dur="1" fill="hold">
+                                          <p:stCondLst>
+                                            <p:cond delay="0"/>
+                                          </p:stCondLst>
+                                        </p:cTn>
+                                        <p:tgtEl>
+                                          <p:spTgt spid="9"/>
+                                        </p:tgtEl>
+                                        <p:attrNameLst>
+                                          <p:attrName>style.visibility</p:attrName>
+                                        </p:attrNameLst>
+                                      </p:cBhvr>
+                                      <p:to>
+                                        <p:strVal val="visible"/>
+                                      </p:to>
+                                    </p:set>
+                                    <p:animEffect transition="in" filter="fade">
+                                      <p:cBhvr>
+                                        <p:cTn id="7" dur="500"/>
+                                        <p:tgtEl>
+                                          <p:spTgt spid="9"/>
+                                        </p:tgtEl>
+                                      </p:cBhvr>
+                                    </p:animEffect>
+                                  </p:childTnLst>
+                                </p:cTn>
+                              </p:par>
+                              <p:par>
+                                <p:cTn id="8" presetID="10" presetClass="entr" presetSubtype="0" fill="hold" nodeType="withEffect">
+                                  <p:stCondLst>
+                                    <p:cond delay="0"/>
+                                  </p:stCondLst>
+                                  <p:childTnLst>
+                                    <p:set>
+                                      <p:cBhvr>
+                                        <p:cTn id="9" dur="1" fill="hold">
+                                          <p:stCondLst>
+                                            <p:cond delay="0"/>
+                                          </p:stCondLst>
+                                        </p:cTn>
+                                        <p:tgtEl>
+                                          <p:spTgt spid="8"/>
+                                        </p:tgtEl>
+                                        <p:attrNameLst>
+                                          <p:attrName>style.visibility</p:attrName>
+                                        </p:attrNameLst>
+                                      </p:cBhvr>
+                                      <p:to>
+                                        <p:strVal val="visible"/>
+                                      </p:to>
+                                    </p:set>
+                                    <p:animEffect transition="in" filter="fade">
+                                      <p:cBhvr>
+                                        <p:cTn id="10" dur="500"/>
+                                        <p:tgtEl>
+                                          <p:spTgt spid="8"/>
+                                        </p:tgtEl>
+                                      </p:cBhvr>
+                                    </p:animEffect>
+                                  </p:childTnLst>
+                                </p:cTn>
+                              </p:par>
+                              <p:par>
+                                <p:cTn id="11" presetID="10" presetClass="entr" presetSubtype="0" fill="hold" grpId="0" nodeType="withEffect">
+                                  <p:stCondLst>
+                                    <p:cond delay="0"/>
+                                  </p:stCondLst>
+                                  <p:childTnLst>
+                                    <p:set>
+                                      <p:cBhvr>
+                                        <p:cTn id="12" dur="1" fill="hold">
+                                          <p:stCondLst>
+                                            <p:cond delay="0"/>
+                                          </p:stCondLst>
+                                        </p:cTn>
+                                        <p:tgtEl>
+                                          <p:spTgt spid="6"/>
+                                        </p:tgtEl>
+                                        <p:attrNameLst>
+                                          <p:attrName>style.visibility</p:attrName>
+                                        </p:attrNameLst>
+                                      </p:cBhvr>
+                                      <p:to>
+                                        <p:strVal val="visible"/>
+                                      </p:to>
+                                    </p:set>
+                                    <p:animEffect transition="in" filter="fade">
+                                      <p:cBhvr>
+                                        <p:cTn id="13" dur="500"/>
+                                        <p:tgtEl>
+                                          <p:spTgt spid="6"/>
+                                        </p:tgtEl>
+                                      </p:cBhvr>
+                                    </p:animEffect>
+                                  </p:childTnLst>
+                                </p:cTn>
+                              </p:par>
+                            </p:childTnLst>
+                          </p:cTn>
+                        </p:par>
+                      </p:childTnLst>
+                    </p:cTn>
+                  </p:par>
+                </p:childTnLst>
+              </p:cTn>
+              <p:prevCondLst>
+                <p:cond evt="onPrev" delay="0">
+                  <p:tgtEl>
+                    <p:sldTgt/>
+                  </p:tgtEl>
+                </p:cond>
+              </p:prevCondLst>
+              <p:nextCondLst>
+                <p:cond evt="onNext" delay="0">
+                  <p:tgtEl>
+                    <p:sldTgt/>
+                  </p:tgtEl>
+                </p:cond>
+              </p:nextCondLst>
+            </p:seq>
+          </p:childTnLst>
+        </p:cTn>
+      </p:par>
+    </p:tnLst>
+    <p:bldLst>
+      <p:bldP spid="6" grpId="0" animBg="1"/>
+      <p:bldP spid="9" grpId="0"/>
+    </p:bldLst>
+  </p:timing>
+</p:sld>
+</file>
+
+<file path=ppt/slides/slide47.xml><?xml version="1.0" encoding="utf-8"?>
+<p:sld xmlns:a="http://schemas.openxmlformats.org/drawingml/2006/main" xmlns:r="http://schemas.openxmlformats.org/officeDocument/2006/relationships" xmlns:p="http://schemas.openxmlformats.org/presentationml/2006/main">
+  <p:cSld>
+    <p:spTree>
+      <p:nvGrpSpPr>
+        <p:cNvPr id="1" name=""/>
+        <p:cNvGrpSpPr/>
+        <p:nvPr/>
+      </p:nvGrpSpPr>
+      <p:grpSpPr>
+        <a:xfrm>
+          <a:off x="0" y="0"/>
+          <a:ext cx="0" cy="0"/>
+          <a:chOff x="0" y="0"/>
+          <a:chExt cx="0" cy="0"/>
+        </a:xfrm>
+      </p:grpSpPr>
+      <p:sp>
+        <p:nvSpPr>
+          <p:cNvPr id="2" name="Title 1"/>
+          <p:cNvSpPr>
+            <a:spLocks noGrp="1"/>
+          </p:cNvSpPr>
+          <p:nvPr>
+            <p:ph type="title"/>
+          </p:nvPr>
+        </p:nvSpPr>
+        <p:spPr/>
+        <p:txBody>
+          <a:bodyPr/>
+          <a:lstStyle/>
+          <a:p>
+            <a:r>
+              <a:rPr lang="en-US" dirty="0" smtClean="0"/>
+              <a:t>Evaluation (7)</a:t>
+            </a:r>
+            <a:endParaRPr lang="en-US" dirty="0"/>
+          </a:p>
+        </p:txBody>
+      </p:sp>
+      <p:sp>
+        <p:nvSpPr>
+          <p:cNvPr id="3" name="Slide Number Placeholder 2"/>
+          <p:cNvSpPr>
+            <a:spLocks noGrp="1"/>
+          </p:cNvSpPr>
+          <p:nvPr>
+            <p:ph type="sldNum" sz="quarter" idx="12"/>
+          </p:nvPr>
+        </p:nvSpPr>
+        <p:spPr/>
+        <p:txBody>
+          <a:bodyPr/>
+          <a:lstStyle/>
+          <a:p>
+            <a:fld id="{7D5018C4-273E-49AF-93AB-259FCF9A742C}" type="slidenum">
+              <a:rPr lang="en-US" smtClean="0"/>
+              <a:t>47</a:t>
+            </a:fld>
+            <a:endParaRPr lang="en-US"/>
+          </a:p>
+        </p:txBody>
+      </p:sp>
+      <p:sp>
+        <p:nvSpPr>
+          <p:cNvPr id="4" name="Content Placeholder 3"/>
+          <p:cNvSpPr>
+            <a:spLocks noGrp="1"/>
+          </p:cNvSpPr>
+          <p:nvPr>
+            <p:ph sz="quarter" idx="1"/>
+          </p:nvPr>
+        </p:nvSpPr>
+        <p:spPr/>
+        <p:txBody>
+          <a:bodyPr/>
+          <a:lstStyle/>
+          <a:p>
+            <a:r>
+              <a:rPr lang="en-US" dirty="0" smtClean="0"/>
+              <a:t>Caching</a:t>
+            </a:r>
+            <a:endParaRPr lang="en-US" dirty="0"/>
+          </a:p>
+        </p:txBody>
+      </p:sp>
+      <p:pic>
+        <p:nvPicPr>
+          <p:cNvPr id="7170" name="Picture 2"/>
+          <p:cNvPicPr>
+            <a:picLocks noChangeAspect="1" noChangeArrowheads="1"/>
+          </p:cNvPicPr>
+          <p:nvPr/>
+        </p:nvPicPr>
+        <p:blipFill>
+          <a:blip r:embed="rId2">
+            <a:extLst>
+              <a:ext uri="{28A0092B-C50C-407E-A947-70E740481C1C}">
+                <a14:useLocalDpi xmlns:a14="http://schemas.microsoft.com/office/drawing/2010/main" val="0"/>
+              </a:ext>
+            </a:extLst>
+          </a:blip>
+          <a:srcRect/>
+          <a:stretch>
+            <a:fillRect/>
+          </a:stretch>
+        </p:blipFill>
+        <p:spPr bwMode="auto">
+          <a:xfrm>
+            <a:off x="2235764" y="2286000"/>
+            <a:ext cx="4657725" cy="3952875"/>
+          </a:xfrm>
+          <a:prstGeom prst="rect">
+            <a:avLst/>
+          </a:prstGeom>
+          <a:noFill/>
+          <a:ln>
+            <a:noFill/>
+          </a:ln>
+          <a:effectLst/>
+          <a:extLst>
+            <a:ext uri="{909E8E84-426E-40DD-AFC4-6F175D3DCCD1}">
+              <a14:hiddenFill xmlns:a14="http://schemas.microsoft.com/office/drawing/2010/main">
+                <a:solidFill>
+                  <a:schemeClr val="accent1"/>
+                </a:solidFill>
+              </a14:hiddenFill>
+            </a:ext>
+            <a:ext uri="{91240B29-F687-4F45-9708-019B960494DF}">
+              <a14:hiddenLine xmlns:a14="http://schemas.microsoft.com/office/drawing/2010/main" w="9525">
+                <a:solidFill>
+                  <a:schemeClr val="tx1"/>
+                </a:solidFill>
+                <a:miter lim="800000"/>
+                <a:headEnd/>
+                <a:tailEnd/>
+              </a14:hiddenLine>
+            </a:ext>
+            <a:ext uri="{AF507438-7753-43E0-B8FC-AC1667EBCBE1}">
+              <a14:hiddenEffects xmlns:a14="http://schemas.microsoft.com/office/drawing/2010/main">
+                <a:effectLst>
+                  <a:outerShdw dist="35921" dir="2700000" algn="ctr" rotWithShape="0">
+                    <a:schemeClr val="bg2"/>
+                  </a:outerShdw>
+                </a:effectLst>
+              </a14:hiddenEffects>
+            </a:ext>
+          </a:extLst>
+        </p:spPr>
+      </p:pic>
+    </p:spTree>
+    <p:extLst>
+      <p:ext uri="{BB962C8B-B14F-4D97-AF65-F5344CB8AC3E}">
+        <p14:creationId xmlns:p14="http://schemas.microsoft.com/office/powerpoint/2010/main" val="3749739261"/>
+      </p:ext>
+    </p:extLst>
+  </p:cSld>
+  <p:clrMapOvr>
+    <a:masterClrMapping/>
+  </p:clrMapOvr>
+  <p:timing>
+    <p:tnLst>
+      <p:par>
+        <p:cTn id="1" dur="indefinite" restart="never" nodeType="tmRoot"/>
+      </p:par>
+    </p:tnLst>
+  </p:timing>
+</p:sld>
+</file>
+
+<file path=ppt/slides/slide48.xml><?xml version="1.0" encoding="utf-8"?>
+<p:sld xmlns:a="http://schemas.openxmlformats.org/drawingml/2006/main" xmlns:r="http://schemas.openxmlformats.org/officeDocument/2006/relationships" xmlns:p="http://schemas.openxmlformats.org/presentationml/2006/main">
+  <p:cSld>
+    <p:spTree>
+      <p:nvGrpSpPr>
+        <p:cNvPr id="1" name=""/>
+        <p:cNvGrpSpPr/>
+        <p:nvPr/>
+      </p:nvGrpSpPr>
+      <p:grpSpPr>
+        <a:xfrm>
+          <a:off x="0" y="0"/>
+          <a:ext cx="0" cy="0"/>
+          <a:chOff x="0" y="0"/>
+          <a:chExt cx="0" cy="0"/>
+        </a:xfrm>
+      </p:grpSpPr>
+      <p:sp>
+        <p:nvSpPr>
+          <p:cNvPr id="2" name="Title 1"/>
+          <p:cNvSpPr>
+            <a:spLocks noGrp="1"/>
+          </p:cNvSpPr>
+          <p:nvPr>
+            <p:ph type="title"/>
+          </p:nvPr>
+        </p:nvSpPr>
+        <p:spPr/>
+        <p:txBody>
+          <a:bodyPr/>
+          <a:lstStyle/>
+          <a:p>
+            <a:r>
+              <a:rPr lang="en-US" dirty="0" smtClean="0"/>
+              <a:t>Discussion</a:t>
+            </a:r>
+            <a:endParaRPr lang="en-US" dirty="0"/>
+          </a:p>
+        </p:txBody>
+      </p:sp>
+      <p:sp>
+        <p:nvSpPr>
+          <p:cNvPr id="3" name="Slide Number Placeholder 2"/>
+          <p:cNvSpPr>
+            <a:spLocks noGrp="1"/>
+          </p:cNvSpPr>
+          <p:nvPr>
+            <p:ph type="sldNum" sz="quarter" idx="12"/>
+          </p:nvPr>
+        </p:nvSpPr>
+        <p:spPr/>
+        <p:txBody>
+          <a:bodyPr/>
+          <a:lstStyle/>
+          <a:p>
+            <a:fld id="{7D5018C4-273E-49AF-93AB-259FCF9A742C}" type="slidenum">
+              <a:rPr lang="en-US" smtClean="0"/>
+              <a:t>48</a:t>
             </a:fld>
             <a:endParaRPr lang="en-US"/>
           </a:p>

</xml_diff>

<commit_message>
presentation: drop worthless evaluation slide.
</commit_message>
<xml_diff>
--- a/p2p/P2P Apps.pptx
+++ b/p2p/P2P Apps.pptx
@@ -5,7 +5,7 @@
     <p:sldMasterId id="2147483684" r:id="rId1"/>
   </p:sldMasterIdLst>
   <p:notesMasterIdLst>
-    <p:notesMasterId r:id="rId50"/>
+    <p:notesMasterId r:id="rId49"/>
   </p:notesMasterIdLst>
   <p:sldIdLst>
     <p:sldId id="256" r:id="rId2"/>
@@ -48,14 +48,13 @@
     <p:sldId id="301" r:id="rId39"/>
     <p:sldId id="302" r:id="rId40"/>
     <p:sldId id="303" r:id="rId41"/>
-    <p:sldId id="305" r:id="rId42"/>
-    <p:sldId id="306" r:id="rId43"/>
-    <p:sldId id="307" r:id="rId44"/>
-    <p:sldId id="308" r:id="rId45"/>
-    <p:sldId id="309" r:id="rId46"/>
-    <p:sldId id="310" r:id="rId47"/>
-    <p:sldId id="311" r:id="rId48"/>
-    <p:sldId id="304" r:id="rId49"/>
+    <p:sldId id="306" r:id="rId42"/>
+    <p:sldId id="307" r:id="rId43"/>
+    <p:sldId id="308" r:id="rId44"/>
+    <p:sldId id="309" r:id="rId45"/>
+    <p:sldId id="310" r:id="rId46"/>
+    <p:sldId id="311" r:id="rId47"/>
+    <p:sldId id="304" r:id="rId48"/>
   </p:sldIdLst>
   <p:sldSz cx="9144000" cy="6858000" type="screen4x3"/>
   <p:notesSz cx="6858000" cy="9144000"/>
@@ -572,7 +571,7 @@
           <a:p>
             <a:fld id="{20F4DCCB-8299-4676-8AAC-8F701426849A}" type="slidenum">
               <a:rPr lang="en-US" smtClean="0"/>
-              <a:t>42</a:t>
+              <a:t>41</a:t>
             </a:fld>
             <a:endParaRPr lang="en-US"/>
           </a:p>
@@ -22868,219 +22867,6 @@
           </a:p>
         </p:txBody>
       </p:sp>
-      <p:pic>
-        <p:nvPicPr>
-          <p:cNvPr id="1027" name="Picture 3"/>
-          <p:cNvPicPr>
-            <a:picLocks noChangeAspect="1" noChangeArrowheads="1"/>
-          </p:cNvPicPr>
-          <p:nvPr/>
-        </p:nvPicPr>
-        <p:blipFill>
-          <a:blip r:embed="rId2">
-            <a:extLst>
-              <a:ext uri="{28A0092B-C50C-407E-A947-70E740481C1C}">
-                <a14:useLocalDpi xmlns:a14="http://schemas.microsoft.com/office/drawing/2010/main" val="0"/>
-              </a:ext>
-            </a:extLst>
-          </a:blip>
-          <a:srcRect/>
-          <a:stretch>
-            <a:fillRect/>
-          </a:stretch>
-        </p:blipFill>
-        <p:spPr bwMode="auto">
-          <a:xfrm>
-            <a:off x="228600" y="1447800"/>
-            <a:ext cx="4619625" cy="2286000"/>
-          </a:xfrm>
-          <a:prstGeom prst="rect">
-            <a:avLst/>
-          </a:prstGeom>
-          <a:noFill/>
-          <a:ln>
-            <a:noFill/>
-          </a:ln>
-          <a:effectLst/>
-          <a:extLst>
-            <a:ext uri="{909E8E84-426E-40DD-AFC4-6F175D3DCCD1}">
-              <a14:hiddenFill xmlns:a14="http://schemas.microsoft.com/office/drawing/2010/main">
-                <a:solidFill>
-                  <a:schemeClr val="accent1"/>
-                </a:solidFill>
-              </a14:hiddenFill>
-            </a:ext>
-            <a:ext uri="{91240B29-F687-4F45-9708-019B960494DF}">
-              <a14:hiddenLine xmlns:a14="http://schemas.microsoft.com/office/drawing/2010/main" w="9525">
-                <a:solidFill>
-                  <a:schemeClr val="tx1"/>
-                </a:solidFill>
-                <a:miter lim="800000"/>
-                <a:headEnd/>
-                <a:tailEnd/>
-              </a14:hiddenLine>
-            </a:ext>
-            <a:ext uri="{AF507438-7753-43E0-B8FC-AC1667EBCBE1}">
-              <a14:hiddenEffects xmlns:a14="http://schemas.microsoft.com/office/drawing/2010/main">
-                <a:effectLst>
-                  <a:outerShdw dist="35921" dir="2700000" algn="ctr" rotWithShape="0">
-                    <a:schemeClr val="bg2"/>
-                  </a:outerShdw>
-                </a:effectLst>
-              </a14:hiddenEffects>
-            </a:ext>
-          </a:extLst>
-        </p:spPr>
-      </p:pic>
-      <p:pic>
-        <p:nvPicPr>
-          <p:cNvPr id="1028" name="Picture 4"/>
-          <p:cNvPicPr>
-            <a:picLocks noGrp="1" noChangeAspect="1" noChangeArrowheads="1"/>
-          </p:cNvPicPr>
-          <p:nvPr>
-            <p:ph sz="quarter" idx="1"/>
-          </p:nvPr>
-        </p:nvPicPr>
-        <p:blipFill>
-          <a:blip r:embed="rId3">
-            <a:extLst>
-              <a:ext uri="{28A0092B-C50C-407E-A947-70E740481C1C}">
-                <a14:useLocalDpi xmlns:a14="http://schemas.microsoft.com/office/drawing/2010/main" val="0"/>
-              </a:ext>
-            </a:extLst>
-          </a:blip>
-          <a:srcRect/>
-          <a:stretch>
-            <a:fillRect/>
-          </a:stretch>
-        </p:blipFill>
-        <p:spPr bwMode="auto">
-          <a:xfrm>
-            <a:off x="4267200" y="3429000"/>
-            <a:ext cx="4533900" cy="3162300"/>
-          </a:xfrm>
-          <a:prstGeom prst="rect">
-            <a:avLst/>
-          </a:prstGeom>
-          <a:noFill/>
-          <a:ln>
-            <a:noFill/>
-          </a:ln>
-          <a:effectLst/>
-          <a:extLst>
-            <a:ext uri="{909E8E84-426E-40DD-AFC4-6F175D3DCCD1}">
-              <a14:hiddenFill xmlns:a14="http://schemas.microsoft.com/office/drawing/2010/main">
-                <a:solidFill>
-                  <a:schemeClr val="accent1"/>
-                </a:solidFill>
-              </a14:hiddenFill>
-            </a:ext>
-            <a:ext uri="{91240B29-F687-4F45-9708-019B960494DF}">
-              <a14:hiddenLine xmlns:a14="http://schemas.microsoft.com/office/drawing/2010/main" w="9525">
-                <a:solidFill>
-                  <a:schemeClr val="tx1"/>
-                </a:solidFill>
-                <a:miter lim="800000"/>
-                <a:headEnd/>
-                <a:tailEnd/>
-              </a14:hiddenLine>
-            </a:ext>
-            <a:ext uri="{AF507438-7753-43E0-B8FC-AC1667EBCBE1}">
-              <a14:hiddenEffects xmlns:a14="http://schemas.microsoft.com/office/drawing/2010/main">
-                <a:effectLst>
-                  <a:outerShdw dist="35921" dir="2700000" algn="ctr" rotWithShape="0">
-                    <a:schemeClr val="bg2"/>
-                  </a:outerShdw>
-                </a:effectLst>
-              </a14:hiddenEffects>
-            </a:ext>
-          </a:extLst>
-        </p:spPr>
-      </p:pic>
-    </p:spTree>
-    <p:extLst>
-      <p:ext uri="{BB962C8B-B14F-4D97-AF65-F5344CB8AC3E}">
-        <p14:creationId xmlns:p14="http://schemas.microsoft.com/office/powerpoint/2010/main" val="2471613814"/>
-      </p:ext>
-    </p:extLst>
-  </p:cSld>
-  <p:clrMapOvr>
-    <a:masterClrMapping/>
-  </p:clrMapOvr>
-  <p:timing>
-    <p:tnLst>
-      <p:par>
-        <p:cTn id="1" dur="indefinite" restart="never" nodeType="tmRoot"/>
-      </p:par>
-    </p:tnLst>
-  </p:timing>
-</p:sld>
-</file>
-
-<file path=ppt/slides/slide42.xml><?xml version="1.0" encoding="utf-8"?>
-<p:sld xmlns:a="http://schemas.openxmlformats.org/drawingml/2006/main" xmlns:r="http://schemas.openxmlformats.org/officeDocument/2006/relationships" xmlns:p="http://schemas.openxmlformats.org/presentationml/2006/main">
-  <p:cSld>
-    <p:spTree>
-      <p:nvGrpSpPr>
-        <p:cNvPr id="1" name=""/>
-        <p:cNvGrpSpPr/>
-        <p:nvPr/>
-      </p:nvGrpSpPr>
-      <p:grpSpPr>
-        <a:xfrm>
-          <a:off x="0" y="0"/>
-          <a:ext cx="0" cy="0"/>
-          <a:chOff x="0" y="0"/>
-          <a:chExt cx="0" cy="0"/>
-        </a:xfrm>
-      </p:grpSpPr>
-      <p:sp>
-        <p:nvSpPr>
-          <p:cNvPr id="2" name="Title 1"/>
-          <p:cNvSpPr>
-            <a:spLocks noGrp="1"/>
-          </p:cNvSpPr>
-          <p:nvPr>
-            <p:ph type="title"/>
-          </p:nvPr>
-        </p:nvSpPr>
-        <p:spPr/>
-        <p:txBody>
-          <a:bodyPr/>
-          <a:lstStyle/>
-          <a:p>
-            <a:r>
-              <a:rPr lang="en-US" dirty="0" smtClean="0"/>
-              <a:t>Evaluation (2)</a:t>
-            </a:r>
-            <a:endParaRPr lang="en-US" dirty="0"/>
-          </a:p>
-        </p:txBody>
-      </p:sp>
-      <p:sp>
-        <p:nvSpPr>
-          <p:cNvPr id="3" name="Slide Number Placeholder 2"/>
-          <p:cNvSpPr>
-            <a:spLocks noGrp="1"/>
-          </p:cNvSpPr>
-          <p:nvPr>
-            <p:ph type="sldNum" sz="quarter" idx="12"/>
-          </p:nvPr>
-        </p:nvSpPr>
-        <p:spPr/>
-        <p:txBody>
-          <a:bodyPr/>
-          <a:lstStyle/>
-          <a:p>
-            <a:fld id="{7D5018C4-273E-49AF-93AB-259FCF9A742C}" type="slidenum">
-              <a:rPr lang="en-US" smtClean="0"/>
-              <a:t>42</a:t>
-            </a:fld>
-            <a:endParaRPr lang="en-US"/>
-          </a:p>
-        </p:txBody>
-      </p:sp>
       <p:sp>
         <p:nvSpPr>
           <p:cNvPr id="5" name="Text Placeholder 4"/>
@@ -23306,7 +23092,7 @@
 </p:sld>
 </file>
 
-<file path=ppt/slides/slide43.xml><?xml version="1.0" encoding="utf-8"?>
+<file path=ppt/slides/slide42.xml><?xml version="1.0" encoding="utf-8"?>
 <p:sld xmlns:a="http://schemas.openxmlformats.org/drawingml/2006/main" xmlns:r="http://schemas.openxmlformats.org/officeDocument/2006/relationships" xmlns:p="http://schemas.openxmlformats.org/presentationml/2006/main">
   <p:cSld>
     <p:spTree>
@@ -23340,7 +23126,7 @@
           <a:p>
             <a:r>
               <a:rPr lang="en-US" dirty="0" smtClean="0"/>
-              <a:t>Evaluation (3)</a:t>
+              <a:t>Evaluation (2)</a:t>
             </a:r>
             <a:endParaRPr lang="en-US" dirty="0"/>
           </a:p>
@@ -23363,7 +23149,7 @@
           <a:p>
             <a:fld id="{7D5018C4-273E-49AF-93AB-259FCF9A742C}" type="slidenum">
               <a:rPr lang="en-US" smtClean="0"/>
-              <a:t>43</a:t>
+              <a:t>42</a:t>
             </a:fld>
             <a:endParaRPr lang="en-US"/>
           </a:p>
@@ -23580,7 +23366,7 @@
 </p:sld>
 </file>
 
-<file path=ppt/slides/slide44.xml><?xml version="1.0" encoding="utf-8"?>
+<file path=ppt/slides/slide43.xml><?xml version="1.0" encoding="utf-8"?>
 <p:sld xmlns:a="http://schemas.openxmlformats.org/drawingml/2006/main" xmlns:r="http://schemas.openxmlformats.org/officeDocument/2006/relationships" xmlns:p="http://schemas.openxmlformats.org/presentationml/2006/main">
   <p:cSld>
     <p:spTree>
@@ -23614,7 +23400,7 @@
           <a:p>
             <a:r>
               <a:rPr lang="en-US" dirty="0" smtClean="0"/>
-              <a:t>Evaluation (4)</a:t>
+              <a:t>Evaluation (3)</a:t>
             </a:r>
             <a:endParaRPr lang="en-US" dirty="0"/>
           </a:p>
@@ -23637,7 +23423,7 @@
           <a:p>
             <a:fld id="{7D5018C4-273E-49AF-93AB-259FCF9A742C}" type="slidenum">
               <a:rPr lang="en-US" smtClean="0"/>
-              <a:t>44</a:t>
+              <a:t>43</a:t>
             </a:fld>
             <a:endParaRPr lang="en-US"/>
           </a:p>
@@ -23810,7 +23596,7 @@
 </p:sld>
 </file>
 
-<file path=ppt/slides/slide45.xml><?xml version="1.0" encoding="utf-8"?>
+<file path=ppt/slides/slide44.xml><?xml version="1.0" encoding="utf-8"?>
 <p:sld xmlns:a="http://schemas.openxmlformats.org/drawingml/2006/main" xmlns:r="http://schemas.openxmlformats.org/officeDocument/2006/relationships" xmlns:p="http://schemas.openxmlformats.org/presentationml/2006/main">
   <p:cSld>
     <p:spTree>
@@ -23844,7 +23630,7 @@
           <a:p>
             <a:r>
               <a:rPr lang="en-US" dirty="0" smtClean="0"/>
-              <a:t>Evaluation (5)</a:t>
+              <a:t>Evaluation (4)</a:t>
             </a:r>
             <a:endParaRPr lang="en-US" dirty="0"/>
           </a:p>
@@ -23867,7 +23653,7 @@
           <a:p>
             <a:fld id="{7D5018C4-273E-49AF-93AB-259FCF9A742C}" type="slidenum">
               <a:rPr lang="en-US" smtClean="0"/>
-              <a:t>45</a:t>
+              <a:t>44</a:t>
             </a:fld>
             <a:endParaRPr lang="en-US"/>
           </a:p>
@@ -24085,6 +23871,446 @@
     <p:extLst>
       <p:ext uri="{BB962C8B-B14F-4D97-AF65-F5344CB8AC3E}">
         <p14:creationId xmlns:p14="http://schemas.microsoft.com/office/powerpoint/2010/main" val="4195572335"/>
+      </p:ext>
+    </p:extLst>
+  </p:cSld>
+  <p:clrMapOvr>
+    <a:masterClrMapping/>
+  </p:clrMapOvr>
+  <p:timing>
+    <p:tnLst>
+      <p:par>
+        <p:cTn id="1" dur="indefinite" restart="never" nodeType="tmRoot">
+          <p:childTnLst>
+            <p:seq concurrent="1" nextAc="seek">
+              <p:cTn id="2" dur="indefinite" nodeType="mainSeq">
+                <p:childTnLst>
+                  <p:par>
+                    <p:cTn id="3" fill="hold">
+                      <p:stCondLst>
+                        <p:cond delay="indefinite"/>
+                      </p:stCondLst>
+                      <p:childTnLst>
+                        <p:par>
+                          <p:cTn id="4" fill="hold">
+                            <p:stCondLst>
+                              <p:cond delay="0"/>
+                            </p:stCondLst>
+                            <p:childTnLst>
+                              <p:par>
+                                <p:cTn id="5" presetID="10" presetClass="entr" presetSubtype="0" fill="hold" grpId="0" nodeType="clickEffect">
+                                  <p:stCondLst>
+                                    <p:cond delay="0"/>
+                                  </p:stCondLst>
+                                  <p:childTnLst>
+                                    <p:set>
+                                      <p:cBhvr>
+                                        <p:cTn id="6" dur="1" fill="hold">
+                                          <p:stCondLst>
+                                            <p:cond delay="0"/>
+                                          </p:stCondLst>
+                                        </p:cTn>
+                                        <p:tgtEl>
+                                          <p:spTgt spid="9"/>
+                                        </p:tgtEl>
+                                        <p:attrNameLst>
+                                          <p:attrName>style.visibility</p:attrName>
+                                        </p:attrNameLst>
+                                      </p:cBhvr>
+                                      <p:to>
+                                        <p:strVal val="visible"/>
+                                      </p:to>
+                                    </p:set>
+                                    <p:animEffect transition="in" filter="fade">
+                                      <p:cBhvr>
+                                        <p:cTn id="7" dur="500"/>
+                                        <p:tgtEl>
+                                          <p:spTgt spid="9"/>
+                                        </p:tgtEl>
+                                      </p:cBhvr>
+                                    </p:animEffect>
+                                  </p:childTnLst>
+                                </p:cTn>
+                              </p:par>
+                              <p:par>
+                                <p:cTn id="8" presetID="10" presetClass="entr" presetSubtype="0" fill="hold" nodeType="withEffect">
+                                  <p:stCondLst>
+                                    <p:cond delay="0"/>
+                                  </p:stCondLst>
+                                  <p:childTnLst>
+                                    <p:set>
+                                      <p:cBhvr>
+                                        <p:cTn id="9" dur="1" fill="hold">
+                                          <p:stCondLst>
+                                            <p:cond delay="0"/>
+                                          </p:stCondLst>
+                                        </p:cTn>
+                                        <p:tgtEl>
+                                          <p:spTgt spid="8"/>
+                                        </p:tgtEl>
+                                        <p:attrNameLst>
+                                          <p:attrName>style.visibility</p:attrName>
+                                        </p:attrNameLst>
+                                      </p:cBhvr>
+                                      <p:to>
+                                        <p:strVal val="visible"/>
+                                      </p:to>
+                                    </p:set>
+                                    <p:animEffect transition="in" filter="fade">
+                                      <p:cBhvr>
+                                        <p:cTn id="10" dur="500"/>
+                                        <p:tgtEl>
+                                          <p:spTgt spid="8"/>
+                                        </p:tgtEl>
+                                      </p:cBhvr>
+                                    </p:animEffect>
+                                  </p:childTnLst>
+                                </p:cTn>
+                              </p:par>
+                              <p:par>
+                                <p:cTn id="11" presetID="10" presetClass="entr" presetSubtype="0" fill="hold" grpId="0" nodeType="withEffect">
+                                  <p:stCondLst>
+                                    <p:cond delay="0"/>
+                                  </p:stCondLst>
+                                  <p:childTnLst>
+                                    <p:set>
+                                      <p:cBhvr>
+                                        <p:cTn id="12" dur="1" fill="hold">
+                                          <p:stCondLst>
+                                            <p:cond delay="0"/>
+                                          </p:stCondLst>
+                                        </p:cTn>
+                                        <p:tgtEl>
+                                          <p:spTgt spid="6"/>
+                                        </p:tgtEl>
+                                        <p:attrNameLst>
+                                          <p:attrName>style.visibility</p:attrName>
+                                        </p:attrNameLst>
+                                      </p:cBhvr>
+                                      <p:to>
+                                        <p:strVal val="visible"/>
+                                      </p:to>
+                                    </p:set>
+                                    <p:animEffect transition="in" filter="fade">
+                                      <p:cBhvr>
+                                        <p:cTn id="13" dur="500"/>
+                                        <p:tgtEl>
+                                          <p:spTgt spid="6"/>
+                                        </p:tgtEl>
+                                      </p:cBhvr>
+                                    </p:animEffect>
+                                  </p:childTnLst>
+                                </p:cTn>
+                              </p:par>
+                            </p:childTnLst>
+                          </p:cTn>
+                        </p:par>
+                      </p:childTnLst>
+                    </p:cTn>
+                  </p:par>
+                </p:childTnLst>
+              </p:cTn>
+              <p:prevCondLst>
+                <p:cond evt="onPrev" delay="0">
+                  <p:tgtEl>
+                    <p:sldTgt/>
+                  </p:tgtEl>
+                </p:cond>
+              </p:prevCondLst>
+              <p:nextCondLst>
+                <p:cond evt="onNext" delay="0">
+                  <p:tgtEl>
+                    <p:sldTgt/>
+                  </p:tgtEl>
+                </p:cond>
+              </p:nextCondLst>
+            </p:seq>
+          </p:childTnLst>
+        </p:cTn>
+      </p:par>
+    </p:tnLst>
+    <p:bldLst>
+      <p:bldP spid="6" grpId="0" animBg="1"/>
+      <p:bldP spid="9" grpId="0"/>
+    </p:bldLst>
+  </p:timing>
+</p:sld>
+</file>
+
+<file path=ppt/slides/slide45.xml><?xml version="1.0" encoding="utf-8"?>
+<p:sld xmlns:a="http://schemas.openxmlformats.org/drawingml/2006/main" xmlns:r="http://schemas.openxmlformats.org/officeDocument/2006/relationships" xmlns:p="http://schemas.openxmlformats.org/presentationml/2006/main">
+  <p:cSld>
+    <p:spTree>
+      <p:nvGrpSpPr>
+        <p:cNvPr id="1" name=""/>
+        <p:cNvGrpSpPr/>
+        <p:nvPr/>
+      </p:nvGrpSpPr>
+      <p:grpSpPr>
+        <a:xfrm>
+          <a:off x="0" y="0"/>
+          <a:ext cx="0" cy="0"/>
+          <a:chOff x="0" y="0"/>
+          <a:chExt cx="0" cy="0"/>
+        </a:xfrm>
+      </p:grpSpPr>
+      <p:sp>
+        <p:nvSpPr>
+          <p:cNvPr id="2" name="Title 1"/>
+          <p:cNvSpPr>
+            <a:spLocks noGrp="1"/>
+          </p:cNvSpPr>
+          <p:nvPr>
+            <p:ph type="title"/>
+          </p:nvPr>
+        </p:nvSpPr>
+        <p:spPr/>
+        <p:txBody>
+          <a:bodyPr/>
+          <a:lstStyle/>
+          <a:p>
+            <a:r>
+              <a:rPr lang="en-US" dirty="0" smtClean="0"/>
+              <a:t>Evaluation (5)</a:t>
+            </a:r>
+            <a:endParaRPr lang="en-US" dirty="0"/>
+          </a:p>
+        </p:txBody>
+      </p:sp>
+      <p:sp>
+        <p:nvSpPr>
+          <p:cNvPr id="3" name="Slide Number Placeholder 2"/>
+          <p:cNvSpPr>
+            <a:spLocks noGrp="1"/>
+          </p:cNvSpPr>
+          <p:nvPr>
+            <p:ph type="sldNum" sz="quarter" idx="12"/>
+          </p:nvPr>
+        </p:nvSpPr>
+        <p:spPr/>
+        <p:txBody>
+          <a:bodyPr/>
+          <a:lstStyle/>
+          <a:p>
+            <a:fld id="{7D5018C4-273E-49AF-93AB-259FCF9A742C}" type="slidenum">
+              <a:rPr lang="en-US" smtClean="0"/>
+              <a:t>45</a:t>
+            </a:fld>
+            <a:endParaRPr lang="en-US"/>
+          </a:p>
+        </p:txBody>
+      </p:sp>
+      <p:sp>
+        <p:nvSpPr>
+          <p:cNvPr id="4" name="Content Placeholder 3"/>
+          <p:cNvSpPr>
+            <a:spLocks noGrp="1"/>
+          </p:cNvSpPr>
+          <p:nvPr>
+            <p:ph sz="quarter" idx="1"/>
+          </p:nvPr>
+        </p:nvSpPr>
+        <p:spPr/>
+        <p:txBody>
+          <a:bodyPr/>
+          <a:lstStyle/>
+          <a:p>
+            <a:r>
+              <a:rPr lang="en-US" dirty="0" smtClean="0"/>
+              <a:t>As system utilization increases:</a:t>
+            </a:r>
+          </a:p>
+          <a:p>
+            <a:pPr lvl="1"/>
+            <a:r>
+              <a:rPr lang="en-US" dirty="0" smtClean="0"/>
+              <a:t>More failures</a:t>
+            </a:r>
+          </a:p>
+          <a:p>
+            <a:pPr lvl="1"/>
+            <a:r>
+              <a:rPr lang="en-US" dirty="0" smtClean="0"/>
+              <a:t>Smaller files fail more</a:t>
+            </a:r>
+          </a:p>
+        </p:txBody>
+      </p:sp>
+      <p:pic>
+        <p:nvPicPr>
+          <p:cNvPr id="6147" name="Picture 3"/>
+          <p:cNvPicPr>
+            <a:picLocks noChangeAspect="1" noChangeArrowheads="1"/>
+          </p:cNvPicPr>
+          <p:nvPr/>
+        </p:nvPicPr>
+        <p:blipFill>
+          <a:blip r:embed="rId2">
+            <a:extLst>
+              <a:ext uri="{28A0092B-C50C-407E-A947-70E740481C1C}">
+                <a14:useLocalDpi xmlns:a14="http://schemas.microsoft.com/office/drawing/2010/main" val="0"/>
+              </a:ext>
+            </a:extLst>
+          </a:blip>
+          <a:srcRect/>
+          <a:stretch>
+            <a:fillRect/>
+          </a:stretch>
+        </p:blipFill>
+        <p:spPr bwMode="auto">
+          <a:xfrm>
+            <a:off x="2209799" y="2895600"/>
+            <a:ext cx="4619625" cy="3543300"/>
+          </a:xfrm>
+          <a:prstGeom prst="rect">
+            <a:avLst/>
+          </a:prstGeom>
+          <a:noFill/>
+          <a:ln>
+            <a:noFill/>
+          </a:ln>
+          <a:effectLst/>
+          <a:extLst>
+            <a:ext uri="{909E8E84-426E-40DD-AFC4-6F175D3DCCD1}">
+              <a14:hiddenFill xmlns:a14="http://schemas.microsoft.com/office/drawing/2010/main">
+                <a:solidFill>
+                  <a:schemeClr val="accent1"/>
+                </a:solidFill>
+              </a14:hiddenFill>
+            </a:ext>
+            <a:ext uri="{91240B29-F687-4F45-9708-019B960494DF}">
+              <a14:hiddenLine xmlns:a14="http://schemas.microsoft.com/office/drawing/2010/main" w="9525">
+                <a:solidFill>
+                  <a:schemeClr val="tx1"/>
+                </a:solidFill>
+                <a:miter lim="800000"/>
+                <a:headEnd/>
+                <a:tailEnd/>
+              </a14:hiddenLine>
+            </a:ext>
+            <a:ext uri="{AF507438-7753-43E0-B8FC-AC1667EBCBE1}">
+              <a14:hiddenEffects xmlns:a14="http://schemas.microsoft.com/office/drawing/2010/main">
+                <a:effectLst>
+                  <a:outerShdw dist="35921" dir="2700000" algn="ctr" rotWithShape="0">
+                    <a:schemeClr val="bg2"/>
+                  </a:outerShdw>
+                </a:effectLst>
+              </a14:hiddenEffects>
+            </a:ext>
+          </a:extLst>
+        </p:spPr>
+      </p:pic>
+      <p:sp>
+        <p:nvSpPr>
+          <p:cNvPr id="6" name="Oval 5"/>
+          <p:cNvSpPr/>
+          <p:nvPr/>
+        </p:nvSpPr>
+        <p:spPr>
+          <a:xfrm>
+            <a:off x="2209799" y="4876800"/>
+            <a:ext cx="1752600" cy="685800"/>
+          </a:xfrm>
+          <a:prstGeom prst="ellipse">
+            <a:avLst/>
+          </a:prstGeom>
+          <a:noFill/>
+          <a:ln w="76200">
+            <a:solidFill>
+              <a:schemeClr val="accent1"/>
+            </a:solidFill>
+          </a:ln>
+        </p:spPr>
+        <p:style>
+          <a:lnRef idx="3">
+            <a:schemeClr val="lt1"/>
+          </a:lnRef>
+          <a:fillRef idx="1">
+            <a:schemeClr val="accent1"/>
+          </a:fillRef>
+          <a:effectRef idx="1">
+            <a:schemeClr val="accent1"/>
+          </a:effectRef>
+          <a:fontRef idx="minor">
+            <a:schemeClr val="lt1"/>
+          </a:fontRef>
+        </p:style>
+        <p:txBody>
+          <a:bodyPr rtlCol="0" anchor="ctr"/>
+          <a:lstStyle/>
+          <a:p>
+            <a:pPr algn="ctr"/>
+            <a:endParaRPr lang="en-US"/>
+          </a:p>
+        </p:txBody>
+      </p:sp>
+      <p:cxnSp>
+        <p:nvCxnSpPr>
+          <p:cNvPr id="8" name="Straight Arrow Connector 7"/>
+          <p:cNvCxnSpPr/>
+          <p:nvPr/>
+        </p:nvCxnSpPr>
+        <p:spPr>
+          <a:xfrm flipH="1" flipV="1">
+            <a:off x="1791810" y="4643761"/>
+            <a:ext cx="494190" cy="309239"/>
+          </a:xfrm>
+          <a:prstGeom prst="straightConnector1">
+            <a:avLst/>
+          </a:prstGeom>
+          <a:ln>
+            <a:tailEnd type="arrow"/>
+          </a:ln>
+        </p:spPr>
+        <p:style>
+          <a:lnRef idx="3">
+            <a:schemeClr val="accent1"/>
+          </a:lnRef>
+          <a:fillRef idx="0">
+            <a:schemeClr val="accent1"/>
+          </a:fillRef>
+          <a:effectRef idx="2">
+            <a:schemeClr val="accent1"/>
+          </a:effectRef>
+          <a:fontRef idx="minor">
+            <a:schemeClr val="tx1"/>
+          </a:fontRef>
+        </p:style>
+      </p:cxnSp>
+      <p:sp>
+        <p:nvSpPr>
+          <p:cNvPr id="9" name="TextBox 8"/>
+          <p:cNvSpPr txBox="1"/>
+          <p:nvPr/>
+        </p:nvSpPr>
+        <p:spPr>
+          <a:xfrm>
+            <a:off x="222246" y="4274429"/>
+            <a:ext cx="2010487" cy="369332"/>
+          </a:xfrm>
+          <a:prstGeom prst="rect">
+            <a:avLst/>
+          </a:prstGeom>
+          <a:noFill/>
+        </p:spPr>
+        <p:txBody>
+          <a:bodyPr wrap="none" rtlCol="0">
+            <a:spAutoFit/>
+          </a:bodyPr>
+          <a:lstStyle/>
+          <a:p>
+            <a:r>
+              <a:rPr lang="en-US" dirty="0" smtClean="0"/>
+              <a:t>What causes this?</a:t>
+            </a:r>
+            <a:endParaRPr lang="en-US" dirty="0"/>
+          </a:p>
+        </p:txBody>
+      </p:sp>
+    </p:spTree>
+    <p:extLst>
+      <p:ext uri="{BB962C8B-B14F-4D97-AF65-F5344CB8AC3E}">
+        <p14:creationId xmlns:p14="http://schemas.microsoft.com/office/powerpoint/2010/main" val="2874560121"/>
       </p:ext>
     </p:extLst>
   </p:cSld>
@@ -24331,446 +24557,6 @@
           <a:p>
             <a:r>
               <a:rPr lang="en-US" dirty="0" smtClean="0"/>
-              <a:t>As system utilization increases:</a:t>
-            </a:r>
-          </a:p>
-          <a:p>
-            <a:pPr lvl="1"/>
-            <a:r>
-              <a:rPr lang="en-US" dirty="0" smtClean="0"/>
-              <a:t>More failures</a:t>
-            </a:r>
-          </a:p>
-          <a:p>
-            <a:pPr lvl="1"/>
-            <a:r>
-              <a:rPr lang="en-US" dirty="0" smtClean="0"/>
-              <a:t>Smaller files fail more</a:t>
-            </a:r>
-          </a:p>
-        </p:txBody>
-      </p:sp>
-      <p:pic>
-        <p:nvPicPr>
-          <p:cNvPr id="6147" name="Picture 3"/>
-          <p:cNvPicPr>
-            <a:picLocks noChangeAspect="1" noChangeArrowheads="1"/>
-          </p:cNvPicPr>
-          <p:nvPr/>
-        </p:nvPicPr>
-        <p:blipFill>
-          <a:blip r:embed="rId2">
-            <a:extLst>
-              <a:ext uri="{28A0092B-C50C-407E-A947-70E740481C1C}">
-                <a14:useLocalDpi xmlns:a14="http://schemas.microsoft.com/office/drawing/2010/main" val="0"/>
-              </a:ext>
-            </a:extLst>
-          </a:blip>
-          <a:srcRect/>
-          <a:stretch>
-            <a:fillRect/>
-          </a:stretch>
-        </p:blipFill>
-        <p:spPr bwMode="auto">
-          <a:xfrm>
-            <a:off x="2209799" y="2895600"/>
-            <a:ext cx="4619625" cy="3543300"/>
-          </a:xfrm>
-          <a:prstGeom prst="rect">
-            <a:avLst/>
-          </a:prstGeom>
-          <a:noFill/>
-          <a:ln>
-            <a:noFill/>
-          </a:ln>
-          <a:effectLst/>
-          <a:extLst>
-            <a:ext uri="{909E8E84-426E-40DD-AFC4-6F175D3DCCD1}">
-              <a14:hiddenFill xmlns:a14="http://schemas.microsoft.com/office/drawing/2010/main">
-                <a:solidFill>
-                  <a:schemeClr val="accent1"/>
-                </a:solidFill>
-              </a14:hiddenFill>
-            </a:ext>
-            <a:ext uri="{91240B29-F687-4F45-9708-019B960494DF}">
-              <a14:hiddenLine xmlns:a14="http://schemas.microsoft.com/office/drawing/2010/main" w="9525">
-                <a:solidFill>
-                  <a:schemeClr val="tx1"/>
-                </a:solidFill>
-                <a:miter lim="800000"/>
-                <a:headEnd/>
-                <a:tailEnd/>
-              </a14:hiddenLine>
-            </a:ext>
-            <a:ext uri="{AF507438-7753-43E0-B8FC-AC1667EBCBE1}">
-              <a14:hiddenEffects xmlns:a14="http://schemas.microsoft.com/office/drawing/2010/main">
-                <a:effectLst>
-                  <a:outerShdw dist="35921" dir="2700000" algn="ctr" rotWithShape="0">
-                    <a:schemeClr val="bg2"/>
-                  </a:outerShdw>
-                </a:effectLst>
-              </a14:hiddenEffects>
-            </a:ext>
-          </a:extLst>
-        </p:spPr>
-      </p:pic>
-      <p:sp>
-        <p:nvSpPr>
-          <p:cNvPr id="6" name="Oval 5"/>
-          <p:cNvSpPr/>
-          <p:nvPr/>
-        </p:nvSpPr>
-        <p:spPr>
-          <a:xfrm>
-            <a:off x="2209799" y="4876800"/>
-            <a:ext cx="1752600" cy="685800"/>
-          </a:xfrm>
-          <a:prstGeom prst="ellipse">
-            <a:avLst/>
-          </a:prstGeom>
-          <a:noFill/>
-          <a:ln w="76200">
-            <a:solidFill>
-              <a:schemeClr val="accent1"/>
-            </a:solidFill>
-          </a:ln>
-        </p:spPr>
-        <p:style>
-          <a:lnRef idx="3">
-            <a:schemeClr val="lt1"/>
-          </a:lnRef>
-          <a:fillRef idx="1">
-            <a:schemeClr val="accent1"/>
-          </a:fillRef>
-          <a:effectRef idx="1">
-            <a:schemeClr val="accent1"/>
-          </a:effectRef>
-          <a:fontRef idx="minor">
-            <a:schemeClr val="lt1"/>
-          </a:fontRef>
-        </p:style>
-        <p:txBody>
-          <a:bodyPr rtlCol="0" anchor="ctr"/>
-          <a:lstStyle/>
-          <a:p>
-            <a:pPr algn="ctr"/>
-            <a:endParaRPr lang="en-US"/>
-          </a:p>
-        </p:txBody>
-      </p:sp>
-      <p:cxnSp>
-        <p:nvCxnSpPr>
-          <p:cNvPr id="8" name="Straight Arrow Connector 7"/>
-          <p:cNvCxnSpPr/>
-          <p:nvPr/>
-        </p:nvCxnSpPr>
-        <p:spPr>
-          <a:xfrm flipH="1" flipV="1">
-            <a:off x="1791810" y="4643761"/>
-            <a:ext cx="494190" cy="309239"/>
-          </a:xfrm>
-          <a:prstGeom prst="straightConnector1">
-            <a:avLst/>
-          </a:prstGeom>
-          <a:ln>
-            <a:tailEnd type="arrow"/>
-          </a:ln>
-        </p:spPr>
-        <p:style>
-          <a:lnRef idx="3">
-            <a:schemeClr val="accent1"/>
-          </a:lnRef>
-          <a:fillRef idx="0">
-            <a:schemeClr val="accent1"/>
-          </a:fillRef>
-          <a:effectRef idx="2">
-            <a:schemeClr val="accent1"/>
-          </a:effectRef>
-          <a:fontRef idx="minor">
-            <a:schemeClr val="tx1"/>
-          </a:fontRef>
-        </p:style>
-      </p:cxnSp>
-      <p:sp>
-        <p:nvSpPr>
-          <p:cNvPr id="9" name="TextBox 8"/>
-          <p:cNvSpPr txBox="1"/>
-          <p:nvPr/>
-        </p:nvSpPr>
-        <p:spPr>
-          <a:xfrm>
-            <a:off x="222246" y="4274429"/>
-            <a:ext cx="2010487" cy="369332"/>
-          </a:xfrm>
-          <a:prstGeom prst="rect">
-            <a:avLst/>
-          </a:prstGeom>
-          <a:noFill/>
-        </p:spPr>
-        <p:txBody>
-          <a:bodyPr wrap="none" rtlCol="0">
-            <a:spAutoFit/>
-          </a:bodyPr>
-          <a:lstStyle/>
-          <a:p>
-            <a:r>
-              <a:rPr lang="en-US" dirty="0" smtClean="0"/>
-              <a:t>What causes this?</a:t>
-            </a:r>
-            <a:endParaRPr lang="en-US" dirty="0"/>
-          </a:p>
-        </p:txBody>
-      </p:sp>
-    </p:spTree>
-    <p:extLst>
-      <p:ext uri="{BB962C8B-B14F-4D97-AF65-F5344CB8AC3E}">
-        <p14:creationId xmlns:p14="http://schemas.microsoft.com/office/powerpoint/2010/main" val="2874560121"/>
-      </p:ext>
-    </p:extLst>
-  </p:cSld>
-  <p:clrMapOvr>
-    <a:masterClrMapping/>
-  </p:clrMapOvr>
-  <p:timing>
-    <p:tnLst>
-      <p:par>
-        <p:cTn id="1" dur="indefinite" restart="never" nodeType="tmRoot">
-          <p:childTnLst>
-            <p:seq concurrent="1" nextAc="seek">
-              <p:cTn id="2" dur="indefinite" nodeType="mainSeq">
-                <p:childTnLst>
-                  <p:par>
-                    <p:cTn id="3" fill="hold">
-                      <p:stCondLst>
-                        <p:cond delay="indefinite"/>
-                      </p:stCondLst>
-                      <p:childTnLst>
-                        <p:par>
-                          <p:cTn id="4" fill="hold">
-                            <p:stCondLst>
-                              <p:cond delay="0"/>
-                            </p:stCondLst>
-                            <p:childTnLst>
-                              <p:par>
-                                <p:cTn id="5" presetID="10" presetClass="entr" presetSubtype="0" fill="hold" grpId="0" nodeType="clickEffect">
-                                  <p:stCondLst>
-                                    <p:cond delay="0"/>
-                                  </p:stCondLst>
-                                  <p:childTnLst>
-                                    <p:set>
-                                      <p:cBhvr>
-                                        <p:cTn id="6" dur="1" fill="hold">
-                                          <p:stCondLst>
-                                            <p:cond delay="0"/>
-                                          </p:stCondLst>
-                                        </p:cTn>
-                                        <p:tgtEl>
-                                          <p:spTgt spid="9"/>
-                                        </p:tgtEl>
-                                        <p:attrNameLst>
-                                          <p:attrName>style.visibility</p:attrName>
-                                        </p:attrNameLst>
-                                      </p:cBhvr>
-                                      <p:to>
-                                        <p:strVal val="visible"/>
-                                      </p:to>
-                                    </p:set>
-                                    <p:animEffect transition="in" filter="fade">
-                                      <p:cBhvr>
-                                        <p:cTn id="7" dur="500"/>
-                                        <p:tgtEl>
-                                          <p:spTgt spid="9"/>
-                                        </p:tgtEl>
-                                      </p:cBhvr>
-                                    </p:animEffect>
-                                  </p:childTnLst>
-                                </p:cTn>
-                              </p:par>
-                              <p:par>
-                                <p:cTn id="8" presetID="10" presetClass="entr" presetSubtype="0" fill="hold" nodeType="withEffect">
-                                  <p:stCondLst>
-                                    <p:cond delay="0"/>
-                                  </p:stCondLst>
-                                  <p:childTnLst>
-                                    <p:set>
-                                      <p:cBhvr>
-                                        <p:cTn id="9" dur="1" fill="hold">
-                                          <p:stCondLst>
-                                            <p:cond delay="0"/>
-                                          </p:stCondLst>
-                                        </p:cTn>
-                                        <p:tgtEl>
-                                          <p:spTgt spid="8"/>
-                                        </p:tgtEl>
-                                        <p:attrNameLst>
-                                          <p:attrName>style.visibility</p:attrName>
-                                        </p:attrNameLst>
-                                      </p:cBhvr>
-                                      <p:to>
-                                        <p:strVal val="visible"/>
-                                      </p:to>
-                                    </p:set>
-                                    <p:animEffect transition="in" filter="fade">
-                                      <p:cBhvr>
-                                        <p:cTn id="10" dur="500"/>
-                                        <p:tgtEl>
-                                          <p:spTgt spid="8"/>
-                                        </p:tgtEl>
-                                      </p:cBhvr>
-                                    </p:animEffect>
-                                  </p:childTnLst>
-                                </p:cTn>
-                              </p:par>
-                              <p:par>
-                                <p:cTn id="11" presetID="10" presetClass="entr" presetSubtype="0" fill="hold" grpId="0" nodeType="withEffect">
-                                  <p:stCondLst>
-                                    <p:cond delay="0"/>
-                                  </p:stCondLst>
-                                  <p:childTnLst>
-                                    <p:set>
-                                      <p:cBhvr>
-                                        <p:cTn id="12" dur="1" fill="hold">
-                                          <p:stCondLst>
-                                            <p:cond delay="0"/>
-                                          </p:stCondLst>
-                                        </p:cTn>
-                                        <p:tgtEl>
-                                          <p:spTgt spid="6"/>
-                                        </p:tgtEl>
-                                        <p:attrNameLst>
-                                          <p:attrName>style.visibility</p:attrName>
-                                        </p:attrNameLst>
-                                      </p:cBhvr>
-                                      <p:to>
-                                        <p:strVal val="visible"/>
-                                      </p:to>
-                                    </p:set>
-                                    <p:animEffect transition="in" filter="fade">
-                                      <p:cBhvr>
-                                        <p:cTn id="13" dur="500"/>
-                                        <p:tgtEl>
-                                          <p:spTgt spid="6"/>
-                                        </p:tgtEl>
-                                      </p:cBhvr>
-                                    </p:animEffect>
-                                  </p:childTnLst>
-                                </p:cTn>
-                              </p:par>
-                            </p:childTnLst>
-                          </p:cTn>
-                        </p:par>
-                      </p:childTnLst>
-                    </p:cTn>
-                  </p:par>
-                </p:childTnLst>
-              </p:cTn>
-              <p:prevCondLst>
-                <p:cond evt="onPrev" delay="0">
-                  <p:tgtEl>
-                    <p:sldTgt/>
-                  </p:tgtEl>
-                </p:cond>
-              </p:prevCondLst>
-              <p:nextCondLst>
-                <p:cond evt="onNext" delay="0">
-                  <p:tgtEl>
-                    <p:sldTgt/>
-                  </p:tgtEl>
-                </p:cond>
-              </p:nextCondLst>
-            </p:seq>
-          </p:childTnLst>
-        </p:cTn>
-      </p:par>
-    </p:tnLst>
-    <p:bldLst>
-      <p:bldP spid="6" grpId="0" animBg="1"/>
-      <p:bldP spid="9" grpId="0"/>
-    </p:bldLst>
-  </p:timing>
-</p:sld>
-</file>
-
-<file path=ppt/slides/slide47.xml><?xml version="1.0" encoding="utf-8"?>
-<p:sld xmlns:a="http://schemas.openxmlformats.org/drawingml/2006/main" xmlns:r="http://schemas.openxmlformats.org/officeDocument/2006/relationships" xmlns:p="http://schemas.openxmlformats.org/presentationml/2006/main">
-  <p:cSld>
-    <p:spTree>
-      <p:nvGrpSpPr>
-        <p:cNvPr id="1" name=""/>
-        <p:cNvGrpSpPr/>
-        <p:nvPr/>
-      </p:nvGrpSpPr>
-      <p:grpSpPr>
-        <a:xfrm>
-          <a:off x="0" y="0"/>
-          <a:ext cx="0" cy="0"/>
-          <a:chOff x="0" y="0"/>
-          <a:chExt cx="0" cy="0"/>
-        </a:xfrm>
-      </p:grpSpPr>
-      <p:sp>
-        <p:nvSpPr>
-          <p:cNvPr id="2" name="Title 1"/>
-          <p:cNvSpPr>
-            <a:spLocks noGrp="1"/>
-          </p:cNvSpPr>
-          <p:nvPr>
-            <p:ph type="title"/>
-          </p:nvPr>
-        </p:nvSpPr>
-        <p:spPr/>
-        <p:txBody>
-          <a:bodyPr/>
-          <a:lstStyle/>
-          <a:p>
-            <a:r>
-              <a:rPr lang="en-US" dirty="0" smtClean="0"/>
-              <a:t>Evaluation (7)</a:t>
-            </a:r>
-            <a:endParaRPr lang="en-US" dirty="0"/>
-          </a:p>
-        </p:txBody>
-      </p:sp>
-      <p:sp>
-        <p:nvSpPr>
-          <p:cNvPr id="3" name="Slide Number Placeholder 2"/>
-          <p:cNvSpPr>
-            <a:spLocks noGrp="1"/>
-          </p:cNvSpPr>
-          <p:nvPr>
-            <p:ph type="sldNum" sz="quarter" idx="12"/>
-          </p:nvPr>
-        </p:nvSpPr>
-        <p:spPr/>
-        <p:txBody>
-          <a:bodyPr/>
-          <a:lstStyle/>
-          <a:p>
-            <a:fld id="{7D5018C4-273E-49AF-93AB-259FCF9A742C}" type="slidenum">
-              <a:rPr lang="en-US" smtClean="0"/>
-              <a:t>47</a:t>
-            </a:fld>
-            <a:endParaRPr lang="en-US"/>
-          </a:p>
-        </p:txBody>
-      </p:sp>
-      <p:sp>
-        <p:nvSpPr>
-          <p:cNvPr id="4" name="Content Placeholder 3"/>
-          <p:cNvSpPr>
-            <a:spLocks noGrp="1"/>
-          </p:cNvSpPr>
-          <p:nvPr>
-            <p:ph sz="quarter" idx="1"/>
-          </p:nvPr>
-        </p:nvSpPr>
-        <p:spPr/>
-        <p:txBody>
-          <a:bodyPr/>
-          <a:lstStyle/>
-          <a:p>
-            <a:r>
-              <a:rPr lang="en-US" dirty="0" smtClean="0"/>
               <a:t>Caching</a:t>
             </a:r>
             <a:endParaRPr lang="en-US" dirty="0"/>
@@ -24861,7 +24647,7 @@
 </p:sld>
 </file>
 
-<file path=ppt/slides/slide48.xml><?xml version="1.0" encoding="utf-8"?>
+<file path=ppt/slides/slide47.xml><?xml version="1.0" encoding="utf-8"?>
 <p:sld xmlns:a="http://schemas.openxmlformats.org/drawingml/2006/main" xmlns:r="http://schemas.openxmlformats.org/officeDocument/2006/relationships" xmlns:p="http://schemas.openxmlformats.org/presentationml/2006/main">
   <p:cSld>
     <p:spTree>
@@ -24918,7 +24704,7 @@
           <a:p>
             <a:fld id="{7D5018C4-273E-49AF-93AB-259FCF9A742C}" type="slidenum">
               <a:rPr lang="en-US" smtClean="0"/>
-              <a:t>48</a:t>
+              <a:t>47</a:t>
             </a:fld>
             <a:endParaRPr lang="en-US"/>
           </a:p>

</xml_diff>

<commit_message>
presentation: main slide on usenetdht
</commit_message>
<xml_diff>
--- a/p2p/P2P Apps.pptx
+++ b/p2p/P2P Apps.pptx
@@ -5,7 +5,7 @@
     <p:sldMasterId id="2147483684" r:id="rId1"/>
   </p:sldMasterIdLst>
   <p:notesMasterIdLst>
-    <p:notesMasterId r:id="rId51"/>
+    <p:notesMasterId r:id="rId52"/>
   </p:notesMasterIdLst>
   <p:sldIdLst>
     <p:sldId id="256" r:id="rId2"/>
@@ -57,6 +57,7 @@
     <p:sldId id="304" r:id="rId48"/>
     <p:sldId id="312" r:id="rId49"/>
     <p:sldId id="313" r:id="rId50"/>
+    <p:sldId id="314" r:id="rId51"/>
   </p:sldIdLst>
   <p:sldSz cx="9144000" cy="6858000" type="screen4x3"/>
   <p:notesSz cx="6858000" cy="9144000"/>
@@ -25115,9 +25116,6 @@
               <a:t>Articles shared via flood-fill</a:t>
             </a:r>
           </a:p>
-          <a:p>
-            <a:endParaRPr lang="en-US" dirty="0"/>
-          </a:p>
         </p:txBody>
       </p:sp>
       <p:pic>
@@ -25418,6 +25416,187 @@
     <p:extLst>
       <p:ext uri="{BB962C8B-B14F-4D97-AF65-F5344CB8AC3E}">
         <p14:creationId xmlns:p14="http://schemas.microsoft.com/office/powerpoint/2010/main" val="577457370"/>
+      </p:ext>
+    </p:extLst>
+  </p:cSld>
+  <p:clrMapOvr>
+    <a:masterClrMapping/>
+  </p:clrMapOvr>
+  <p:timing>
+    <p:tnLst>
+      <p:par>
+        <p:cTn id="1" dur="indefinite" restart="never" nodeType="tmRoot"/>
+      </p:par>
+    </p:tnLst>
+  </p:timing>
+</p:sld>
+</file>
+
+<file path=ppt/slides/slide50.xml><?xml version="1.0" encoding="utf-8"?>
+<p:sld xmlns:a="http://schemas.openxmlformats.org/drawingml/2006/main" xmlns:r="http://schemas.openxmlformats.org/officeDocument/2006/relationships" xmlns:p="http://schemas.openxmlformats.org/presentationml/2006/main">
+  <p:cSld>
+    <p:spTree>
+      <p:nvGrpSpPr>
+        <p:cNvPr id="1" name=""/>
+        <p:cNvGrpSpPr/>
+        <p:nvPr/>
+      </p:nvGrpSpPr>
+      <p:grpSpPr>
+        <a:xfrm>
+          <a:off x="0" y="0"/>
+          <a:ext cx="0" cy="0"/>
+          <a:chOff x="0" y="0"/>
+          <a:chExt cx="0" cy="0"/>
+        </a:xfrm>
+      </p:grpSpPr>
+      <p:sp>
+        <p:nvSpPr>
+          <p:cNvPr id="2" name="Title 1"/>
+          <p:cNvSpPr>
+            <a:spLocks noGrp="1"/>
+          </p:cNvSpPr>
+          <p:nvPr>
+            <p:ph type="title"/>
+          </p:nvPr>
+        </p:nvSpPr>
+        <p:spPr/>
+        <p:txBody>
+          <a:bodyPr/>
+          <a:lstStyle/>
+          <a:p>
+            <a:r>
+              <a:rPr lang="en-US" dirty="0" err="1" smtClean="0"/>
+              <a:t>UsenetDHT</a:t>
+            </a:r>
+            <a:endParaRPr lang="en-US" dirty="0"/>
+          </a:p>
+        </p:txBody>
+      </p:sp>
+      <p:sp>
+        <p:nvSpPr>
+          <p:cNvPr id="3" name="Slide Number Placeholder 2"/>
+          <p:cNvSpPr>
+            <a:spLocks noGrp="1"/>
+          </p:cNvSpPr>
+          <p:nvPr>
+            <p:ph type="sldNum" sz="quarter" idx="12"/>
+          </p:nvPr>
+        </p:nvSpPr>
+        <p:spPr/>
+        <p:txBody>
+          <a:bodyPr/>
+          <a:lstStyle/>
+          <a:p>
+            <a:fld id="{7D5018C4-273E-49AF-93AB-259FCF9A742C}" type="slidenum">
+              <a:rPr lang="en-US" smtClean="0"/>
+              <a:t>50</a:t>
+            </a:fld>
+            <a:endParaRPr lang="en-US"/>
+          </a:p>
+        </p:txBody>
+      </p:sp>
+      <p:sp>
+        <p:nvSpPr>
+          <p:cNvPr id="4" name="Content Placeholder 3"/>
+          <p:cNvSpPr>
+            <a:spLocks noGrp="1"/>
+          </p:cNvSpPr>
+          <p:nvPr>
+            <p:ph sz="quarter" idx="1"/>
+          </p:nvPr>
+        </p:nvSpPr>
+        <p:spPr/>
+        <p:txBody>
+          <a:bodyPr/>
+          <a:lstStyle/>
+          <a:p>
+            <a:r>
+              <a:rPr lang="en-US" dirty="0" smtClean="0"/>
+              <a:t>Problem:</a:t>
+            </a:r>
+          </a:p>
+          <a:p>
+            <a:pPr lvl="1"/>
+            <a:r>
+              <a:rPr lang="en-US" dirty="0" smtClean="0"/>
+              <a:t>Each server stores copies of</a:t>
+            </a:r>
+            <a:r>
+              <a:rPr lang="en-US" baseline="0" dirty="0" smtClean="0"/>
+              <a:t> all articles (that it wants)</a:t>
+            </a:r>
+          </a:p>
+          <a:p>
+            <a:pPr lvl="1"/>
+            <a:r>
+              <a:rPr lang="en-US" baseline="0" dirty="0" smtClean="0"/>
+              <a:t>O(n) copies of each article!</a:t>
+            </a:r>
+          </a:p>
+          <a:p>
+            <a:pPr lvl="0"/>
+            <a:r>
+              <a:rPr lang="en-US" dirty="0" smtClean="0"/>
+              <a:t>Idea:</a:t>
+            </a:r>
+          </a:p>
+          <a:p>
+            <a:pPr lvl="1"/>
+            <a:r>
+              <a:rPr lang="en-US" dirty="0" smtClean="0"/>
+              <a:t>Store articles in common store</a:t>
+            </a:r>
+          </a:p>
+          <a:p>
+            <a:pPr lvl="1"/>
+            <a:r>
+              <a:rPr lang="en-US" dirty="0" smtClean="0"/>
+              <a:t>O(n) reduction of space used</a:t>
+            </a:r>
+          </a:p>
+          <a:p>
+            <a:pPr lvl="0"/>
+            <a:r>
+              <a:rPr lang="en-US" dirty="0" err="1" smtClean="0"/>
+              <a:t>UsenetDHT</a:t>
+            </a:r>
+            <a:r>
+              <a:rPr lang="en-US" dirty="0" smtClean="0"/>
+              <a:t>:</a:t>
+            </a:r>
+          </a:p>
+          <a:p>
+            <a:pPr lvl="1"/>
+            <a:r>
+              <a:rPr lang="en-US" dirty="0" smtClean="0"/>
+              <a:t>Peer-to-peer applications</a:t>
+            </a:r>
+          </a:p>
+          <a:p>
+            <a:pPr lvl="1"/>
+            <a:r>
+              <a:rPr lang="en-US" dirty="0" smtClean="0"/>
+              <a:t>Each node acts as Usenet</a:t>
+            </a:r>
+            <a:r>
+              <a:rPr lang="en-US" baseline="0" dirty="0" smtClean="0"/>
+              <a:t> frontend, and DHT node</a:t>
+            </a:r>
+          </a:p>
+          <a:p>
+            <a:pPr lvl="1"/>
+            <a:r>
+              <a:rPr lang="en-US" baseline="0" dirty="0" smtClean="0"/>
+              <a:t>Headers flood-filled as normal, articles stored in DHT</a:t>
+            </a:r>
+            <a:endParaRPr lang="en-US" dirty="0"/>
+          </a:p>
+        </p:txBody>
+      </p:sp>
+    </p:spTree>
+    <p:extLst>
+      <p:ext uri="{BB962C8B-B14F-4D97-AF65-F5344CB8AC3E}">
+        <p14:creationId xmlns:p14="http://schemas.microsoft.com/office/powerpoint/2010/main" val="1217706295"/>
       </p:ext>
     </p:extLst>
   </p:cSld>

</xml_diff>

<commit_message>
presentation: usenetdht discussion points.
</commit_message>
<xml_diff>
--- a/p2p/P2P Apps.pptx
+++ b/p2p/P2P Apps.pptx
@@ -5,7 +5,7 @@
     <p:sldMasterId id="2147483684" r:id="rId1"/>
   </p:sldMasterIdLst>
   <p:notesMasterIdLst>
-    <p:notesMasterId r:id="rId52"/>
+    <p:notesMasterId r:id="rId53"/>
   </p:notesMasterIdLst>
   <p:sldIdLst>
     <p:sldId id="256" r:id="rId2"/>
@@ -58,6 +58,7 @@
     <p:sldId id="312" r:id="rId49"/>
     <p:sldId id="313" r:id="rId50"/>
     <p:sldId id="314" r:id="rId51"/>
+    <p:sldId id="315" r:id="rId52"/>
   </p:sldIdLst>
   <p:sldSz cx="9144000" cy="6858000" type="screen4x3"/>
   <p:notesSz cx="6858000" cy="9144000"/>
@@ -25589,7 +25590,6 @@
               <a:rPr lang="en-US" baseline="0" dirty="0" smtClean="0"/>
               <a:t>Headers flood-filled as normal, articles stored in DHT</a:t>
             </a:r>
-            <a:endParaRPr lang="en-US" dirty="0"/>
           </a:p>
         </p:txBody>
       </p:sp>
@@ -25597,6 +25597,182 @@
     <p:extLst>
       <p:ext uri="{BB962C8B-B14F-4D97-AF65-F5344CB8AC3E}">
         <p14:creationId xmlns:p14="http://schemas.microsoft.com/office/powerpoint/2010/main" val="1217706295"/>
+      </p:ext>
+    </p:extLst>
+  </p:cSld>
+  <p:clrMapOvr>
+    <a:masterClrMapping/>
+  </p:clrMapOvr>
+  <p:timing>
+    <p:tnLst>
+      <p:par>
+        <p:cTn id="1" dur="indefinite" restart="never" nodeType="tmRoot"/>
+      </p:par>
+    </p:tnLst>
+  </p:timing>
+</p:sld>
+</file>
+
+<file path=ppt/slides/slide51.xml><?xml version="1.0" encoding="utf-8"?>
+<p:sld xmlns:a="http://schemas.openxmlformats.org/drawingml/2006/main" xmlns:r="http://schemas.openxmlformats.org/officeDocument/2006/relationships" xmlns:p="http://schemas.openxmlformats.org/presentationml/2006/main">
+  <p:cSld>
+    <p:spTree>
+      <p:nvGrpSpPr>
+        <p:cNvPr id="1" name=""/>
+        <p:cNvGrpSpPr/>
+        <p:nvPr/>
+      </p:nvGrpSpPr>
+      <p:grpSpPr>
+        <a:xfrm>
+          <a:off x="0" y="0"/>
+          <a:ext cx="0" cy="0"/>
+          <a:chOff x="0" y="0"/>
+          <a:chExt cx="0" cy="0"/>
+        </a:xfrm>
+      </p:grpSpPr>
+      <p:sp>
+        <p:nvSpPr>
+          <p:cNvPr id="2" name="Title 1"/>
+          <p:cNvSpPr>
+            <a:spLocks noGrp="1"/>
+          </p:cNvSpPr>
+          <p:nvPr>
+            <p:ph type="title"/>
+          </p:nvPr>
+        </p:nvSpPr>
+        <p:spPr/>
+        <p:txBody>
+          <a:bodyPr/>
+          <a:lstStyle/>
+          <a:p>
+            <a:r>
+              <a:rPr lang="en-US" dirty="0" smtClean="0"/>
+              <a:t>Discussion</a:t>
+            </a:r>
+            <a:endParaRPr lang="en-US" dirty="0"/>
+          </a:p>
+        </p:txBody>
+      </p:sp>
+      <p:sp>
+        <p:nvSpPr>
+          <p:cNvPr id="3" name="Slide Number Placeholder 2"/>
+          <p:cNvSpPr>
+            <a:spLocks noGrp="1"/>
+          </p:cNvSpPr>
+          <p:nvPr>
+            <p:ph type="sldNum" sz="quarter" idx="12"/>
+          </p:nvPr>
+        </p:nvSpPr>
+        <p:spPr/>
+        <p:txBody>
+          <a:bodyPr/>
+          <a:lstStyle/>
+          <a:p>
+            <a:fld id="{7D5018C4-273E-49AF-93AB-259FCF9A742C}" type="slidenum">
+              <a:rPr lang="en-US" smtClean="0"/>
+              <a:t>51</a:t>
+            </a:fld>
+            <a:endParaRPr lang="en-US"/>
+          </a:p>
+        </p:txBody>
+      </p:sp>
+      <p:sp>
+        <p:nvSpPr>
+          <p:cNvPr id="4" name="Content Placeholder 3"/>
+          <p:cNvSpPr>
+            <a:spLocks noGrp="1"/>
+          </p:cNvSpPr>
+          <p:nvPr>
+            <p:ph sz="quarter" idx="1"/>
+          </p:nvPr>
+        </p:nvSpPr>
+        <p:spPr/>
+        <p:txBody>
+          <a:bodyPr/>
+          <a:lstStyle/>
+          <a:p>
+            <a:r>
+              <a:rPr lang="en-US" dirty="0" smtClean="0"/>
+              <a:t>What does this system</a:t>
+            </a:r>
+            <a:r>
+              <a:rPr lang="en-US" baseline="0" dirty="0" smtClean="0"/>
+              <a:t> gain from being P2P?</a:t>
+            </a:r>
+          </a:p>
+          <a:p>
+            <a:pPr lvl="1"/>
+            <a:r>
+              <a:rPr lang="en-US" dirty="0" smtClean="0"/>
+              <a:t>Why not separate storage from front-ends</a:t>
+            </a:r>
+            <a:r>
+              <a:rPr lang="en-US" baseline="0" dirty="0" smtClean="0"/>
+              <a:t>? (Articles in S3?)</a:t>
+            </a:r>
+          </a:p>
+          <a:p>
+            <a:pPr lvl="0"/>
+            <a:r>
+              <a:rPr lang="en-US" baseline="0" dirty="0" smtClean="0"/>
+              <a:t>Per-site filtering?</a:t>
+            </a:r>
+          </a:p>
+          <a:p>
+            <a:pPr lvl="0"/>
+            <a:r>
+              <a:rPr lang="en-US" dirty="0" smtClean="0"/>
+              <a:t>For those that read the paper…</a:t>
+            </a:r>
+          </a:p>
+          <a:p>
+            <a:pPr lvl="1"/>
+            <a:r>
+              <a:rPr lang="en-US" baseline="0" dirty="0" smtClean="0"/>
+              <a:t>Passing tone requires</a:t>
+            </a:r>
+            <a:r>
+              <a:rPr lang="en-US" dirty="0" smtClean="0"/>
+              <a:t> synchronized clocks– how to fix this?</a:t>
+            </a:r>
+          </a:p>
+          <a:p>
+            <a:r>
+              <a:rPr lang="en-US" dirty="0" smtClean="0"/>
+              <a:t>Local caching</a:t>
+            </a:r>
+          </a:p>
+          <a:p>
+            <a:pPr lvl="1"/>
+            <a:r>
+              <a:rPr lang="en-US" dirty="0" smtClean="0"/>
+              <a:t>Trade-off between performance and required storage per node</a:t>
+            </a:r>
+          </a:p>
+          <a:p>
+            <a:pPr lvl="1"/>
+            <a:r>
+              <a:rPr lang="en-US" dirty="0" smtClean="0"/>
+              <a:t>How does this effect the bounds on number of messages?</a:t>
+            </a:r>
+          </a:p>
+          <a:p>
+            <a:r>
+              <a:rPr lang="en-US" dirty="0" smtClean="0"/>
+              <a:t>Why </a:t>
+            </a:r>
+            <a:r>
+              <a:rPr lang="en-US" smtClean="0"/>
+              <a:t>isn’t this used today?</a:t>
+            </a:r>
+            <a:endParaRPr lang="en-US" dirty="0" smtClean="0"/>
+          </a:p>
+        </p:txBody>
+      </p:sp>
+    </p:spTree>
+    <p:extLst>
+      <p:ext uri="{BB962C8B-B14F-4D97-AF65-F5344CB8AC3E}">
+        <p14:creationId xmlns:p14="http://schemas.microsoft.com/office/powerpoint/2010/main" val="3514364359"/>
       </p:ext>
     </p:extLst>
   </p:cSld>

</xml_diff>

<commit_message>
presentation: fix popups boxes in codns slides
</commit_message>
<xml_diff>
--- a/p2p/P2P Apps.pptx
+++ b/p2p/P2P Apps.pptx
@@ -7079,23 +7079,25 @@
           <a:p>
             <a:pPr marL="0" lvl="1"/>
             <a:r>
-              <a:rPr lang="en-US" dirty="0" smtClean="0"/>
+              <a:rPr lang="en-US" sz="1600" dirty="0" smtClean="0"/>
               <a:t>Long lasting, continuous failures: </a:t>
             </a:r>
           </a:p>
           <a:p>
             <a:pPr marL="0" lvl="1"/>
             <a:r>
-              <a:rPr lang="en-US" dirty="0" smtClean="0"/>
+              <a:rPr lang="en-US" sz="1600" dirty="0" smtClean="0"/>
               <a:t>- Result </a:t>
             </a:r>
             <a:r>
-              <a:rPr lang="en-US" dirty="0"/>
-              <a:t>from nameserver failures and extended overloading</a:t>
-            </a:r>
-          </a:p>
-          <a:p>
-            <a:endParaRPr lang="en-US" dirty="0"/>
+              <a:rPr lang="en-US" sz="1600" dirty="0"/>
+              <a:t>from nameserver failures and extended </a:t>
+            </a:r>
+            <a:r>
+              <a:rPr lang="en-US" sz="1600" dirty="0" smtClean="0"/>
+              <a:t>overloading</a:t>
+            </a:r>
+            <a:endParaRPr lang="en-US" sz="1600" dirty="0"/>
           </a:p>
         </p:txBody>
       </p:sp>
@@ -7131,26 +7133,24 @@
           <a:lstStyle/>
           <a:p>
             <a:r>
-              <a:rPr lang="en-US" dirty="0"/>
+              <a:rPr lang="en-US" sz="1600" dirty="0"/>
               <a:t>Short sporadic </a:t>
             </a:r>
             <a:r>
-              <a:rPr lang="en-US" dirty="0" smtClean="0"/>
+              <a:rPr lang="en-US" sz="1600" dirty="0" smtClean="0"/>
               <a:t>failures: </a:t>
             </a:r>
           </a:p>
           <a:p>
             <a:r>
-              <a:rPr lang="en-US" dirty="0" smtClean="0"/>
+              <a:rPr lang="en-US" sz="1600" dirty="0" smtClean="0"/>
               <a:t>- Result from temporary </a:t>
             </a:r>
             <a:r>
-              <a:rPr lang="en-US" dirty="0"/>
+              <a:rPr lang="en-US" sz="1600" dirty="0" smtClean="0"/>
               <a:t>overloading</a:t>
             </a:r>
-          </a:p>
-          <a:p>
-            <a:endParaRPr lang="en-US" dirty="0"/>
+            <a:endParaRPr lang="en-US" sz="1600" dirty="0"/>
           </a:p>
         </p:txBody>
       </p:sp>
@@ -7186,20 +7186,22 @@
           <a:lstStyle/>
           <a:p>
             <a:r>
-              <a:rPr lang="en-US" dirty="0"/>
+              <a:rPr lang="en-US" sz="1600" dirty="0"/>
               <a:t>Periodic Failures – caused by </a:t>
             </a:r>
             <a:r>
-              <a:rPr lang="en-US" dirty="0" err="1"/>
+              <a:rPr lang="en-US" sz="1600" dirty="0" err="1"/>
               <a:t>cron</a:t>
             </a:r>
             <a:r>
-              <a:rPr lang="en-US" dirty="0"/>
-              <a:t> jobs and other scheduled tasks</a:t>
-            </a:r>
-          </a:p>
-          <a:p>
-            <a:endParaRPr lang="en-US" dirty="0"/>
+              <a:rPr lang="en-US" sz="1600" dirty="0"/>
+              <a:t> jobs and other scheduled </a:t>
+            </a:r>
+            <a:r>
+              <a:rPr lang="en-US" sz="1600" dirty="0" smtClean="0"/>
+              <a:t>tasks</a:t>
+            </a:r>
+            <a:endParaRPr lang="en-US" sz="1600" dirty="0"/>
           </a:p>
         </p:txBody>
       </p:sp>
@@ -25759,13 +25761,8 @@
           <a:p>
             <a:r>
               <a:rPr lang="en-US" dirty="0" smtClean="0"/>
-              <a:t>Why </a:t>
-            </a:r>
-            <a:r>
-              <a:rPr lang="en-US" smtClean="0"/>
-              <a:t>isn’t this used today?</a:t>
-            </a:r>
-            <a:endParaRPr lang="en-US" dirty="0" smtClean="0"/>
+              <a:t>Why isn’t this used today?</a:t>
+            </a:r>
           </a:p>
         </p:txBody>
       </p:sp>

</xml_diff>

<commit_message>
presentation: small typo fixing, remove supurious node in pastry review
</commit_message>
<xml_diff>
--- a/p2p/P2P Apps.pptx
+++ b/p2p/P2P Apps.pptx
@@ -9562,7 +9562,7 @@
             <a:pPr lvl="1"/>
             <a:r>
               <a:rPr lang="en-US" dirty="0" smtClean="0"/>
-              <a:t>Routing entries biased towards closed nodes</a:t>
+              <a:t>Routing entries biased towards closer nodes</a:t>
             </a:r>
           </a:p>
           <a:p>
@@ -13993,65 +13993,6 @@
           </p:txBody>
         </p:sp>
       </p:grpSp>
-      <p:pic>
-        <p:nvPicPr>
-          <p:cNvPr id="73" name="Picture 70"/>
-          <p:cNvPicPr>
-            <a:picLocks noChangeArrowheads="1"/>
-          </p:cNvPicPr>
-          <p:nvPr/>
-        </p:nvPicPr>
-        <p:blipFill>
-          <a:blip r:embed="rId2" cstate="print">
-            <a:extLst>
-              <a:ext uri="{28A0092B-C50C-407E-A947-70E740481C1C}">
-                <a14:useLocalDpi xmlns:a14="http://schemas.microsoft.com/office/drawing/2010/main" val="0"/>
-              </a:ext>
-            </a:extLst>
-          </a:blip>
-          <a:srcRect/>
-          <a:stretch>
-            <a:fillRect/>
-          </a:stretch>
-        </p:blipFill>
-        <p:spPr bwMode="auto">
-          <a:xfrm>
-            <a:off x="7878763" y="6013450"/>
-            <a:ext cx="201612" cy="182563"/>
-          </a:xfrm>
-          <a:prstGeom prst="rect">
-            <a:avLst/>
-          </a:prstGeom>
-          <a:solidFill>
-            <a:schemeClr val="accent1"/>
-          </a:solidFill>
-          <a:ln>
-            <a:noFill/>
-          </a:ln>
-          <a:effectLst/>
-          <a:extLst>
-            <a:ext uri="{91240B29-F687-4F45-9708-019B960494DF}">
-              <a14:hiddenLine xmlns:a14="http://schemas.microsoft.com/office/drawing/2010/main" w="9525">
-                <a:solidFill>
-                  <a:schemeClr val="tx1"/>
-                </a:solidFill>
-                <a:miter lim="800000"/>
-                <a:headEnd/>
-                <a:tailEnd/>
-              </a14:hiddenLine>
-            </a:ext>
-            <a:ext uri="{AF507438-7753-43E0-B8FC-AC1667EBCBE1}">
-              <a14:hiddenEffects xmlns:a14="http://schemas.microsoft.com/office/drawing/2010/main">
-                <a:effectLst>
-                  <a:outerShdw dist="35921" dir="2700000" algn="ctr" rotWithShape="0">
-                    <a:schemeClr val="bg2"/>
-                  </a:outerShdw>
-                </a:effectLst>
-              </a14:hiddenEffects>
-            </a:ext>
-          </a:extLst>
-        </p:spPr>
-      </p:pic>
     </p:spTree>
     <p:extLst>
       <p:ext uri="{BB962C8B-B14F-4D97-AF65-F5344CB8AC3E}">
@@ -14092,11 +14033,11 @@
                                       <p:cBhvr>
                                         <p:cTn id="6" dur="1" fill="hold">
                                           <p:stCondLst>
-                                            <p:cond delay="499"/>
+                                            <p:cond delay="0"/>
                                           </p:stCondLst>
                                         </p:cTn>
                                         <p:tgtEl>
-                                          <p:spTgt spid="73"/>
+                                          <p:spTgt spid="5"/>
                                         </p:tgtEl>
                                         <p:attrNameLst>
                                           <p:attrName>style.visibility</p:attrName>

</xml_diff>

<commit_message>
presentation: mention cache locality, silly goose!
</commit_message>
<xml_diff>
--- a/p2p/P2P Apps.pptx
+++ b/p2p/P2P Apps.pptx
@@ -14523,7 +14523,7 @@
             </a:r>
           </a:p>
           <a:p>
-            <a:pPr lvl="0"/>
+            <a:pPr lvl="1"/>
             <a:r>
               <a:rPr lang="en-US" dirty="0" smtClean="0"/>
               <a:t>Simply</a:t>
@@ -22131,7 +22131,9 @@
         </p:nvSpPr>
         <p:spPr/>
         <p:txBody>
-          <a:bodyPr/>
+          <a:bodyPr>
+            <a:normAutofit/>
+          </a:bodyPr>
           <a:lstStyle/>
           <a:p>
             <a:r>
@@ -22167,7 +22169,24 @@
           <a:p>
             <a:r>
               <a:rPr lang="en-US" dirty="0" smtClean="0"/>
-              <a:t>Cache Policy: </a:t>
+              <a:t>Cache locality</a:t>
+            </a:r>
+          </a:p>
+          <a:p>
+            <a:pPr lvl="1"/>
+            <a:r>
+              <a:rPr lang="en-US" smtClean="0"/>
+              <a:t>Due to Pastry’s proximity</a:t>
+            </a:r>
+          </a:p>
+          <a:p>
+            <a:r>
+              <a:rPr lang="en-US" smtClean="0"/>
+              <a:t>Cache </a:t>
+            </a:r>
+            <a:r>
+              <a:rPr lang="en-US" dirty="0" smtClean="0"/>
+              <a:t>Policy: </a:t>
             </a:r>
             <a:r>
               <a:rPr lang="en-US" dirty="0" err="1" smtClean="0"/>

</xml_diff>

<commit_message>
presentation: after kevin's changes
</commit_message>
<xml_diff>
--- a/p2p/P2P Apps.pptx
+++ b/p2p/P2P Apps.pptx
@@ -2,10 +2,10 @@
 <file path=ppt/presentation.xml><?xml version="1.0" encoding="utf-8"?>
 <p:presentation xmlns:a="http://schemas.openxmlformats.org/drawingml/2006/main" xmlns:r="http://schemas.openxmlformats.org/officeDocument/2006/relationships" xmlns:p="http://schemas.openxmlformats.org/presentationml/2006/main" saveSubsetFonts="1">
   <p:sldMasterIdLst>
-    <p:sldMasterId id="2147483684" r:id="rId1"/>
+    <p:sldMasterId id="2147483732" r:id="rId1"/>
   </p:sldMasterIdLst>
   <p:notesMasterIdLst>
-    <p:notesMasterId r:id="rId53"/>
+    <p:notesMasterId r:id="rId52"/>
   </p:notesMasterIdLst>
   <p:sldIdLst>
     <p:sldId id="256" r:id="rId2"/>
@@ -17,16 +17,16 @@
     <p:sldId id="271" r:id="rId8"/>
     <p:sldId id="260" r:id="rId9"/>
     <p:sldId id="261" r:id="rId10"/>
-    <p:sldId id="272" r:id="rId11"/>
+    <p:sldId id="316" r:id="rId11"/>
     <p:sldId id="263" r:id="rId12"/>
     <p:sldId id="264" r:id="rId13"/>
     <p:sldId id="265" r:id="rId14"/>
-    <p:sldId id="266" r:id="rId15"/>
-    <p:sldId id="273" r:id="rId16"/>
-    <p:sldId id="267" r:id="rId17"/>
-    <p:sldId id="268" r:id="rId18"/>
-    <p:sldId id="269" r:id="rId19"/>
-    <p:sldId id="270" r:id="rId20"/>
+    <p:sldId id="317" r:id="rId15"/>
+    <p:sldId id="266" r:id="rId16"/>
+    <p:sldId id="273" r:id="rId17"/>
+    <p:sldId id="267" r:id="rId18"/>
+    <p:sldId id="268" r:id="rId19"/>
+    <p:sldId id="269" r:id="rId20"/>
     <p:sldId id="276" r:id="rId21"/>
     <p:sldId id="277" r:id="rId22"/>
     <p:sldId id="278" r:id="rId23"/>
@@ -49,16 +49,15 @@
     <p:sldId id="302" r:id="rId40"/>
     <p:sldId id="303" r:id="rId41"/>
     <p:sldId id="306" r:id="rId42"/>
-    <p:sldId id="307" r:id="rId43"/>
-    <p:sldId id="308" r:id="rId44"/>
-    <p:sldId id="309" r:id="rId45"/>
-    <p:sldId id="310" r:id="rId46"/>
-    <p:sldId id="311" r:id="rId47"/>
-    <p:sldId id="304" r:id="rId48"/>
-    <p:sldId id="312" r:id="rId49"/>
-    <p:sldId id="313" r:id="rId50"/>
-    <p:sldId id="314" r:id="rId51"/>
-    <p:sldId id="315" r:id="rId52"/>
+    <p:sldId id="308" r:id="rId43"/>
+    <p:sldId id="309" r:id="rId44"/>
+    <p:sldId id="310" r:id="rId45"/>
+    <p:sldId id="311" r:id="rId46"/>
+    <p:sldId id="304" r:id="rId47"/>
+    <p:sldId id="312" r:id="rId48"/>
+    <p:sldId id="313" r:id="rId49"/>
+    <p:sldId id="314" r:id="rId50"/>
+    <p:sldId id="315" r:id="rId51"/>
   </p:sldIdLst>
   <p:sldSz cx="9144000" cy="6858000" type="screen4x3"/>
   <p:notesSz cx="6858000" cy="9144000"/>
@@ -819,7 +818,9 @@
               <a:buNone/>
               <a:defRPr sz="1600" b="1" cap="all" spc="250" baseline="0">
                 <a:solidFill>
-                  <a:schemeClr val="tx2"/>
+                  <a:schemeClr val="bg2">
+                    <a:lumMod val="10000"/>
+                  </a:schemeClr>
                 </a:solidFill>
               </a:defRPr>
             </a:lvl1pPr>
@@ -850,10 +851,10 @@
           </a:lstStyle>
           <a:p>
             <a:r>
-              <a:rPr kumimoji="0" lang="en-US" smtClean="0"/>
+              <a:rPr kumimoji="0" lang="en-US" dirty="0" smtClean="0"/>
               <a:t>Click to edit Master subtitle style</a:t>
             </a:r>
-            <a:endParaRPr kumimoji="0" lang="en-US"/>
+            <a:endParaRPr kumimoji="0" lang="en-US" dirty="0"/>
           </a:p>
         </p:txBody>
       </p:sp>
@@ -1150,6 +1151,13 @@
   <p:clrMapOvr>
     <a:overrideClrMapping bg1="lt1" tx1="dk1" bg2="lt2" tx2="dk2" accent1="accent1" accent2="accent2" accent3="accent3" accent4="accent4" accent5="accent5" accent6="accent6" hlink="hlink" folHlink="folHlink"/>
   </p:clrMapOvr>
+  <p:timing>
+    <p:tnLst>
+      <p:par>
+        <p:cTn id="1" dur="indefinite" restart="never" nodeType="tmRoot"/>
+      </p:par>
+    </p:tnLst>
+  </p:timing>
 </p:sldLayout>
 </file>
 
@@ -2047,6 +2055,13 @@
   <p:clrMapOvr>
     <a:overrideClrMapping bg1="lt1" tx1="dk1" bg2="lt2" tx2="dk2" accent1="accent1" accent2="accent2" accent3="accent3" accent4="accent4" accent5="accent5" accent6="accent6" hlink="hlink" folHlink="folHlink"/>
   </p:clrMapOvr>
+  <p:timing>
+    <p:tnLst>
+      <p:par>
+        <p:cTn id="1" dur="indefinite" restart="never" nodeType="tmRoot"/>
+      </p:par>
+    </p:tnLst>
+  </p:timing>
 </p:sldLayout>
 </file>
 
@@ -2695,6 +2710,13 @@
   <p:clrMapOvr>
     <a:overrideClrMapping bg1="lt1" tx1="dk1" bg2="lt2" tx2="dk2" accent1="accent1" accent2="accent2" accent3="accent3" accent4="accent4" accent5="accent5" accent6="accent6" hlink="hlink" folHlink="folHlink"/>
   </p:clrMapOvr>
+  <p:timing>
+    <p:tnLst>
+      <p:par>
+        <p:cTn id="1" dur="indefinite" restart="never" nodeType="tmRoot"/>
+      </p:par>
+    </p:tnLst>
+  </p:timing>
 </p:sldLayout>
 </file>
 
@@ -2981,6 +3003,13 @@
   <p:clrMapOvr>
     <a:overrideClrMapping bg1="lt1" tx1="dk1" bg2="lt2" tx2="dk2" accent1="accent1" accent2="accent2" accent3="accent3" accent4="accent4" accent5="accent5" accent6="accent6" hlink="hlink" folHlink="folHlink"/>
   </p:clrMapOvr>
+  <p:timing>
+    <p:tnLst>
+      <p:par>
+        <p:cTn id="1" dur="indefinite" restart="never" nodeType="tmRoot"/>
+      </p:par>
+    </p:tnLst>
+  </p:timing>
 </p:sldLayout>
 </file>
 
@@ -6129,10 +6158,10 @@
           <a:lstStyle/>
           <a:p>
             <a:r>
-              <a:rPr kumimoji="0" lang="en-US" smtClean="0"/>
+              <a:rPr kumimoji="0" lang="en-US" dirty="0" smtClean="0"/>
               <a:t>Click to edit Master title style</a:t>
             </a:r>
-            <a:endParaRPr kumimoji="0" lang="en-US"/>
+            <a:endParaRPr kumimoji="0" lang="en-US" dirty="0"/>
           </a:p>
         </p:txBody>
       </p:sp>
@@ -6163,38 +6192,38 @@
           <a:p>
             <a:pPr lvl="0" eaLnBrk="1" latinLnBrk="0" hangingPunct="1"/>
             <a:r>
-              <a:rPr kumimoji="0" lang="en-US" smtClean="0"/>
+              <a:rPr kumimoji="0" lang="en-US" dirty="0" smtClean="0"/>
               <a:t>Click to edit Master text styles</a:t>
             </a:r>
           </a:p>
           <a:p>
             <a:pPr lvl="1" eaLnBrk="1" latinLnBrk="0" hangingPunct="1"/>
             <a:r>
-              <a:rPr kumimoji="0" lang="en-US" smtClean="0"/>
+              <a:rPr kumimoji="0" lang="en-US" dirty="0" smtClean="0"/>
               <a:t>Second level</a:t>
             </a:r>
           </a:p>
           <a:p>
             <a:pPr lvl="2" eaLnBrk="1" latinLnBrk="0" hangingPunct="1"/>
             <a:r>
-              <a:rPr kumimoji="0" lang="en-US" smtClean="0"/>
+              <a:rPr kumimoji="0" lang="en-US" dirty="0" smtClean="0"/>
               <a:t>Third level</a:t>
             </a:r>
           </a:p>
           <a:p>
             <a:pPr lvl="3" eaLnBrk="1" latinLnBrk="0" hangingPunct="1"/>
             <a:r>
-              <a:rPr kumimoji="0" lang="en-US" smtClean="0"/>
+              <a:rPr kumimoji="0" lang="en-US" dirty="0" smtClean="0"/>
               <a:t>Fourth level</a:t>
             </a:r>
           </a:p>
           <a:p>
             <a:pPr lvl="4" eaLnBrk="1" latinLnBrk="0" hangingPunct="1"/>
             <a:r>
-              <a:rPr kumimoji="0" lang="en-US" smtClean="0"/>
+              <a:rPr kumimoji="0" lang="en-US" dirty="0" smtClean="0"/>
               <a:t>Fifth level</a:t>
             </a:r>
-            <a:endParaRPr kumimoji="0" lang="en-US"/>
+            <a:endParaRPr kumimoji="0" lang="en-US" dirty="0"/>
           </a:p>
         </p:txBody>
       </p:sp>
@@ -6202,18 +6231,25 @@
   </p:cSld>
   <p:clrMap bg1="lt1" tx1="dk1" bg2="lt2" tx2="dk2" accent1="accent1" accent2="accent2" accent3="accent3" accent4="accent4" accent5="accent5" accent6="accent6" hlink="hlink" folHlink="folHlink"/>
   <p:sldLayoutIdLst>
-    <p:sldLayoutId id="2147483685" r:id="rId1"/>
-    <p:sldLayoutId id="2147483686" r:id="rId2"/>
-    <p:sldLayoutId id="2147483687" r:id="rId3"/>
-    <p:sldLayoutId id="2147483688" r:id="rId4"/>
-    <p:sldLayoutId id="2147483689" r:id="rId5"/>
-    <p:sldLayoutId id="2147483690" r:id="rId6"/>
-    <p:sldLayoutId id="2147483691" r:id="rId7"/>
-    <p:sldLayoutId id="2147483692" r:id="rId8"/>
-    <p:sldLayoutId id="2147483693" r:id="rId9"/>
-    <p:sldLayoutId id="2147483694" r:id="rId10"/>
-    <p:sldLayoutId id="2147483695" r:id="rId11"/>
+    <p:sldLayoutId id="2147483733" r:id="rId1"/>
+    <p:sldLayoutId id="2147483734" r:id="rId2"/>
+    <p:sldLayoutId id="2147483735" r:id="rId3"/>
+    <p:sldLayoutId id="2147483736" r:id="rId4"/>
+    <p:sldLayoutId id="2147483737" r:id="rId5"/>
+    <p:sldLayoutId id="2147483738" r:id="rId6"/>
+    <p:sldLayoutId id="2147483739" r:id="rId7"/>
+    <p:sldLayoutId id="2147483740" r:id="rId8"/>
+    <p:sldLayoutId id="2147483741" r:id="rId9"/>
+    <p:sldLayoutId id="2147483742" r:id="rId10"/>
+    <p:sldLayoutId id="2147483743" r:id="rId11"/>
   </p:sldLayoutIdLst>
+  <p:timing>
+    <p:tnLst>
+      <p:par>
+        <p:cTn id="1" dur="indefinite" restart="never" nodeType="tmRoot"/>
+      </p:par>
+    </p:tnLst>
+  </p:timing>
   <p:hf hdr="0" ftr="0" dt="0"/>
   <p:txStyles>
     <p:titleStyle>
@@ -6266,7 +6302,9 @@
         <a:buChar char=""/>
         <a:defRPr kumimoji="0" sz="2200" kern="1200">
           <a:solidFill>
-            <a:schemeClr val="tx2"/>
+            <a:schemeClr val="bg2">
+              <a:lumMod val="25000"/>
+            </a:schemeClr>
           </a:solidFill>
           <a:latin typeface="+mn-lt"/>
           <a:ea typeface="+mn-ea"/>
@@ -6682,7 +6720,7 @@
           <a:p>
             <a:r>
               <a:rPr lang="en-US" dirty="0" smtClean="0"/>
-              <a:t>Failure Classification</a:t>
+              <a:t>Observed Performance </a:t>
             </a:r>
             <a:endParaRPr lang="en-US" dirty="0"/>
           </a:p>
@@ -6690,7 +6728,7 @@
       </p:sp>
       <p:sp>
         <p:nvSpPr>
-          <p:cNvPr id="6" name="Slide Number Placeholder 5"/>
+          <p:cNvPr id="23" name="Slide Number Placeholder 22"/>
           <p:cNvSpPr>
             <a:spLocks noGrp="1"/>
           </p:cNvSpPr>
@@ -6734,7 +6772,7 @@
         </p:blipFill>
         <p:spPr bwMode="auto">
           <a:xfrm>
-            <a:off x="1828800" y="1219200"/>
+            <a:off x="1828800" y="1673219"/>
             <a:ext cx="5486400" cy="917581"/>
           </a:xfrm>
           <a:prstGeom prst="rect">
@@ -6788,7 +6826,7 @@
         </p:blipFill>
         <p:spPr bwMode="auto">
           <a:xfrm>
-            <a:off x="1817914" y="2487970"/>
+            <a:off x="1817914" y="2882875"/>
             <a:ext cx="5486400" cy="927125"/>
           </a:xfrm>
           <a:prstGeom prst="rect">
@@ -6842,7 +6880,7 @@
         </p:blipFill>
         <p:spPr bwMode="auto">
           <a:xfrm>
-            <a:off x="1793420" y="3861560"/>
+            <a:off x="1828800" y="4114800"/>
             <a:ext cx="5486400" cy="927125"/>
           </a:xfrm>
           <a:prstGeom prst="rect">
@@ -6881,8 +6919,8 @@
         </p:nvSpPr>
         <p:spPr>
           <a:xfrm>
-            <a:off x="4110061" y="2136781"/>
-            <a:ext cx="853119" cy="369332"/>
+            <a:off x="4136157" y="2557046"/>
+            <a:ext cx="849913" cy="338554"/>
           </a:xfrm>
           <a:prstGeom prst="rect">
             <a:avLst/>
@@ -6896,10 +6934,10 @@
           <a:lstStyle/>
           <a:p>
             <a:r>
-              <a:rPr lang="en-US" dirty="0" smtClean="0"/>
+              <a:rPr lang="en-US" sz="1600" dirty="0" smtClean="0"/>
               <a:t>Cornell</a:t>
             </a:r>
-            <a:endParaRPr lang="en-US" dirty="0"/>
+            <a:endParaRPr lang="en-US" sz="1600" dirty="0"/>
           </a:p>
         </p:txBody>
       </p:sp>
@@ -6911,8 +6949,8 @@
         </p:nvSpPr>
         <p:spPr>
           <a:xfrm>
-            <a:off x="3439114" y="3431393"/>
-            <a:ext cx="2118272" cy="369332"/>
+            <a:off x="3531824" y="3810000"/>
+            <a:ext cx="2077813" cy="338554"/>
           </a:xfrm>
           <a:prstGeom prst="rect">
             <a:avLst/>
@@ -6926,10 +6964,10 @@
           <a:lstStyle/>
           <a:p>
             <a:r>
-              <a:rPr lang="en-US" dirty="0" smtClean="0"/>
+              <a:rPr lang="en-US" sz="1600" dirty="0" smtClean="0"/>
               <a:t>University of Oregon</a:t>
             </a:r>
-            <a:endParaRPr lang="en-US" dirty="0"/>
+            <a:endParaRPr lang="en-US" sz="1600" dirty="0"/>
           </a:p>
         </p:txBody>
       </p:sp>
@@ -6941,8 +6979,8 @@
         </p:nvSpPr>
         <p:spPr>
           <a:xfrm>
-            <a:off x="3395570" y="4788685"/>
-            <a:ext cx="2282100" cy="369332"/>
+            <a:off x="3450397" y="5034379"/>
+            <a:ext cx="2262158" cy="338554"/>
           </a:xfrm>
           <a:prstGeom prst="rect">
             <a:avLst/>
@@ -6956,7 +6994,7 @@
           <a:lstStyle/>
           <a:p>
             <a:r>
-              <a:rPr lang="en-US" dirty="0" smtClean="0"/>
+              <a:rPr lang="en-US" sz="1600" dirty="0" smtClean="0"/>
               <a:t>University of Michigan</a:t>
             </a:r>
           </a:p>
@@ -6985,7 +7023,7 @@
         </p:blipFill>
         <p:spPr bwMode="auto">
           <a:xfrm>
-            <a:off x="1849527" y="5158017"/>
+            <a:off x="1817914" y="5334000"/>
             <a:ext cx="5486400" cy="804418"/>
           </a:xfrm>
           <a:prstGeom prst="rect">
@@ -7024,8 +7062,8 @@
         </p:nvSpPr>
         <p:spPr>
           <a:xfrm>
-            <a:off x="3361651" y="5980969"/>
-            <a:ext cx="2398926" cy="369332"/>
+            <a:off x="3395570" y="6067578"/>
+            <a:ext cx="2350323" cy="338554"/>
           </a:xfrm>
           <a:prstGeom prst="rect">
             <a:avLst/>
@@ -7039,23 +7077,23 @@
           <a:lstStyle/>
           <a:p>
             <a:r>
-              <a:rPr lang="en-US" dirty="0" smtClean="0"/>
+              <a:rPr lang="en-US" sz="1600" dirty="0" smtClean="0"/>
               <a:t>University of Tennessee</a:t>
             </a:r>
-            <a:endParaRPr lang="en-US" dirty="0"/>
-          </a:p>
-        </p:txBody>
-      </p:sp>
-      <p:sp>
-        <p:nvSpPr>
-          <p:cNvPr id="17" name="TextBox 16"/>
+            <a:endParaRPr lang="en-US" sz="1600" dirty="0"/>
+          </a:p>
+        </p:txBody>
+      </p:sp>
+      <p:sp>
+        <p:nvSpPr>
+          <p:cNvPr id="14" name="TextBox 13"/>
           <p:cNvSpPr txBox="1"/>
           <p:nvPr/>
         </p:nvSpPr>
         <p:spPr>
           <a:xfrm>
-            <a:off x="5565320" y="1190307"/>
-            <a:ext cx="3429000" cy="1019493"/>
+            <a:off x="5791200" y="1676401"/>
+            <a:ext cx="3203120" cy="914400"/>
           </a:xfrm>
           <a:prstGeom prst="rect">
             <a:avLst/>
@@ -7103,14 +7141,14 @@
       </p:sp>
       <p:sp>
         <p:nvSpPr>
-          <p:cNvPr id="20" name="TextBox 19"/>
+          <p:cNvPr id="15" name="TextBox 14"/>
           <p:cNvSpPr txBox="1"/>
           <p:nvPr/>
         </p:nvSpPr>
         <p:spPr>
           <a:xfrm>
-            <a:off x="5557386" y="2487970"/>
-            <a:ext cx="3429000" cy="1019493"/>
+            <a:off x="5791200" y="2895601"/>
+            <a:ext cx="3195186" cy="914400"/>
           </a:xfrm>
           <a:prstGeom prst="rect">
             <a:avLst/>
@@ -7156,14 +7194,14 @@
       </p:sp>
       <p:sp>
         <p:nvSpPr>
-          <p:cNvPr id="21" name="TextBox 20"/>
+          <p:cNvPr id="16" name="TextBox 15"/>
           <p:cNvSpPr txBox="1"/>
           <p:nvPr/>
         </p:nvSpPr>
         <p:spPr>
           <a:xfrm>
-            <a:off x="5677670" y="4572000"/>
-            <a:ext cx="3316650" cy="762000"/>
+            <a:off x="5791200" y="4724401"/>
+            <a:ext cx="3203120" cy="914400"/>
           </a:xfrm>
           <a:prstGeom prst="rect">
             <a:avLst/>
@@ -7187,15 +7225,7 @@
           <a:p>
             <a:r>
               <a:rPr lang="en-US" sz="1600" dirty="0"/>
-              <a:t>Periodic Failures – caused by </a:t>
-            </a:r>
-            <a:r>
-              <a:rPr lang="en-US" sz="1600" dirty="0" err="1"/>
-              <a:t>cron</a:t>
-            </a:r>
-            <a:r>
-              <a:rPr lang="en-US" sz="1600" dirty="0"/>
-              <a:t> jobs and other scheduled </a:t>
+              <a:t>Periodic Failures – caused by cron jobs and other scheduled </a:t>
             </a:r>
             <a:r>
               <a:rPr lang="en-US" sz="1600" dirty="0" smtClean="0"/>
@@ -7208,7 +7238,7 @@
     </p:spTree>
     <p:extLst>
       <p:ext uri="{BB962C8B-B14F-4D97-AF65-F5344CB8AC3E}">
-        <p14:creationId xmlns:p14="http://schemas.microsoft.com/office/powerpoint/2010/main" val="3345404554"/>
+        <p14:creationId xmlns:p14="http://schemas.microsoft.com/office/powerpoint/2010/main" val="4249551666"/>
       </p:ext>
     </p:extLst>
   </p:cSld>
@@ -7249,7 +7279,7 @@
                                           </p:stCondLst>
                                         </p:cTn>
                                         <p:tgtEl>
-                                          <p:spTgt spid="17"/>
+                                          <p:spTgt spid="14"/>
                                         </p:tgtEl>
                                         <p:attrNameLst>
                                           <p:attrName>style.visibility</p:attrName>
@@ -7294,7 +7324,7 @@
                                           </p:stCondLst>
                                         </p:cTn>
                                         <p:tgtEl>
-                                          <p:spTgt spid="20"/>
+                                          <p:spTgt spid="15"/>
                                         </p:tgtEl>
                                         <p:attrNameLst>
                                           <p:attrName>style.visibility</p:attrName>
@@ -7339,7 +7369,7 @@
                                           </p:stCondLst>
                                         </p:cTn>
                                         <p:tgtEl>
-                                          <p:spTgt spid="21"/>
+                                          <p:spTgt spid="16"/>
                                         </p:tgtEl>
                                         <p:attrNameLst>
                                           <p:attrName>style.visibility</p:attrName>
@@ -7380,9 +7410,9 @@
       </p:par>
     </p:tnLst>
     <p:bldLst>
-      <p:bldP spid="17" grpId="0" animBg="1"/>
-      <p:bldP spid="20" grpId="0" animBg="1"/>
-      <p:bldP spid="21" grpId="0" animBg="1"/>
+      <p:bldP spid="14" grpId="0" animBg="1"/>
+      <p:bldP spid="15" grpId="0" animBg="1"/>
+      <p:bldP spid="16" grpId="0" animBg="1"/>
     </p:bldLst>
   </p:timing>
 </p:sld>
@@ -7421,12 +7451,8 @@
           <a:lstStyle/>
           <a:p>
             <a:r>
-              <a:rPr lang="en-US" dirty="0" err="1" smtClean="0"/>
-              <a:t>CoDNS</a:t>
-            </a:r>
-            <a:r>
-              <a:rPr lang="en-US" dirty="0" smtClean="0"/>
-              <a:t> Ideas</a:t>
+              <a:rPr lang="en-US" dirty="0" smtClean="0"/>
+              <a:t>CoDNS Ideas</a:t>
             </a:r>
             <a:endParaRPr lang="en-US" dirty="0"/>
           </a:p>
@@ -7480,14 +7506,12 @@
           <a:p>
             <a:r>
               <a:rPr lang="en-US" dirty="0" smtClean="0"/>
-              <a:t>Distribute DNS cache across many peers - Improve size and performance of “global </a:t>
-            </a:r>
-            <a:r>
-              <a:rPr lang="en-US" smtClean="0"/>
-              <a:t>cache”</a:t>
-            </a:r>
-          </a:p>
-          <a:p>
+              <a:t>Distribute DNS cache across many peers - Improve size and performance of “global cache</a:t>
+            </a:r>
+            <a:r>
+              <a:rPr lang="en-US" dirty="0" smtClean="0"/>
+              <a:t>”</a:t>
+            </a:r>
             <a:endParaRPr lang="en-US" dirty="0" smtClean="0"/>
           </a:p>
           <a:p>
@@ -7579,12 +7603,8 @@
           <a:lstStyle/>
           <a:p>
             <a:r>
-              <a:rPr lang="en-US" dirty="0" err="1" smtClean="0"/>
-              <a:t>CoDNS</a:t>
-            </a:r>
-            <a:r>
-              <a:rPr lang="en-US" dirty="0" smtClean="0"/>
-              <a:t> Counter-thoughts</a:t>
+              <a:rPr lang="en-US" dirty="0" smtClean="0"/>
+              <a:t>CoDNS Counter-thoughts</a:t>
             </a:r>
             <a:endParaRPr lang="en-US" dirty="0"/>
           </a:p>
@@ -7831,12 +7851,8 @@
           <a:lstStyle/>
           <a:p>
             <a:r>
-              <a:rPr lang="en-US" dirty="0" err="1" smtClean="0"/>
-              <a:t>CoDNS</a:t>
-            </a:r>
-            <a:r>
-              <a:rPr lang="en-US" dirty="0" smtClean="0"/>
-              <a:t> Implementation</a:t>
+              <a:rPr lang="en-US" dirty="0" smtClean="0"/>
+              <a:t>CoDNS Implementation</a:t>
             </a:r>
             <a:endParaRPr lang="en-US" dirty="0"/>
           </a:p>
@@ -7875,7 +7891,12 @@
             <p:ph sz="quarter" idx="1"/>
           </p:nvPr>
         </p:nvSpPr>
-        <p:spPr/>
+        <p:spPr>
+          <a:xfrm>
+            <a:off x="301752" y="1676400"/>
+            <a:ext cx="8503920" cy="4572000"/>
+          </a:xfrm>
+        </p:spPr>
         <p:txBody>
           <a:bodyPr/>
           <a:lstStyle/>
@@ -7916,8 +7937,36 @@
           <a:p>
             <a:r>
               <a:rPr lang="en-US" dirty="0" smtClean="0"/>
-              <a:t>Dynamic reissue delay</a:t>
-            </a:r>
+              <a:t>Dynamic reissue </a:t>
+            </a:r>
+            <a:r>
+              <a:rPr lang="en-US" dirty="0" smtClean="0"/>
+              <a:t>delay</a:t>
+            </a:r>
+          </a:p>
+          <a:p>
+            <a:pPr lvl="1"/>
+            <a:r>
+              <a:rPr lang="en-US" dirty="0" smtClean="0"/>
+              <a:t>Good local performance – Increase reissue delay up to 200ms</a:t>
+            </a:r>
+          </a:p>
+          <a:p>
+            <a:pPr lvl="1"/>
+            <a:r>
+              <a:rPr lang="en-US" dirty="0" smtClean="0"/>
+              <a:t>Frequently relying on remote lookups – Reduce reissue delay to as low as 0ms</a:t>
+            </a:r>
+          </a:p>
+          <a:p>
+            <a:pPr marL="0" indent="0">
+              <a:buNone/>
+            </a:pPr>
+            <a:r>
+              <a:rPr lang="en-US" dirty="0" smtClean="0"/>
+              <a:t> </a:t>
+            </a:r>
+            <a:endParaRPr lang="en-US" dirty="0" smtClean="0"/>
           </a:p>
           <a:p>
             <a:pPr lvl="1"/>
@@ -7982,7 +8031,7 @@
           <a:p>
             <a:r>
               <a:rPr lang="en-US" dirty="0" smtClean="0"/>
-              <a:t>Results</a:t>
+              <a:t>Peer Management &amp; Maintenance</a:t>
             </a:r>
             <a:endParaRPr lang="en-US" dirty="0"/>
           </a:p>
@@ -7990,7 +8039,7 @@
       </p:sp>
       <p:sp>
         <p:nvSpPr>
-          <p:cNvPr id="4" name="Slide Number Placeholder 3"/>
+          <p:cNvPr id="3" name="Slide Number Placeholder 2"/>
           <p:cNvSpPr>
             <a:spLocks noGrp="1"/>
           </p:cNvSpPr>
@@ -8013,7 +8062,7 @@
       </p:sp>
       <p:sp>
         <p:nvSpPr>
-          <p:cNvPr id="3" name="Content Placeholder 2"/>
+          <p:cNvPr id="4" name="Content Placeholder 3"/>
           <p:cNvSpPr>
             <a:spLocks noGrp="1"/>
           </p:cNvSpPr>
@@ -8024,64 +8073,82 @@
         <p:spPr/>
         <p:txBody>
           <a:bodyPr>
-            <a:normAutofit/>
+            <a:normAutofit fontScale="92500"/>
           </a:bodyPr>
           <a:lstStyle/>
           <a:p>
             <a:r>
               <a:rPr lang="en-US" dirty="0" smtClean="0"/>
-              <a:t>Overall, average responses improved between </a:t>
-            </a:r>
-            <a:r>
-              <a:rPr lang="en-US" dirty="0" err="1" smtClean="0"/>
-              <a:t>between</a:t>
-            </a:r>
-            <a:r>
-              <a:rPr lang="en-US" dirty="0" smtClean="0"/>
-              <a:t> 16% and 75%</a:t>
+              <a:t>Highest Random Weight (HRW)</a:t>
             </a:r>
           </a:p>
           <a:p>
             <a:pPr lvl="1"/>
             <a:r>
               <a:rPr lang="en-US" dirty="0" smtClean="0"/>
-              <a:t>Host lookups: 37ms to 7ms</a:t>
+              <a:t>Assigns random weights to servers (nodes)</a:t>
             </a:r>
           </a:p>
           <a:p>
             <a:pPr lvl="1"/>
             <a:r>
               <a:rPr lang="en-US" dirty="0" smtClean="0"/>
-              <a:t>Real Traffic: 237ms to 84ms</a:t>
-            </a:r>
-          </a:p>
-          <a:p>
-            <a:r>
-              <a:rPr lang="en-US" dirty="0" smtClean="0"/>
-              <a:t>At Cornell, the worst performing node, average response times massively reduced:</a:t>
+              <a:t>Sorts nodes by weights</a:t>
             </a:r>
           </a:p>
           <a:p>
             <a:pPr lvl="1"/>
             <a:r>
               <a:rPr lang="en-US" dirty="0" smtClean="0"/>
-              <a:t>Host lookups: 554ms to 21ms</a:t>
+              <a:t>Weights can be scaled depending on the properties of a node</a:t>
+            </a:r>
+            <a:endParaRPr lang="en-US" dirty="0"/>
+          </a:p>
+          <a:p>
+            <a:r>
+              <a:rPr lang="en-US" dirty="0" smtClean="0"/>
+              <a:t>Sends heartbeats to other nodes every second</a:t>
             </a:r>
           </a:p>
           <a:p>
             <a:pPr lvl="1"/>
             <a:r>
               <a:rPr lang="en-US" dirty="0" smtClean="0"/>
-              <a:t>Real Traffic: 1095ms to 79ms</a:t>
-            </a:r>
-            <a:endParaRPr lang="en-US" dirty="0"/>
+              <a:t>Acquires round trip and average response latency</a:t>
+            </a:r>
+          </a:p>
+          <a:p>
+            <a:pPr lvl="1"/>
+            <a:r>
+              <a:rPr lang="en-US" dirty="0" smtClean="0"/>
+              <a:t>If these sum to less than 90ms, add the node to neighbor set</a:t>
+            </a:r>
+          </a:p>
+          <a:p>
+            <a:pPr lvl="1"/>
+            <a:r>
+              <a:rPr lang="en-US" dirty="0" smtClean="0"/>
+              <a:t>Stops at 30 neighbors or increase threshold until 30 neighbors are found</a:t>
+            </a:r>
+          </a:p>
+          <a:p>
+            <a:r>
+              <a:rPr lang="en-US" dirty="0" smtClean="0"/>
+              <a:t>Liveness tested with heartbeat every 30 seconds</a:t>
+            </a:r>
+          </a:p>
+          <a:p>
+            <a:r>
+              <a:rPr lang="en-US" dirty="0" smtClean="0"/>
+              <a:t>What are the advantages over DHT peer management?</a:t>
+            </a:r>
           </a:p>
         </p:txBody>
       </p:sp>
     </p:spTree>
     <p:extLst>
       <p:ext uri="{BB962C8B-B14F-4D97-AF65-F5344CB8AC3E}">
-        <p14:creationId xmlns:p14="http://schemas.microsoft.com/office/powerpoint/2010/main" val="174329572"/>
+        <p14:creationId xmlns:p14="http://schemas.microsoft.com/office/powerpoint/2010/main" val="2567611774"/>
       </p:ext>
     </p:extLst>
   </p:cSld>
@@ -8131,16 +8198,16 @@
           <a:lstStyle/>
           <a:p>
             <a:r>
-              <a:rPr lang="en-US" sz="3200" dirty="0" smtClean="0"/>
-              <a:t>Results: One Day of Traffic</a:t>
-            </a:r>
-            <a:endParaRPr lang="en-US" sz="3200" dirty="0"/>
-          </a:p>
-        </p:txBody>
-      </p:sp>
-      <p:sp>
-        <p:nvSpPr>
-          <p:cNvPr id="8" name="Slide Number Placeholder 7"/>
+              <a:rPr lang="en-US" dirty="0" smtClean="0"/>
+              <a:t>Results</a:t>
+            </a:r>
+            <a:endParaRPr lang="en-US" dirty="0"/>
+          </a:p>
+        </p:txBody>
+      </p:sp>
+      <p:sp>
+        <p:nvSpPr>
+          <p:cNvPr id="4" name="Slide Number Placeholder 3"/>
           <p:cNvSpPr>
             <a:spLocks noGrp="1"/>
           </p:cNvSpPr>
@@ -8156,6 +8223,164 @@
             <a:fld id="{7D5018C4-273E-49AF-93AB-259FCF9A742C}" type="slidenum">
               <a:rPr lang="en-US" smtClean="0"/>
               <a:t>15</a:t>
+            </a:fld>
+            <a:endParaRPr lang="en-US"/>
+          </a:p>
+        </p:txBody>
+      </p:sp>
+      <p:sp>
+        <p:nvSpPr>
+          <p:cNvPr id="3" name="Content Placeholder 2"/>
+          <p:cNvSpPr>
+            <a:spLocks noGrp="1"/>
+          </p:cNvSpPr>
+          <p:nvPr>
+            <p:ph sz="quarter" idx="1"/>
+          </p:nvPr>
+        </p:nvSpPr>
+        <p:spPr/>
+        <p:txBody>
+          <a:bodyPr>
+            <a:normAutofit/>
+          </a:bodyPr>
+          <a:lstStyle/>
+          <a:p>
+            <a:r>
+              <a:rPr lang="en-US" dirty="0" smtClean="0"/>
+              <a:t>Overall, average responses </a:t>
+            </a:r>
+            <a:r>
+              <a:rPr lang="en-US" dirty="0" smtClean="0"/>
+              <a:t>improved </a:t>
+            </a:r>
+            <a:r>
+              <a:rPr lang="en-US" dirty="0" smtClean="0"/>
+              <a:t>16% </a:t>
+            </a:r>
+            <a:r>
+              <a:rPr lang="en-US" dirty="0" smtClean="0"/>
+              <a:t>to 75</a:t>
+            </a:r>
+            <a:r>
+              <a:rPr lang="en-US" dirty="0" smtClean="0"/>
+              <a:t>%</a:t>
+            </a:r>
+          </a:p>
+          <a:p>
+            <a:pPr lvl="1"/>
+            <a:r>
+              <a:rPr lang="en-US" dirty="0" smtClean="0"/>
+              <a:t>Host lookups: 37ms to 7ms</a:t>
+            </a:r>
+          </a:p>
+          <a:p>
+            <a:pPr lvl="1"/>
+            <a:r>
+              <a:rPr lang="en-US" dirty="0" smtClean="0"/>
+              <a:t>Real Traffic: 237ms to 84ms</a:t>
+            </a:r>
+          </a:p>
+          <a:p>
+            <a:r>
+              <a:rPr lang="en-US" dirty="0" smtClean="0"/>
+              <a:t>At Cornell, the worst performing node, average response times massively reduced:</a:t>
+            </a:r>
+          </a:p>
+          <a:p>
+            <a:pPr lvl="1"/>
+            <a:r>
+              <a:rPr lang="en-US" dirty="0" smtClean="0"/>
+              <a:t>Host lookups: 554ms to 21ms</a:t>
+            </a:r>
+          </a:p>
+          <a:p>
+            <a:pPr lvl="1"/>
+            <a:r>
+              <a:rPr lang="en-US" dirty="0" smtClean="0"/>
+              <a:t>Real Traffic: 1095ms to 79ms</a:t>
+            </a:r>
+            <a:endParaRPr lang="en-US" dirty="0"/>
+          </a:p>
+        </p:txBody>
+      </p:sp>
+    </p:spTree>
+    <p:extLst>
+      <p:ext uri="{BB962C8B-B14F-4D97-AF65-F5344CB8AC3E}">
+        <p14:creationId xmlns:p14="http://schemas.microsoft.com/office/powerpoint/2010/main" val="174329572"/>
+      </p:ext>
+    </p:extLst>
+  </p:cSld>
+  <p:clrMapOvr>
+    <a:masterClrMapping/>
+  </p:clrMapOvr>
+  <p:timing>
+    <p:tnLst>
+      <p:par>
+        <p:cTn id="1" dur="indefinite" restart="never" nodeType="tmRoot"/>
+      </p:par>
+    </p:tnLst>
+  </p:timing>
+</p:sld>
+</file>
+
+<file path=ppt/slides/slide16.xml><?xml version="1.0" encoding="utf-8"?>
+<p:sld xmlns:a="http://schemas.openxmlformats.org/drawingml/2006/main" xmlns:r="http://schemas.openxmlformats.org/officeDocument/2006/relationships" xmlns:p="http://schemas.openxmlformats.org/presentationml/2006/main">
+  <p:cSld>
+    <p:spTree>
+      <p:nvGrpSpPr>
+        <p:cNvPr id="1" name=""/>
+        <p:cNvGrpSpPr/>
+        <p:nvPr/>
+      </p:nvGrpSpPr>
+      <p:grpSpPr>
+        <a:xfrm>
+          <a:off x="0" y="0"/>
+          <a:ext cx="0" cy="0"/>
+          <a:chOff x="0" y="0"/>
+          <a:chExt cx="0" cy="0"/>
+        </a:xfrm>
+      </p:grpSpPr>
+      <p:sp>
+        <p:nvSpPr>
+          <p:cNvPr id="2" name="Title 1"/>
+          <p:cNvSpPr>
+            <a:spLocks noGrp="1"/>
+          </p:cNvSpPr>
+          <p:nvPr>
+            <p:ph type="title"/>
+          </p:nvPr>
+        </p:nvSpPr>
+        <p:spPr/>
+        <p:txBody>
+          <a:bodyPr/>
+          <a:lstStyle/>
+          <a:p>
+            <a:r>
+              <a:rPr lang="en-US" sz="3200" dirty="0" smtClean="0"/>
+              <a:t>Results: One Day of Traffic</a:t>
+            </a:r>
+            <a:endParaRPr lang="en-US" sz="3200" dirty="0"/>
+          </a:p>
+        </p:txBody>
+      </p:sp>
+      <p:sp>
+        <p:nvSpPr>
+          <p:cNvPr id="8" name="Slide Number Placeholder 7"/>
+          <p:cNvSpPr>
+            <a:spLocks noGrp="1"/>
+          </p:cNvSpPr>
+          <p:nvPr>
+            <p:ph type="sldNum" sz="quarter" idx="12"/>
+          </p:nvPr>
+        </p:nvSpPr>
+        <p:spPr/>
+        <p:txBody>
+          <a:bodyPr/>
+          <a:lstStyle/>
+          <a:p>
+            <a:fld id="{7D5018C4-273E-49AF-93AB-259FCF9A742C}" type="slidenum">
+              <a:rPr lang="en-US" smtClean="0"/>
+              <a:t>16</a:t>
             </a:fld>
             <a:endParaRPr lang="en-US"/>
           </a:p>
@@ -8296,7 +8521,7 @@
           <a:lstStyle/>
           <a:p>
             <a:r>
-              <a:rPr lang="en-US" sz="3200" dirty="0" err="1" smtClean="0"/>
+              <a:rPr lang="en-US" sz="3200" dirty="0" smtClean="0"/>
               <a:t>CoDNS</a:t>
             </a:r>
             <a:endParaRPr lang="en-US" sz="3200" dirty="0"/>
@@ -8307,180 +8532,6 @@
     <p:extLst>
       <p:ext uri="{BB962C8B-B14F-4D97-AF65-F5344CB8AC3E}">
         <p14:creationId xmlns:p14="http://schemas.microsoft.com/office/powerpoint/2010/main" val="2319043011"/>
-      </p:ext>
-    </p:extLst>
-  </p:cSld>
-  <p:clrMapOvr>
-    <a:masterClrMapping/>
-  </p:clrMapOvr>
-  <p:timing>
-    <p:tnLst>
-      <p:par>
-        <p:cTn id="1" dur="indefinite" restart="never" nodeType="tmRoot"/>
-      </p:par>
-    </p:tnLst>
-  </p:timing>
-</p:sld>
-</file>
-
-<file path=ppt/slides/slide16.xml><?xml version="1.0" encoding="utf-8"?>
-<p:sld xmlns:a="http://schemas.openxmlformats.org/drawingml/2006/main" xmlns:r="http://schemas.openxmlformats.org/officeDocument/2006/relationships" xmlns:p="http://schemas.openxmlformats.org/presentationml/2006/main">
-  <p:cSld>
-    <p:spTree>
-      <p:nvGrpSpPr>
-        <p:cNvPr id="1" name=""/>
-        <p:cNvGrpSpPr/>
-        <p:nvPr/>
-      </p:nvGrpSpPr>
-      <p:grpSpPr>
-        <a:xfrm>
-          <a:off x="0" y="0"/>
-          <a:ext cx="0" cy="0"/>
-          <a:chOff x="0" y="0"/>
-          <a:chExt cx="0" cy="0"/>
-        </a:xfrm>
-      </p:grpSpPr>
-      <p:sp>
-        <p:nvSpPr>
-          <p:cNvPr id="2" name="Title 1"/>
-          <p:cNvSpPr>
-            <a:spLocks noGrp="1"/>
-          </p:cNvSpPr>
-          <p:nvPr>
-            <p:ph type="title"/>
-          </p:nvPr>
-        </p:nvSpPr>
-        <p:spPr/>
-        <p:txBody>
-          <a:bodyPr/>
-          <a:lstStyle/>
-          <a:p>
-            <a:r>
-              <a:rPr lang="en-US" dirty="0" smtClean="0"/>
-              <a:t>Observations</a:t>
-            </a:r>
-            <a:endParaRPr lang="en-US" dirty="0"/>
-          </a:p>
-        </p:txBody>
-      </p:sp>
-      <p:sp>
-        <p:nvSpPr>
-          <p:cNvPr id="4" name="Slide Number Placeholder 3"/>
-          <p:cNvSpPr>
-            <a:spLocks noGrp="1"/>
-          </p:cNvSpPr>
-          <p:nvPr>
-            <p:ph type="sldNum" sz="quarter" idx="12"/>
-          </p:nvPr>
-        </p:nvSpPr>
-        <p:spPr/>
-        <p:txBody>
-          <a:bodyPr/>
-          <a:lstStyle/>
-          <a:p>
-            <a:fld id="{7D5018C4-273E-49AF-93AB-259FCF9A742C}" type="slidenum">
-              <a:rPr lang="en-US" smtClean="0"/>
-              <a:t>16</a:t>
-            </a:fld>
-            <a:endParaRPr lang="en-US"/>
-          </a:p>
-        </p:txBody>
-      </p:sp>
-      <p:sp>
-        <p:nvSpPr>
-          <p:cNvPr id="3" name="Content Placeholder 2"/>
-          <p:cNvSpPr>
-            <a:spLocks noGrp="1"/>
-          </p:cNvSpPr>
-          <p:nvPr>
-            <p:ph sz="quarter" idx="1"/>
-          </p:nvPr>
-        </p:nvSpPr>
-        <p:spPr/>
-        <p:txBody>
-          <a:bodyPr>
-            <a:normAutofit/>
-          </a:bodyPr>
-          <a:lstStyle/>
-          <a:p>
-            <a:pPr marL="514350" indent="-457200"/>
-            <a:r>
-              <a:rPr lang="en-US" dirty="0"/>
-              <a:t>Three observed cases where </a:t>
-            </a:r>
-            <a:r>
-              <a:rPr lang="en-US" dirty="0" err="1"/>
-              <a:t>CoDNS</a:t>
-            </a:r>
-            <a:r>
-              <a:rPr lang="en-US" dirty="0"/>
-              <a:t> doesn’t provide benefit:</a:t>
-            </a:r>
-          </a:p>
-          <a:p>
-            <a:pPr marL="914400" lvl="1" indent="-457200"/>
-            <a:r>
-              <a:rPr lang="en-US" dirty="0"/>
-              <a:t>Name does not exist</a:t>
-            </a:r>
-          </a:p>
-          <a:p>
-            <a:pPr marL="914400" lvl="1" indent="-457200"/>
-            <a:r>
-              <a:rPr lang="en-US" dirty="0"/>
-              <a:t>Local nameserver poorly gathers neighbors</a:t>
-            </a:r>
-          </a:p>
-          <a:p>
-            <a:pPr marL="914400" lvl="1" indent="-457200"/>
-            <a:r>
-              <a:rPr lang="en-US" dirty="0"/>
-              <a:t>Network prevents </a:t>
-            </a:r>
-            <a:r>
-              <a:rPr lang="en-US" dirty="0" err="1"/>
-              <a:t>CoDNS</a:t>
-            </a:r>
-            <a:r>
-              <a:rPr lang="en-US" dirty="0"/>
-              <a:t> from contacting </a:t>
-            </a:r>
-            <a:r>
-              <a:rPr lang="en-US" dirty="0" smtClean="0"/>
-              <a:t>peers</a:t>
-            </a:r>
-            <a:endParaRPr lang="en-US" dirty="0"/>
-          </a:p>
-          <a:p>
-            <a:pPr marL="514350" indent="-457200"/>
-            <a:r>
-              <a:rPr lang="en-US" dirty="0" err="1" smtClean="0"/>
-              <a:t>CoDNS</a:t>
-            </a:r>
-            <a:r>
-              <a:rPr lang="en-US" dirty="0" smtClean="0"/>
-              <a:t> uses peers for 18.9% of lookups</a:t>
-            </a:r>
-          </a:p>
-          <a:p>
-            <a:pPr marL="514350" indent="-457200"/>
-            <a:r>
-              <a:rPr lang="en-US" dirty="0" smtClean="0"/>
-              <a:t>34.6% of remote queries return faster than local lookup.</a:t>
-            </a:r>
-          </a:p>
-          <a:p>
-            <a:pPr marL="57150" indent="0">
-              <a:buNone/>
-            </a:pPr>
-            <a:endParaRPr lang="en-US" dirty="0"/>
-          </a:p>
-        </p:txBody>
-      </p:sp>
-    </p:spTree>
-    <p:extLst>
-      <p:ext uri="{BB962C8B-B14F-4D97-AF65-F5344CB8AC3E}">
-        <p14:creationId xmlns:p14="http://schemas.microsoft.com/office/powerpoint/2010/main" val="2524961252"/>
       </p:ext>
     </p:extLst>
   </p:cSld>
@@ -8531,7 +8582,7 @@
           <a:p>
             <a:r>
               <a:rPr lang="en-US" dirty="0" smtClean="0"/>
-              <a:t>Overhead</a:t>
+              <a:t>Observations</a:t>
             </a:r>
             <a:endParaRPr lang="en-US" dirty="0"/>
           </a:p>
@@ -8572,69 +8623,74 @@
         </p:nvSpPr>
         <p:spPr/>
         <p:txBody>
-          <a:bodyPr/>
-          <a:lstStyle/>
-          <a:p>
-            <a:r>
-              <a:rPr lang="en-US" dirty="0" smtClean="0"/>
-              <a:t>Extra DNS lookups: </a:t>
-            </a:r>
-          </a:p>
-          <a:p>
-            <a:pPr lvl="1"/>
-            <a:r>
-              <a:rPr lang="en-US" dirty="0" smtClean="0"/>
-              <a:t>Controllable via variable initial delay time</a:t>
-            </a:r>
-          </a:p>
-          <a:p>
-            <a:pPr lvl="1"/>
-            <a:r>
-              <a:rPr lang="en-US" dirty="0" smtClean="0"/>
-              <a:t>Naive 500ms delay adds about 10% overhead</a:t>
-            </a:r>
-          </a:p>
-          <a:p>
-            <a:pPr lvl="1"/>
-            <a:r>
-              <a:rPr lang="en-US" dirty="0" smtClean="0"/>
-              <a:t>Dynamic delay adds only 18.9%</a:t>
-            </a:r>
-          </a:p>
-          <a:p>
-            <a:r>
-              <a:rPr lang="en-US" dirty="0" smtClean="0"/>
-              <a:t>Extra Network Traffic:</a:t>
-            </a:r>
-          </a:p>
-          <a:p>
-            <a:pPr lvl="1"/>
-            <a:r>
-              <a:rPr lang="en-US" dirty="0" smtClean="0"/>
-              <a:t>Remote queries and heartbeats only account for about 520MB/day across all nodes</a:t>
-            </a:r>
-          </a:p>
-          <a:p>
-            <a:pPr lvl="1"/>
-            <a:r>
-              <a:rPr lang="en-US" dirty="0" smtClean="0"/>
-              <a:t>Only 0.3% overhead for </a:t>
-            </a:r>
-            <a:r>
-              <a:rPr lang="en-US" dirty="0" err="1" smtClean="0"/>
-              <a:t>CoDeeN</a:t>
-            </a:r>
-            <a:r>
-              <a:rPr lang="en-US" dirty="0" smtClean="0"/>
-              <a:t> workload</a:t>
-            </a:r>
+          <a:bodyPr>
+            <a:normAutofit/>
+          </a:bodyPr>
+          <a:lstStyle/>
+          <a:p>
+            <a:pPr marL="514350" indent="-457200"/>
+            <a:r>
+              <a:rPr lang="en-US" dirty="0"/>
+              <a:t>Three observed cases where CoDNS doesn’t provide benefit:</a:t>
+            </a:r>
+          </a:p>
+          <a:p>
+            <a:pPr marL="914400" lvl="1" indent="-457200"/>
+            <a:r>
+              <a:rPr lang="en-US" dirty="0"/>
+              <a:t>Name does not exist</a:t>
+            </a:r>
+          </a:p>
+          <a:p>
+            <a:pPr marL="914400" lvl="1" indent="-457200"/>
+            <a:r>
+              <a:rPr lang="en-US" dirty="0"/>
+              <a:t>Local nameserver poorly gathers neighbors</a:t>
+            </a:r>
+          </a:p>
+          <a:p>
+            <a:pPr marL="914400" lvl="1" indent="-457200"/>
+            <a:r>
+              <a:rPr lang="en-US" dirty="0"/>
+              <a:t>Network prevents CoDNS from contacting </a:t>
+            </a:r>
+            <a:r>
+              <a:rPr lang="en-US" dirty="0" smtClean="0"/>
+              <a:t>peers</a:t>
+            </a:r>
+            <a:endParaRPr lang="en-US" dirty="0"/>
+          </a:p>
+          <a:p>
+            <a:pPr marL="514350" indent="-457200"/>
+            <a:r>
+              <a:rPr lang="en-US" dirty="0" smtClean="0"/>
+              <a:t>CoDNS uses peers for 18.9% of lookups</a:t>
+            </a:r>
+          </a:p>
+          <a:p>
+            <a:pPr marL="514350" indent="-457200"/>
+            <a:r>
+              <a:rPr lang="en-US" dirty="0" smtClean="0"/>
+              <a:t>34.6% of remote queries return faster than local </a:t>
+            </a:r>
+            <a:r>
+              <a:rPr lang="en-US" dirty="0" smtClean="0"/>
+              <a:t>lookup</a:t>
+            </a:r>
+            <a:endParaRPr lang="en-US" dirty="0" smtClean="0"/>
+          </a:p>
+          <a:p>
+            <a:pPr marL="57150" indent="0">
+              <a:buNone/>
+            </a:pPr>
+            <a:endParaRPr lang="en-US" dirty="0"/>
           </a:p>
         </p:txBody>
       </p:sp>
     </p:spTree>
     <p:extLst>
       <p:ext uri="{BB962C8B-B14F-4D97-AF65-F5344CB8AC3E}">
-        <p14:creationId xmlns:p14="http://schemas.microsoft.com/office/powerpoint/2010/main" val="1098360432"/>
+        <p14:creationId xmlns:p14="http://schemas.microsoft.com/office/powerpoint/2010/main" val="2524961252"/>
       </p:ext>
     </p:extLst>
   </p:cSld>
@@ -8685,7 +8741,7 @@
           <a:p>
             <a:r>
               <a:rPr lang="en-US" dirty="0" smtClean="0"/>
-              <a:t>Questions</a:t>
+              <a:t>Overhead</a:t>
             </a:r>
             <a:endParaRPr lang="en-US" dirty="0"/>
           </a:p>
@@ -8726,46 +8782,66 @@
         </p:nvSpPr>
         <p:spPr/>
         <p:txBody>
-          <a:bodyPr>
-            <a:normAutofit/>
-          </a:bodyPr>
-          <a:lstStyle/>
-          <a:p>
-            <a:r>
-              <a:rPr lang="en-US" dirty="0" smtClean="0"/>
-              <a:t>The authors took a black box approach towards observing and working with the DNS servers, do you think a more integrated method could further improve observations or results? </a:t>
-            </a:r>
-          </a:p>
-          <a:p>
-            <a:r>
-              <a:rPr lang="en-US" dirty="0" err="1" smtClean="0"/>
-              <a:t>CoDNS</a:t>
-            </a:r>
-            <a:r>
-              <a:rPr lang="en-US" dirty="0" smtClean="0"/>
-              <a:t> proved to work remarkably well in the </a:t>
-            </a:r>
-            <a:r>
-              <a:rPr lang="en-US" dirty="0" err="1" smtClean="0"/>
-              <a:t>PlanetLab</a:t>
-            </a:r>
-            <a:r>
-              <a:rPr lang="en-US" dirty="0" smtClean="0"/>
-              <a:t> environment, would it behave comparably in a home environment?</a:t>
-            </a:r>
-          </a:p>
-          <a:p>
-            <a:r>
-              <a:rPr lang="en-US" dirty="0" smtClean="0"/>
-              <a:t>If not, where else could the architecture prove useful?</a:t>
-            </a:r>
+          <a:bodyPr/>
+          <a:lstStyle/>
+          <a:p>
+            <a:r>
+              <a:rPr lang="en-US" dirty="0" smtClean="0"/>
+              <a:t>Extra DNS lookups: </a:t>
+            </a:r>
+          </a:p>
+          <a:p>
+            <a:pPr lvl="1"/>
+            <a:r>
+              <a:rPr lang="en-US" dirty="0" smtClean="0"/>
+              <a:t>Controllable via variable initial delay time</a:t>
+            </a:r>
+          </a:p>
+          <a:p>
+            <a:pPr lvl="1"/>
+            <a:r>
+              <a:rPr lang="en-US" dirty="0" smtClean="0"/>
+              <a:t>Naive 500ms delay adds about 10% overhead</a:t>
+            </a:r>
+          </a:p>
+          <a:p>
+            <a:pPr lvl="1"/>
+            <a:r>
+              <a:rPr lang="en-US" dirty="0" smtClean="0"/>
+              <a:t>Dynamic delay adds only 18.9%</a:t>
+            </a:r>
+          </a:p>
+          <a:p>
+            <a:r>
+              <a:rPr lang="en-US" dirty="0" smtClean="0"/>
+              <a:t>Extra Network Traffic:</a:t>
+            </a:r>
+          </a:p>
+          <a:p>
+            <a:pPr lvl="1"/>
+            <a:r>
+              <a:rPr lang="en-US" dirty="0" smtClean="0"/>
+              <a:t>Remote queries and heartbeats only account for about 520MB/day across all nodes</a:t>
+            </a:r>
+          </a:p>
+          <a:p>
+            <a:pPr lvl="1"/>
+            <a:r>
+              <a:rPr lang="en-US" dirty="0" smtClean="0"/>
+              <a:t>Only 0.3% </a:t>
+            </a:r>
+            <a:r>
+              <a:rPr lang="en-US" dirty="0" smtClean="0"/>
+              <a:t>overhead</a:t>
+            </a:r>
+            <a:endParaRPr lang="en-US" dirty="0" smtClean="0"/>
           </a:p>
         </p:txBody>
       </p:sp>
     </p:spTree>
     <p:extLst>
       <p:ext uri="{BB962C8B-B14F-4D97-AF65-F5344CB8AC3E}">
-        <p14:creationId xmlns:p14="http://schemas.microsoft.com/office/powerpoint/2010/main" val="1194668466"/>
+        <p14:creationId xmlns:p14="http://schemas.microsoft.com/office/powerpoint/2010/main" val="1098360432"/>
       </p:ext>
     </p:extLst>
   </p:cSld>
@@ -8811,14 +8887,12 @@
         </p:nvSpPr>
         <p:spPr/>
         <p:txBody>
-          <a:bodyPr>
-            <a:normAutofit/>
-          </a:bodyPr>
-          <a:lstStyle/>
-          <a:p>
-            <a:r>
-              <a:rPr lang="en-US" dirty="0" smtClean="0"/>
-              <a:t>Questions (continued)</a:t>
+          <a:bodyPr/>
+          <a:lstStyle/>
+          <a:p>
+            <a:r>
+              <a:rPr lang="en-US" dirty="0" smtClean="0"/>
+              <a:t>Questions</a:t>
             </a:r>
             <a:endParaRPr lang="en-US" dirty="0"/>
           </a:p>
@@ -8859,42 +8933,45 @@
         </p:nvSpPr>
         <p:spPr/>
         <p:txBody>
-          <a:bodyPr/>
-          <a:lstStyle/>
-          <a:p>
-            <a:r>
-              <a:rPr lang="en-US" dirty="0" smtClean="0"/>
-              <a:t>It seems a surprising number of failures result from </a:t>
-            </a:r>
-            <a:r>
-              <a:rPr lang="en-US" dirty="0" err="1" smtClean="0"/>
-              <a:t>Cron</a:t>
-            </a:r>
-            <a:r>
-              <a:rPr lang="en-US" dirty="0" smtClean="0"/>
-              <a:t> jobs, should this have been a task for policy or policy enforcement?</a:t>
-            </a:r>
-          </a:p>
-          <a:p>
-            <a:r>
-              <a:rPr lang="en-US" dirty="0" smtClean="0"/>
-              <a:t>Are there any other tasks where failures dominate usage, and could benefit from knowledge gained by </a:t>
-            </a:r>
-            <a:r>
-              <a:rPr lang="en-US" dirty="0" err="1" smtClean="0"/>
-              <a:t>CoDNS</a:t>
-            </a:r>
-            <a:r>
-              <a:rPr lang="en-US" dirty="0" smtClean="0"/>
-              <a:t>?</a:t>
-            </a:r>
+          <a:bodyPr>
+            <a:normAutofit fontScale="92500" lnSpcReduction="20000"/>
+          </a:bodyPr>
+          <a:lstStyle/>
+          <a:p>
+            <a:r>
+              <a:rPr lang="en-US" dirty="0" smtClean="0"/>
+              <a:t>The CoDeeN workload has a very diverse lookup set, would you expect different behavior from a less diverse set of lookups?</a:t>
+            </a:r>
+            <a:endParaRPr lang="en-US" dirty="0" smtClean="0"/>
+          </a:p>
+          <a:p>
+            <a:r>
+              <a:rPr lang="en-US" dirty="0" smtClean="0"/>
+              <a:t>CoDNS proved to work remarkably well in the PlanetLab environment, where else could the architecture prove useful?</a:t>
+            </a:r>
+          </a:p>
+          <a:p>
+            <a:r>
+              <a:rPr lang="en-US" dirty="0"/>
+              <a:t>The authors took a black box approach towards observing and working with the DNS servers, do you think a more integrated method could further improve observations or results? </a:t>
+            </a:r>
+            <a:endParaRPr lang="en-US" dirty="0" smtClean="0"/>
+          </a:p>
+          <a:p>
+            <a:r>
+              <a:rPr lang="en-US" dirty="0" smtClean="0"/>
+              <a:t>It seems a surprising number of failures result from Cron jobs, should this have been a task for policy or policy enforcement?</a:t>
+            </a:r>
+          </a:p>
+          <a:p>
+            <a:endParaRPr lang="en-US" dirty="0" smtClean="0"/>
           </a:p>
         </p:txBody>
       </p:sp>
     </p:spTree>
     <p:extLst>
       <p:ext uri="{BB962C8B-B14F-4D97-AF65-F5344CB8AC3E}">
-        <p14:creationId xmlns:p14="http://schemas.microsoft.com/office/powerpoint/2010/main" val="3356773318"/>
+        <p14:creationId xmlns:p14="http://schemas.microsoft.com/office/powerpoint/2010/main" val="1194668466"/>
       </p:ext>
     </p:extLst>
   </p:cSld>
@@ -10556,33 +10633,25 @@
             <a:prstGeom prst="line">
               <a:avLst/>
             </a:prstGeom>
-            <a:noFill/>
-            <a:ln w="25400">
-              <a:solidFill>
-                <a:srgbClr val="00FF00"/>
-              </a:solidFill>
-              <a:round/>
+            <a:ln>
               <a:headEnd type="none" w="sm" len="sm"/>
               <a:tailEnd type="triangle" w="med" len="med"/>
             </a:ln>
-            <a:effectLst/>
-            <a:extLst>
-              <a:ext uri="{909E8E84-426E-40DD-AFC4-6F175D3DCCD1}">
-                <a14:hiddenFill xmlns:a14="http://schemas.microsoft.com/office/drawing/2010/main">
-                  <a:noFill/>
-                </a14:hiddenFill>
-              </a:ext>
-              <a:ext uri="{AF507438-7753-43E0-B8FC-AC1667EBCBE1}">
-                <a14:hiddenEffects xmlns:a14="http://schemas.microsoft.com/office/drawing/2010/main">
-                  <a:effectLst>
-                    <a:outerShdw dist="35921" dir="2700000" algn="ctr" rotWithShape="0">
-                      <a:schemeClr val="bg2"/>
-                    </a:outerShdw>
-                  </a:effectLst>
-                </a14:hiddenEffects>
-              </a:ext>
-            </a:extLst>
           </p:spPr>
+          <p:style>
+            <a:lnRef idx="3">
+              <a:schemeClr val="accent4"/>
+            </a:lnRef>
+            <a:fillRef idx="0">
+              <a:schemeClr val="accent4"/>
+            </a:fillRef>
+            <a:effectRef idx="2">
+              <a:schemeClr val="accent4"/>
+            </a:effectRef>
+            <a:fontRef idx="minor">
+              <a:schemeClr val="tx1"/>
+            </a:fontRef>
+          </p:style>
           <p:txBody>
             <a:bodyPr wrap="none" anchor="ctr"/>
             <a:lstStyle/>
@@ -10607,33 +10676,25 @@
             <a:prstGeom prst="line">
               <a:avLst/>
             </a:prstGeom>
-            <a:noFill/>
-            <a:ln w="25400">
-              <a:solidFill>
-                <a:srgbClr val="00FF00"/>
-              </a:solidFill>
-              <a:round/>
+            <a:ln>
               <a:headEnd type="none" w="sm" len="sm"/>
               <a:tailEnd type="triangle" w="med" len="med"/>
             </a:ln>
-            <a:effectLst/>
-            <a:extLst>
-              <a:ext uri="{909E8E84-426E-40DD-AFC4-6F175D3DCCD1}">
-                <a14:hiddenFill xmlns:a14="http://schemas.microsoft.com/office/drawing/2010/main">
-                  <a:noFill/>
-                </a14:hiddenFill>
-              </a:ext>
-              <a:ext uri="{AF507438-7753-43E0-B8FC-AC1667EBCBE1}">
-                <a14:hiddenEffects xmlns:a14="http://schemas.microsoft.com/office/drawing/2010/main">
-                  <a:effectLst>
-                    <a:outerShdw dist="35921" dir="2700000" algn="ctr" rotWithShape="0">
-                      <a:schemeClr val="bg2"/>
-                    </a:outerShdw>
-                  </a:effectLst>
-                </a14:hiddenEffects>
-              </a:ext>
-            </a:extLst>
           </p:spPr>
+          <p:style>
+            <a:lnRef idx="3">
+              <a:schemeClr val="accent4"/>
+            </a:lnRef>
+            <a:fillRef idx="0">
+              <a:schemeClr val="accent4"/>
+            </a:fillRef>
+            <a:effectRef idx="2">
+              <a:schemeClr val="accent4"/>
+            </a:effectRef>
+            <a:fontRef idx="minor">
+              <a:schemeClr val="tx1"/>
+            </a:fontRef>
+          </p:style>
           <p:txBody>
             <a:bodyPr wrap="none" anchor="ctr"/>
             <a:lstStyle/>
@@ -10658,33 +10719,25 @@
             <a:prstGeom prst="line">
               <a:avLst/>
             </a:prstGeom>
-            <a:noFill/>
-            <a:ln w="31750">
-              <a:solidFill>
-                <a:srgbClr val="00FF00"/>
-              </a:solidFill>
-              <a:round/>
+            <a:ln>
               <a:headEnd type="none" w="sm" len="sm"/>
               <a:tailEnd type="triangle" w="med" len="med"/>
             </a:ln>
-            <a:effectLst/>
-            <a:extLst>
-              <a:ext uri="{909E8E84-426E-40DD-AFC4-6F175D3DCCD1}">
-                <a14:hiddenFill xmlns:a14="http://schemas.microsoft.com/office/drawing/2010/main">
-                  <a:noFill/>
-                </a14:hiddenFill>
-              </a:ext>
-              <a:ext uri="{AF507438-7753-43E0-B8FC-AC1667EBCBE1}">
-                <a14:hiddenEffects xmlns:a14="http://schemas.microsoft.com/office/drawing/2010/main">
-                  <a:effectLst>
-                    <a:outerShdw dist="35921" dir="2700000" algn="ctr" rotWithShape="0">
-                      <a:schemeClr val="bg2"/>
-                    </a:outerShdw>
-                  </a:effectLst>
-                </a14:hiddenEffects>
-              </a:ext>
-            </a:extLst>
           </p:spPr>
+          <p:style>
+            <a:lnRef idx="3">
+              <a:schemeClr val="accent4"/>
+            </a:lnRef>
+            <a:fillRef idx="0">
+              <a:schemeClr val="accent4"/>
+            </a:fillRef>
+            <a:effectRef idx="2">
+              <a:schemeClr val="accent4"/>
+            </a:effectRef>
+            <a:fontRef idx="minor">
+              <a:schemeClr val="tx1"/>
+            </a:fontRef>
+          </p:style>
           <p:txBody>
             <a:bodyPr wrap="none" anchor="ctr"/>
             <a:lstStyle/>
@@ -10960,33 +11013,25 @@
             <a:prstGeom prst="line">
               <a:avLst/>
             </a:prstGeom>
-            <a:noFill/>
-            <a:ln w="25400">
-              <a:solidFill>
-                <a:srgbClr val="00FF00"/>
-              </a:solidFill>
-              <a:round/>
+            <a:ln>
               <a:headEnd type="none" w="sm" len="sm"/>
               <a:tailEnd type="triangle" w="med" len="med"/>
             </a:ln>
-            <a:effectLst/>
-            <a:extLst>
-              <a:ext uri="{909E8E84-426E-40DD-AFC4-6F175D3DCCD1}">
-                <a14:hiddenFill xmlns:a14="http://schemas.microsoft.com/office/drawing/2010/main">
-                  <a:noFill/>
-                </a14:hiddenFill>
-              </a:ext>
-              <a:ext uri="{AF507438-7753-43E0-B8FC-AC1667EBCBE1}">
-                <a14:hiddenEffects xmlns:a14="http://schemas.microsoft.com/office/drawing/2010/main">
-                  <a:effectLst>
-                    <a:outerShdw dist="35921" dir="2700000" algn="ctr" rotWithShape="0">
-                      <a:schemeClr val="bg2"/>
-                    </a:outerShdw>
-                  </a:effectLst>
-                </a14:hiddenEffects>
-              </a:ext>
-            </a:extLst>
           </p:spPr>
+          <p:style>
+            <a:lnRef idx="3">
+              <a:schemeClr val="accent4"/>
+            </a:lnRef>
+            <a:fillRef idx="0">
+              <a:schemeClr val="accent4"/>
+            </a:fillRef>
+            <a:effectRef idx="2">
+              <a:schemeClr val="accent4"/>
+            </a:effectRef>
+            <a:fontRef idx="minor">
+              <a:schemeClr val="tx1"/>
+            </a:fontRef>
+          </p:style>
           <p:txBody>
             <a:bodyPr wrap="none" anchor="ctr"/>
             <a:lstStyle/>
@@ -12747,33 +12792,25 @@
             <a:prstGeom prst="curvedConnector2">
               <a:avLst/>
             </a:prstGeom>
-            <a:noFill/>
-            <a:ln w="25400">
-              <a:solidFill>
-                <a:srgbClr val="00FF00"/>
-              </a:solidFill>
-              <a:round/>
+            <a:ln>
               <a:headEnd/>
               <a:tailEnd type="triangle" w="med" len="med"/>
             </a:ln>
-            <a:effectLst/>
-            <a:extLst>
-              <a:ext uri="{909E8E84-426E-40DD-AFC4-6F175D3DCCD1}">
-                <a14:hiddenFill xmlns:a14="http://schemas.microsoft.com/office/drawing/2010/main">
-                  <a:noFill/>
-                </a14:hiddenFill>
-              </a:ext>
-              <a:ext uri="{AF507438-7753-43E0-B8FC-AC1667EBCBE1}">
-                <a14:hiddenEffects xmlns:a14="http://schemas.microsoft.com/office/drawing/2010/main">
-                  <a:effectLst>
-                    <a:outerShdw dist="35921" dir="2700000" algn="ctr" rotWithShape="0">
-                      <a:schemeClr val="bg2"/>
-                    </a:outerShdw>
-                  </a:effectLst>
-                </a14:hiddenEffects>
-              </a:ext>
-            </a:extLst>
           </p:spPr>
+          <p:style>
+            <a:lnRef idx="3">
+              <a:schemeClr val="accent4"/>
+            </a:lnRef>
+            <a:fillRef idx="0">
+              <a:schemeClr val="accent4"/>
+            </a:fillRef>
+            <a:effectRef idx="2">
+              <a:schemeClr val="accent4"/>
+            </a:effectRef>
+            <a:fontRef idx="minor">
+              <a:schemeClr val="tx1"/>
+            </a:fontRef>
+          </p:style>
         </p:cxnSp>
         <p:pic>
           <p:nvPicPr>
@@ -13051,33 +13088,25 @@
                 <a:gd name="adj1" fmla="val -300000"/>
               </a:avLst>
             </a:prstGeom>
-            <a:noFill/>
-            <a:ln w="25400">
-              <a:solidFill>
-                <a:srgbClr val="00FF00"/>
-              </a:solidFill>
-              <a:round/>
+            <a:ln>
               <a:headEnd/>
               <a:tailEnd type="triangle" w="med" len="med"/>
             </a:ln>
-            <a:effectLst/>
-            <a:extLst>
-              <a:ext uri="{909E8E84-426E-40DD-AFC4-6F175D3DCCD1}">
-                <a14:hiddenFill xmlns:a14="http://schemas.microsoft.com/office/drawing/2010/main">
-                  <a:noFill/>
-                </a14:hiddenFill>
-              </a:ext>
-              <a:ext uri="{AF507438-7753-43E0-B8FC-AC1667EBCBE1}">
-                <a14:hiddenEffects xmlns:a14="http://schemas.microsoft.com/office/drawing/2010/main">
-                  <a:effectLst>
-                    <a:outerShdw dist="35921" dir="2700000" algn="ctr" rotWithShape="0">
-                      <a:schemeClr val="bg2"/>
-                    </a:outerShdw>
-                  </a:effectLst>
-                </a14:hiddenEffects>
-              </a:ext>
-            </a:extLst>
           </p:spPr>
+          <p:style>
+            <a:lnRef idx="3">
+              <a:schemeClr val="accent4"/>
+            </a:lnRef>
+            <a:fillRef idx="0">
+              <a:schemeClr val="accent4"/>
+            </a:fillRef>
+            <a:effectRef idx="2">
+              <a:schemeClr val="accent4"/>
+            </a:effectRef>
+            <a:fontRef idx="minor">
+              <a:schemeClr val="tx1"/>
+            </a:fontRef>
+          </p:style>
         </p:cxnSp>
         <p:cxnSp>
           <p:nvCxnSpPr>
@@ -13099,33 +13128,25 @@
                 <a:gd name="adj1" fmla="val 200000"/>
               </a:avLst>
             </a:prstGeom>
-            <a:noFill/>
-            <a:ln w="25400">
-              <a:solidFill>
-                <a:srgbClr val="00FF00"/>
-              </a:solidFill>
-              <a:round/>
+            <a:ln>
               <a:headEnd/>
               <a:tailEnd type="triangle" w="med" len="med"/>
             </a:ln>
-            <a:effectLst/>
-            <a:extLst>
-              <a:ext uri="{909E8E84-426E-40DD-AFC4-6F175D3DCCD1}">
-                <a14:hiddenFill xmlns:a14="http://schemas.microsoft.com/office/drawing/2010/main">
-                  <a:noFill/>
-                </a14:hiddenFill>
-              </a:ext>
-              <a:ext uri="{AF507438-7753-43E0-B8FC-AC1667EBCBE1}">
-                <a14:hiddenEffects xmlns:a14="http://schemas.microsoft.com/office/drawing/2010/main">
-                  <a:effectLst>
-                    <a:outerShdw dist="35921" dir="2700000" algn="ctr" rotWithShape="0">
-                      <a:schemeClr val="bg2"/>
-                    </a:outerShdw>
-                  </a:effectLst>
-                </a14:hiddenEffects>
-              </a:ext>
-            </a:extLst>
           </p:spPr>
+          <p:style>
+            <a:lnRef idx="3">
+              <a:schemeClr val="accent4"/>
+            </a:lnRef>
+            <a:fillRef idx="0">
+              <a:schemeClr val="accent4"/>
+            </a:fillRef>
+            <a:effectRef idx="2">
+              <a:schemeClr val="accent4"/>
+            </a:effectRef>
+            <a:fontRef idx="minor">
+              <a:schemeClr val="tx1"/>
+            </a:fontRef>
+          </p:style>
         </p:cxnSp>
         <p:sp>
           <p:nvSpPr>
@@ -13717,33 +13738,25 @@
                 <a:gd name="adj1" fmla="val 302815"/>
               </a:avLst>
             </a:prstGeom>
-            <a:noFill/>
-            <a:ln w="25400">
-              <a:solidFill>
-                <a:srgbClr val="00FF00"/>
-              </a:solidFill>
-              <a:round/>
+            <a:ln>
               <a:headEnd type="none" w="sm" len="sm"/>
               <a:tailEnd type="triangle" w="sm" len="sm"/>
             </a:ln>
-            <a:effectLst/>
-            <a:extLst>
-              <a:ext uri="{909E8E84-426E-40DD-AFC4-6F175D3DCCD1}">
-                <a14:hiddenFill xmlns:a14="http://schemas.microsoft.com/office/drawing/2010/main">
-                  <a:noFill/>
-                </a14:hiddenFill>
-              </a:ext>
-              <a:ext uri="{AF507438-7753-43E0-B8FC-AC1667EBCBE1}">
-                <a14:hiddenEffects xmlns:a14="http://schemas.microsoft.com/office/drawing/2010/main">
-                  <a:effectLst>
-                    <a:outerShdw dist="35921" dir="2700000" algn="ctr" rotWithShape="0">
-                      <a:schemeClr val="bg2"/>
-                    </a:outerShdw>
-                  </a:effectLst>
-                </a14:hiddenEffects>
-              </a:ext>
-            </a:extLst>
           </p:spPr>
+          <p:style>
+            <a:lnRef idx="3">
+              <a:schemeClr val="accent4"/>
+            </a:lnRef>
+            <a:fillRef idx="0">
+              <a:schemeClr val="accent4"/>
+            </a:fillRef>
+            <a:effectRef idx="2">
+              <a:schemeClr val="accent4"/>
+            </a:effectRef>
+            <a:fontRef idx="minor">
+              <a:schemeClr val="tx1"/>
+            </a:fontRef>
+          </p:style>
         </p:cxnSp>
         <p:sp>
           <p:nvSpPr>
@@ -13901,33 +13914,25 @@
                 <a:gd name="adj2" fmla="val 135556"/>
               </a:avLst>
             </a:prstGeom>
-            <a:noFill/>
-            <a:ln w="25400">
-              <a:solidFill>
-                <a:srgbClr val="00FF00"/>
-              </a:solidFill>
-              <a:round/>
+            <a:ln>
               <a:headEnd type="none" w="sm" len="sm"/>
               <a:tailEnd type="triangle" w="sm" len="sm"/>
             </a:ln>
-            <a:effectLst/>
-            <a:extLst>
-              <a:ext uri="{909E8E84-426E-40DD-AFC4-6F175D3DCCD1}">
-                <a14:hiddenFill xmlns:a14="http://schemas.microsoft.com/office/drawing/2010/main">
-                  <a:noFill/>
-                </a14:hiddenFill>
-              </a:ext>
-              <a:ext uri="{AF507438-7753-43E0-B8FC-AC1667EBCBE1}">
-                <a14:hiddenEffects xmlns:a14="http://schemas.microsoft.com/office/drawing/2010/main">
-                  <a:effectLst>
-                    <a:outerShdw dist="35921" dir="2700000" algn="ctr" rotWithShape="0">
-                      <a:schemeClr val="bg2"/>
-                    </a:outerShdw>
-                  </a:effectLst>
-                </a14:hiddenEffects>
-              </a:ext>
-            </a:extLst>
           </p:spPr>
+          <p:style>
+            <a:lnRef idx="3">
+              <a:schemeClr val="accent4"/>
+            </a:lnRef>
+            <a:fillRef idx="0">
+              <a:schemeClr val="accent4"/>
+            </a:fillRef>
+            <a:effectRef idx="2">
+              <a:schemeClr val="accent4"/>
+            </a:effectRef>
+            <a:fontRef idx="minor">
+              <a:schemeClr val="tx1"/>
+            </a:fontRef>
+          </p:style>
         </p:cxnSp>
         <p:sp>
           <p:nvSpPr>
@@ -15011,7 +15016,9 @@
         </p:nvSpPr>
         <p:spPr/>
         <p:txBody>
-          <a:bodyPr/>
+          <a:bodyPr>
+            <a:normAutofit/>
+          </a:bodyPr>
           <a:lstStyle/>
           <a:p>
             <a:r>
@@ -15219,10 +15226,9 @@
           <a:lstStyle/>
           <a:p>
             <a:r>
-              <a:rPr lang="en-US" dirty="0" err="1" smtClean="0"/>
+              <a:rPr lang="en-US" dirty="0" smtClean="0"/>
               <a:t>CoDNS</a:t>
             </a:r>
-            <a:endParaRPr lang="en-US" dirty="0" smtClean="0"/>
           </a:p>
           <a:p>
             <a:pPr lvl="1"/>
@@ -17108,33 +17114,25 @@
             <a:prstGeom prst="curvedConnector2">
               <a:avLst/>
             </a:prstGeom>
-            <a:noFill/>
-            <a:ln w="25400">
-              <a:solidFill>
-                <a:srgbClr val="00FF00"/>
-              </a:solidFill>
-              <a:round/>
+            <a:ln>
               <a:headEnd/>
               <a:tailEnd type="triangle" w="med" len="med"/>
             </a:ln>
-            <a:effectLst/>
-            <a:extLst>
-              <a:ext uri="{909E8E84-426E-40DD-AFC4-6F175D3DCCD1}">
-                <a14:hiddenFill xmlns:a14="http://schemas.microsoft.com/office/drawing/2010/main">
-                  <a:noFill/>
-                </a14:hiddenFill>
-              </a:ext>
-              <a:ext uri="{AF507438-7753-43E0-B8FC-AC1667EBCBE1}">
-                <a14:hiddenEffects xmlns:a14="http://schemas.microsoft.com/office/drawing/2010/main">
-                  <a:effectLst>
-                    <a:outerShdw dist="35921" dir="2700000" algn="ctr" rotWithShape="0">
-                      <a:schemeClr val="bg2"/>
-                    </a:outerShdw>
-                  </a:effectLst>
-                </a14:hiddenEffects>
-              </a:ext>
-            </a:extLst>
           </p:spPr>
+          <p:style>
+            <a:lnRef idx="3">
+              <a:schemeClr val="accent5"/>
+            </a:lnRef>
+            <a:fillRef idx="0">
+              <a:schemeClr val="accent5"/>
+            </a:fillRef>
+            <a:effectRef idx="2">
+              <a:schemeClr val="accent5"/>
+            </a:effectRef>
+            <a:fontRef idx="minor">
+              <a:schemeClr val="tx1"/>
+            </a:fontRef>
+          </p:style>
         </p:cxnSp>
         <p:pic>
           <p:nvPicPr>
@@ -17412,33 +17410,25 @@
                 <a:gd name="adj1" fmla="val -150000"/>
               </a:avLst>
             </a:prstGeom>
-            <a:noFill/>
-            <a:ln w="25400">
-              <a:solidFill>
-                <a:srgbClr val="00FF00"/>
-              </a:solidFill>
-              <a:round/>
+            <a:ln>
               <a:headEnd/>
               <a:tailEnd type="triangle" w="med" len="med"/>
             </a:ln>
-            <a:effectLst/>
-            <a:extLst>
-              <a:ext uri="{909E8E84-426E-40DD-AFC4-6F175D3DCCD1}">
-                <a14:hiddenFill xmlns:a14="http://schemas.microsoft.com/office/drawing/2010/main">
-                  <a:noFill/>
-                </a14:hiddenFill>
-              </a:ext>
-              <a:ext uri="{AF507438-7753-43E0-B8FC-AC1667EBCBE1}">
-                <a14:hiddenEffects xmlns:a14="http://schemas.microsoft.com/office/drawing/2010/main">
-                  <a:effectLst>
-                    <a:outerShdw dist="35921" dir="2700000" algn="ctr" rotWithShape="0">
-                      <a:schemeClr val="bg2"/>
-                    </a:outerShdw>
-                  </a:effectLst>
-                </a14:hiddenEffects>
-              </a:ext>
-            </a:extLst>
           </p:spPr>
+          <p:style>
+            <a:lnRef idx="3">
+              <a:schemeClr val="accent5"/>
+            </a:lnRef>
+            <a:fillRef idx="0">
+              <a:schemeClr val="accent5"/>
+            </a:fillRef>
+            <a:effectRef idx="2">
+              <a:schemeClr val="accent5"/>
+            </a:effectRef>
+            <a:fontRef idx="minor">
+              <a:schemeClr val="tx1"/>
+            </a:fontRef>
+          </p:style>
         </p:cxnSp>
         <p:cxnSp>
           <p:nvCxnSpPr>
@@ -17460,33 +17450,25 @@
                 <a:gd name="adj1" fmla="val 175000"/>
               </a:avLst>
             </a:prstGeom>
-            <a:noFill/>
-            <a:ln w="25400">
-              <a:solidFill>
-                <a:srgbClr val="00FF00"/>
-              </a:solidFill>
-              <a:round/>
+            <a:ln>
               <a:headEnd/>
               <a:tailEnd type="triangle" w="med" len="med"/>
             </a:ln>
-            <a:effectLst/>
-            <a:extLst>
-              <a:ext uri="{909E8E84-426E-40DD-AFC4-6F175D3DCCD1}">
-                <a14:hiddenFill xmlns:a14="http://schemas.microsoft.com/office/drawing/2010/main">
-                  <a:noFill/>
-                </a14:hiddenFill>
-              </a:ext>
-              <a:ext uri="{AF507438-7753-43E0-B8FC-AC1667EBCBE1}">
-                <a14:hiddenEffects xmlns:a14="http://schemas.microsoft.com/office/drawing/2010/main">
-                  <a:effectLst>
-                    <a:outerShdw dist="35921" dir="2700000" algn="ctr" rotWithShape="0">
-                      <a:schemeClr val="bg2"/>
-                    </a:outerShdw>
-                  </a:effectLst>
-                </a14:hiddenEffects>
-              </a:ext>
-            </a:extLst>
           </p:spPr>
+          <p:style>
+            <a:lnRef idx="3">
+              <a:schemeClr val="accent5"/>
+            </a:lnRef>
+            <a:fillRef idx="0">
+              <a:schemeClr val="accent5"/>
+            </a:fillRef>
+            <a:effectRef idx="2">
+              <a:schemeClr val="accent5"/>
+            </a:effectRef>
+            <a:fontRef idx="minor">
+              <a:schemeClr val="tx1"/>
+            </a:fontRef>
+          </p:style>
         </p:cxnSp>
         <p:cxnSp>
           <p:nvCxnSpPr>
@@ -17508,33 +17490,25 @@
                 <a:gd name="adj1" fmla="val 200000"/>
               </a:avLst>
             </a:prstGeom>
-            <a:noFill/>
-            <a:ln w="25400">
-              <a:solidFill>
-                <a:srgbClr val="00FF00"/>
-              </a:solidFill>
-              <a:round/>
+            <a:ln>
               <a:headEnd/>
               <a:tailEnd type="triangle" w="med" len="med"/>
             </a:ln>
-            <a:effectLst/>
-            <a:extLst>
-              <a:ext uri="{909E8E84-426E-40DD-AFC4-6F175D3DCCD1}">
-                <a14:hiddenFill xmlns:a14="http://schemas.microsoft.com/office/drawing/2010/main">
-                  <a:noFill/>
-                </a14:hiddenFill>
-              </a:ext>
-              <a:ext uri="{AF507438-7753-43E0-B8FC-AC1667EBCBE1}">
-                <a14:hiddenEffects xmlns:a14="http://schemas.microsoft.com/office/drawing/2010/main">
-                  <a:effectLst>
-                    <a:outerShdw dist="35921" dir="2700000" algn="ctr" rotWithShape="0">
-                      <a:schemeClr val="bg2"/>
-                    </a:outerShdw>
-                  </a:effectLst>
-                </a14:hiddenEffects>
-              </a:ext>
-            </a:extLst>
           </p:spPr>
+          <p:style>
+            <a:lnRef idx="3">
+              <a:schemeClr val="accent5"/>
+            </a:lnRef>
+            <a:fillRef idx="0">
+              <a:schemeClr val="accent5"/>
+            </a:fillRef>
+            <a:effectRef idx="2">
+              <a:schemeClr val="accent5"/>
+            </a:effectRef>
+            <a:fontRef idx="minor">
+              <a:schemeClr val="tx1"/>
+            </a:fontRef>
+          </p:style>
         </p:cxnSp>
         <p:cxnSp>
           <p:nvCxnSpPr>
@@ -17557,33 +17531,25 @@
                 <a:gd name="adj2" fmla="val 130250"/>
               </a:avLst>
             </a:prstGeom>
-            <a:noFill/>
-            <a:ln w="25400">
-              <a:solidFill>
-                <a:srgbClr val="00FF00"/>
-              </a:solidFill>
-              <a:round/>
+            <a:ln>
               <a:headEnd/>
               <a:tailEnd type="triangle" w="med" len="med"/>
             </a:ln>
-            <a:effectLst/>
-            <a:extLst>
-              <a:ext uri="{909E8E84-426E-40DD-AFC4-6F175D3DCCD1}">
-                <a14:hiddenFill xmlns:a14="http://schemas.microsoft.com/office/drawing/2010/main">
-                  <a:noFill/>
-                </a14:hiddenFill>
-              </a:ext>
-              <a:ext uri="{AF507438-7753-43E0-B8FC-AC1667EBCBE1}">
-                <a14:hiddenEffects xmlns:a14="http://schemas.microsoft.com/office/drawing/2010/main">
-                  <a:effectLst>
-                    <a:outerShdw dist="35921" dir="2700000" algn="ctr" rotWithShape="0">
-                      <a:schemeClr val="bg2"/>
-                    </a:outerShdw>
-                  </a:effectLst>
-                </a14:hiddenEffects>
-              </a:ext>
-            </a:extLst>
           </p:spPr>
+          <p:style>
+            <a:lnRef idx="3">
+              <a:schemeClr val="accent5"/>
+            </a:lnRef>
+            <a:fillRef idx="0">
+              <a:schemeClr val="accent5"/>
+            </a:fillRef>
+            <a:effectRef idx="2">
+              <a:schemeClr val="accent5"/>
+            </a:effectRef>
+            <a:fontRef idx="minor">
+              <a:schemeClr val="tx1"/>
+            </a:fontRef>
+          </p:style>
         </p:cxnSp>
         <p:cxnSp>
           <p:nvCxnSpPr>
@@ -17605,33 +17571,25 @@
                 <a:gd name="adj1" fmla="val -50000"/>
               </a:avLst>
             </a:prstGeom>
-            <a:noFill/>
-            <a:ln w="25400">
-              <a:solidFill>
-                <a:srgbClr val="00FF00"/>
-              </a:solidFill>
-              <a:round/>
+            <a:ln>
               <a:headEnd/>
               <a:tailEnd type="triangle" w="med" len="med"/>
             </a:ln>
-            <a:effectLst/>
-            <a:extLst>
-              <a:ext uri="{909E8E84-426E-40DD-AFC4-6F175D3DCCD1}">
-                <a14:hiddenFill xmlns:a14="http://schemas.microsoft.com/office/drawing/2010/main">
-                  <a:noFill/>
-                </a14:hiddenFill>
-              </a:ext>
-              <a:ext uri="{AF507438-7753-43E0-B8FC-AC1667EBCBE1}">
-                <a14:hiddenEffects xmlns:a14="http://schemas.microsoft.com/office/drawing/2010/main">
-                  <a:effectLst>
-                    <a:outerShdw dist="35921" dir="2700000" algn="ctr" rotWithShape="0">
-                      <a:schemeClr val="bg2"/>
-                    </a:outerShdw>
-                  </a:effectLst>
-                </a14:hiddenEffects>
-              </a:ext>
-            </a:extLst>
           </p:spPr>
+          <p:style>
+            <a:lnRef idx="3">
+              <a:schemeClr val="accent5"/>
+            </a:lnRef>
+            <a:fillRef idx="0">
+              <a:schemeClr val="accent5"/>
+            </a:fillRef>
+            <a:effectRef idx="2">
+              <a:schemeClr val="accent5"/>
+            </a:effectRef>
+            <a:fontRef idx="minor">
+              <a:schemeClr val="tx1"/>
+            </a:fontRef>
+          </p:style>
         </p:cxnSp>
         <p:sp>
           <p:nvSpPr>
@@ -19660,13 +19618,8 @@
             <a:pPr lvl="0"/>
             <a:r>
               <a:rPr lang="en-US" dirty="0" smtClean="0"/>
-              <a:t>When </a:t>
-            </a:r>
-            <a:r>
-              <a:rPr lang="en-US" smtClean="0"/>
-              <a:t>to divert?</a:t>
-            </a:r>
-            <a:endParaRPr lang="en-US" dirty="0" smtClean="0"/>
+              <a:t>When to divert?</a:t>
+            </a:r>
           </a:p>
           <a:p>
             <a:pPr lvl="1"/>
@@ -21754,36 +21707,6 @@
           </a:fontRef>
         </p:style>
       </p:cxnSp>
-      <p:sp>
-        <p:nvSpPr>
-          <p:cNvPr id="41" name="TextBox 40"/>
-          <p:cNvSpPr txBox="1"/>
-          <p:nvPr/>
-        </p:nvSpPr>
-        <p:spPr>
-          <a:xfrm>
-            <a:off x="5486400" y="6248400"/>
-            <a:ext cx="813043" cy="369332"/>
-          </a:xfrm>
-          <a:prstGeom prst="rect">
-            <a:avLst/>
-          </a:prstGeom>
-          <a:noFill/>
-        </p:spPr>
-        <p:txBody>
-          <a:bodyPr wrap="none" rtlCol="0">
-            <a:spAutoFit/>
-          </a:bodyPr>
-          <a:lstStyle/>
-          <a:p>
-            <a:r>
-              <a:rPr lang="en-US" dirty="0" smtClean="0"/>
-              <a:t>…and </a:t>
-            </a:r>
-            <a:endParaRPr lang="en-US" dirty="0"/>
-          </a:p>
-        </p:txBody>
-      </p:sp>
     </p:spTree>
     <p:extLst>
       <p:ext uri="{BB962C8B-B14F-4D97-AF65-F5344CB8AC3E}">
@@ -22612,7 +22535,7 @@
           <a:lstStyle/>
           <a:p>
             <a:r>
-              <a:rPr lang="en-US" dirty="0" err="1" smtClean="0"/>
+              <a:rPr lang="en-US" dirty="0" smtClean="0"/>
               <a:t>CoDNS</a:t>
             </a:r>
             <a:endParaRPr lang="en-US" dirty="0"/>
@@ -22909,88 +22832,15 @@
           </a:p>
         </p:txBody>
       </p:sp>
-      <p:sp>
-        <p:nvSpPr>
-          <p:cNvPr id="5" name="Text Placeholder 4"/>
-          <p:cNvSpPr>
-            <a:spLocks noGrp="1"/>
-          </p:cNvSpPr>
-          <p:nvPr>
-            <p:ph type="body" idx="4294967295"/>
-          </p:nvPr>
-        </p:nvSpPr>
-        <p:spPr>
-          <a:xfrm>
-            <a:off x="76200" y="3743325"/>
-            <a:ext cx="8534400" cy="1752600"/>
-          </a:xfrm>
-        </p:spPr>
-        <p:txBody>
-          <a:bodyPr>
-            <a:normAutofit fontScale="92500" lnSpcReduction="20000"/>
-          </a:bodyPr>
-          <a:lstStyle/>
-          <a:p>
-            <a:pPr marL="274320" lvl="1" indent="0">
-              <a:buNone/>
-            </a:pPr>
-            <a:r>
-              <a:rPr lang="en-US" dirty="0"/>
-              <a:t>	</a:t>
-            </a:r>
-            <a:endParaRPr lang="en-US" dirty="0" smtClean="0"/>
-          </a:p>
-          <a:p>
-            <a:r>
-              <a:rPr lang="en-US" dirty="0" smtClean="0"/>
-              <a:t>As </a:t>
-            </a:r>
-            <a:r>
-              <a:rPr lang="en-US" dirty="0" err="1" smtClean="0"/>
-              <a:t>t_pri</a:t>
-            </a:r>
-            <a:r>
-              <a:rPr lang="en-US" dirty="0" smtClean="0"/>
-              <a:t> increases:</a:t>
-            </a:r>
-          </a:p>
-          <a:p>
-            <a:pPr lvl="1"/>
-            <a:r>
-              <a:rPr lang="en-US" dirty="0" smtClean="0"/>
-              <a:t>More </a:t>
-            </a:r>
-            <a:r>
-              <a:rPr lang="en-US" dirty="0"/>
-              <a:t>utilization</a:t>
-            </a:r>
-          </a:p>
-          <a:p>
-            <a:pPr lvl="1"/>
-            <a:r>
-              <a:rPr lang="en-US" dirty="0"/>
-              <a:t>More failures</a:t>
-            </a:r>
-          </a:p>
-          <a:p>
-            <a:pPr lvl="1"/>
-            <a:r>
-              <a:rPr lang="en-US" dirty="0"/>
-              <a:t>Why?</a:t>
-            </a:r>
-          </a:p>
-          <a:p>
-            <a:endParaRPr lang="en-US" baseline="0" dirty="0" smtClean="0"/>
-          </a:p>
-        </p:txBody>
-      </p:sp>
       <p:pic>
         <p:nvPicPr>
-          <p:cNvPr id="2052" name="Picture 4"/>
+          <p:cNvPr id="2050" name="Picture 2"/>
           <p:cNvPicPr>
-            <a:picLocks noChangeAspect="1" noChangeArrowheads="1"/>
+            <a:picLocks noGrp="1" noChangeAspect="1" noChangeArrowheads="1"/>
           </p:cNvPicPr>
-          <p:nvPr/>
+          <p:nvPr>
+            <p:ph sz="quarter" idx="1"/>
+          </p:nvPr>
         </p:nvPicPr>
         <p:blipFill>
           <a:blip r:embed="rId3">
@@ -23007,8 +22857,8 @@
         </p:blipFill>
         <p:spPr bwMode="auto">
           <a:xfrm>
-            <a:off x="4584290" y="2743200"/>
-            <a:ext cx="4429125" cy="3752850"/>
+            <a:off x="228600" y="1447800"/>
+            <a:ext cx="4648200" cy="1971675"/>
           </a:xfrm>
           <a:prstGeom prst="rect">
             <a:avLst/>
@@ -23048,15 +22898,88 @@
           </a:extLst>
         </p:spPr>
       </p:pic>
+      <p:sp>
+        <p:nvSpPr>
+          <p:cNvPr id="5" name="Text Placeholder 4"/>
+          <p:cNvSpPr>
+            <a:spLocks noGrp="1"/>
+          </p:cNvSpPr>
+          <p:nvPr>
+            <p:ph type="body" idx="4294967295"/>
+          </p:nvPr>
+        </p:nvSpPr>
+        <p:spPr>
+          <a:xfrm>
+            <a:off x="0" y="3743325"/>
+            <a:ext cx="8534400" cy="1752600"/>
+          </a:xfrm>
+        </p:spPr>
+        <p:txBody>
+          <a:bodyPr>
+            <a:normAutofit fontScale="92500" lnSpcReduction="20000"/>
+          </a:bodyPr>
+          <a:lstStyle/>
+          <a:p>
+            <a:pPr marL="274320" lvl="1" indent="0">
+              <a:buNone/>
+            </a:pPr>
+            <a:r>
+              <a:rPr lang="en-US" dirty="0"/>
+              <a:t>	</a:t>
+            </a:r>
+            <a:endParaRPr lang="en-US" dirty="0" smtClean="0"/>
+          </a:p>
+          <a:p>
+            <a:r>
+              <a:rPr lang="en-US" dirty="0" smtClean="0"/>
+              <a:t>As </a:t>
+            </a:r>
+            <a:r>
+              <a:rPr lang="en-US" dirty="0" err="1" smtClean="0"/>
+              <a:t>t_pri</a:t>
+            </a:r>
+            <a:r>
+              <a:rPr lang="en-US" dirty="0" smtClean="0"/>
+              <a:t> increases:</a:t>
+            </a:r>
+          </a:p>
+          <a:p>
+            <a:pPr lvl="1"/>
+            <a:r>
+              <a:rPr lang="en-US" dirty="0" smtClean="0"/>
+              <a:t>More </a:t>
+            </a:r>
+            <a:r>
+              <a:rPr lang="en-US" dirty="0"/>
+              <a:t>utilization</a:t>
+            </a:r>
+          </a:p>
+          <a:p>
+            <a:pPr lvl="1"/>
+            <a:r>
+              <a:rPr lang="en-US" dirty="0"/>
+              <a:t>More failures</a:t>
+            </a:r>
+          </a:p>
+          <a:p>
+            <a:pPr lvl="1"/>
+            <a:r>
+              <a:rPr lang="en-US" dirty="0"/>
+              <a:t>Why?</a:t>
+            </a:r>
+          </a:p>
+          <a:p>
+            <a:endParaRPr lang="en-US" baseline="0" dirty="0" smtClean="0"/>
+          </a:p>
+        </p:txBody>
+      </p:sp>
       <p:pic>
         <p:nvPicPr>
-          <p:cNvPr id="2050" name="Picture 2"/>
+          <p:cNvPr id="2052" name="Picture 4"/>
           <p:cNvPicPr>
-            <a:picLocks noGrp="1" noChangeAspect="1" noChangeArrowheads="1"/>
+            <a:picLocks noChangeAspect="1" noChangeArrowheads="1"/>
           </p:cNvPicPr>
-          <p:nvPr>
-            <p:ph sz="quarter" idx="1"/>
-          </p:nvPr>
+          <p:nvPr/>
         </p:nvPicPr>
         <p:blipFill>
           <a:blip r:embed="rId4">
@@ -23073,8 +22996,8 @@
         </p:blipFill>
         <p:spPr bwMode="auto">
           <a:xfrm>
-            <a:off x="228600" y="1447800"/>
-            <a:ext cx="4648200" cy="1971675"/>
+            <a:off x="4584290" y="2743200"/>
+            <a:ext cx="4429125" cy="3752850"/>
           </a:xfrm>
           <a:prstGeom prst="rect">
             <a:avLst/>
@@ -23197,280 +23120,6 @@
           </a:p>
         </p:txBody>
       </p:sp>
-      <p:pic>
-        <p:nvPicPr>
-          <p:cNvPr id="3075" name="Picture 3"/>
-          <p:cNvPicPr>
-            <a:picLocks noChangeAspect="1" noChangeArrowheads="1"/>
-          </p:cNvPicPr>
-          <p:nvPr/>
-        </p:nvPicPr>
-        <p:blipFill>
-          <a:blip r:embed="rId2">
-            <a:extLst>
-              <a:ext uri="{28A0092B-C50C-407E-A947-70E740481C1C}">
-                <a14:useLocalDpi xmlns:a14="http://schemas.microsoft.com/office/drawing/2010/main" val="0"/>
-              </a:ext>
-            </a:extLst>
-          </a:blip>
-          <a:srcRect/>
-          <a:stretch>
-            <a:fillRect/>
-          </a:stretch>
-        </p:blipFill>
-        <p:spPr bwMode="auto">
-          <a:xfrm>
-            <a:off x="4572000" y="2971800"/>
-            <a:ext cx="4467225" cy="3686175"/>
-          </a:xfrm>
-          <a:prstGeom prst="rect">
-            <a:avLst/>
-          </a:prstGeom>
-          <a:noFill/>
-          <a:ln>
-            <a:noFill/>
-          </a:ln>
-          <a:effectLst/>
-          <a:extLst>
-            <a:ext uri="{909E8E84-426E-40DD-AFC4-6F175D3DCCD1}">
-              <a14:hiddenFill xmlns:a14="http://schemas.microsoft.com/office/drawing/2010/main">
-                <a:solidFill>
-                  <a:schemeClr val="accent1"/>
-                </a:solidFill>
-              </a14:hiddenFill>
-            </a:ext>
-            <a:ext uri="{91240B29-F687-4F45-9708-019B960494DF}">
-              <a14:hiddenLine xmlns:a14="http://schemas.microsoft.com/office/drawing/2010/main" w="9525">
-                <a:solidFill>
-                  <a:schemeClr val="tx1"/>
-                </a:solidFill>
-                <a:miter lim="800000"/>
-                <a:headEnd/>
-                <a:tailEnd/>
-              </a14:hiddenLine>
-            </a:ext>
-            <a:ext uri="{AF507438-7753-43E0-B8FC-AC1667EBCBE1}">
-              <a14:hiddenEffects xmlns:a14="http://schemas.microsoft.com/office/drawing/2010/main">
-                <a:effectLst>
-                  <a:outerShdw dist="35921" dir="2700000" algn="ctr" rotWithShape="0">
-                    <a:schemeClr val="bg2"/>
-                  </a:outerShdw>
-                </a:effectLst>
-              </a14:hiddenEffects>
-            </a:ext>
-          </a:extLst>
-        </p:spPr>
-      </p:pic>
-      <p:pic>
-        <p:nvPicPr>
-          <p:cNvPr id="3074" name="Picture 2"/>
-          <p:cNvPicPr>
-            <a:picLocks noGrp="1" noChangeAspect="1" noChangeArrowheads="1"/>
-          </p:cNvPicPr>
-          <p:nvPr>
-            <p:ph sz="quarter" idx="1"/>
-          </p:nvPr>
-        </p:nvPicPr>
-        <p:blipFill>
-          <a:blip r:embed="rId3">
-            <a:extLst>
-              <a:ext uri="{28A0092B-C50C-407E-A947-70E740481C1C}">
-                <a14:useLocalDpi xmlns:a14="http://schemas.microsoft.com/office/drawing/2010/main" val="0"/>
-              </a:ext>
-            </a:extLst>
-          </a:blip>
-          <a:srcRect/>
-          <a:stretch>
-            <a:fillRect/>
-          </a:stretch>
-        </p:blipFill>
-        <p:spPr bwMode="auto">
-          <a:xfrm>
-            <a:off x="304800" y="1524000"/>
-            <a:ext cx="4552950" cy="2038350"/>
-          </a:xfrm>
-          <a:prstGeom prst="rect">
-            <a:avLst/>
-          </a:prstGeom>
-          <a:noFill/>
-          <a:ln>
-            <a:noFill/>
-          </a:ln>
-          <a:effectLst/>
-          <a:extLst>
-            <a:ext uri="{909E8E84-426E-40DD-AFC4-6F175D3DCCD1}">
-              <a14:hiddenFill xmlns:a14="http://schemas.microsoft.com/office/drawing/2010/main">
-                <a:solidFill>
-                  <a:schemeClr val="accent1"/>
-                </a:solidFill>
-              </a14:hiddenFill>
-            </a:ext>
-            <a:ext uri="{91240B29-F687-4F45-9708-019B960494DF}">
-              <a14:hiddenLine xmlns:a14="http://schemas.microsoft.com/office/drawing/2010/main" w="9525">
-                <a:solidFill>
-                  <a:schemeClr val="tx1"/>
-                </a:solidFill>
-                <a:miter lim="800000"/>
-                <a:headEnd/>
-                <a:tailEnd/>
-              </a14:hiddenLine>
-            </a:ext>
-            <a:ext uri="{AF507438-7753-43E0-B8FC-AC1667EBCBE1}">
-              <a14:hiddenEffects xmlns:a14="http://schemas.microsoft.com/office/drawing/2010/main">
-                <a:effectLst>
-                  <a:outerShdw dist="35921" dir="2700000" algn="ctr" rotWithShape="0">
-                    <a:schemeClr val="bg2"/>
-                  </a:outerShdw>
-                </a:effectLst>
-              </a14:hiddenEffects>
-            </a:ext>
-          </a:extLst>
-        </p:spPr>
-      </p:pic>
-      <p:sp>
-        <p:nvSpPr>
-          <p:cNvPr id="5" name="Text Placeholder 4"/>
-          <p:cNvSpPr>
-            <a:spLocks noGrp="1"/>
-          </p:cNvSpPr>
-          <p:nvPr>
-            <p:ph type="body" idx="4294967295"/>
-          </p:nvPr>
-        </p:nvSpPr>
-        <p:spPr>
-          <a:xfrm>
-            <a:off x="304800" y="3657600"/>
-            <a:ext cx="4191000" cy="2878787"/>
-          </a:xfrm>
-        </p:spPr>
-        <p:txBody>
-          <a:bodyPr/>
-          <a:lstStyle/>
-          <a:p>
-            <a:r>
-              <a:rPr lang="en-US" dirty="0" smtClean="0"/>
-              <a:t>As</a:t>
-            </a:r>
-            <a:r>
-              <a:rPr lang="en-US" baseline="0" dirty="0" smtClean="0"/>
-              <a:t> </a:t>
-            </a:r>
-            <a:r>
-              <a:rPr lang="en-US" baseline="0" dirty="0" err="1" smtClean="0"/>
-              <a:t>t_div</a:t>
-            </a:r>
-            <a:r>
-              <a:rPr lang="en-US" baseline="0" dirty="0" smtClean="0"/>
-              <a:t> increases:</a:t>
-            </a:r>
-          </a:p>
-          <a:p>
-            <a:pPr lvl="1"/>
-            <a:r>
-              <a:rPr lang="en-US" dirty="0" smtClean="0"/>
-              <a:t>More failures</a:t>
-            </a:r>
-          </a:p>
-          <a:p>
-            <a:pPr lvl="1"/>
-            <a:r>
-              <a:rPr lang="en-US" dirty="0" smtClean="0"/>
-              <a:t>More utilization</a:t>
-            </a:r>
-          </a:p>
-          <a:p>
-            <a:pPr lvl="1"/>
-            <a:r>
-              <a:rPr lang="en-US" dirty="0" smtClean="0"/>
-              <a:t>Why?</a:t>
-            </a:r>
-            <a:endParaRPr lang="en-US" dirty="0"/>
-          </a:p>
-        </p:txBody>
-      </p:sp>
-    </p:spTree>
-    <p:extLst>
-      <p:ext uri="{BB962C8B-B14F-4D97-AF65-F5344CB8AC3E}">
-        <p14:creationId xmlns:p14="http://schemas.microsoft.com/office/powerpoint/2010/main" val="2602111604"/>
-      </p:ext>
-    </p:extLst>
-  </p:cSld>
-  <p:clrMapOvr>
-    <a:masterClrMapping/>
-  </p:clrMapOvr>
-  <p:timing>
-    <p:tnLst>
-      <p:par>
-        <p:cTn id="1" dur="indefinite" restart="never" nodeType="tmRoot"/>
-      </p:par>
-    </p:tnLst>
-  </p:timing>
-</p:sld>
-</file>
-
-<file path=ppt/slides/slide43.xml><?xml version="1.0" encoding="utf-8"?>
-<p:sld xmlns:a="http://schemas.openxmlformats.org/drawingml/2006/main" xmlns:r="http://schemas.openxmlformats.org/officeDocument/2006/relationships" xmlns:p="http://schemas.openxmlformats.org/presentationml/2006/main">
-  <p:cSld>
-    <p:spTree>
-      <p:nvGrpSpPr>
-        <p:cNvPr id="1" name=""/>
-        <p:cNvGrpSpPr/>
-        <p:nvPr/>
-      </p:nvGrpSpPr>
-      <p:grpSpPr>
-        <a:xfrm>
-          <a:off x="0" y="0"/>
-          <a:ext cx="0" cy="0"/>
-          <a:chOff x="0" y="0"/>
-          <a:chExt cx="0" cy="0"/>
-        </a:xfrm>
-      </p:grpSpPr>
-      <p:sp>
-        <p:nvSpPr>
-          <p:cNvPr id="2" name="Title 1"/>
-          <p:cNvSpPr>
-            <a:spLocks noGrp="1"/>
-          </p:cNvSpPr>
-          <p:nvPr>
-            <p:ph type="title"/>
-          </p:nvPr>
-        </p:nvSpPr>
-        <p:spPr/>
-        <p:txBody>
-          <a:bodyPr/>
-          <a:lstStyle/>
-          <a:p>
-            <a:r>
-              <a:rPr lang="en-US" dirty="0" smtClean="0"/>
-              <a:t>Evaluation (3)</a:t>
-            </a:r>
-            <a:endParaRPr lang="en-US" dirty="0"/>
-          </a:p>
-        </p:txBody>
-      </p:sp>
-      <p:sp>
-        <p:nvSpPr>
-          <p:cNvPr id="3" name="Slide Number Placeholder 2"/>
-          <p:cNvSpPr>
-            <a:spLocks noGrp="1"/>
-          </p:cNvSpPr>
-          <p:nvPr>
-            <p:ph type="sldNum" sz="quarter" idx="12"/>
-          </p:nvPr>
-        </p:nvSpPr>
-        <p:spPr/>
-        <p:txBody>
-          <a:bodyPr/>
-          <a:lstStyle/>
-          <a:p>
-            <a:fld id="{7D5018C4-273E-49AF-93AB-259FCF9A742C}" type="slidenum">
-              <a:rPr lang="en-US" smtClean="0"/>
-              <a:t>43</a:t>
-            </a:fld>
-            <a:endParaRPr lang="en-US"/>
-          </a:p>
-        </p:txBody>
-      </p:sp>
       <p:sp>
         <p:nvSpPr>
           <p:cNvPr id="4" name="Content Placeholder 3"/>
@@ -23638,7 +23287,7 @@
 </p:sld>
 </file>
 
-<file path=ppt/slides/slide44.xml><?xml version="1.0" encoding="utf-8"?>
+<file path=ppt/slides/slide43.xml><?xml version="1.0" encoding="utf-8"?>
 <p:sld xmlns:a="http://schemas.openxmlformats.org/drawingml/2006/main" xmlns:r="http://schemas.openxmlformats.org/officeDocument/2006/relationships" xmlns:p="http://schemas.openxmlformats.org/presentationml/2006/main">
   <p:cSld>
     <p:spTree>
@@ -23672,7 +23321,7 @@
           <a:p>
             <a:r>
               <a:rPr lang="en-US" dirty="0" smtClean="0"/>
-              <a:t>Evaluation (4)</a:t>
+              <a:t>Evaluation (3)</a:t>
             </a:r>
             <a:endParaRPr lang="en-US" dirty="0"/>
           </a:p>
@@ -23695,7 +23344,7 @@
           <a:p>
             <a:fld id="{7D5018C4-273E-49AF-93AB-259FCF9A742C}" type="slidenum">
               <a:rPr lang="en-US" smtClean="0"/>
-              <a:t>44</a:t>
+              <a:t>43</a:t>
             </a:fld>
             <a:endParaRPr lang="en-US"/>
           </a:p>
@@ -23913,6 +23562,446 @@
     <p:extLst>
       <p:ext uri="{BB962C8B-B14F-4D97-AF65-F5344CB8AC3E}">
         <p14:creationId xmlns:p14="http://schemas.microsoft.com/office/powerpoint/2010/main" val="4195572335"/>
+      </p:ext>
+    </p:extLst>
+  </p:cSld>
+  <p:clrMapOvr>
+    <a:masterClrMapping/>
+  </p:clrMapOvr>
+  <p:timing>
+    <p:tnLst>
+      <p:par>
+        <p:cTn id="1" dur="indefinite" restart="never" nodeType="tmRoot">
+          <p:childTnLst>
+            <p:seq concurrent="1" nextAc="seek">
+              <p:cTn id="2" dur="indefinite" nodeType="mainSeq">
+                <p:childTnLst>
+                  <p:par>
+                    <p:cTn id="3" fill="hold">
+                      <p:stCondLst>
+                        <p:cond delay="indefinite"/>
+                      </p:stCondLst>
+                      <p:childTnLst>
+                        <p:par>
+                          <p:cTn id="4" fill="hold">
+                            <p:stCondLst>
+                              <p:cond delay="0"/>
+                            </p:stCondLst>
+                            <p:childTnLst>
+                              <p:par>
+                                <p:cTn id="5" presetID="10" presetClass="entr" presetSubtype="0" fill="hold" grpId="0" nodeType="clickEffect">
+                                  <p:stCondLst>
+                                    <p:cond delay="0"/>
+                                  </p:stCondLst>
+                                  <p:childTnLst>
+                                    <p:set>
+                                      <p:cBhvr>
+                                        <p:cTn id="6" dur="1" fill="hold">
+                                          <p:stCondLst>
+                                            <p:cond delay="0"/>
+                                          </p:stCondLst>
+                                        </p:cTn>
+                                        <p:tgtEl>
+                                          <p:spTgt spid="9"/>
+                                        </p:tgtEl>
+                                        <p:attrNameLst>
+                                          <p:attrName>style.visibility</p:attrName>
+                                        </p:attrNameLst>
+                                      </p:cBhvr>
+                                      <p:to>
+                                        <p:strVal val="visible"/>
+                                      </p:to>
+                                    </p:set>
+                                    <p:animEffect transition="in" filter="fade">
+                                      <p:cBhvr>
+                                        <p:cTn id="7" dur="500"/>
+                                        <p:tgtEl>
+                                          <p:spTgt spid="9"/>
+                                        </p:tgtEl>
+                                      </p:cBhvr>
+                                    </p:animEffect>
+                                  </p:childTnLst>
+                                </p:cTn>
+                              </p:par>
+                              <p:par>
+                                <p:cTn id="8" presetID="10" presetClass="entr" presetSubtype="0" fill="hold" nodeType="withEffect">
+                                  <p:stCondLst>
+                                    <p:cond delay="0"/>
+                                  </p:stCondLst>
+                                  <p:childTnLst>
+                                    <p:set>
+                                      <p:cBhvr>
+                                        <p:cTn id="9" dur="1" fill="hold">
+                                          <p:stCondLst>
+                                            <p:cond delay="0"/>
+                                          </p:stCondLst>
+                                        </p:cTn>
+                                        <p:tgtEl>
+                                          <p:spTgt spid="8"/>
+                                        </p:tgtEl>
+                                        <p:attrNameLst>
+                                          <p:attrName>style.visibility</p:attrName>
+                                        </p:attrNameLst>
+                                      </p:cBhvr>
+                                      <p:to>
+                                        <p:strVal val="visible"/>
+                                      </p:to>
+                                    </p:set>
+                                    <p:animEffect transition="in" filter="fade">
+                                      <p:cBhvr>
+                                        <p:cTn id="10" dur="500"/>
+                                        <p:tgtEl>
+                                          <p:spTgt spid="8"/>
+                                        </p:tgtEl>
+                                      </p:cBhvr>
+                                    </p:animEffect>
+                                  </p:childTnLst>
+                                </p:cTn>
+                              </p:par>
+                              <p:par>
+                                <p:cTn id="11" presetID="10" presetClass="entr" presetSubtype="0" fill="hold" grpId="0" nodeType="withEffect">
+                                  <p:stCondLst>
+                                    <p:cond delay="0"/>
+                                  </p:stCondLst>
+                                  <p:childTnLst>
+                                    <p:set>
+                                      <p:cBhvr>
+                                        <p:cTn id="12" dur="1" fill="hold">
+                                          <p:stCondLst>
+                                            <p:cond delay="0"/>
+                                          </p:stCondLst>
+                                        </p:cTn>
+                                        <p:tgtEl>
+                                          <p:spTgt spid="6"/>
+                                        </p:tgtEl>
+                                        <p:attrNameLst>
+                                          <p:attrName>style.visibility</p:attrName>
+                                        </p:attrNameLst>
+                                      </p:cBhvr>
+                                      <p:to>
+                                        <p:strVal val="visible"/>
+                                      </p:to>
+                                    </p:set>
+                                    <p:animEffect transition="in" filter="fade">
+                                      <p:cBhvr>
+                                        <p:cTn id="13" dur="500"/>
+                                        <p:tgtEl>
+                                          <p:spTgt spid="6"/>
+                                        </p:tgtEl>
+                                      </p:cBhvr>
+                                    </p:animEffect>
+                                  </p:childTnLst>
+                                </p:cTn>
+                              </p:par>
+                            </p:childTnLst>
+                          </p:cTn>
+                        </p:par>
+                      </p:childTnLst>
+                    </p:cTn>
+                  </p:par>
+                </p:childTnLst>
+              </p:cTn>
+              <p:prevCondLst>
+                <p:cond evt="onPrev" delay="0">
+                  <p:tgtEl>
+                    <p:sldTgt/>
+                  </p:tgtEl>
+                </p:cond>
+              </p:prevCondLst>
+              <p:nextCondLst>
+                <p:cond evt="onNext" delay="0">
+                  <p:tgtEl>
+                    <p:sldTgt/>
+                  </p:tgtEl>
+                </p:cond>
+              </p:nextCondLst>
+            </p:seq>
+          </p:childTnLst>
+        </p:cTn>
+      </p:par>
+    </p:tnLst>
+    <p:bldLst>
+      <p:bldP spid="6" grpId="0" animBg="1"/>
+      <p:bldP spid="9" grpId="0"/>
+    </p:bldLst>
+  </p:timing>
+</p:sld>
+</file>
+
+<file path=ppt/slides/slide44.xml><?xml version="1.0" encoding="utf-8"?>
+<p:sld xmlns:a="http://schemas.openxmlformats.org/drawingml/2006/main" xmlns:r="http://schemas.openxmlformats.org/officeDocument/2006/relationships" xmlns:p="http://schemas.openxmlformats.org/presentationml/2006/main">
+  <p:cSld>
+    <p:spTree>
+      <p:nvGrpSpPr>
+        <p:cNvPr id="1" name=""/>
+        <p:cNvGrpSpPr/>
+        <p:nvPr/>
+      </p:nvGrpSpPr>
+      <p:grpSpPr>
+        <a:xfrm>
+          <a:off x="0" y="0"/>
+          <a:ext cx="0" cy="0"/>
+          <a:chOff x="0" y="0"/>
+          <a:chExt cx="0" cy="0"/>
+        </a:xfrm>
+      </p:grpSpPr>
+      <p:sp>
+        <p:nvSpPr>
+          <p:cNvPr id="2" name="Title 1"/>
+          <p:cNvSpPr>
+            <a:spLocks noGrp="1"/>
+          </p:cNvSpPr>
+          <p:nvPr>
+            <p:ph type="title"/>
+          </p:nvPr>
+        </p:nvSpPr>
+        <p:spPr/>
+        <p:txBody>
+          <a:bodyPr/>
+          <a:lstStyle/>
+          <a:p>
+            <a:r>
+              <a:rPr lang="en-US" dirty="0" smtClean="0"/>
+              <a:t>Evaluation (4)</a:t>
+            </a:r>
+            <a:endParaRPr lang="en-US" dirty="0"/>
+          </a:p>
+        </p:txBody>
+      </p:sp>
+      <p:sp>
+        <p:nvSpPr>
+          <p:cNvPr id="3" name="Slide Number Placeholder 2"/>
+          <p:cNvSpPr>
+            <a:spLocks noGrp="1"/>
+          </p:cNvSpPr>
+          <p:nvPr>
+            <p:ph type="sldNum" sz="quarter" idx="12"/>
+          </p:nvPr>
+        </p:nvSpPr>
+        <p:spPr/>
+        <p:txBody>
+          <a:bodyPr/>
+          <a:lstStyle/>
+          <a:p>
+            <a:fld id="{7D5018C4-273E-49AF-93AB-259FCF9A742C}" type="slidenum">
+              <a:rPr lang="en-US" smtClean="0"/>
+              <a:t>44</a:t>
+            </a:fld>
+            <a:endParaRPr lang="en-US"/>
+          </a:p>
+        </p:txBody>
+      </p:sp>
+      <p:sp>
+        <p:nvSpPr>
+          <p:cNvPr id="4" name="Content Placeholder 3"/>
+          <p:cNvSpPr>
+            <a:spLocks noGrp="1"/>
+          </p:cNvSpPr>
+          <p:nvPr>
+            <p:ph sz="quarter" idx="1"/>
+          </p:nvPr>
+        </p:nvSpPr>
+        <p:spPr/>
+        <p:txBody>
+          <a:bodyPr/>
+          <a:lstStyle/>
+          <a:p>
+            <a:r>
+              <a:rPr lang="en-US" dirty="0" smtClean="0"/>
+              <a:t>As system utilization increases:</a:t>
+            </a:r>
+          </a:p>
+          <a:p>
+            <a:pPr lvl="1"/>
+            <a:r>
+              <a:rPr lang="en-US" dirty="0" smtClean="0"/>
+              <a:t>More failures</a:t>
+            </a:r>
+          </a:p>
+          <a:p>
+            <a:pPr lvl="1"/>
+            <a:r>
+              <a:rPr lang="en-US" dirty="0" smtClean="0"/>
+              <a:t>Smaller files fail more</a:t>
+            </a:r>
+          </a:p>
+        </p:txBody>
+      </p:sp>
+      <p:pic>
+        <p:nvPicPr>
+          <p:cNvPr id="6147" name="Picture 3"/>
+          <p:cNvPicPr>
+            <a:picLocks noChangeAspect="1" noChangeArrowheads="1"/>
+          </p:cNvPicPr>
+          <p:nvPr/>
+        </p:nvPicPr>
+        <p:blipFill>
+          <a:blip r:embed="rId2">
+            <a:extLst>
+              <a:ext uri="{28A0092B-C50C-407E-A947-70E740481C1C}">
+                <a14:useLocalDpi xmlns:a14="http://schemas.microsoft.com/office/drawing/2010/main" val="0"/>
+              </a:ext>
+            </a:extLst>
+          </a:blip>
+          <a:srcRect/>
+          <a:stretch>
+            <a:fillRect/>
+          </a:stretch>
+        </p:blipFill>
+        <p:spPr bwMode="auto">
+          <a:xfrm>
+            <a:off x="2209799" y="2895600"/>
+            <a:ext cx="4619625" cy="3543300"/>
+          </a:xfrm>
+          <a:prstGeom prst="rect">
+            <a:avLst/>
+          </a:prstGeom>
+          <a:noFill/>
+          <a:ln>
+            <a:noFill/>
+          </a:ln>
+          <a:effectLst/>
+          <a:extLst>
+            <a:ext uri="{909E8E84-426E-40DD-AFC4-6F175D3DCCD1}">
+              <a14:hiddenFill xmlns:a14="http://schemas.microsoft.com/office/drawing/2010/main">
+                <a:solidFill>
+                  <a:schemeClr val="accent1"/>
+                </a:solidFill>
+              </a14:hiddenFill>
+            </a:ext>
+            <a:ext uri="{91240B29-F687-4F45-9708-019B960494DF}">
+              <a14:hiddenLine xmlns:a14="http://schemas.microsoft.com/office/drawing/2010/main" w="9525">
+                <a:solidFill>
+                  <a:schemeClr val="tx1"/>
+                </a:solidFill>
+                <a:miter lim="800000"/>
+                <a:headEnd/>
+                <a:tailEnd/>
+              </a14:hiddenLine>
+            </a:ext>
+            <a:ext uri="{AF507438-7753-43E0-B8FC-AC1667EBCBE1}">
+              <a14:hiddenEffects xmlns:a14="http://schemas.microsoft.com/office/drawing/2010/main">
+                <a:effectLst>
+                  <a:outerShdw dist="35921" dir="2700000" algn="ctr" rotWithShape="0">
+                    <a:schemeClr val="bg2"/>
+                  </a:outerShdw>
+                </a:effectLst>
+              </a14:hiddenEffects>
+            </a:ext>
+          </a:extLst>
+        </p:spPr>
+      </p:pic>
+      <p:sp>
+        <p:nvSpPr>
+          <p:cNvPr id="6" name="Oval 5"/>
+          <p:cNvSpPr/>
+          <p:nvPr/>
+        </p:nvSpPr>
+        <p:spPr>
+          <a:xfrm>
+            <a:off x="2209799" y="4876800"/>
+            <a:ext cx="1752600" cy="685800"/>
+          </a:xfrm>
+          <a:prstGeom prst="ellipse">
+            <a:avLst/>
+          </a:prstGeom>
+          <a:noFill/>
+          <a:ln w="76200">
+            <a:solidFill>
+              <a:schemeClr val="accent1"/>
+            </a:solidFill>
+          </a:ln>
+        </p:spPr>
+        <p:style>
+          <a:lnRef idx="3">
+            <a:schemeClr val="lt1"/>
+          </a:lnRef>
+          <a:fillRef idx="1">
+            <a:schemeClr val="accent1"/>
+          </a:fillRef>
+          <a:effectRef idx="1">
+            <a:schemeClr val="accent1"/>
+          </a:effectRef>
+          <a:fontRef idx="minor">
+            <a:schemeClr val="lt1"/>
+          </a:fontRef>
+        </p:style>
+        <p:txBody>
+          <a:bodyPr rtlCol="0" anchor="ctr"/>
+          <a:lstStyle/>
+          <a:p>
+            <a:pPr algn="ctr"/>
+            <a:endParaRPr lang="en-US"/>
+          </a:p>
+        </p:txBody>
+      </p:sp>
+      <p:cxnSp>
+        <p:nvCxnSpPr>
+          <p:cNvPr id="8" name="Straight Arrow Connector 7"/>
+          <p:cNvCxnSpPr/>
+          <p:nvPr/>
+        </p:nvCxnSpPr>
+        <p:spPr>
+          <a:xfrm flipH="1" flipV="1">
+            <a:off x="1791810" y="4643761"/>
+            <a:ext cx="494190" cy="309239"/>
+          </a:xfrm>
+          <a:prstGeom prst="straightConnector1">
+            <a:avLst/>
+          </a:prstGeom>
+          <a:ln>
+            <a:tailEnd type="arrow"/>
+          </a:ln>
+        </p:spPr>
+        <p:style>
+          <a:lnRef idx="3">
+            <a:schemeClr val="accent1"/>
+          </a:lnRef>
+          <a:fillRef idx="0">
+            <a:schemeClr val="accent1"/>
+          </a:fillRef>
+          <a:effectRef idx="2">
+            <a:schemeClr val="accent1"/>
+          </a:effectRef>
+          <a:fontRef idx="minor">
+            <a:schemeClr val="tx1"/>
+          </a:fontRef>
+        </p:style>
+      </p:cxnSp>
+      <p:sp>
+        <p:nvSpPr>
+          <p:cNvPr id="9" name="TextBox 8"/>
+          <p:cNvSpPr txBox="1"/>
+          <p:nvPr/>
+        </p:nvSpPr>
+        <p:spPr>
+          <a:xfrm>
+            <a:off x="222246" y="4274429"/>
+            <a:ext cx="2010487" cy="369332"/>
+          </a:xfrm>
+          <a:prstGeom prst="rect">
+            <a:avLst/>
+          </a:prstGeom>
+          <a:noFill/>
+        </p:spPr>
+        <p:txBody>
+          <a:bodyPr wrap="none" rtlCol="0">
+            <a:spAutoFit/>
+          </a:bodyPr>
+          <a:lstStyle/>
+          <a:p>
+            <a:r>
+              <a:rPr lang="en-US" dirty="0" smtClean="0"/>
+              <a:t>What causes this?</a:t>
+            </a:r>
+            <a:endParaRPr lang="en-US" dirty="0"/>
+          </a:p>
+        </p:txBody>
+      </p:sp>
+    </p:spTree>
+    <p:extLst>
+      <p:ext uri="{BB962C8B-B14F-4D97-AF65-F5344CB8AC3E}">
+        <p14:creationId xmlns:p14="http://schemas.microsoft.com/office/powerpoint/2010/main" val="2874560121"/>
       </p:ext>
     </p:extLst>
   </p:cSld>
@@ -24112,7 +24201,7 @@
           <a:lstStyle/>
           <a:p>
             <a:r>
-              <a:rPr lang="en-US" dirty="0" smtClean="0"/>
+              <a:rPr lang="en-US" smtClean="0"/>
               <a:t>Evaluation (5)</a:t>
             </a:r>
             <a:endParaRPr lang="en-US" dirty="0"/>
@@ -24137,446 +24226,6 @@
             <a:fld id="{7D5018C4-273E-49AF-93AB-259FCF9A742C}" type="slidenum">
               <a:rPr lang="en-US" smtClean="0"/>
               <a:t>45</a:t>
-            </a:fld>
-            <a:endParaRPr lang="en-US"/>
-          </a:p>
-        </p:txBody>
-      </p:sp>
-      <p:sp>
-        <p:nvSpPr>
-          <p:cNvPr id="4" name="Content Placeholder 3"/>
-          <p:cNvSpPr>
-            <a:spLocks noGrp="1"/>
-          </p:cNvSpPr>
-          <p:nvPr>
-            <p:ph sz="quarter" idx="1"/>
-          </p:nvPr>
-        </p:nvSpPr>
-        <p:spPr/>
-        <p:txBody>
-          <a:bodyPr/>
-          <a:lstStyle/>
-          <a:p>
-            <a:r>
-              <a:rPr lang="en-US" dirty="0" smtClean="0"/>
-              <a:t>As system utilization increases:</a:t>
-            </a:r>
-          </a:p>
-          <a:p>
-            <a:pPr lvl="1"/>
-            <a:r>
-              <a:rPr lang="en-US" dirty="0" smtClean="0"/>
-              <a:t>More failures</a:t>
-            </a:r>
-          </a:p>
-          <a:p>
-            <a:pPr lvl="1"/>
-            <a:r>
-              <a:rPr lang="en-US" dirty="0" smtClean="0"/>
-              <a:t>Smaller files fail more</a:t>
-            </a:r>
-          </a:p>
-        </p:txBody>
-      </p:sp>
-      <p:pic>
-        <p:nvPicPr>
-          <p:cNvPr id="6147" name="Picture 3"/>
-          <p:cNvPicPr>
-            <a:picLocks noChangeAspect="1" noChangeArrowheads="1"/>
-          </p:cNvPicPr>
-          <p:nvPr/>
-        </p:nvPicPr>
-        <p:blipFill>
-          <a:blip r:embed="rId2">
-            <a:extLst>
-              <a:ext uri="{28A0092B-C50C-407E-A947-70E740481C1C}">
-                <a14:useLocalDpi xmlns:a14="http://schemas.microsoft.com/office/drawing/2010/main" val="0"/>
-              </a:ext>
-            </a:extLst>
-          </a:blip>
-          <a:srcRect/>
-          <a:stretch>
-            <a:fillRect/>
-          </a:stretch>
-        </p:blipFill>
-        <p:spPr bwMode="auto">
-          <a:xfrm>
-            <a:off x="2209799" y="2895600"/>
-            <a:ext cx="4619625" cy="3543300"/>
-          </a:xfrm>
-          <a:prstGeom prst="rect">
-            <a:avLst/>
-          </a:prstGeom>
-          <a:noFill/>
-          <a:ln>
-            <a:noFill/>
-          </a:ln>
-          <a:effectLst/>
-          <a:extLst>
-            <a:ext uri="{909E8E84-426E-40DD-AFC4-6F175D3DCCD1}">
-              <a14:hiddenFill xmlns:a14="http://schemas.microsoft.com/office/drawing/2010/main">
-                <a:solidFill>
-                  <a:schemeClr val="accent1"/>
-                </a:solidFill>
-              </a14:hiddenFill>
-            </a:ext>
-            <a:ext uri="{91240B29-F687-4F45-9708-019B960494DF}">
-              <a14:hiddenLine xmlns:a14="http://schemas.microsoft.com/office/drawing/2010/main" w="9525">
-                <a:solidFill>
-                  <a:schemeClr val="tx1"/>
-                </a:solidFill>
-                <a:miter lim="800000"/>
-                <a:headEnd/>
-                <a:tailEnd/>
-              </a14:hiddenLine>
-            </a:ext>
-            <a:ext uri="{AF507438-7753-43E0-B8FC-AC1667EBCBE1}">
-              <a14:hiddenEffects xmlns:a14="http://schemas.microsoft.com/office/drawing/2010/main">
-                <a:effectLst>
-                  <a:outerShdw dist="35921" dir="2700000" algn="ctr" rotWithShape="0">
-                    <a:schemeClr val="bg2"/>
-                  </a:outerShdw>
-                </a:effectLst>
-              </a14:hiddenEffects>
-            </a:ext>
-          </a:extLst>
-        </p:spPr>
-      </p:pic>
-      <p:sp>
-        <p:nvSpPr>
-          <p:cNvPr id="6" name="Oval 5"/>
-          <p:cNvSpPr/>
-          <p:nvPr/>
-        </p:nvSpPr>
-        <p:spPr>
-          <a:xfrm>
-            <a:off x="2209799" y="4876800"/>
-            <a:ext cx="1752600" cy="685800"/>
-          </a:xfrm>
-          <a:prstGeom prst="ellipse">
-            <a:avLst/>
-          </a:prstGeom>
-          <a:noFill/>
-          <a:ln w="76200">
-            <a:solidFill>
-              <a:schemeClr val="accent1"/>
-            </a:solidFill>
-          </a:ln>
-        </p:spPr>
-        <p:style>
-          <a:lnRef idx="3">
-            <a:schemeClr val="lt1"/>
-          </a:lnRef>
-          <a:fillRef idx="1">
-            <a:schemeClr val="accent1"/>
-          </a:fillRef>
-          <a:effectRef idx="1">
-            <a:schemeClr val="accent1"/>
-          </a:effectRef>
-          <a:fontRef idx="minor">
-            <a:schemeClr val="lt1"/>
-          </a:fontRef>
-        </p:style>
-        <p:txBody>
-          <a:bodyPr rtlCol="0" anchor="ctr"/>
-          <a:lstStyle/>
-          <a:p>
-            <a:pPr algn="ctr"/>
-            <a:endParaRPr lang="en-US"/>
-          </a:p>
-        </p:txBody>
-      </p:sp>
-      <p:cxnSp>
-        <p:nvCxnSpPr>
-          <p:cNvPr id="8" name="Straight Arrow Connector 7"/>
-          <p:cNvCxnSpPr/>
-          <p:nvPr/>
-        </p:nvCxnSpPr>
-        <p:spPr>
-          <a:xfrm flipH="1" flipV="1">
-            <a:off x="1791810" y="4643761"/>
-            <a:ext cx="494190" cy="309239"/>
-          </a:xfrm>
-          <a:prstGeom prst="straightConnector1">
-            <a:avLst/>
-          </a:prstGeom>
-          <a:ln>
-            <a:tailEnd type="arrow"/>
-          </a:ln>
-        </p:spPr>
-        <p:style>
-          <a:lnRef idx="3">
-            <a:schemeClr val="accent1"/>
-          </a:lnRef>
-          <a:fillRef idx="0">
-            <a:schemeClr val="accent1"/>
-          </a:fillRef>
-          <a:effectRef idx="2">
-            <a:schemeClr val="accent1"/>
-          </a:effectRef>
-          <a:fontRef idx="minor">
-            <a:schemeClr val="tx1"/>
-          </a:fontRef>
-        </p:style>
-      </p:cxnSp>
-      <p:sp>
-        <p:nvSpPr>
-          <p:cNvPr id="9" name="TextBox 8"/>
-          <p:cNvSpPr txBox="1"/>
-          <p:nvPr/>
-        </p:nvSpPr>
-        <p:spPr>
-          <a:xfrm>
-            <a:off x="222246" y="4274429"/>
-            <a:ext cx="2010487" cy="369332"/>
-          </a:xfrm>
-          <a:prstGeom prst="rect">
-            <a:avLst/>
-          </a:prstGeom>
-          <a:noFill/>
-        </p:spPr>
-        <p:txBody>
-          <a:bodyPr wrap="none" rtlCol="0">
-            <a:spAutoFit/>
-          </a:bodyPr>
-          <a:lstStyle/>
-          <a:p>
-            <a:r>
-              <a:rPr lang="en-US" dirty="0" smtClean="0"/>
-              <a:t>What causes this?</a:t>
-            </a:r>
-            <a:endParaRPr lang="en-US" dirty="0"/>
-          </a:p>
-        </p:txBody>
-      </p:sp>
-    </p:spTree>
-    <p:extLst>
-      <p:ext uri="{BB962C8B-B14F-4D97-AF65-F5344CB8AC3E}">
-        <p14:creationId xmlns:p14="http://schemas.microsoft.com/office/powerpoint/2010/main" val="2874560121"/>
-      </p:ext>
-    </p:extLst>
-  </p:cSld>
-  <p:clrMapOvr>
-    <a:masterClrMapping/>
-  </p:clrMapOvr>
-  <p:timing>
-    <p:tnLst>
-      <p:par>
-        <p:cTn id="1" dur="indefinite" restart="never" nodeType="tmRoot">
-          <p:childTnLst>
-            <p:seq concurrent="1" nextAc="seek">
-              <p:cTn id="2" dur="indefinite" nodeType="mainSeq">
-                <p:childTnLst>
-                  <p:par>
-                    <p:cTn id="3" fill="hold">
-                      <p:stCondLst>
-                        <p:cond delay="indefinite"/>
-                      </p:stCondLst>
-                      <p:childTnLst>
-                        <p:par>
-                          <p:cTn id="4" fill="hold">
-                            <p:stCondLst>
-                              <p:cond delay="0"/>
-                            </p:stCondLst>
-                            <p:childTnLst>
-                              <p:par>
-                                <p:cTn id="5" presetID="10" presetClass="entr" presetSubtype="0" fill="hold" grpId="0" nodeType="clickEffect">
-                                  <p:stCondLst>
-                                    <p:cond delay="0"/>
-                                  </p:stCondLst>
-                                  <p:childTnLst>
-                                    <p:set>
-                                      <p:cBhvr>
-                                        <p:cTn id="6" dur="1" fill="hold">
-                                          <p:stCondLst>
-                                            <p:cond delay="0"/>
-                                          </p:stCondLst>
-                                        </p:cTn>
-                                        <p:tgtEl>
-                                          <p:spTgt spid="9"/>
-                                        </p:tgtEl>
-                                        <p:attrNameLst>
-                                          <p:attrName>style.visibility</p:attrName>
-                                        </p:attrNameLst>
-                                      </p:cBhvr>
-                                      <p:to>
-                                        <p:strVal val="visible"/>
-                                      </p:to>
-                                    </p:set>
-                                    <p:animEffect transition="in" filter="fade">
-                                      <p:cBhvr>
-                                        <p:cTn id="7" dur="500"/>
-                                        <p:tgtEl>
-                                          <p:spTgt spid="9"/>
-                                        </p:tgtEl>
-                                      </p:cBhvr>
-                                    </p:animEffect>
-                                  </p:childTnLst>
-                                </p:cTn>
-                              </p:par>
-                              <p:par>
-                                <p:cTn id="8" presetID="10" presetClass="entr" presetSubtype="0" fill="hold" nodeType="withEffect">
-                                  <p:stCondLst>
-                                    <p:cond delay="0"/>
-                                  </p:stCondLst>
-                                  <p:childTnLst>
-                                    <p:set>
-                                      <p:cBhvr>
-                                        <p:cTn id="9" dur="1" fill="hold">
-                                          <p:stCondLst>
-                                            <p:cond delay="0"/>
-                                          </p:stCondLst>
-                                        </p:cTn>
-                                        <p:tgtEl>
-                                          <p:spTgt spid="8"/>
-                                        </p:tgtEl>
-                                        <p:attrNameLst>
-                                          <p:attrName>style.visibility</p:attrName>
-                                        </p:attrNameLst>
-                                      </p:cBhvr>
-                                      <p:to>
-                                        <p:strVal val="visible"/>
-                                      </p:to>
-                                    </p:set>
-                                    <p:animEffect transition="in" filter="fade">
-                                      <p:cBhvr>
-                                        <p:cTn id="10" dur="500"/>
-                                        <p:tgtEl>
-                                          <p:spTgt spid="8"/>
-                                        </p:tgtEl>
-                                      </p:cBhvr>
-                                    </p:animEffect>
-                                  </p:childTnLst>
-                                </p:cTn>
-                              </p:par>
-                              <p:par>
-                                <p:cTn id="11" presetID="10" presetClass="entr" presetSubtype="0" fill="hold" grpId="0" nodeType="withEffect">
-                                  <p:stCondLst>
-                                    <p:cond delay="0"/>
-                                  </p:stCondLst>
-                                  <p:childTnLst>
-                                    <p:set>
-                                      <p:cBhvr>
-                                        <p:cTn id="12" dur="1" fill="hold">
-                                          <p:stCondLst>
-                                            <p:cond delay="0"/>
-                                          </p:stCondLst>
-                                        </p:cTn>
-                                        <p:tgtEl>
-                                          <p:spTgt spid="6"/>
-                                        </p:tgtEl>
-                                        <p:attrNameLst>
-                                          <p:attrName>style.visibility</p:attrName>
-                                        </p:attrNameLst>
-                                      </p:cBhvr>
-                                      <p:to>
-                                        <p:strVal val="visible"/>
-                                      </p:to>
-                                    </p:set>
-                                    <p:animEffect transition="in" filter="fade">
-                                      <p:cBhvr>
-                                        <p:cTn id="13" dur="500"/>
-                                        <p:tgtEl>
-                                          <p:spTgt spid="6"/>
-                                        </p:tgtEl>
-                                      </p:cBhvr>
-                                    </p:animEffect>
-                                  </p:childTnLst>
-                                </p:cTn>
-                              </p:par>
-                            </p:childTnLst>
-                          </p:cTn>
-                        </p:par>
-                      </p:childTnLst>
-                    </p:cTn>
-                  </p:par>
-                </p:childTnLst>
-              </p:cTn>
-              <p:prevCondLst>
-                <p:cond evt="onPrev" delay="0">
-                  <p:tgtEl>
-                    <p:sldTgt/>
-                  </p:tgtEl>
-                </p:cond>
-              </p:prevCondLst>
-              <p:nextCondLst>
-                <p:cond evt="onNext" delay="0">
-                  <p:tgtEl>
-                    <p:sldTgt/>
-                  </p:tgtEl>
-                </p:cond>
-              </p:nextCondLst>
-            </p:seq>
-          </p:childTnLst>
-        </p:cTn>
-      </p:par>
-    </p:tnLst>
-    <p:bldLst>
-      <p:bldP spid="6" grpId="0" animBg="1"/>
-      <p:bldP spid="9" grpId="0"/>
-    </p:bldLst>
-  </p:timing>
-</p:sld>
-</file>
-
-<file path=ppt/slides/slide46.xml><?xml version="1.0" encoding="utf-8"?>
-<p:sld xmlns:a="http://schemas.openxmlformats.org/drawingml/2006/main" xmlns:r="http://schemas.openxmlformats.org/officeDocument/2006/relationships" xmlns:p="http://schemas.openxmlformats.org/presentationml/2006/main">
-  <p:cSld>
-    <p:spTree>
-      <p:nvGrpSpPr>
-        <p:cNvPr id="1" name=""/>
-        <p:cNvGrpSpPr/>
-        <p:nvPr/>
-      </p:nvGrpSpPr>
-      <p:grpSpPr>
-        <a:xfrm>
-          <a:off x="0" y="0"/>
-          <a:ext cx="0" cy="0"/>
-          <a:chOff x="0" y="0"/>
-          <a:chExt cx="0" cy="0"/>
-        </a:xfrm>
-      </p:grpSpPr>
-      <p:sp>
-        <p:nvSpPr>
-          <p:cNvPr id="2" name="Title 1"/>
-          <p:cNvSpPr>
-            <a:spLocks noGrp="1"/>
-          </p:cNvSpPr>
-          <p:nvPr>
-            <p:ph type="title"/>
-          </p:nvPr>
-        </p:nvSpPr>
-        <p:spPr/>
-        <p:txBody>
-          <a:bodyPr/>
-          <a:lstStyle/>
-          <a:p>
-            <a:r>
-              <a:rPr lang="en-US" dirty="0" smtClean="0"/>
-              <a:t>Evaluation (6)</a:t>
-            </a:r>
-            <a:endParaRPr lang="en-US" dirty="0"/>
-          </a:p>
-        </p:txBody>
-      </p:sp>
-      <p:sp>
-        <p:nvSpPr>
-          <p:cNvPr id="3" name="Slide Number Placeholder 2"/>
-          <p:cNvSpPr>
-            <a:spLocks noGrp="1"/>
-          </p:cNvSpPr>
-          <p:nvPr>
-            <p:ph type="sldNum" sz="quarter" idx="12"/>
-          </p:nvPr>
-        </p:nvSpPr>
-        <p:spPr/>
-        <p:txBody>
-          <a:bodyPr/>
-          <a:lstStyle/>
-          <a:p>
-            <a:fld id="{7D5018C4-273E-49AF-93AB-259FCF9A742C}" type="slidenum">
-              <a:rPr lang="en-US" smtClean="0"/>
-              <a:t>46</a:t>
             </a:fld>
             <a:endParaRPr lang="en-US"/>
           </a:p>
@@ -24689,6 +24338,191 @@
 </p:sld>
 </file>
 
+<file path=ppt/slides/slide46.xml><?xml version="1.0" encoding="utf-8"?>
+<p:sld xmlns:a="http://schemas.openxmlformats.org/drawingml/2006/main" xmlns:r="http://schemas.openxmlformats.org/officeDocument/2006/relationships" xmlns:p="http://schemas.openxmlformats.org/presentationml/2006/main">
+  <p:cSld>
+    <p:spTree>
+      <p:nvGrpSpPr>
+        <p:cNvPr id="1" name=""/>
+        <p:cNvGrpSpPr/>
+        <p:nvPr/>
+      </p:nvGrpSpPr>
+      <p:grpSpPr>
+        <a:xfrm>
+          <a:off x="0" y="0"/>
+          <a:ext cx="0" cy="0"/>
+          <a:chOff x="0" y="0"/>
+          <a:chExt cx="0" cy="0"/>
+        </a:xfrm>
+      </p:grpSpPr>
+      <p:sp>
+        <p:nvSpPr>
+          <p:cNvPr id="2" name="Title 1"/>
+          <p:cNvSpPr>
+            <a:spLocks noGrp="1"/>
+          </p:cNvSpPr>
+          <p:nvPr>
+            <p:ph type="title"/>
+          </p:nvPr>
+        </p:nvSpPr>
+        <p:spPr/>
+        <p:txBody>
+          <a:bodyPr/>
+          <a:lstStyle/>
+          <a:p>
+            <a:r>
+              <a:rPr lang="en-US" dirty="0" smtClean="0"/>
+              <a:t>Discussion</a:t>
+            </a:r>
+            <a:endParaRPr lang="en-US" dirty="0"/>
+          </a:p>
+        </p:txBody>
+      </p:sp>
+      <p:sp>
+        <p:nvSpPr>
+          <p:cNvPr id="3" name="Slide Number Placeholder 2"/>
+          <p:cNvSpPr>
+            <a:spLocks noGrp="1"/>
+          </p:cNvSpPr>
+          <p:nvPr>
+            <p:ph type="sldNum" sz="quarter" idx="12"/>
+          </p:nvPr>
+        </p:nvSpPr>
+        <p:spPr/>
+        <p:txBody>
+          <a:bodyPr/>
+          <a:lstStyle/>
+          <a:p>
+            <a:fld id="{7D5018C4-273E-49AF-93AB-259FCF9A742C}" type="slidenum">
+              <a:rPr lang="en-US" smtClean="0"/>
+              <a:t>46</a:t>
+            </a:fld>
+            <a:endParaRPr lang="en-US"/>
+          </a:p>
+        </p:txBody>
+      </p:sp>
+      <p:sp>
+        <p:nvSpPr>
+          <p:cNvPr id="4" name="Content Placeholder 3"/>
+          <p:cNvSpPr>
+            <a:spLocks noGrp="1"/>
+          </p:cNvSpPr>
+          <p:nvPr>
+            <p:ph sz="quarter" idx="1"/>
+          </p:nvPr>
+        </p:nvSpPr>
+        <p:spPr/>
+        <p:txBody>
+          <a:bodyPr/>
+          <a:lstStyle/>
+          <a:p>
+            <a:r>
+              <a:rPr lang="en-US" dirty="0" smtClean="0"/>
+              <a:t>Block storage </a:t>
+            </a:r>
+            <a:r>
+              <a:rPr lang="en-US" dirty="0" err="1" smtClean="0"/>
+              <a:t>vs</a:t>
+            </a:r>
+            <a:r>
+              <a:rPr lang="en-US" dirty="0" smtClean="0"/>
+              <a:t> file storage?</a:t>
+            </a:r>
+          </a:p>
+          <a:p>
+            <a:pPr lvl="0"/>
+            <a:r>
+              <a:rPr lang="en-US" dirty="0" smtClean="0"/>
+              <a:t>Replace the threshold</a:t>
+            </a:r>
+            <a:r>
+              <a:rPr lang="en-US" baseline="0" dirty="0" smtClean="0"/>
+              <a:t> metric?</a:t>
+            </a:r>
+          </a:p>
+          <a:p>
+            <a:pPr lvl="1"/>
+            <a:r>
+              <a:rPr lang="en-US" dirty="0" smtClean="0"/>
+              <a:t>(file size)/(</a:t>
+            </a:r>
+            <a:r>
+              <a:rPr lang="en-US" dirty="0" err="1" smtClean="0"/>
+              <a:t>freespace</a:t>
+            </a:r>
+            <a:r>
+              <a:rPr lang="en-US" dirty="0" smtClean="0"/>
+              <a:t>) &gt; t</a:t>
+            </a:r>
+          </a:p>
+          <a:p>
+            <a:pPr lvl="0"/>
+            <a:r>
+              <a:rPr lang="en-US" dirty="0" smtClean="0"/>
+              <a:t>Would you use PAST? What for?</a:t>
+            </a:r>
+          </a:p>
+          <a:p>
+            <a:pPr lvl="0"/>
+            <a:r>
+              <a:rPr lang="en-US" dirty="0" smtClean="0"/>
+              <a:t>Is P2P right solution for PAST?</a:t>
+            </a:r>
+          </a:p>
+          <a:p>
+            <a:pPr lvl="1"/>
+            <a:r>
+              <a:rPr lang="en-US" dirty="0" smtClean="0"/>
+              <a:t>For backup in general?</a:t>
+            </a:r>
+          </a:p>
+          <a:p>
+            <a:pPr lvl="0"/>
+            <a:r>
+              <a:rPr lang="en-US" dirty="0" smtClean="0"/>
+              <a:t>Economically</a:t>
+            </a:r>
+            <a:r>
+              <a:rPr lang="en-US" baseline="0" dirty="0" smtClean="0"/>
+              <a:t> sound?</a:t>
+            </a:r>
+          </a:p>
+          <a:p>
+            <a:pPr lvl="1"/>
+            <a:r>
+              <a:rPr lang="en-US" baseline="0" dirty="0" smtClean="0"/>
+              <a:t>Compared to tape drives, compared to cloud storage</a:t>
+            </a:r>
+          </a:p>
+          <a:p>
+            <a:pPr lvl="0"/>
+            <a:r>
+              <a:rPr lang="en-US" baseline="0" dirty="0" smtClean="0"/>
+              <a:t>Resilience to churn?</a:t>
+            </a:r>
+          </a:p>
+        </p:txBody>
+      </p:sp>
+    </p:spTree>
+    <p:extLst>
+      <p:ext uri="{BB962C8B-B14F-4D97-AF65-F5344CB8AC3E}">
+        <p14:creationId xmlns:p14="http://schemas.microsoft.com/office/powerpoint/2010/main" val="2160574676"/>
+      </p:ext>
+    </p:extLst>
+  </p:cSld>
+  <p:clrMapOvr>
+    <a:masterClrMapping/>
+  </p:clrMapOvr>
+  <p:timing>
+    <p:tnLst>
+      <p:par>
+        <p:cTn id="1" dur="indefinite" restart="never" nodeType="tmRoot"/>
+      </p:par>
+    </p:tnLst>
+  </p:timing>
+</p:sld>
+</file>
+
 <file path=ppt/slides/slide47.xml><?xml version="1.0" encoding="utf-8"?>
 <p:sld xmlns:a="http://schemas.openxmlformats.org/drawingml/2006/main" xmlns:r="http://schemas.openxmlformats.org/officeDocument/2006/relationships" xmlns:p="http://schemas.openxmlformats.org/presentationml/2006/main">
   <p:cSld>
@@ -24708,24 +24542,68 @@
       </p:grpSpPr>
       <p:sp>
         <p:nvSpPr>
-          <p:cNvPr id="2" name="Title 1"/>
+          <p:cNvPr id="5" name="Subtitle 4"/>
           <p:cNvSpPr>
             <a:spLocks noGrp="1"/>
           </p:cNvSpPr>
           <p:nvPr>
-            <p:ph type="title"/>
+            <p:ph type="subTitle" idx="1"/>
           </p:nvPr>
         </p:nvSpPr>
         <p:spPr/>
         <p:txBody>
-          <a:bodyPr/>
-          <a:lstStyle/>
-          <a:p>
-            <a:r>
-              <a:rPr lang="en-US" dirty="0" smtClean="0"/>
-              <a:t>Discussion</a:t>
-            </a:r>
-            <a:endParaRPr lang="en-US" dirty="0"/>
+          <a:bodyPr>
+            <a:normAutofit fontScale="92500" lnSpcReduction="20000"/>
+          </a:bodyPr>
+          <a:lstStyle/>
+          <a:p>
+            <a:r>
+              <a:rPr lang="en-US" dirty="0" smtClean="0"/>
+              <a:t>NDSI ’08</a:t>
+            </a:r>
+          </a:p>
+          <a:p>
+            <a:endParaRPr lang="en-US" dirty="0" smtClean="0"/>
+          </a:p>
+          <a:p>
+            <a:r>
+              <a:rPr lang="en-US" dirty="0" smtClean="0"/>
+              <a:t>Emil sit</a:t>
+            </a:r>
+          </a:p>
+          <a:p>
+            <a:r>
+              <a:rPr lang="en-US" dirty="0" smtClean="0"/>
+              <a:t>Robert Morris</a:t>
+            </a:r>
+          </a:p>
+          <a:p>
+            <a:r>
+              <a:rPr lang="en-US" dirty="0" smtClean="0"/>
+              <a:t>M. </a:t>
+            </a:r>
+            <a:r>
+              <a:rPr lang="en-US" dirty="0" err="1" smtClean="0"/>
+              <a:t>Frans</a:t>
+            </a:r>
+            <a:r>
+              <a:rPr lang="en-US" dirty="0" smtClean="0"/>
+              <a:t> </a:t>
+            </a:r>
+            <a:r>
+              <a:rPr lang="en-US" dirty="0" err="1" smtClean="0"/>
+              <a:t>Kaashoek</a:t>
+            </a:r>
+            <a:endParaRPr lang="en-US" dirty="0" smtClean="0"/>
+          </a:p>
+          <a:p>
+            <a:endParaRPr lang="en-US" dirty="0" smtClean="0"/>
+          </a:p>
+          <a:p>
+            <a:r>
+              <a:rPr lang="en-US" dirty="0" smtClean="0"/>
+              <a:t>MIT CSAIL</a:t>
+            </a:r>
           </a:p>
         </p:txBody>
       </p:sp>
@@ -24754,12 +24632,12 @@
       </p:sp>
       <p:sp>
         <p:nvSpPr>
-          <p:cNvPr id="4" name="Content Placeholder 3"/>
+          <p:cNvPr id="2" name="Title 1"/>
           <p:cNvSpPr>
             <a:spLocks noGrp="1"/>
           </p:cNvSpPr>
           <p:nvPr>
-            <p:ph sz="quarter" idx="1"/>
+            <p:ph type="ctrTitle"/>
           </p:nvPr>
         </p:nvSpPr>
         <p:spPr/>
@@ -24768,96 +24646,17 @@
           <a:lstStyle/>
           <a:p>
             <a:r>
-              <a:rPr lang="en-US" dirty="0" smtClean="0"/>
-              <a:t>Block storage </a:t>
-            </a:r>
-            <a:r>
               <a:rPr lang="en-US" dirty="0" err="1" smtClean="0"/>
-              <a:t>vs</a:t>
-            </a:r>
-            <a:r>
-              <a:rPr lang="en-US" dirty="0" smtClean="0"/>
-              <a:t> file storage?</a:t>
-            </a:r>
-          </a:p>
-          <a:p>
-            <a:pPr lvl="0"/>
-            <a:r>
-              <a:rPr lang="en-US" dirty="0" smtClean="0"/>
-              <a:t>Replace the threshold</a:t>
-            </a:r>
-            <a:r>
-              <a:rPr lang="en-US" baseline="0" dirty="0" smtClean="0"/>
-              <a:t> metric?</a:t>
-            </a:r>
-          </a:p>
-          <a:p>
-            <a:pPr lvl="1"/>
-            <a:r>
-              <a:rPr lang="en-US" dirty="0" smtClean="0"/>
-              <a:t>(file size)/(</a:t>
-            </a:r>
-            <a:r>
-              <a:rPr lang="en-US" dirty="0" err="1" smtClean="0"/>
-              <a:t>freespace</a:t>
-            </a:r>
-            <a:r>
-              <a:rPr lang="en-US" dirty="0" smtClean="0"/>
-              <a:t>) &gt; t</a:t>
-            </a:r>
-          </a:p>
-          <a:p>
-            <a:pPr lvl="0"/>
-            <a:r>
-              <a:rPr lang="en-US" dirty="0" smtClean="0"/>
-              <a:t>Would you use PAST? What for?</a:t>
-            </a:r>
-          </a:p>
-          <a:p>
-            <a:pPr lvl="0"/>
-            <a:r>
-              <a:rPr lang="en-US" dirty="0" smtClean="0"/>
-              <a:t>Is P2P right solution for PAST?</a:t>
-            </a:r>
-          </a:p>
-          <a:p>
-            <a:pPr lvl="1"/>
-            <a:r>
-              <a:rPr lang="en-US" dirty="0" smtClean="0"/>
-              <a:t>For backup in general?</a:t>
-            </a:r>
-          </a:p>
-          <a:p>
-            <a:pPr lvl="0"/>
-            <a:r>
-              <a:rPr lang="en-US" dirty="0" smtClean="0"/>
-              <a:t>Economically</a:t>
-            </a:r>
-            <a:r>
-              <a:rPr lang="en-US" baseline="0" dirty="0" smtClean="0"/>
-              <a:t> sound?</a:t>
-            </a:r>
-          </a:p>
-          <a:p>
-            <a:pPr lvl="1"/>
-            <a:r>
-              <a:rPr lang="en-US" baseline="0" dirty="0" smtClean="0"/>
-              <a:t>Compared to tape drives, compared to cloud storage</a:t>
-            </a:r>
-          </a:p>
-          <a:p>
-            <a:pPr lvl="0"/>
-            <a:r>
-              <a:rPr lang="en-US" baseline="0" dirty="0" smtClean="0"/>
-              <a:t>Resilience to churn?</a:t>
-            </a:r>
+              <a:t>UsenetDHT</a:t>
+            </a:r>
+            <a:endParaRPr lang="en-US" dirty="0"/>
           </a:p>
         </p:txBody>
       </p:sp>
     </p:spTree>
     <p:extLst>
       <p:ext uri="{BB962C8B-B14F-4D97-AF65-F5344CB8AC3E}">
-        <p14:creationId xmlns:p14="http://schemas.microsoft.com/office/powerpoint/2010/main" val="2160574676"/>
+        <p14:creationId xmlns:p14="http://schemas.microsoft.com/office/powerpoint/2010/main" val="1293907830"/>
       </p:ext>
     </p:extLst>
   </p:cSld>
@@ -24893,68 +24692,24 @@
       </p:grpSpPr>
       <p:sp>
         <p:nvSpPr>
-          <p:cNvPr id="5" name="Subtitle 4"/>
+          <p:cNvPr id="2" name="Title 1"/>
           <p:cNvSpPr>
             <a:spLocks noGrp="1"/>
           </p:cNvSpPr>
           <p:nvPr>
-            <p:ph type="subTitle" idx="1"/>
+            <p:ph type="title"/>
           </p:nvPr>
         </p:nvSpPr>
         <p:spPr/>
         <p:txBody>
-          <a:bodyPr>
-            <a:normAutofit fontScale="92500" lnSpcReduction="20000"/>
-          </a:bodyPr>
-          <a:lstStyle/>
-          <a:p>
-            <a:r>
-              <a:rPr lang="en-US" dirty="0" smtClean="0"/>
-              <a:t>NDSI ’08</a:t>
-            </a:r>
-          </a:p>
-          <a:p>
-            <a:endParaRPr lang="en-US" dirty="0" smtClean="0"/>
-          </a:p>
-          <a:p>
-            <a:r>
-              <a:rPr lang="en-US" dirty="0" smtClean="0"/>
-              <a:t>Emil sit</a:t>
-            </a:r>
-          </a:p>
-          <a:p>
-            <a:r>
-              <a:rPr lang="en-US" dirty="0" smtClean="0"/>
-              <a:t>Robert Morris</a:t>
-            </a:r>
-          </a:p>
-          <a:p>
-            <a:r>
-              <a:rPr lang="en-US" dirty="0" smtClean="0"/>
-              <a:t>M. </a:t>
-            </a:r>
-            <a:r>
-              <a:rPr lang="en-US" dirty="0" err="1" smtClean="0"/>
-              <a:t>Frans</a:t>
-            </a:r>
-            <a:r>
-              <a:rPr lang="en-US" dirty="0" smtClean="0"/>
-              <a:t> </a:t>
-            </a:r>
-            <a:r>
-              <a:rPr lang="en-US" dirty="0" err="1" smtClean="0"/>
-              <a:t>Kaashoek</a:t>
-            </a:r>
-            <a:endParaRPr lang="en-US" dirty="0" smtClean="0"/>
-          </a:p>
-          <a:p>
-            <a:endParaRPr lang="en-US" dirty="0" smtClean="0"/>
-          </a:p>
-          <a:p>
-            <a:r>
-              <a:rPr lang="en-US" dirty="0" smtClean="0"/>
-              <a:t>MIT CSAIL</a:t>
-            </a:r>
+          <a:bodyPr/>
+          <a:lstStyle/>
+          <a:p>
+            <a:r>
+              <a:rPr lang="en-US" dirty="0" smtClean="0"/>
+              <a:t>Background: Usenet</a:t>
+            </a:r>
+            <a:endParaRPr lang="en-US" dirty="0"/>
           </a:p>
         </p:txBody>
       </p:sp>
@@ -24983,12 +24738,12 @@
       </p:sp>
       <p:sp>
         <p:nvSpPr>
-          <p:cNvPr id="2" name="Title 1"/>
+          <p:cNvPr id="4" name="Content Placeholder 3"/>
           <p:cNvSpPr>
             <a:spLocks noGrp="1"/>
           </p:cNvSpPr>
           <p:nvPr>
-            <p:ph type="ctrTitle"/>
+            <p:ph sz="quarter" idx="1"/>
           </p:nvPr>
         </p:nvSpPr>
         <p:spPr/>
@@ -24997,8 +24752,123 @@
           <a:lstStyle/>
           <a:p>
             <a:r>
-              <a:rPr lang="en-US" dirty="0" err="1" smtClean="0"/>
-              <a:t>UsenetDHT</a:t>
+              <a:rPr lang="en-US" dirty="0" smtClean="0"/>
+              <a:t>Distributed system for discussion</a:t>
+            </a:r>
+          </a:p>
+          <a:p>
+            <a:pPr lvl="0"/>
+            <a:r>
+              <a:rPr lang="en-US" dirty="0" smtClean="0"/>
+              <a:t>Threaded discussion</a:t>
+            </a:r>
+          </a:p>
+          <a:p>
+            <a:pPr lvl="1"/>
+            <a:r>
+              <a:rPr lang="en-US" dirty="0" smtClean="0"/>
+              <a:t>Headers, article body</a:t>
+            </a:r>
+          </a:p>
+          <a:p>
+            <a:pPr lvl="1"/>
+            <a:r>
+              <a:rPr lang="en-US" dirty="0" smtClean="0"/>
+              <a:t>Different (hierarchical) groups</a:t>
+            </a:r>
+          </a:p>
+          <a:p>
+            <a:r>
+              <a:rPr lang="en-US" dirty="0" smtClean="0"/>
+              <a:t>Network of peering servers</a:t>
+            </a:r>
+          </a:p>
+          <a:p>
+            <a:pPr lvl="1"/>
+            <a:r>
+              <a:rPr lang="en-US" dirty="0" smtClean="0"/>
+              <a:t>Each server has full copy</a:t>
+            </a:r>
+          </a:p>
+          <a:p>
+            <a:pPr lvl="1"/>
+            <a:r>
+              <a:rPr lang="en-US" dirty="0" smtClean="0"/>
+              <a:t>Per-server retention policy</a:t>
+            </a:r>
+          </a:p>
+          <a:p>
+            <a:pPr lvl="1"/>
+            <a:r>
+              <a:rPr lang="en-US" dirty="0" smtClean="0"/>
+              <a:t>Articles shared via flood-fill</a:t>
+            </a:r>
+          </a:p>
+        </p:txBody>
+      </p:sp>
+      <p:pic>
+        <p:nvPicPr>
+          <p:cNvPr id="6" name="Picture 5"/>
+          <p:cNvPicPr>
+            <a:picLocks noChangeAspect="1"/>
+          </p:cNvPicPr>
+          <p:nvPr/>
+        </p:nvPicPr>
+        <p:blipFill>
+          <a:blip r:embed="rId2">
+            <a:extLst>
+              <a:ext uri="{28A0092B-C50C-407E-A947-70E740481C1C}">
+                <a14:useLocalDpi xmlns:a14="http://schemas.microsoft.com/office/drawing/2010/main" val="0"/>
+              </a:ext>
+            </a:extLst>
+          </a:blip>
+          <a:stretch>
+            <a:fillRect/>
+          </a:stretch>
+        </p:blipFill>
+        <p:spPr>
+          <a:xfrm>
+            <a:off x="5105400" y="2133600"/>
+            <a:ext cx="3524250" cy="3238500"/>
+          </a:xfrm>
+          <a:prstGeom prst="rect">
+            <a:avLst/>
+          </a:prstGeom>
+        </p:spPr>
+      </p:pic>
+      <p:sp>
+        <p:nvSpPr>
+          <p:cNvPr id="7" name="TextBox 6"/>
+          <p:cNvSpPr txBox="1"/>
+          <p:nvPr/>
+        </p:nvSpPr>
+        <p:spPr>
+          <a:xfrm>
+            <a:off x="457200" y="5943600"/>
+            <a:ext cx="8404865" cy="369332"/>
+          </a:xfrm>
+          <a:prstGeom prst="rect">
+            <a:avLst/>
+          </a:prstGeom>
+          <a:noFill/>
+        </p:spPr>
+        <p:txBody>
+          <a:bodyPr wrap="none" rtlCol="0">
+            <a:spAutoFit/>
+          </a:bodyPr>
+          <a:lstStyle/>
+          <a:p>
+            <a:r>
+              <a:rPr lang="en-US" dirty="0" smtClean="0"/>
+              <a:t>(Image from http</a:t>
+            </a:r>
+            <a:r>
+              <a:rPr lang="en-US" dirty="0"/>
+              <a:t>://</a:t>
+            </a:r>
+            <a:r>
+              <a:rPr lang="en-US" dirty="0" smtClean="0"/>
+              <a:t>en.wikipedia.org/wiki/File:Usenet_servers_and_clients.svg)</a:t>
             </a:r>
             <a:endParaRPr lang="en-US" dirty="0"/>
           </a:p>
@@ -25007,7 +24877,7 @@
     </p:spTree>
     <p:extLst>
       <p:ext uri="{BB962C8B-B14F-4D97-AF65-F5344CB8AC3E}">
-        <p14:creationId xmlns:p14="http://schemas.microsoft.com/office/powerpoint/2010/main" val="1293907830"/>
+        <p14:creationId xmlns:p14="http://schemas.microsoft.com/office/powerpoint/2010/main" val="1868385487"/>
       </p:ext>
     </p:extLst>
   </p:cSld>
@@ -25057,8 +24927,8 @@
           <a:lstStyle/>
           <a:p>
             <a:r>
-              <a:rPr lang="en-US" dirty="0" smtClean="0"/>
-              <a:t>Background: Usenet</a:t>
+              <a:rPr lang="en-US" dirty="0" err="1" smtClean="0"/>
+              <a:t>UsenetDHT</a:t>
             </a:r>
             <a:endParaRPr lang="en-US" dirty="0"/>
           </a:p>
@@ -25104,131 +24974,90 @@
           <a:p>
             <a:r>
               <a:rPr lang="en-US" dirty="0" smtClean="0"/>
-              <a:t>Distributed system for discussion</a:t>
+              <a:t>Problem:</a:t>
+            </a:r>
+          </a:p>
+          <a:p>
+            <a:pPr lvl="1"/>
+            <a:r>
+              <a:rPr lang="en-US" dirty="0" smtClean="0"/>
+              <a:t>Each server stores copies of</a:t>
+            </a:r>
+            <a:r>
+              <a:rPr lang="en-US" baseline="0" dirty="0" smtClean="0"/>
+              <a:t> all articles (that it wants)</a:t>
+            </a:r>
+          </a:p>
+          <a:p>
+            <a:pPr lvl="1"/>
+            <a:r>
+              <a:rPr lang="en-US" baseline="0" dirty="0" smtClean="0"/>
+              <a:t>O(n) copies of each article!</a:t>
             </a:r>
           </a:p>
           <a:p>
             <a:pPr lvl="0"/>
             <a:r>
               <a:rPr lang="en-US" dirty="0" smtClean="0"/>
-              <a:t>Threaded discussion</a:t>
+              <a:t>Idea:</a:t>
             </a:r>
           </a:p>
           <a:p>
             <a:pPr lvl="1"/>
             <a:r>
               <a:rPr lang="en-US" dirty="0" smtClean="0"/>
-              <a:t>Headers, article body</a:t>
+              <a:t>Store articles in common store</a:t>
             </a:r>
           </a:p>
           <a:p>
             <a:pPr lvl="1"/>
             <a:r>
               <a:rPr lang="en-US" dirty="0" smtClean="0"/>
-              <a:t>Different (hierarchical) groups</a:t>
-            </a:r>
-          </a:p>
-          <a:p>
-            <a:r>
-              <a:rPr lang="en-US" dirty="0" smtClean="0"/>
-              <a:t>Network of peering servers</a:t>
+              <a:t>O(n) reduction of space used</a:t>
+            </a:r>
+          </a:p>
+          <a:p>
+            <a:pPr lvl="0"/>
+            <a:r>
+              <a:rPr lang="en-US" dirty="0" err="1" smtClean="0"/>
+              <a:t>UsenetDHT</a:t>
+            </a:r>
+            <a:r>
+              <a:rPr lang="en-US" dirty="0" smtClean="0"/>
+              <a:t>:</a:t>
             </a:r>
           </a:p>
           <a:p>
             <a:pPr lvl="1"/>
             <a:r>
               <a:rPr lang="en-US" dirty="0" smtClean="0"/>
-              <a:t>Each server has full copy</a:t>
+              <a:t>Peer-to-peer applications</a:t>
             </a:r>
           </a:p>
           <a:p>
             <a:pPr lvl="1"/>
             <a:r>
               <a:rPr lang="en-US" dirty="0" smtClean="0"/>
-              <a:t>Per-server retention policy</a:t>
+              <a:t>Each node acts as Usenet</a:t>
+            </a:r>
+            <a:r>
+              <a:rPr lang="en-US" baseline="0" dirty="0" smtClean="0"/>
+              <a:t> frontend, and DHT node</a:t>
             </a:r>
           </a:p>
           <a:p>
             <a:pPr lvl="1"/>
             <a:r>
-              <a:rPr lang="en-US" dirty="0" smtClean="0"/>
-              <a:t>Articles shared via flood-fill</a:t>
-            </a:r>
-          </a:p>
-        </p:txBody>
-      </p:sp>
-      <p:pic>
-        <p:nvPicPr>
-          <p:cNvPr id="6" name="Picture 5"/>
-          <p:cNvPicPr>
-            <a:picLocks noChangeAspect="1"/>
-          </p:cNvPicPr>
-          <p:nvPr/>
-        </p:nvPicPr>
-        <p:blipFill>
-          <a:blip r:embed="rId2">
-            <a:extLst>
-              <a:ext uri="{28A0092B-C50C-407E-A947-70E740481C1C}">
-                <a14:useLocalDpi xmlns:a14="http://schemas.microsoft.com/office/drawing/2010/main" val="0"/>
-              </a:ext>
-            </a:extLst>
-          </a:blip>
-          <a:stretch>
-            <a:fillRect/>
-          </a:stretch>
-        </p:blipFill>
-        <p:spPr>
-          <a:xfrm>
-            <a:off x="5105400" y="2133600"/>
-            <a:ext cx="3524250" cy="3238500"/>
-          </a:xfrm>
-          <a:prstGeom prst="rect">
-            <a:avLst/>
-          </a:prstGeom>
-        </p:spPr>
-      </p:pic>
-      <p:sp>
-        <p:nvSpPr>
-          <p:cNvPr id="7" name="TextBox 6"/>
-          <p:cNvSpPr txBox="1"/>
-          <p:nvPr/>
-        </p:nvSpPr>
-        <p:spPr>
-          <a:xfrm>
-            <a:off x="457200" y="5943600"/>
-            <a:ext cx="8404865" cy="369332"/>
-          </a:xfrm>
-          <a:prstGeom prst="rect">
-            <a:avLst/>
-          </a:prstGeom>
-          <a:noFill/>
-        </p:spPr>
-        <p:txBody>
-          <a:bodyPr wrap="none" rtlCol="0">
-            <a:spAutoFit/>
-          </a:bodyPr>
-          <a:lstStyle/>
-          <a:p>
-            <a:r>
-              <a:rPr lang="en-US" dirty="0" smtClean="0"/>
-              <a:t>(Image from http</a:t>
-            </a:r>
-            <a:r>
-              <a:rPr lang="en-US" dirty="0"/>
-              <a:t>://</a:t>
-            </a:r>
-            <a:r>
-              <a:rPr lang="en-US" dirty="0" smtClean="0"/>
-              <a:t>en.wikipedia.org/wiki/File:Usenet_servers_and_clients.svg)</a:t>
-            </a:r>
-            <a:endParaRPr lang="en-US" dirty="0"/>
+              <a:rPr lang="en-US" baseline="0" dirty="0" smtClean="0"/>
+              <a:t>Headers flood-filled as normal, articles stored in DHT</a:t>
+            </a:r>
           </a:p>
         </p:txBody>
       </p:sp>
     </p:spTree>
     <p:extLst>
       <p:ext uri="{BB962C8B-B14F-4D97-AF65-F5344CB8AC3E}">
-        <p14:creationId xmlns:p14="http://schemas.microsoft.com/office/powerpoint/2010/main" val="1868385487"/>
+        <p14:creationId xmlns:p14="http://schemas.microsoft.com/office/powerpoint/2010/main" val="1217706295"/>
       </p:ext>
     </p:extLst>
   </p:cSld>
@@ -25437,15 +25266,7 @@
           <a:p>
             <a:r>
               <a:rPr lang="en-US" dirty="0" smtClean="0"/>
-              <a:t>Desired Performance, as observed </a:t>
-            </a:r>
-            <a:r>
-              <a:rPr lang="en-US" dirty="0" err="1" smtClean="0"/>
-              <a:t>PlanetLab</a:t>
-            </a:r>
-            <a:r>
-              <a:rPr lang="en-US" dirty="0" smtClean="0"/>
-              <a:t> nodes at Rice and University of Utah</a:t>
+              <a:t>Desired Performance, as observed PlanetLab nodes at Rice and University of Utah</a:t>
             </a:r>
             <a:endParaRPr lang="en-US" dirty="0"/>
           </a:p>
@@ -25504,8 +25325,8 @@
           <a:lstStyle/>
           <a:p>
             <a:r>
-              <a:rPr lang="en-US" dirty="0" err="1" smtClean="0"/>
-              <a:t>UsenetDHT</a:t>
+              <a:rPr lang="en-US" dirty="0" smtClean="0"/>
+              <a:t>Discussion</a:t>
             </a:r>
             <a:endParaRPr lang="en-US" dirty="0"/>
           </a:p>
@@ -25529,186 +25350,6 @@
             <a:fld id="{7D5018C4-273E-49AF-93AB-259FCF9A742C}" type="slidenum">
               <a:rPr lang="en-US" smtClean="0"/>
               <a:t>50</a:t>
-            </a:fld>
-            <a:endParaRPr lang="en-US"/>
-          </a:p>
-        </p:txBody>
-      </p:sp>
-      <p:sp>
-        <p:nvSpPr>
-          <p:cNvPr id="4" name="Content Placeholder 3"/>
-          <p:cNvSpPr>
-            <a:spLocks noGrp="1"/>
-          </p:cNvSpPr>
-          <p:nvPr>
-            <p:ph sz="quarter" idx="1"/>
-          </p:nvPr>
-        </p:nvSpPr>
-        <p:spPr/>
-        <p:txBody>
-          <a:bodyPr/>
-          <a:lstStyle/>
-          <a:p>
-            <a:r>
-              <a:rPr lang="en-US" dirty="0" smtClean="0"/>
-              <a:t>Problem:</a:t>
-            </a:r>
-          </a:p>
-          <a:p>
-            <a:pPr lvl="1"/>
-            <a:r>
-              <a:rPr lang="en-US" dirty="0" smtClean="0"/>
-              <a:t>Each server stores copies of</a:t>
-            </a:r>
-            <a:r>
-              <a:rPr lang="en-US" baseline="0" dirty="0" smtClean="0"/>
-              <a:t> all articles (that it wants)</a:t>
-            </a:r>
-          </a:p>
-          <a:p>
-            <a:pPr lvl="1"/>
-            <a:r>
-              <a:rPr lang="en-US" baseline="0" dirty="0" smtClean="0"/>
-              <a:t>O(n) copies of each article!</a:t>
-            </a:r>
-          </a:p>
-          <a:p>
-            <a:pPr lvl="0"/>
-            <a:r>
-              <a:rPr lang="en-US" dirty="0" smtClean="0"/>
-              <a:t>Idea:</a:t>
-            </a:r>
-          </a:p>
-          <a:p>
-            <a:pPr lvl="1"/>
-            <a:r>
-              <a:rPr lang="en-US" dirty="0" smtClean="0"/>
-              <a:t>Store articles in common store</a:t>
-            </a:r>
-          </a:p>
-          <a:p>
-            <a:pPr lvl="1"/>
-            <a:r>
-              <a:rPr lang="en-US" dirty="0" smtClean="0"/>
-              <a:t>O(n) reduction of space used</a:t>
-            </a:r>
-          </a:p>
-          <a:p>
-            <a:pPr lvl="0"/>
-            <a:r>
-              <a:rPr lang="en-US" dirty="0" err="1" smtClean="0"/>
-              <a:t>UsenetDHT</a:t>
-            </a:r>
-            <a:r>
-              <a:rPr lang="en-US" dirty="0" smtClean="0"/>
-              <a:t>:</a:t>
-            </a:r>
-          </a:p>
-          <a:p>
-            <a:pPr lvl="1"/>
-            <a:r>
-              <a:rPr lang="en-US" dirty="0" smtClean="0"/>
-              <a:t>Peer-to-peer applications</a:t>
-            </a:r>
-          </a:p>
-          <a:p>
-            <a:pPr lvl="1"/>
-            <a:r>
-              <a:rPr lang="en-US" dirty="0" smtClean="0"/>
-              <a:t>Each node acts as Usenet</a:t>
-            </a:r>
-            <a:r>
-              <a:rPr lang="en-US" baseline="0" dirty="0" smtClean="0"/>
-              <a:t> frontend, and DHT node</a:t>
-            </a:r>
-          </a:p>
-          <a:p>
-            <a:pPr lvl="1"/>
-            <a:r>
-              <a:rPr lang="en-US" baseline="0" dirty="0" smtClean="0"/>
-              <a:t>Headers flood-filled as normal, articles stored in DHT</a:t>
-            </a:r>
-          </a:p>
-        </p:txBody>
-      </p:sp>
-    </p:spTree>
-    <p:extLst>
-      <p:ext uri="{BB962C8B-B14F-4D97-AF65-F5344CB8AC3E}">
-        <p14:creationId xmlns:p14="http://schemas.microsoft.com/office/powerpoint/2010/main" val="1217706295"/>
-      </p:ext>
-    </p:extLst>
-  </p:cSld>
-  <p:clrMapOvr>
-    <a:masterClrMapping/>
-  </p:clrMapOvr>
-  <p:timing>
-    <p:tnLst>
-      <p:par>
-        <p:cTn id="1" dur="indefinite" restart="never" nodeType="tmRoot"/>
-      </p:par>
-    </p:tnLst>
-  </p:timing>
-</p:sld>
-</file>
-
-<file path=ppt/slides/slide51.xml><?xml version="1.0" encoding="utf-8"?>
-<p:sld xmlns:a="http://schemas.openxmlformats.org/drawingml/2006/main" xmlns:r="http://schemas.openxmlformats.org/officeDocument/2006/relationships" xmlns:p="http://schemas.openxmlformats.org/presentationml/2006/main">
-  <p:cSld>
-    <p:spTree>
-      <p:nvGrpSpPr>
-        <p:cNvPr id="1" name=""/>
-        <p:cNvGrpSpPr/>
-        <p:nvPr/>
-      </p:nvGrpSpPr>
-      <p:grpSpPr>
-        <a:xfrm>
-          <a:off x="0" y="0"/>
-          <a:ext cx="0" cy="0"/>
-          <a:chOff x="0" y="0"/>
-          <a:chExt cx="0" cy="0"/>
-        </a:xfrm>
-      </p:grpSpPr>
-      <p:sp>
-        <p:nvSpPr>
-          <p:cNvPr id="2" name="Title 1"/>
-          <p:cNvSpPr>
-            <a:spLocks noGrp="1"/>
-          </p:cNvSpPr>
-          <p:nvPr>
-            <p:ph type="title"/>
-          </p:nvPr>
-        </p:nvSpPr>
-        <p:spPr/>
-        <p:txBody>
-          <a:bodyPr/>
-          <a:lstStyle/>
-          <a:p>
-            <a:r>
-              <a:rPr lang="en-US" dirty="0" smtClean="0"/>
-              <a:t>Discussion</a:t>
-            </a:r>
-            <a:endParaRPr lang="en-US" dirty="0"/>
-          </a:p>
-        </p:txBody>
-      </p:sp>
-      <p:sp>
-        <p:nvSpPr>
-          <p:cNvPr id="3" name="Slide Number Placeholder 2"/>
-          <p:cNvSpPr>
-            <a:spLocks noGrp="1"/>
-          </p:cNvSpPr>
-          <p:nvPr>
-            <p:ph type="sldNum" sz="quarter" idx="12"/>
-          </p:nvPr>
-        </p:nvSpPr>
-        <p:spPr/>
-        <p:txBody>
-          <a:bodyPr/>
-          <a:lstStyle/>
-          <a:p>
-            <a:fld id="{7D5018C4-273E-49AF-93AB-259FCF9A742C}" type="slidenum">
-              <a:rPr lang="en-US" smtClean="0"/>
-              <a:t>51</a:t>
             </a:fld>
             <a:endParaRPr lang="en-US"/>
           </a:p>
@@ -25903,12 +25544,8 @@
           <a:lstStyle/>
           <a:p>
             <a:r>
-              <a:rPr lang="en-US" dirty="0" err="1" smtClean="0"/>
-              <a:t>PlanetLab</a:t>
-            </a:r>
-            <a:r>
-              <a:rPr lang="en-US" dirty="0" smtClean="0"/>
-              <a:t> </a:t>
+              <a:rPr lang="en-US" dirty="0" smtClean="0"/>
+              <a:t>PlanetLab </a:t>
             </a:r>
           </a:p>
           <a:p>
@@ -25934,10 +25571,9 @@
           </a:p>
           <a:p>
             <a:r>
-              <a:rPr lang="en-US" dirty="0" err="1" smtClean="0"/>
+              <a:rPr lang="en-US" dirty="0" smtClean="0"/>
               <a:t>CoDeeN</a:t>
             </a:r>
-            <a:endParaRPr lang="en-US" dirty="0" smtClean="0"/>
           </a:p>
           <a:p>
             <a:pPr lvl="1"/>
@@ -25964,13 +25600,8 @@
             <a:pPr lvl="1"/>
             <a:r>
               <a:rPr lang="en-US" dirty="0" smtClean="0"/>
-              <a:t>Built on top of </a:t>
-            </a:r>
-            <a:r>
-              <a:rPr lang="en-US" dirty="0" err="1" smtClean="0"/>
-              <a:t>PlanetLab</a:t>
-            </a:r>
-            <a:endParaRPr lang="en-US" dirty="0" smtClean="0"/>
+              <a:t>Built on top of PlanetLab</a:t>
+            </a:r>
           </a:p>
           <a:p>
             <a:pPr lvl="1"/>
@@ -26092,7 +25723,7 @@
         </p:blipFill>
         <p:spPr bwMode="auto">
           <a:xfrm>
-            <a:off x="1828800" y="1219200"/>
+            <a:off x="1828800" y="1673219"/>
             <a:ext cx="5486400" cy="917581"/>
           </a:xfrm>
           <a:prstGeom prst="rect">
@@ -26146,7 +25777,7 @@
         </p:blipFill>
         <p:spPr bwMode="auto">
           <a:xfrm>
-            <a:off x="1817914" y="2487970"/>
+            <a:off x="1817914" y="2882875"/>
             <a:ext cx="5486400" cy="927125"/>
           </a:xfrm>
           <a:prstGeom prst="rect">
@@ -26200,7 +25831,7 @@
         </p:blipFill>
         <p:spPr bwMode="auto">
           <a:xfrm>
-            <a:off x="1793420" y="3861560"/>
+            <a:off x="1828800" y="4114800"/>
             <a:ext cx="5486400" cy="927125"/>
           </a:xfrm>
           <a:prstGeom prst="rect">
@@ -26239,8 +25870,8 @@
         </p:nvSpPr>
         <p:spPr>
           <a:xfrm>
-            <a:off x="4110061" y="2136781"/>
-            <a:ext cx="853119" cy="369332"/>
+            <a:off x="4136157" y="2557046"/>
+            <a:ext cx="849913" cy="338554"/>
           </a:xfrm>
           <a:prstGeom prst="rect">
             <a:avLst/>
@@ -26254,10 +25885,10 @@
           <a:lstStyle/>
           <a:p>
             <a:r>
-              <a:rPr lang="en-US" dirty="0" smtClean="0"/>
+              <a:rPr lang="en-US" sz="1600" dirty="0" smtClean="0"/>
               <a:t>Cornell</a:t>
             </a:r>
-            <a:endParaRPr lang="en-US" dirty="0"/>
+            <a:endParaRPr lang="en-US" sz="1600" dirty="0"/>
           </a:p>
         </p:txBody>
       </p:sp>
@@ -26269,8 +25900,8 @@
         </p:nvSpPr>
         <p:spPr>
           <a:xfrm>
-            <a:off x="3439114" y="3431393"/>
-            <a:ext cx="2118272" cy="369332"/>
+            <a:off x="3531824" y="3810000"/>
+            <a:ext cx="2077813" cy="338554"/>
           </a:xfrm>
           <a:prstGeom prst="rect">
             <a:avLst/>
@@ -26284,10 +25915,10 @@
           <a:lstStyle/>
           <a:p>
             <a:r>
-              <a:rPr lang="en-US" dirty="0" smtClean="0"/>
+              <a:rPr lang="en-US" sz="1600" dirty="0" smtClean="0"/>
               <a:t>University of Oregon</a:t>
             </a:r>
-            <a:endParaRPr lang="en-US" dirty="0"/>
+            <a:endParaRPr lang="en-US" sz="1600" dirty="0"/>
           </a:p>
         </p:txBody>
       </p:sp>
@@ -26299,8 +25930,8 @@
         </p:nvSpPr>
         <p:spPr>
           <a:xfrm>
-            <a:off x="3395570" y="4788685"/>
-            <a:ext cx="2282100" cy="369332"/>
+            <a:off x="3450397" y="5034379"/>
+            <a:ext cx="2262158" cy="338554"/>
           </a:xfrm>
           <a:prstGeom prst="rect">
             <a:avLst/>
@@ -26314,7 +25945,7 @@
           <a:lstStyle/>
           <a:p>
             <a:r>
-              <a:rPr lang="en-US" dirty="0" smtClean="0"/>
+              <a:rPr lang="en-US" sz="1600" dirty="0" smtClean="0"/>
               <a:t>University of Michigan</a:t>
             </a:r>
           </a:p>
@@ -26343,7 +25974,7 @@
         </p:blipFill>
         <p:spPr bwMode="auto">
           <a:xfrm>
-            <a:off x="1849527" y="5158017"/>
+            <a:off x="1817914" y="5334000"/>
             <a:ext cx="5486400" cy="804418"/>
           </a:xfrm>
           <a:prstGeom prst="rect">
@@ -26382,8 +26013,8 @@
         </p:nvSpPr>
         <p:spPr>
           <a:xfrm>
-            <a:off x="3361651" y="5980969"/>
-            <a:ext cx="2398926" cy="369332"/>
+            <a:off x="3395570" y="6067578"/>
+            <a:ext cx="2350323" cy="338554"/>
           </a:xfrm>
           <a:prstGeom prst="rect">
             <a:avLst/>
@@ -26397,10 +26028,10 @@
           <a:lstStyle/>
           <a:p>
             <a:r>
-              <a:rPr lang="en-US" dirty="0" smtClean="0"/>
+              <a:rPr lang="en-US" sz="1600" dirty="0" smtClean="0"/>
               <a:t>University of Tennessee</a:t>
             </a:r>
-            <a:endParaRPr lang="en-US" dirty="0"/>
+            <a:endParaRPr lang="en-US" sz="1600" dirty="0"/>
           </a:p>
         </p:txBody>
       </p:sp>
@@ -26412,8 +26043,8 @@
         </p:nvSpPr>
         <p:spPr>
           <a:xfrm>
-            <a:off x="2209800" y="1219200"/>
-            <a:ext cx="228600" cy="5029200"/>
+            <a:off x="2209800" y="1600200"/>
+            <a:ext cx="228600" cy="4648200"/>
           </a:xfrm>
           <a:prstGeom prst="rect">
             <a:avLst/>

</xml_diff>

<commit_message>
presentation: remove graphicaly depiction of replica diversion threshold; clouds are tacky.
</commit_message>
<xml_diff>
--- a/p2p/P2P Apps.pptx
+++ b/p2p/P2P Apps.pptx
@@ -19635,876 +19635,61 @@
               <a:t>‘t’ is system parameter</a:t>
             </a:r>
           </a:p>
-        </p:txBody>
-      </p:sp>
-      <p:cxnSp>
-        <p:nvCxnSpPr>
-          <p:cNvPr id="5" name="Straight Connector 4"/>
-          <p:cNvCxnSpPr/>
-          <p:nvPr/>
-        </p:nvCxnSpPr>
-        <p:spPr>
-          <a:xfrm flipH="1" flipV="1">
-            <a:off x="152400" y="4050268"/>
-            <a:ext cx="8839200" cy="3048"/>
-          </a:xfrm>
-          <a:prstGeom prst="line">
-            <a:avLst/>
-          </a:prstGeom>
-        </p:spPr>
-        <p:style>
-          <a:lnRef idx="3">
-            <a:schemeClr val="dk1"/>
-          </a:lnRef>
-          <a:fillRef idx="0">
-            <a:schemeClr val="dk1"/>
-          </a:fillRef>
-          <a:effectRef idx="2">
-            <a:schemeClr val="dk1"/>
-          </a:effectRef>
-          <a:fontRef idx="minor">
-            <a:schemeClr val="tx1"/>
-          </a:fontRef>
-        </p:style>
-      </p:cxnSp>
-      <p:sp>
-        <p:nvSpPr>
-          <p:cNvPr id="6" name="Oval 5"/>
-          <p:cNvSpPr/>
-          <p:nvPr/>
-        </p:nvSpPr>
-        <p:spPr>
-          <a:xfrm>
-            <a:off x="3190807" y="3528295"/>
-            <a:ext cx="914400" cy="914400"/>
-          </a:xfrm>
-          <a:prstGeom prst="ellipse">
-            <a:avLst/>
-          </a:prstGeom>
-        </p:spPr>
-        <p:style>
-          <a:lnRef idx="2">
-            <a:schemeClr val="accent1">
-              <a:shade val="50000"/>
-            </a:schemeClr>
-          </a:lnRef>
-          <a:fillRef idx="1">
-            <a:schemeClr val="accent1"/>
-          </a:fillRef>
-          <a:effectRef idx="0">
-            <a:schemeClr val="accent1"/>
-          </a:effectRef>
-          <a:fontRef idx="minor">
-            <a:schemeClr val="lt1"/>
-          </a:fontRef>
-        </p:style>
-        <p:txBody>
-          <a:bodyPr rtlCol="0" anchor="ctr"/>
-          <a:lstStyle/>
-          <a:p>
-            <a:pPr algn="ctr"/>
-            <a:r>
-              <a:rPr lang="en-US" dirty="0"/>
-              <a:t>A</a:t>
-            </a:r>
-          </a:p>
-        </p:txBody>
-      </p:sp>
-      <p:sp>
-        <p:nvSpPr>
-          <p:cNvPr id="7" name="Oval 6"/>
-          <p:cNvSpPr/>
-          <p:nvPr/>
-        </p:nvSpPr>
-        <p:spPr>
-          <a:xfrm>
-            <a:off x="4219545" y="3528295"/>
-            <a:ext cx="914400" cy="914400"/>
-          </a:xfrm>
-          <a:prstGeom prst="ellipse">
-            <a:avLst/>
-          </a:prstGeom>
-        </p:spPr>
-        <p:style>
-          <a:lnRef idx="2">
-            <a:schemeClr val="accent1">
-              <a:shade val="50000"/>
-            </a:schemeClr>
-          </a:lnRef>
-          <a:fillRef idx="1">
-            <a:schemeClr val="accent1"/>
-          </a:fillRef>
-          <a:effectRef idx="0">
-            <a:schemeClr val="accent1"/>
-          </a:effectRef>
-          <a:fontRef idx="minor">
-            <a:schemeClr val="lt1"/>
-          </a:fontRef>
-        </p:style>
-        <p:txBody>
-          <a:bodyPr rtlCol="0" anchor="ctr"/>
-          <a:lstStyle/>
-          <a:p>
-            <a:pPr algn="ctr"/>
-            <a:r>
-              <a:rPr lang="en-US" dirty="0" smtClean="0"/>
-              <a:t>N</a:t>
-            </a:r>
-            <a:endParaRPr lang="en-US" dirty="0"/>
-          </a:p>
-        </p:txBody>
-      </p:sp>
-      <p:sp>
-        <p:nvSpPr>
-          <p:cNvPr id="8" name="Oval 7"/>
-          <p:cNvSpPr/>
-          <p:nvPr/>
-        </p:nvSpPr>
-        <p:spPr>
-          <a:xfrm>
-            <a:off x="5261499" y="3528295"/>
-            <a:ext cx="914400" cy="914400"/>
-          </a:xfrm>
-          <a:prstGeom prst="ellipse">
-            <a:avLst/>
-          </a:prstGeom>
-        </p:spPr>
-        <p:style>
-          <a:lnRef idx="2">
-            <a:schemeClr val="accent1">
-              <a:shade val="50000"/>
-            </a:schemeClr>
-          </a:lnRef>
-          <a:fillRef idx="1">
-            <a:schemeClr val="accent1"/>
-          </a:fillRef>
-          <a:effectRef idx="0">
-            <a:schemeClr val="accent1"/>
-          </a:effectRef>
-          <a:fontRef idx="minor">
-            <a:schemeClr val="lt1"/>
-          </a:fontRef>
-        </p:style>
-        <p:txBody>
-          <a:bodyPr rtlCol="0" anchor="ctr"/>
-          <a:lstStyle/>
-          <a:p>
-            <a:pPr algn="ctr"/>
-            <a:endParaRPr lang="en-US" dirty="0"/>
-          </a:p>
-        </p:txBody>
-      </p:sp>
-      <p:sp>
-        <p:nvSpPr>
-          <p:cNvPr id="9" name="Oval 8"/>
-          <p:cNvSpPr/>
-          <p:nvPr/>
-        </p:nvSpPr>
-        <p:spPr>
-          <a:xfrm>
-            <a:off x="2154397" y="3528295"/>
-            <a:ext cx="914400" cy="914400"/>
-          </a:xfrm>
-          <a:prstGeom prst="ellipse">
-            <a:avLst/>
-          </a:prstGeom>
-        </p:spPr>
-        <p:style>
-          <a:lnRef idx="2">
-            <a:schemeClr val="accent1">
-              <a:shade val="50000"/>
-            </a:schemeClr>
-          </a:lnRef>
-          <a:fillRef idx="1">
-            <a:schemeClr val="accent1"/>
-          </a:fillRef>
-          <a:effectRef idx="0">
-            <a:schemeClr val="accent1"/>
-          </a:effectRef>
-          <a:fontRef idx="minor">
-            <a:schemeClr val="lt1"/>
-          </a:fontRef>
-        </p:style>
-        <p:txBody>
-          <a:bodyPr rtlCol="0" anchor="ctr"/>
-          <a:lstStyle/>
-          <a:p>
-            <a:pPr algn="ctr"/>
-            <a:endParaRPr lang="en-US" dirty="0"/>
-          </a:p>
-        </p:txBody>
-      </p:sp>
-      <p:cxnSp>
-        <p:nvCxnSpPr>
-          <p:cNvPr id="10" name="Elbow Connector 9"/>
-          <p:cNvCxnSpPr>
-            <a:stCxn id="7" idx="0"/>
-            <a:endCxn id="6" idx="0"/>
-          </p:cNvCxnSpPr>
-          <p:nvPr/>
-        </p:nvCxnSpPr>
-        <p:spPr>
-          <a:xfrm rot="16200000" flipV="1">
-            <a:off x="4162376" y="3013926"/>
-            <a:ext cx="12700" cy="1028738"/>
-          </a:xfrm>
-          <a:prstGeom prst="bentConnector3">
-            <a:avLst>
-              <a:gd name="adj1" fmla="val 1800000"/>
-            </a:avLst>
-          </a:prstGeom>
-          <a:ln>
-            <a:tailEnd type="arrow"/>
-          </a:ln>
-        </p:spPr>
-        <p:style>
-          <a:lnRef idx="3">
-            <a:schemeClr val="accent5"/>
-          </a:lnRef>
-          <a:fillRef idx="0">
-            <a:schemeClr val="accent5"/>
-          </a:fillRef>
-          <a:effectRef idx="2">
-            <a:schemeClr val="accent5"/>
-          </a:effectRef>
-          <a:fontRef idx="minor">
-            <a:schemeClr val="tx1"/>
-          </a:fontRef>
-        </p:style>
-      </p:cxnSp>
-      <p:cxnSp>
-        <p:nvCxnSpPr>
-          <p:cNvPr id="11" name="Elbow Connector 10"/>
-          <p:cNvCxnSpPr>
-            <a:stCxn id="7" idx="0"/>
-            <a:endCxn id="9" idx="0"/>
-          </p:cNvCxnSpPr>
-          <p:nvPr/>
-        </p:nvCxnSpPr>
-        <p:spPr>
-          <a:xfrm rot="16200000" flipV="1">
-            <a:off x="3644171" y="2495721"/>
-            <a:ext cx="12700" cy="2065148"/>
-          </a:xfrm>
-          <a:prstGeom prst="bentConnector3">
-            <a:avLst>
-              <a:gd name="adj1" fmla="val 3407764"/>
-            </a:avLst>
-          </a:prstGeom>
-          <a:ln>
-            <a:tailEnd type="arrow"/>
-          </a:ln>
-        </p:spPr>
-        <p:style>
-          <a:lnRef idx="3">
-            <a:schemeClr val="accent5"/>
-          </a:lnRef>
-          <a:fillRef idx="0">
-            <a:schemeClr val="accent5"/>
-          </a:fillRef>
-          <a:effectRef idx="2">
-            <a:schemeClr val="accent5"/>
-          </a:effectRef>
-          <a:fontRef idx="minor">
-            <a:schemeClr val="tx1"/>
-          </a:fontRef>
-        </p:style>
-      </p:cxnSp>
-      <p:cxnSp>
-        <p:nvCxnSpPr>
-          <p:cNvPr id="12" name="Elbow Connector 11"/>
-          <p:cNvCxnSpPr>
-            <a:stCxn id="7" idx="0"/>
-            <a:endCxn id="8" idx="0"/>
-          </p:cNvCxnSpPr>
-          <p:nvPr/>
-        </p:nvCxnSpPr>
-        <p:spPr>
-          <a:xfrm rot="5400000" flipH="1" flipV="1">
-            <a:off x="5197722" y="3007318"/>
-            <a:ext cx="12700" cy="1041954"/>
-          </a:xfrm>
-          <a:prstGeom prst="bentConnector3">
-            <a:avLst>
-              <a:gd name="adj1" fmla="val 2429126"/>
-            </a:avLst>
-          </a:prstGeom>
-          <a:ln>
-            <a:tailEnd type="arrow"/>
-          </a:ln>
-        </p:spPr>
-        <p:style>
-          <a:lnRef idx="3">
-            <a:schemeClr val="accent5"/>
-          </a:lnRef>
-          <a:fillRef idx="0">
-            <a:schemeClr val="accent5"/>
-          </a:fillRef>
-          <a:effectRef idx="2">
-            <a:schemeClr val="accent5"/>
-          </a:effectRef>
-          <a:fontRef idx="minor">
-            <a:schemeClr val="tx1"/>
-          </a:fontRef>
-        </p:style>
-      </p:cxnSp>
-      <p:sp>
-        <p:nvSpPr>
-          <p:cNvPr id="13" name="Left Brace 12"/>
-          <p:cNvSpPr/>
-          <p:nvPr/>
-        </p:nvSpPr>
-        <p:spPr>
-          <a:xfrm rot="16200000">
-            <a:off x="3869236" y="3191405"/>
-            <a:ext cx="598174" cy="3100752"/>
-          </a:xfrm>
-          <a:prstGeom prst="leftBrace">
-            <a:avLst/>
-          </a:prstGeom>
-        </p:spPr>
-        <p:style>
-          <a:lnRef idx="3">
-            <a:schemeClr val="accent2"/>
-          </a:lnRef>
-          <a:fillRef idx="0">
-            <a:schemeClr val="accent2"/>
-          </a:fillRef>
-          <a:effectRef idx="2">
-            <a:schemeClr val="accent2"/>
-          </a:effectRef>
-          <a:fontRef idx="minor">
-            <a:schemeClr val="tx1"/>
-          </a:fontRef>
-        </p:style>
-        <p:txBody>
-          <a:bodyPr rtlCol="0" anchor="ctr"/>
-          <a:lstStyle/>
-          <a:p>
-            <a:pPr algn="ctr"/>
-            <a:endParaRPr lang="en-US"/>
-          </a:p>
-        </p:txBody>
-      </p:sp>
-      <p:sp>
-        <p:nvSpPr>
-          <p:cNvPr id="14" name="TextBox 13"/>
-          <p:cNvSpPr txBox="1"/>
-          <p:nvPr/>
-        </p:nvSpPr>
-        <p:spPr>
-          <a:xfrm>
-            <a:off x="3810000" y="5345668"/>
-            <a:ext cx="587020" cy="369332"/>
-          </a:xfrm>
-          <a:prstGeom prst="rect">
-            <a:avLst/>
-          </a:prstGeom>
-          <a:noFill/>
-        </p:spPr>
-        <p:txBody>
-          <a:bodyPr wrap="none" rtlCol="0">
-            <a:spAutoFit/>
-          </a:bodyPr>
-          <a:lstStyle/>
-          <a:p>
-            <a:r>
-              <a:rPr lang="en-US" dirty="0"/>
-              <a:t>k</a:t>
-            </a:r>
-            <a:r>
-              <a:rPr lang="en-US" dirty="0" smtClean="0"/>
-              <a:t>=4</a:t>
-            </a:r>
-            <a:endParaRPr lang="en-US" dirty="0"/>
-          </a:p>
-        </p:txBody>
-      </p:sp>
-      <p:sp>
-        <p:nvSpPr>
-          <p:cNvPr id="15" name="Oval 14"/>
-          <p:cNvSpPr/>
-          <p:nvPr/>
-        </p:nvSpPr>
-        <p:spPr>
-          <a:xfrm>
-            <a:off x="1143000" y="3534645"/>
-            <a:ext cx="914400" cy="914400"/>
-          </a:xfrm>
-          <a:prstGeom prst="ellipse">
-            <a:avLst/>
-          </a:prstGeom>
-        </p:spPr>
-        <p:style>
-          <a:lnRef idx="2">
-            <a:schemeClr val="accent1">
-              <a:shade val="50000"/>
-            </a:schemeClr>
-          </a:lnRef>
-          <a:fillRef idx="1">
-            <a:schemeClr val="accent1"/>
-          </a:fillRef>
-          <a:effectRef idx="0">
-            <a:schemeClr val="accent1"/>
-          </a:effectRef>
-          <a:fontRef idx="minor">
-            <a:schemeClr val="lt1"/>
-          </a:fontRef>
-        </p:style>
-        <p:txBody>
-          <a:bodyPr rtlCol="0" anchor="ctr"/>
-          <a:lstStyle/>
-          <a:p>
-            <a:pPr algn="ctr"/>
-            <a:r>
-              <a:rPr lang="en-US" dirty="0" smtClean="0"/>
-              <a:t>C</a:t>
-            </a:r>
-          </a:p>
-        </p:txBody>
-      </p:sp>
-      <p:sp>
-        <p:nvSpPr>
-          <p:cNvPr id="16" name="Oval 15"/>
-          <p:cNvSpPr/>
-          <p:nvPr/>
-        </p:nvSpPr>
-        <p:spPr>
-          <a:xfrm>
-            <a:off x="6324600" y="3534645"/>
-            <a:ext cx="914400" cy="914400"/>
-          </a:xfrm>
-          <a:prstGeom prst="ellipse">
-            <a:avLst/>
-          </a:prstGeom>
-        </p:spPr>
-        <p:style>
-          <a:lnRef idx="2">
-            <a:schemeClr val="accent1">
-              <a:shade val="50000"/>
-            </a:schemeClr>
-          </a:lnRef>
-          <a:fillRef idx="1">
-            <a:schemeClr val="accent1"/>
-          </a:fillRef>
-          <a:effectRef idx="0">
-            <a:schemeClr val="accent1"/>
-          </a:effectRef>
-          <a:fontRef idx="minor">
-            <a:schemeClr val="lt1"/>
-          </a:fontRef>
-        </p:style>
-        <p:txBody>
-          <a:bodyPr rtlCol="0" anchor="ctr"/>
-          <a:lstStyle/>
-          <a:p>
-            <a:pPr algn="ctr"/>
-            <a:endParaRPr lang="en-US" dirty="0"/>
-          </a:p>
-        </p:txBody>
-      </p:sp>
-      <p:sp>
-        <p:nvSpPr>
-          <p:cNvPr id="17" name="Oval 16"/>
-          <p:cNvSpPr/>
-          <p:nvPr/>
-        </p:nvSpPr>
-        <p:spPr>
-          <a:xfrm>
-            <a:off x="7391400" y="3534645"/>
-            <a:ext cx="914400" cy="914400"/>
-          </a:xfrm>
-          <a:prstGeom prst="ellipse">
-            <a:avLst/>
-          </a:prstGeom>
-        </p:spPr>
-        <p:style>
-          <a:lnRef idx="2">
-            <a:schemeClr val="accent1">
-              <a:shade val="50000"/>
-            </a:schemeClr>
-          </a:lnRef>
-          <a:fillRef idx="1">
-            <a:schemeClr val="accent1"/>
-          </a:fillRef>
-          <a:effectRef idx="0">
-            <a:schemeClr val="accent1"/>
-          </a:effectRef>
-          <a:fontRef idx="minor">
-            <a:schemeClr val="lt1"/>
-          </a:fontRef>
-        </p:style>
-        <p:txBody>
-          <a:bodyPr rtlCol="0" anchor="ctr"/>
-          <a:lstStyle/>
-          <a:p>
-            <a:pPr algn="ctr"/>
-            <a:r>
-              <a:rPr lang="en-US" dirty="0" smtClean="0"/>
-              <a:t>B</a:t>
-            </a:r>
-            <a:endParaRPr lang="en-US" dirty="0"/>
-          </a:p>
-        </p:txBody>
-      </p:sp>
-      <p:sp>
-        <p:nvSpPr>
-          <p:cNvPr id="18" name="TextBox 17"/>
-          <p:cNvSpPr txBox="1"/>
-          <p:nvPr/>
-        </p:nvSpPr>
-        <p:spPr>
-          <a:xfrm>
-            <a:off x="469234" y="3521944"/>
-            <a:ext cx="433132" cy="461665"/>
-          </a:xfrm>
-          <a:prstGeom prst="rect">
-            <a:avLst/>
-          </a:prstGeom>
-          <a:noFill/>
-        </p:spPr>
-        <p:txBody>
-          <a:bodyPr wrap="none" rtlCol="0">
-            <a:spAutoFit/>
-          </a:bodyPr>
-          <a:lstStyle/>
-          <a:p>
-            <a:r>
-              <a:rPr lang="en-US" sz="2400" dirty="0" smtClean="0"/>
-              <a:t>…</a:t>
-            </a:r>
-            <a:endParaRPr lang="en-US" sz="2400" dirty="0"/>
-          </a:p>
-        </p:txBody>
-      </p:sp>
-      <p:sp>
-        <p:nvSpPr>
-          <p:cNvPr id="19" name="TextBox 18"/>
-          <p:cNvSpPr txBox="1"/>
-          <p:nvPr/>
-        </p:nvSpPr>
-        <p:spPr>
-          <a:xfrm>
-            <a:off x="8458200" y="3521943"/>
-            <a:ext cx="433132" cy="461665"/>
-          </a:xfrm>
-          <a:prstGeom prst="rect">
-            <a:avLst/>
-          </a:prstGeom>
-          <a:noFill/>
-        </p:spPr>
-        <p:txBody>
-          <a:bodyPr wrap="none" rtlCol="0">
-            <a:spAutoFit/>
-          </a:bodyPr>
-          <a:lstStyle/>
-          <a:p>
-            <a:r>
-              <a:rPr lang="en-US" sz="2400" dirty="0" smtClean="0"/>
-              <a:t>…</a:t>
-            </a:r>
-            <a:endParaRPr lang="en-US" sz="2400" dirty="0"/>
-          </a:p>
-        </p:txBody>
-      </p:sp>
-      <p:cxnSp>
-        <p:nvCxnSpPr>
-          <p:cNvPr id="21" name="Elbow Connector 20"/>
-          <p:cNvCxnSpPr>
-            <a:stCxn id="6" idx="4"/>
-            <a:endCxn id="17" idx="4"/>
-          </p:cNvCxnSpPr>
-          <p:nvPr/>
-        </p:nvCxnSpPr>
-        <p:spPr>
-          <a:xfrm rot="16200000" flipH="1">
-            <a:off x="5745128" y="2345573"/>
-            <a:ext cx="6350" cy="4200593"/>
-          </a:xfrm>
-          <a:prstGeom prst="bentConnector3">
-            <a:avLst>
-              <a:gd name="adj1" fmla="val 2861102"/>
-            </a:avLst>
-          </a:prstGeom>
-          <a:ln>
-            <a:tailEnd type="arrow"/>
-          </a:ln>
-        </p:spPr>
-        <p:style>
-          <a:lnRef idx="3">
-            <a:schemeClr val="accent1"/>
-          </a:lnRef>
-          <a:fillRef idx="0">
-            <a:schemeClr val="accent1"/>
-          </a:fillRef>
-          <a:effectRef idx="2">
-            <a:schemeClr val="accent1"/>
-          </a:effectRef>
-          <a:fontRef idx="minor">
-            <a:schemeClr val="tx1"/>
-          </a:fontRef>
-        </p:style>
-      </p:cxnSp>
-      <p:cxnSp>
-        <p:nvCxnSpPr>
-          <p:cNvPr id="24" name="Elbow Connector 23"/>
-          <p:cNvCxnSpPr>
-            <a:stCxn id="15" idx="4"/>
-            <a:endCxn id="17" idx="4"/>
-          </p:cNvCxnSpPr>
-          <p:nvPr/>
-        </p:nvCxnSpPr>
-        <p:spPr>
-          <a:xfrm rot="16200000" flipH="1">
-            <a:off x="4724400" y="1324845"/>
-            <a:ext cx="12700" cy="6248400"/>
-          </a:xfrm>
-          <a:prstGeom prst="bentConnector3">
-            <a:avLst>
-              <a:gd name="adj1" fmla="val 3337866"/>
-            </a:avLst>
-          </a:prstGeom>
-          <a:ln>
-            <a:tailEnd type="arrow"/>
-          </a:ln>
-        </p:spPr>
-        <p:style>
-          <a:lnRef idx="3">
-            <a:schemeClr val="accent1"/>
-          </a:lnRef>
-          <a:fillRef idx="0">
-            <a:schemeClr val="accent1"/>
-          </a:fillRef>
-          <a:effectRef idx="2">
-            <a:schemeClr val="accent1"/>
-          </a:effectRef>
-          <a:fontRef idx="minor">
-            <a:schemeClr val="tx1"/>
-          </a:fontRef>
-        </p:style>
-      </p:cxnSp>
-      <p:sp>
-        <p:nvSpPr>
-          <p:cNvPr id="20" name="Cloud 19"/>
-          <p:cNvSpPr/>
-          <p:nvPr/>
-        </p:nvSpPr>
-        <p:spPr>
-          <a:xfrm>
-            <a:off x="2154396" y="2674308"/>
-            <a:ext cx="2874803" cy="1078468"/>
-          </a:xfrm>
-          <a:prstGeom prst="cloud">
-            <a:avLst/>
-          </a:prstGeom>
-        </p:spPr>
-        <p:style>
-          <a:lnRef idx="1">
-            <a:schemeClr val="accent1"/>
-          </a:lnRef>
-          <a:fillRef idx="2">
-            <a:schemeClr val="accent1"/>
-          </a:fillRef>
-          <a:effectRef idx="1">
-            <a:schemeClr val="accent1"/>
-          </a:effectRef>
-          <a:fontRef idx="minor">
-            <a:schemeClr val="dk1"/>
-          </a:fontRef>
-        </p:style>
-        <p:txBody>
-          <a:bodyPr rtlCol="0" anchor="ctr"/>
-          <a:lstStyle/>
-          <a:p>
-            <a:pPr algn="ctr"/>
-            <a:r>
-              <a:rPr lang="en-US" sz="1400" dirty="0" smtClean="0"/>
-              <a:t>Size / space &gt; </a:t>
-            </a:r>
-            <a:r>
-              <a:rPr lang="en-US" sz="1400" dirty="0" err="1" smtClean="0"/>
-              <a:t>t_pri</a:t>
-            </a:r>
-            <a:r>
-              <a:rPr lang="en-US" sz="1400" dirty="0"/>
-              <a:t> </a:t>
-            </a:r>
-            <a:r>
-              <a:rPr lang="en-US" sz="1400" dirty="0" smtClean="0"/>
-              <a:t>?</a:t>
-            </a:r>
-            <a:endParaRPr lang="en-US" sz="1400" dirty="0"/>
-          </a:p>
-        </p:txBody>
-      </p:sp>
-      <p:sp>
-        <p:nvSpPr>
-          <p:cNvPr id="23" name="Cloud 22"/>
-          <p:cNvSpPr/>
-          <p:nvPr/>
-        </p:nvSpPr>
-        <p:spPr>
-          <a:xfrm>
-            <a:off x="6116797" y="2674308"/>
-            <a:ext cx="2874803" cy="1078468"/>
-          </a:xfrm>
-          <a:prstGeom prst="cloud">
-            <a:avLst/>
-          </a:prstGeom>
-        </p:spPr>
-        <p:style>
-          <a:lnRef idx="1">
-            <a:schemeClr val="accent1"/>
-          </a:lnRef>
-          <a:fillRef idx="2">
-            <a:schemeClr val="accent1"/>
-          </a:fillRef>
-          <a:effectRef idx="1">
-            <a:schemeClr val="accent1"/>
-          </a:effectRef>
-          <a:fontRef idx="minor">
-            <a:schemeClr val="dk1"/>
-          </a:fontRef>
-        </p:style>
-        <p:txBody>
-          <a:bodyPr rtlCol="0" anchor="ctr"/>
-          <a:lstStyle/>
-          <a:p>
-            <a:pPr algn="ctr"/>
-            <a:r>
-              <a:rPr lang="en-US" sz="1400" dirty="0" smtClean="0"/>
-              <a:t>Size / space &gt; </a:t>
-            </a:r>
-            <a:r>
-              <a:rPr lang="en-US" sz="1400" dirty="0" err="1" smtClean="0"/>
-              <a:t>t_div</a:t>
-            </a:r>
-            <a:r>
-              <a:rPr lang="en-US" sz="1400" dirty="0" smtClean="0"/>
-              <a:t> ?</a:t>
-            </a:r>
-            <a:endParaRPr lang="en-US" sz="1400" dirty="0"/>
-          </a:p>
-        </p:txBody>
-      </p:sp>
-      <p:sp>
-        <p:nvSpPr>
-          <p:cNvPr id="22" name="TextBox 21"/>
-          <p:cNvSpPr txBox="1"/>
-          <p:nvPr/>
-        </p:nvSpPr>
-        <p:spPr>
-          <a:xfrm>
-            <a:off x="469233" y="5913099"/>
-            <a:ext cx="8422099" cy="369332"/>
-          </a:xfrm>
-          <a:prstGeom prst="rect">
-            <a:avLst/>
-          </a:prstGeom>
-          <a:noFill/>
-        </p:spPr>
-        <p:txBody>
-          <a:bodyPr wrap="square" rtlCol="0">
-            <a:spAutoFit/>
-          </a:bodyPr>
-          <a:lstStyle/>
-          <a:p>
+          <a:p>
+            <a:r>
+              <a:rPr lang="en-US" dirty="0" smtClean="0"/>
+              <a:t>Two ‘t’ parameters</a:t>
+            </a:r>
+          </a:p>
+          <a:p>
+            <a:pPr lvl="1"/>
             <a:r>
               <a:rPr lang="en-US" dirty="0" err="1" smtClean="0"/>
               <a:t>t_pri</a:t>
             </a:r>
             <a:r>
               <a:rPr lang="en-US" dirty="0" smtClean="0"/>
-              <a:t> &gt; </a:t>
-            </a:r>
+              <a:t> – Threshold for accepting primary replica</a:t>
+            </a:r>
+          </a:p>
+          <a:p>
+            <a:pPr lvl="1"/>
             <a:r>
               <a:rPr lang="en-US" dirty="0" err="1" smtClean="0"/>
               <a:t>t_div</a:t>
             </a:r>
             <a:r>
               <a:rPr lang="en-US" dirty="0" smtClean="0"/>
-              <a:t>, prioritize primary replicas at a node over storing diverted files</a:t>
-            </a:r>
-            <a:endParaRPr lang="en-US" dirty="0"/>
-          </a:p>
-        </p:txBody>
-      </p:sp>
-      <p:sp>
-        <p:nvSpPr>
-          <p:cNvPr id="26" name="Oval 25"/>
-          <p:cNvSpPr/>
-          <p:nvPr/>
-        </p:nvSpPr>
-        <p:spPr>
-          <a:xfrm>
-            <a:off x="6007766" y="2135195"/>
-            <a:ext cx="2667000" cy="2156693"/>
-          </a:xfrm>
-          <a:prstGeom prst="ellipse">
-            <a:avLst/>
-          </a:prstGeom>
-          <a:noFill/>
-          <a:ln w="76200">
-            <a:solidFill>
-              <a:schemeClr val="accent1">
-                <a:lumMod val="75000"/>
-              </a:schemeClr>
-            </a:solidFill>
-            <a:prstDash val="solid"/>
-          </a:ln>
-        </p:spPr>
-        <p:style>
-          <a:lnRef idx="2">
-            <a:schemeClr val="accent1">
-              <a:shade val="50000"/>
-            </a:schemeClr>
-          </a:lnRef>
-          <a:fillRef idx="1">
-            <a:schemeClr val="accent1"/>
-          </a:fillRef>
-          <a:effectRef idx="0">
-            <a:schemeClr val="accent1"/>
-          </a:effectRef>
-          <a:fontRef idx="minor">
-            <a:schemeClr val="lt1"/>
-          </a:fontRef>
-        </p:style>
-        <p:txBody>
-          <a:bodyPr rtlCol="0" anchor="ctr"/>
-          <a:lstStyle/>
-          <a:p>
-            <a:pPr algn="ctr"/>
-            <a:endParaRPr lang="en-US"/>
-          </a:p>
-        </p:txBody>
-      </p:sp>
-      <p:sp>
-        <p:nvSpPr>
-          <p:cNvPr id="27" name="TextBox 26"/>
-          <p:cNvSpPr txBox="1"/>
-          <p:nvPr/>
-        </p:nvSpPr>
-        <p:spPr>
-          <a:xfrm>
-            <a:off x="5718698" y="1600200"/>
-            <a:ext cx="3337773" cy="369332"/>
-          </a:xfrm>
-          <a:prstGeom prst="rect">
-            <a:avLst/>
-          </a:prstGeom>
-          <a:noFill/>
-        </p:spPr>
-        <p:txBody>
-          <a:bodyPr wrap="none" rtlCol="0">
-            <a:spAutoFit/>
-          </a:bodyPr>
-          <a:lstStyle/>
-          <a:p>
-            <a:r>
-              <a:rPr lang="en-US" dirty="0" smtClean="0"/>
-              <a:t>What if ‘B’ can’t store it either?</a:t>
-            </a:r>
-            <a:endParaRPr lang="en-US" dirty="0"/>
+              <a:t> – Threshold for accepting diverted replica</a:t>
+            </a:r>
+          </a:p>
+          <a:p>
+            <a:r>
+              <a:rPr lang="en-US" dirty="0" err="1"/>
+              <a:t>t_pri</a:t>
+            </a:r>
+            <a:r>
+              <a:rPr lang="en-US" dirty="0"/>
+              <a:t> &gt; </a:t>
+            </a:r>
+            <a:r>
+              <a:rPr lang="en-US" dirty="0" err="1" smtClean="0"/>
+              <a:t>t_div</a:t>
+            </a:r>
+            <a:endParaRPr lang="en-US" dirty="0" smtClean="0"/>
+          </a:p>
+          <a:p>
+            <a:pPr lvl="1"/>
+            <a:r>
+              <a:rPr lang="en-US" dirty="0" smtClean="0"/>
+              <a:t>Reserve space for primary replicas</a:t>
+            </a:r>
+          </a:p>
+          <a:p>
+            <a:r>
+              <a:rPr lang="en-US" dirty="0" smtClean="0"/>
+              <a:t>Is this a good metric?</a:t>
+            </a:r>
           </a:p>
         </p:txBody>
       </p:sp>
@@ -20521,246 +19706,9 @@
   <p:timing>
     <p:tnLst>
       <p:par>
-        <p:cTn id="1" dur="indefinite" restart="never" nodeType="tmRoot">
-          <p:childTnLst>
-            <p:seq concurrent="1" nextAc="seek">
-              <p:cTn id="2" dur="indefinite" nodeType="mainSeq">
-                <p:childTnLst>
-                  <p:par>
-                    <p:cTn id="3" fill="hold">
-                      <p:stCondLst>
-                        <p:cond delay="indefinite"/>
-                      </p:stCondLst>
-                      <p:childTnLst>
-                        <p:par>
-                          <p:cTn id="4" fill="hold">
-                            <p:stCondLst>
-                              <p:cond delay="0"/>
-                            </p:stCondLst>
-                            <p:childTnLst>
-                              <p:par>
-                                <p:cTn id="5" presetID="1" presetClass="entr" presetSubtype="0" fill="hold" grpId="0" nodeType="clickEffect">
-                                  <p:stCondLst>
-                                    <p:cond delay="0"/>
-                                  </p:stCondLst>
-                                  <p:childTnLst>
-                                    <p:set>
-                                      <p:cBhvr>
-                                        <p:cTn id="6" dur="1" fill="hold">
-                                          <p:stCondLst>
-                                            <p:cond delay="0"/>
-                                          </p:stCondLst>
-                                        </p:cTn>
-                                        <p:tgtEl>
-                                          <p:spTgt spid="20"/>
-                                        </p:tgtEl>
-                                        <p:attrNameLst>
-                                          <p:attrName>style.visibility</p:attrName>
-                                        </p:attrNameLst>
-                                      </p:cBhvr>
-                                      <p:to>
-                                        <p:strVal val="visible"/>
-                                      </p:to>
-                                    </p:set>
-                                  </p:childTnLst>
-                                </p:cTn>
-                              </p:par>
-                            </p:childTnLst>
-                          </p:cTn>
-                        </p:par>
-                      </p:childTnLst>
-                    </p:cTn>
-                  </p:par>
-                  <p:par>
-                    <p:cTn id="7" fill="hold">
-                      <p:stCondLst>
-                        <p:cond delay="indefinite"/>
-                      </p:stCondLst>
-                      <p:childTnLst>
-                        <p:par>
-                          <p:cTn id="8" fill="hold">
-                            <p:stCondLst>
-                              <p:cond delay="0"/>
-                            </p:stCondLst>
-                            <p:childTnLst>
-                              <p:par>
-                                <p:cTn id="9" presetID="1" presetClass="entr" presetSubtype="0" fill="hold" grpId="0" nodeType="clickEffect">
-                                  <p:stCondLst>
-                                    <p:cond delay="0"/>
-                                  </p:stCondLst>
-                                  <p:childTnLst>
-                                    <p:set>
-                                      <p:cBhvr>
-                                        <p:cTn id="10" dur="1" fill="hold">
-                                          <p:stCondLst>
-                                            <p:cond delay="0"/>
-                                          </p:stCondLst>
-                                        </p:cTn>
-                                        <p:tgtEl>
-                                          <p:spTgt spid="23"/>
-                                        </p:tgtEl>
-                                        <p:attrNameLst>
-                                          <p:attrName>style.visibility</p:attrName>
-                                        </p:attrNameLst>
-                                      </p:cBhvr>
-                                      <p:to>
-                                        <p:strVal val="visible"/>
-                                      </p:to>
-                                    </p:set>
-                                  </p:childTnLst>
-                                </p:cTn>
-                              </p:par>
-                            </p:childTnLst>
-                          </p:cTn>
-                        </p:par>
-                      </p:childTnLst>
-                    </p:cTn>
-                  </p:par>
-                  <p:par>
-                    <p:cTn id="11" fill="hold">
-                      <p:stCondLst>
-                        <p:cond delay="indefinite"/>
-                      </p:stCondLst>
-                      <p:childTnLst>
-                        <p:par>
-                          <p:cTn id="12" fill="hold">
-                            <p:stCondLst>
-                              <p:cond delay="0"/>
-                            </p:stCondLst>
-                            <p:childTnLst>
-                              <p:par>
-                                <p:cTn id="13" presetID="1" presetClass="entr" presetSubtype="0" fill="hold" grpId="0" nodeType="clickEffect">
-                                  <p:stCondLst>
-                                    <p:cond delay="0"/>
-                                  </p:stCondLst>
-                                  <p:childTnLst>
-                                    <p:set>
-                                      <p:cBhvr>
-                                        <p:cTn id="14" dur="1" fill="hold">
-                                          <p:stCondLst>
-                                            <p:cond delay="0"/>
-                                          </p:stCondLst>
-                                        </p:cTn>
-                                        <p:tgtEl>
-                                          <p:spTgt spid="22"/>
-                                        </p:tgtEl>
-                                        <p:attrNameLst>
-                                          <p:attrName>style.visibility</p:attrName>
-                                        </p:attrNameLst>
-                                      </p:cBhvr>
-                                      <p:to>
-                                        <p:strVal val="visible"/>
-                                      </p:to>
-                                    </p:set>
-                                  </p:childTnLst>
-                                </p:cTn>
-                              </p:par>
-                            </p:childTnLst>
-                          </p:cTn>
-                        </p:par>
-                      </p:childTnLst>
-                    </p:cTn>
-                  </p:par>
-                  <p:par>
-                    <p:cTn id="15" fill="hold">
-                      <p:stCondLst>
-                        <p:cond delay="indefinite"/>
-                      </p:stCondLst>
-                      <p:childTnLst>
-                        <p:par>
-                          <p:cTn id="16" fill="hold">
-                            <p:stCondLst>
-                              <p:cond delay="0"/>
-                            </p:stCondLst>
-                            <p:childTnLst>
-                              <p:par>
-                                <p:cTn id="17" presetID="1" presetClass="entr" presetSubtype="0" fill="hold" grpId="0" nodeType="clickEffect">
-                                  <p:stCondLst>
-                                    <p:cond delay="0"/>
-                                  </p:stCondLst>
-                                  <p:childTnLst>
-                                    <p:set>
-                                      <p:cBhvr>
-                                        <p:cTn id="18" dur="1" fill="hold">
-                                          <p:stCondLst>
-                                            <p:cond delay="0"/>
-                                          </p:stCondLst>
-                                        </p:cTn>
-                                        <p:tgtEl>
-                                          <p:spTgt spid="27"/>
-                                        </p:tgtEl>
-                                        <p:attrNameLst>
-                                          <p:attrName>style.visibility</p:attrName>
-                                        </p:attrNameLst>
-                                      </p:cBhvr>
-                                      <p:to>
-                                        <p:strVal val="visible"/>
-                                      </p:to>
-                                    </p:set>
-                                  </p:childTnLst>
-                                </p:cTn>
-                              </p:par>
-                              <p:par>
-                                <p:cTn id="19" presetID="1" presetClass="entr" presetSubtype="0" fill="hold" grpId="0" nodeType="withEffect">
-                                  <p:stCondLst>
-                                    <p:cond delay="0"/>
-                                  </p:stCondLst>
-                                  <p:childTnLst>
-                                    <p:set>
-                                      <p:cBhvr>
-                                        <p:cTn id="20" dur="1" fill="hold">
-                                          <p:stCondLst>
-                                            <p:cond delay="0"/>
-                                          </p:stCondLst>
-                                        </p:cTn>
-                                        <p:tgtEl>
-                                          <p:spTgt spid="26"/>
-                                        </p:tgtEl>
-                                        <p:attrNameLst>
-                                          <p:attrName>style.visibility</p:attrName>
-                                        </p:attrNameLst>
-                                      </p:cBhvr>
-                                      <p:to>
-                                        <p:strVal val="visible"/>
-                                      </p:to>
-                                    </p:set>
-                                  </p:childTnLst>
-                                </p:cTn>
-                              </p:par>
-                            </p:childTnLst>
-                          </p:cTn>
-                        </p:par>
-                      </p:childTnLst>
-                    </p:cTn>
-                  </p:par>
-                </p:childTnLst>
-              </p:cTn>
-              <p:prevCondLst>
-                <p:cond evt="onPrev" delay="0">
-                  <p:tgtEl>
-                    <p:sldTgt/>
-                  </p:tgtEl>
-                </p:cond>
-              </p:prevCondLst>
-              <p:nextCondLst>
-                <p:cond evt="onNext" delay="0">
-                  <p:tgtEl>
-                    <p:sldTgt/>
-                  </p:tgtEl>
-                </p:cond>
-              </p:nextCondLst>
-            </p:seq>
-          </p:childTnLst>
-        </p:cTn>
+        <p:cTn id="1" dur="indefinite" restart="never" nodeType="tmRoot"/>
       </p:par>
     </p:tnLst>
-    <p:bldLst>
-      <p:bldP spid="20" grpId="0" animBg="1"/>
-      <p:bldP spid="23" grpId="0" animBg="1"/>
-      <p:bldP spid="22" grpId="0"/>
-      <p:bldP spid="26" grpId="0" animBg="1"/>
-      <p:bldP spid="27" grpId="0"/>
-    </p:bldLst>
   </p:timing>
 </p:sld>
 </file>

</xml_diff>

<commit_message>
presentation: fix wording on diverted replica threshold slide.
</commit_message>
<xml_diff>
--- a/p2p/P2P Apps.pptx
+++ b/p2p/P2P Apps.pptx
@@ -19612,7 +19612,9 @@
         </p:nvSpPr>
         <p:spPr/>
         <p:txBody>
-          <a:bodyPr/>
+          <a:bodyPr>
+            <a:normAutofit lnSpcReduction="10000"/>
+          </a:bodyPr>
           <a:lstStyle/>
           <a:p>
             <a:pPr lvl="0"/>
@@ -19689,6 +19691,12 @@
             <a:r>
               <a:rPr lang="en-US" dirty="0" smtClean="0"/>
               <a:t>Is this a good metric?</a:t>
+            </a:r>
+          </a:p>
+          <a:p>
+            <a:r>
+              <a:rPr lang="en-US" dirty="0" smtClean="0"/>
+              <a:t>What happens when node picked for diverted replica can’t store the file?</a:t>
             </a:r>
           </a:p>
         </p:txBody>

</xml_diff>

<commit_message>
presentation: done for the night
</commit_message>
<xml_diff>
--- a/p2p/P2P Apps.pptx
+++ b/p2p/P2P Apps.pptx
@@ -6720,7 +6720,7 @@
           <a:p>
             <a:r>
               <a:rPr lang="en-US" dirty="0" smtClean="0"/>
-              <a:t>Observed Performance </a:t>
+              <a:t>Suspected Failure Classification</a:t>
             </a:r>
             <a:endParaRPr lang="en-US" dirty="0"/>
           </a:p>
@@ -7506,11 +7506,7 @@
           <a:p>
             <a:r>
               <a:rPr lang="en-US" dirty="0" smtClean="0"/>
-              <a:t>Distribute DNS cache across many peers - Improve size and performance of “global cache</a:t>
-            </a:r>
-            <a:r>
-              <a:rPr lang="en-US" dirty="0" smtClean="0"/>
-              <a:t>”</a:t>
+              <a:t>Distributed DNS cache - peer may have hostname in cache</a:t>
             </a:r>
             <a:endParaRPr lang="en-US" dirty="0" smtClean="0"/>
           </a:p>
@@ -7524,8 +7520,13 @@
             <a:pPr lvl="1"/>
             <a:r>
               <a:rPr lang="en-US" dirty="0" smtClean="0"/>
-              <a:t>How important is locality ? </a:t>
-            </a:r>
+              <a:t>How important is </a:t>
+            </a:r>
+            <a:r>
+              <a:rPr lang="en-US" dirty="0" smtClean="0"/>
+              <a:t>locality? </a:t>
+            </a:r>
+            <a:endParaRPr lang="en-US" dirty="0" smtClean="0"/>
           </a:p>
           <a:p>
             <a:pPr lvl="1"/>
@@ -7910,14 +7911,11 @@
             <a:pPr lvl="1"/>
             <a:r>
               <a:rPr lang="en-US" dirty="0" smtClean="0"/>
-              <a:t>UDP for queries, TCP for local name lookups</a:t>
-            </a:r>
-          </a:p>
-          <a:p>
-            <a:pPr lvl="1"/>
-            <a:r>
-              <a:rPr lang="en-US" dirty="0" smtClean="0"/>
-              <a:t>Master &amp; slave processes for resolution</a:t>
+              <a:t>Master </a:t>
+            </a:r>
+            <a:r>
+              <a:rPr lang="en-US" dirty="0" smtClean="0"/>
+              <a:t>&amp; slave processes for resolution</a:t>
             </a:r>
           </a:p>
           <a:p>
@@ -7937,12 +7935,15 @@
           <a:p>
             <a:r>
               <a:rPr lang="en-US" dirty="0" smtClean="0"/>
-              <a:t>Dynamic reissue </a:t>
-            </a:r>
-            <a:r>
-              <a:rPr lang="en-US" dirty="0" smtClean="0"/>
-              <a:t>delay</a:t>
-            </a:r>
+              <a:t>How soon before you contact peers?</a:t>
+            </a:r>
+          </a:p>
+          <a:p>
+            <a:r>
+              <a:rPr lang="en-US" dirty="0" smtClean="0"/>
+              <a:t>It depends</a:t>
+            </a:r>
+            <a:endParaRPr lang="en-US" dirty="0" smtClean="0"/>
           </a:p>
           <a:p>
             <a:pPr lvl="1"/>
@@ -7990,7 +7991,141 @@
   <p:timing>
     <p:tnLst>
       <p:par>
-        <p:cTn id="1" dur="indefinite" restart="never" nodeType="tmRoot"/>
+        <p:cTn id="1" dur="indefinite" restart="never" nodeType="tmRoot">
+          <p:childTnLst>
+            <p:seq concurrent="1" nextAc="seek">
+              <p:cTn id="2" dur="indefinite" nodeType="mainSeq">
+                <p:childTnLst>
+                  <p:par>
+                    <p:cTn id="3" fill="hold">
+                      <p:stCondLst>
+                        <p:cond delay="indefinite"/>
+                      </p:stCondLst>
+                      <p:childTnLst>
+                        <p:par>
+                          <p:cTn id="4" fill="hold">
+                            <p:stCondLst>
+                              <p:cond delay="0"/>
+                            </p:stCondLst>
+                            <p:childTnLst>
+                              <p:par>
+                                <p:cTn id="5" presetID="1" presetClass="entr" presetSubtype="0" fill="hold" nodeType="clickEffect">
+                                  <p:stCondLst>
+                                    <p:cond delay="0"/>
+                                  </p:stCondLst>
+                                  <p:childTnLst>
+                                    <p:set>
+                                      <p:cBhvr>
+                                        <p:cTn id="6" dur="1" fill="hold">
+                                          <p:stCondLst>
+                                            <p:cond delay="0"/>
+                                          </p:stCondLst>
+                                        </p:cTn>
+                                        <p:tgtEl>
+                                          <p:spTgt spid="3">
+                                            <p:txEl>
+                                              <p:pRg st="5" end="5"/>
+                                            </p:txEl>
+                                          </p:spTgt>
+                                        </p:tgtEl>
+                                        <p:attrNameLst>
+                                          <p:attrName>style.visibility</p:attrName>
+                                        </p:attrNameLst>
+                                      </p:cBhvr>
+                                      <p:to>
+                                        <p:strVal val="visible"/>
+                                      </p:to>
+                                    </p:set>
+                                  </p:childTnLst>
+                                </p:cTn>
+                              </p:par>
+                              <p:par>
+                                <p:cTn id="7" presetID="1" presetClass="entr" presetSubtype="0" fill="hold" nodeType="withEffect">
+                                  <p:stCondLst>
+                                    <p:cond delay="0"/>
+                                  </p:stCondLst>
+                                  <p:childTnLst>
+                                    <p:set>
+                                      <p:cBhvr>
+                                        <p:cTn id="8" dur="1" fill="hold">
+                                          <p:stCondLst>
+                                            <p:cond delay="0"/>
+                                          </p:stCondLst>
+                                        </p:cTn>
+                                        <p:tgtEl>
+                                          <p:spTgt spid="3">
+                                            <p:txEl>
+                                              <p:pRg st="6" end="6"/>
+                                            </p:txEl>
+                                          </p:spTgt>
+                                        </p:tgtEl>
+                                        <p:attrNameLst>
+                                          <p:attrName>style.visibility</p:attrName>
+                                        </p:attrNameLst>
+                                      </p:cBhvr>
+                                      <p:to>
+                                        <p:strVal val="visible"/>
+                                      </p:to>
+                                    </p:set>
+                                  </p:childTnLst>
+                                </p:cTn>
+                              </p:par>
+                              <p:par>
+                                <p:cTn id="9" presetID="1" presetClass="entr" presetSubtype="0" fill="hold" nodeType="withEffect">
+                                  <p:stCondLst>
+                                    <p:cond delay="0"/>
+                                  </p:stCondLst>
+                                  <p:childTnLst>
+                                    <p:set>
+                                      <p:cBhvr>
+                                        <p:cTn id="10" dur="1" fill="hold">
+                                          <p:stCondLst>
+                                            <p:cond delay="0"/>
+                                          </p:stCondLst>
+                                        </p:cTn>
+                                        <p:tgtEl>
+                                          <p:spTgt spid="3">
+                                            <p:txEl>
+                                              <p:pRg st="7" end="7"/>
+                                            </p:txEl>
+                                          </p:spTgt>
+                                        </p:tgtEl>
+                                        <p:attrNameLst>
+                                          <p:attrName>style.visibility</p:attrName>
+                                        </p:attrNameLst>
+                                      </p:cBhvr>
+                                      <p:to>
+                                        <p:strVal val="visible"/>
+                                      </p:to>
+                                    </p:set>
+                                  </p:childTnLst>
+                                </p:cTn>
+                              </p:par>
+                            </p:childTnLst>
+                          </p:cTn>
+                        </p:par>
+                      </p:childTnLst>
+                    </p:cTn>
+                  </p:par>
+                </p:childTnLst>
+              </p:cTn>
+              <p:prevCondLst>
+                <p:cond evt="onPrev" delay="0">
+                  <p:tgtEl>
+                    <p:sldTgt/>
+                  </p:tgtEl>
+                </p:cond>
+              </p:prevCondLst>
+              <p:nextCondLst>
+                <p:cond evt="onNext" delay="0">
+                  <p:tgtEl>
+                    <p:sldTgt/>
+                  </p:tgtEl>
+                </p:cond>
+              </p:nextCondLst>
+            </p:seq>
+          </p:childTnLst>
+        </p:cTn>
       </p:par>
     </p:tnLst>
   </p:timing>
@@ -8031,9 +8166,8 @@
           <a:p>
             <a:r>
               <a:rPr lang="en-US" dirty="0" smtClean="0"/>
-              <a:t>Peer Management &amp; Maintenance</a:t>
-            </a:r>
-            <a:endParaRPr lang="en-US" dirty="0"/>
+              <a:t>Peer Management &amp; Communication</a:t>
+            </a:r>
           </a:p>
         </p:txBody>
       </p:sp>
@@ -8073,75 +8207,65 @@
         <p:spPr/>
         <p:txBody>
           <a:bodyPr>
-            <a:normAutofit fontScale="92500"/>
+            <a:normAutofit/>
           </a:bodyPr>
           <a:lstStyle/>
           <a:p>
             <a:r>
               <a:rPr lang="en-US" dirty="0" smtClean="0"/>
-              <a:t>Highest Random Weight (HRW)</a:t>
+              <a:t>Peers maintain a set of neighbors</a:t>
             </a:r>
           </a:p>
           <a:p>
             <a:pPr lvl="1"/>
             <a:r>
               <a:rPr lang="en-US" dirty="0" smtClean="0"/>
-              <a:t>Assigns random weights to servers (nodes)</a:t>
+              <a:t>Built by contacting list of all peers</a:t>
             </a:r>
           </a:p>
           <a:p>
             <a:pPr lvl="1"/>
             <a:r>
               <a:rPr lang="en-US" dirty="0" smtClean="0"/>
-              <a:t>Sorts nodes by weights</a:t>
+              <a:t>Periodic heartbeats determine liveness</a:t>
             </a:r>
           </a:p>
           <a:p>
             <a:pPr lvl="1"/>
             <a:r>
               <a:rPr lang="en-US" dirty="0" smtClean="0"/>
-              <a:t>Weights can be scaled depending on the properties of a node</a:t>
-            </a:r>
-            <a:endParaRPr lang="en-US" dirty="0"/>
-          </a:p>
-          <a:p>
-            <a:r>
-              <a:rPr lang="en-US" dirty="0" smtClean="0"/>
-              <a:t>Sends heartbeats to other nodes every second</a:t>
+              <a:t>Replace dead nodes with additional scanning of node list</a:t>
+            </a:r>
+          </a:p>
+          <a:p>
+            <a:r>
+              <a:rPr lang="en-US" dirty="0" smtClean="0"/>
+              <a:t>Uses Highest Random Weight (HRW) hashing</a:t>
             </a:r>
           </a:p>
           <a:p>
             <a:pPr lvl="1"/>
             <a:r>
               <a:rPr lang="en-US" dirty="0" smtClean="0"/>
-              <a:t>Acquires round trip and average response latency</a:t>
+              <a:t>Generates ordered list of nodes given a hostname</a:t>
             </a:r>
           </a:p>
           <a:p>
             <a:pPr lvl="1"/>
             <a:r>
               <a:rPr lang="en-US" dirty="0" smtClean="0"/>
-              <a:t>If these sum to less than 90ms, add the node to neighbor set</a:t>
+              <a:t>Sorted by a hash of hostname and peer address</a:t>
             </a:r>
           </a:p>
           <a:p>
             <a:pPr lvl="1"/>
             <a:r>
               <a:rPr lang="en-US" dirty="0" smtClean="0"/>
-              <a:t>Stops at 30 neighbors or increase threshold until 30 neighbors are found</a:t>
-            </a:r>
-          </a:p>
-          <a:p>
-            <a:r>
-              <a:rPr lang="en-US" dirty="0" smtClean="0"/>
-              <a:t>Liveness tested with heartbeat every 30 seconds</a:t>
-            </a:r>
-          </a:p>
-          <a:p>
-            <a:r>
-              <a:rPr lang="en-US" dirty="0" smtClean="0"/>
-              <a:t>What are the advantages over DHT peer management?</a:t>
-            </a:r>
+              <a:t>Provides request locality</a:t>
+            </a:r>
+          </a:p>
+          <a:p>
+            <a:endParaRPr lang="en-US" dirty="0" smtClean="0"/>
           </a:p>
         </p:txBody>
       </p:sp>
@@ -8270,14 +8394,26 @@
             <a:pPr lvl="1"/>
             <a:r>
               <a:rPr lang="en-US" dirty="0" smtClean="0"/>
-              <a:t>Host lookups: 37ms to 7ms</a:t>
+              <a:t>Internal </a:t>
+            </a:r>
+            <a:r>
+              <a:rPr lang="en-US" dirty="0" smtClean="0"/>
+              <a:t>lookups: 37ms to 7ms</a:t>
             </a:r>
           </a:p>
           <a:p>
             <a:pPr lvl="1"/>
             <a:r>
               <a:rPr lang="en-US" dirty="0" smtClean="0"/>
-              <a:t>Real Traffic: 237ms to 84ms</a:t>
+              <a:t>Real </a:t>
+            </a:r>
+            <a:r>
+              <a:rPr lang="en-US" dirty="0" smtClean="0"/>
+              <a:t>traffic</a:t>
+            </a:r>
+            <a:r>
+              <a:rPr lang="en-US" dirty="0" smtClean="0"/>
+              <a:t>: 237ms to 84ms</a:t>
             </a:r>
           </a:p>
           <a:p>
@@ -8290,14 +8426,26 @@
             <a:pPr lvl="1"/>
             <a:r>
               <a:rPr lang="en-US" dirty="0" smtClean="0"/>
-              <a:t>Host lookups: 554ms to 21ms</a:t>
+              <a:t>Internal </a:t>
+            </a:r>
+            <a:r>
+              <a:rPr lang="en-US" dirty="0" smtClean="0"/>
+              <a:t>lookups: 554ms to 21ms</a:t>
             </a:r>
           </a:p>
           <a:p>
             <a:pPr lvl="1"/>
             <a:r>
               <a:rPr lang="en-US" dirty="0" smtClean="0"/>
-              <a:t>Real Traffic: 1095ms to 79ms</a:t>
+              <a:t>Real </a:t>
+            </a:r>
+            <a:r>
+              <a:rPr lang="en-US" dirty="0" smtClean="0"/>
+              <a:t>traffic</a:t>
+            </a:r>
+            <a:r>
+              <a:rPr lang="en-US" dirty="0" smtClean="0"/>
+              <a:t>: 1095ms to 79ms</a:t>
             </a:r>
             <a:endParaRPr lang="en-US" dirty="0"/>
           </a:p>
@@ -8644,9 +8792,10 @@
           <a:p>
             <a:pPr marL="914400" lvl="1" indent="-457200"/>
             <a:r>
-              <a:rPr lang="en-US" dirty="0"/>
-              <a:t>Local nameserver poorly gathers neighbors</a:t>
-            </a:r>
+              <a:rPr lang="en-US" dirty="0" smtClean="0"/>
+              <a:t>Initialization problems result in bad neighbor set</a:t>
+            </a:r>
+            <a:endParaRPr lang="en-US" dirty="0"/>
           </a:p>
           <a:p>
             <a:pPr marL="914400" lvl="1" indent="-457200"/>
@@ -14653,13 +14802,48 @@
           <a:p>
             <a:r>
               <a:rPr lang="en-US" dirty="0" smtClean="0"/>
-              <a:t>Basic DHT experiment found:</a:t>
+              <a:t>Experimental results on this basic DHT store</a:t>
             </a:r>
           </a:p>
           <a:p>
             <a:pPr lvl="1"/>
             <a:r>
               <a:rPr lang="en-US" dirty="0" smtClean="0"/>
+              <a:t>Numbers </a:t>
+            </a:r>
+            <a:r>
+              <a:rPr lang="en-US" dirty="0"/>
+              <a:t>from NATLR web proxy trace</a:t>
+            </a:r>
+          </a:p>
+          <a:p>
+            <a:pPr lvl="2"/>
+            <a:r>
+              <a:rPr lang="en-US" dirty="0"/>
+              <a:t>Full details in evaluation later</a:t>
+            </a:r>
+          </a:p>
+          <a:p>
+            <a:pPr lvl="1"/>
+            <a:r>
+              <a:rPr lang="en-US" dirty="0"/>
+              <a:t>Hosts modeled after corporate desktop </a:t>
+            </a:r>
+            <a:r>
+              <a:rPr lang="en-US" dirty="0" smtClean="0"/>
+              <a:t>environment</a:t>
+            </a:r>
+          </a:p>
+          <a:p>
+            <a:r>
+              <a:rPr lang="en-US" dirty="0" smtClean="0"/>
+              <a:t>Results</a:t>
+            </a:r>
+          </a:p>
+          <a:p>
+            <a:pPr lvl="1"/>
+            <a:r>
+              <a:rPr lang="en-US" dirty="0" smtClean="0"/>
               <a:t>Many insertion failures (51.1%)</a:t>
             </a:r>
           </a:p>
@@ -14668,45 +14852,6 @@
             <a:r>
               <a:rPr lang="en-US" dirty="0" smtClean="0"/>
               <a:t>Poor system utilization (60.8%)</a:t>
-            </a:r>
-          </a:p>
-          <a:p>
-            <a:r>
-              <a:rPr lang="en-US" dirty="0" smtClean="0"/>
-              <a:t>Compared with (full) PAST:</a:t>
-            </a:r>
-          </a:p>
-          <a:p>
-            <a:pPr lvl="1"/>
-            <a:r>
-              <a:rPr lang="en-US" dirty="0" smtClean="0"/>
-              <a:t>Low insertion failures: (0-11.98%)</a:t>
-            </a:r>
-          </a:p>
-          <a:p>
-            <a:pPr lvl="1"/>
-            <a:r>
-              <a:rPr lang="en-US" dirty="0" smtClean="0"/>
-              <a:t>High system utilization (97.4%-99.7%)</a:t>
-            </a:r>
-          </a:p>
-          <a:p>
-            <a:r>
-              <a:rPr lang="en-US" dirty="0" smtClean="0"/>
-              <a:t>Numbers from NATLR web proxy trace</a:t>
-            </a:r>
-          </a:p>
-          <a:p>
-            <a:pPr lvl="1"/>
-            <a:r>
-              <a:rPr lang="en-US" dirty="0" smtClean="0"/>
-              <a:t>Full details in evaluation later</a:t>
-            </a:r>
-          </a:p>
-          <a:p>
-            <a:r>
-              <a:rPr lang="en-US" dirty="0" smtClean="0"/>
-              <a:t>Hosts modeled after corporate desktop environment</a:t>
             </a:r>
           </a:p>
           <a:p>
@@ -14813,20 +14958,13 @@
         <p:spPr/>
         <p:txBody>
           <a:bodyPr>
-            <a:normAutofit lnSpcReduction="10000"/>
+            <a:normAutofit/>
           </a:bodyPr>
           <a:lstStyle/>
           <a:p>
             <a:r>
               <a:rPr lang="en-US" dirty="0" smtClean="0"/>
               <a:t>Storage Imbalance</a:t>
-            </a:r>
-          </a:p>
-          <a:p>
-            <a:pPr lvl="1"/>
-            <a:r>
-              <a:rPr lang="en-US" dirty="0" smtClean="0"/>
-              <a:t>Why?</a:t>
             </a:r>
           </a:p>
           <a:p>
@@ -14941,7 +15079,7 @@
                                         <p:tgtEl>
                                           <p:spTgt spid="4">
                                             <p:txEl>
-                                              <p:pRg st="9" end="9"/>
+                                              <p:pRg st="8" end="8"/>
                                             </p:txEl>
                                           </p:spTgt>
                                         </p:tgtEl>
@@ -15083,12 +15221,8 @@
           <a:p>
             <a:pPr lvl="1"/>
             <a:r>
-              <a:rPr lang="en-US" dirty="0" smtClean="0"/>
-              <a:t>Concept:</a:t>
-            </a:r>
-            <a:r>
               <a:rPr lang="en-US" baseline="0" dirty="0" smtClean="0"/>
-              <a:t> Balance free space amongst nodes in a leaf set</a:t>
+              <a:t>Balance free space amongst nodes in a leaf set</a:t>
             </a:r>
           </a:p>
           <a:p>
@@ -15102,7 +15236,7 @@
             <a:pPr lvl="1"/>
             <a:r>
               <a:rPr lang="en-US" dirty="0" smtClean="0"/>
-              <a:t>Concept: If replica diversion fails, try</a:t>
+              <a:t>If replica diversion fails, try</a:t>
             </a:r>
             <a:r>
               <a:rPr lang="en-US" baseline="0" dirty="0" smtClean="0"/>
@@ -15238,7 +15372,26 @@
             </a:r>
             <a:r>
               <a:rPr lang="en-US" dirty="0" smtClean="0"/>
-              <a:t>DNS load to other clients in order to greatly reduce latency of non-cached entries.</a:t>
+              <a:t>DNS load to other clients in order to greatly reduce latency </a:t>
+            </a:r>
+            <a:r>
+              <a:rPr lang="en-US" dirty="0" smtClean="0"/>
+              <a:t>in the case of local failures </a:t>
+            </a:r>
+            <a:endParaRPr lang="en-US" dirty="0" smtClean="0"/>
+          </a:p>
+          <a:p>
+            <a:pPr lvl="0"/>
+            <a:r>
+              <a:rPr lang="en-US" dirty="0"/>
+              <a:t>PAST </a:t>
+            </a:r>
+          </a:p>
+          <a:p>
+            <a:pPr lvl="1"/>
+            <a:r>
+              <a:rPr lang="en-US" dirty="0"/>
+              <a:t>Distribute files and replicas across many peers, using diversion and hashing to increase utilization and insertion success</a:t>
             </a:r>
           </a:p>
           <a:p>
@@ -15261,20 +15414,6 @@
             <a:r>
               <a:rPr lang="en-US" dirty="0" smtClean="0"/>
               <a:t>service</a:t>
-            </a:r>
-          </a:p>
-          <a:p>
-            <a:pPr lvl="0"/>
-            <a:r>
-              <a:rPr lang="en-US" dirty="0" smtClean="0"/>
-              <a:t>PAST </a:t>
-            </a:r>
-          </a:p>
-          <a:p>
-            <a:pPr lvl="1"/>
-            <a:r>
-              <a:rPr lang="en-US" dirty="0" smtClean="0"/>
-              <a:t>Distribute files and replicas across many peers, using diversion and hashing to increase utilization and insertion success</a:t>
             </a:r>
           </a:p>
         </p:txBody>
@@ -19613,7 +19752,7 @@
         <p:spPr/>
         <p:txBody>
           <a:bodyPr>
-            <a:normAutofit lnSpcReduction="10000"/>
+            <a:normAutofit/>
           </a:bodyPr>
           <a:lstStyle/>
           <a:p>
@@ -19685,12 +19824,6 @@
             <a:r>
               <a:rPr lang="en-US" dirty="0" smtClean="0"/>
               <a:t>Reserve space for primary replicas</a:t>
-            </a:r>
-          </a:p>
-          <a:p>
-            <a:r>
-              <a:rPr lang="en-US" dirty="0" smtClean="0"/>
-              <a:t>Is this a good metric?</a:t>
             </a:r>
           </a:p>
           <a:p>
@@ -19797,7 +19930,7 @@
         <p:spPr/>
         <p:txBody>
           <a:bodyPr>
-            <a:normAutofit lnSpcReduction="10000"/>
+            <a:normAutofit/>
           </a:bodyPr>
           <a:lstStyle/>
           <a:p>
@@ -19807,68 +19940,17 @@
             </a:r>
           </a:p>
           <a:p>
-            <a:pPr lvl="1"/>
-            <a:r>
-              <a:rPr lang="en-US" dirty="0" smtClean="0"/>
-              <a:t>Due to threshold</a:t>
-            </a:r>
-          </a:p>
-          <a:p>
-            <a:pPr lvl="0"/>
-            <a:r>
-              <a:rPr lang="en-US" dirty="0" smtClean="0"/>
-              <a:t>Concept:</a:t>
-            </a:r>
-          </a:p>
-          <a:p>
-            <a:pPr lvl="1"/>
-            <a:r>
-              <a:rPr lang="en-US" dirty="0" smtClean="0"/>
-              <a:t>That portion of the ring is overloaded</a:t>
-            </a:r>
-          </a:p>
-          <a:p>
-            <a:pPr lvl="1"/>
-            <a:r>
-              <a:rPr lang="en-US" dirty="0" smtClean="0"/>
-              <a:t>Try elsewhere!</a:t>
-            </a:r>
-          </a:p>
-          <a:p>
-            <a:pPr lvl="0"/>
-            <a:r>
-              <a:rPr lang="en-US" dirty="0" smtClean="0"/>
-              <a:t>Recall: </a:t>
+            <a:r>
+              <a:rPr lang="en-US" dirty="0" smtClean="0"/>
+              <a:t>Create new </a:t>
             </a:r>
             <a:r>
               <a:rPr lang="en-US" dirty="0" err="1" smtClean="0"/>
               <a:t>fileID</a:t>
             </a:r>
-            <a:r>
-              <a:rPr lang="en-US" dirty="0" smtClean="0"/>
-              <a:t> is result of hash</a:t>
-            </a:r>
-          </a:p>
-          <a:p>
-            <a:pPr lvl="1"/>
-            <a:r>
-              <a:rPr lang="en-US" dirty="0" smtClean="0"/>
-              <a:t>…Including random salt</a:t>
-            </a:r>
-          </a:p>
-          <a:p>
-            <a:pPr lvl="0"/>
-            <a:r>
-              <a:rPr lang="en-US" dirty="0" smtClean="0"/>
-              <a:t>Solution: Create</a:t>
-            </a:r>
-            <a:r>
-              <a:rPr lang="en-US" baseline="0" dirty="0" smtClean="0"/>
-              <a:t> new salt, therefore new hash</a:t>
-            </a:r>
-          </a:p>
-          <a:p>
-            <a:pPr lvl="0"/>
+            <a:endParaRPr lang="en-US" dirty="0"/>
+          </a:p>
+          <a:p>
             <a:r>
               <a:rPr lang="en-US" baseline="0" dirty="0" smtClean="0"/>
               <a:t>Try again, up to three times</a:t>
@@ -24125,7 +24207,15 @@
             </a:r>
             <a:r>
               <a:rPr lang="en-US" dirty="0" smtClean="0"/>
-              <a:t>Translates traditional URLs into IP addresses</a:t>
+              <a:t>Translates </a:t>
+            </a:r>
+            <a:r>
+              <a:rPr lang="en-US" dirty="0" smtClean="0"/>
+              <a:t>hostnames into </a:t>
+            </a:r>
+            <a:r>
+              <a:rPr lang="en-US" dirty="0" smtClean="0"/>
+              <a:t>IP addresses</a:t>
             </a:r>
           </a:p>
           <a:p>
@@ -24991,52 +25081,6 @@
           </a:p>
         </p:txBody>
       </p:sp>
-      <p:sp>
-        <p:nvSpPr>
-          <p:cNvPr id="22" name="Rectangle 21"/>
-          <p:cNvSpPr/>
-          <p:nvPr/>
-        </p:nvSpPr>
-        <p:spPr>
-          <a:xfrm>
-            <a:off x="2209800" y="1600200"/>
-            <a:ext cx="228600" cy="4648200"/>
-          </a:xfrm>
-          <a:prstGeom prst="rect">
-            <a:avLst/>
-          </a:prstGeom>
-          <a:noFill/>
-          <a:ln>
-            <a:solidFill>
-              <a:srgbClr val="002060"/>
-            </a:solidFill>
-          </a:ln>
-        </p:spPr>
-        <p:style>
-          <a:lnRef idx="2">
-            <a:schemeClr val="accent1">
-              <a:shade val="50000"/>
-            </a:schemeClr>
-          </a:lnRef>
-          <a:fillRef idx="1">
-            <a:schemeClr val="accent1"/>
-          </a:fillRef>
-          <a:effectRef idx="0">
-            <a:schemeClr val="accent1"/>
-          </a:effectRef>
-          <a:fontRef idx="minor">
-            <a:schemeClr val="lt1"/>
-          </a:fontRef>
-        </p:style>
-        <p:txBody>
-          <a:bodyPr rtlCol="0" anchor="ctr"/>
-          <a:lstStyle/>
-          <a:p>
-            <a:pPr algn="ctr"/>
-            <a:endParaRPr lang="en-US"/>
-          </a:p>
-        </p:txBody>
-      </p:sp>
     </p:spTree>
     <p:extLst>
       <p:ext uri="{BB962C8B-B14F-4D97-AF65-F5344CB8AC3E}">
@@ -25050,80 +25094,9 @@
   <p:timing>
     <p:tnLst>
       <p:par>
-        <p:cTn id="1" dur="indefinite" restart="never" nodeType="tmRoot">
-          <p:childTnLst>
-            <p:seq concurrent="1" nextAc="seek">
-              <p:cTn id="2" dur="indefinite" nodeType="mainSeq">
-                <p:childTnLst>
-                  <p:par>
-                    <p:cTn id="3" fill="hold">
-                      <p:stCondLst>
-                        <p:cond delay="indefinite"/>
-                      </p:stCondLst>
-                      <p:childTnLst>
-                        <p:par>
-                          <p:cTn id="4" fill="hold">
-                            <p:stCondLst>
-                              <p:cond delay="0"/>
-                            </p:stCondLst>
-                            <p:childTnLst>
-                              <p:par>
-                                <p:cTn id="5" presetID="1" presetClass="entr" presetSubtype="0" fill="hold" grpId="0" nodeType="clickEffect">
-                                  <p:stCondLst>
-                                    <p:cond delay="0"/>
-                                  </p:stCondLst>
-                                  <p:childTnLst>
-                                    <p:set>
-                                      <p:cBhvr>
-                                        <p:cTn id="6" dur="1" fill="hold">
-                                          <p:stCondLst>
-                                            <p:cond delay="0"/>
-                                          </p:stCondLst>
-                                        </p:cTn>
-                                        <p:tgtEl>
-                                          <p:spTgt spid="22"/>
-                                        </p:tgtEl>
-                                        <p:attrNameLst>
-                                          <p:attrName>style.visibility</p:attrName>
-                                        </p:attrNameLst>
-                                      </p:cBhvr>
-                                      <p:to>
-                                        <p:strVal val="visible"/>
-                                      </p:to>
-                                    </p:set>
-                                  </p:childTnLst>
-                                </p:cTn>
-                              </p:par>
-                            </p:childTnLst>
-                          </p:cTn>
-                        </p:par>
-                      </p:childTnLst>
-                    </p:cTn>
-                  </p:par>
-                </p:childTnLst>
-              </p:cTn>
-              <p:prevCondLst>
-                <p:cond evt="onPrev" delay="0">
-                  <p:tgtEl>
-                    <p:sldTgt/>
-                  </p:tgtEl>
-                </p:cond>
-              </p:prevCondLst>
-              <p:nextCondLst>
-                <p:cond evt="onNext" delay="0">
-                  <p:tgtEl>
-                    <p:sldTgt/>
-                  </p:tgtEl>
-                </p:cond>
-              </p:nextCondLst>
-            </p:seq>
-          </p:childTnLst>
-        </p:cTn>
+        <p:cTn id="1" dur="indefinite" restart="never" nodeType="tmRoot"/>
       </p:par>
     </p:tnLst>
-    <p:bldLst>
-      <p:bldP spid="22" grpId="0" animBg="1"/>
-    </p:bldLst>
   </p:timing>
 </p:sld>
 </file>
@@ -25210,8 +25183,21 @@
           <a:p>
             <a:r>
               <a:rPr lang="en-US" dirty="0" smtClean="0"/>
-              <a:t>DNS lookups are high reliability, but failures are  still responsible for significant delays.</a:t>
-            </a:r>
+              <a:t>DNS lookups </a:t>
+            </a:r>
+            <a:r>
+              <a:rPr lang="en-US" dirty="0" smtClean="0"/>
+              <a:t>have high </a:t>
+            </a:r>
+            <a:r>
+              <a:rPr lang="en-US" dirty="0" smtClean="0"/>
+              <a:t>reliability, but </a:t>
+            </a:r>
+            <a:r>
+              <a:rPr lang="en-US" dirty="0" smtClean="0"/>
+              <a:t>make no latency guarantees:</a:t>
+            </a:r>
+            <a:endParaRPr lang="en-US" dirty="0" smtClean="0"/>
           </a:p>
           <a:p>
             <a:pPr lvl="1"/>
@@ -25244,14 +25230,11 @@
             <a:pPr lvl="1"/>
             <a:r>
               <a:rPr lang="en-US" dirty="0" smtClean="0"/>
-              <a:t>No answer</a:t>
-            </a:r>
-            <a:endParaRPr lang="en-US" dirty="0"/>
-          </a:p>
-          <a:p>
-            <a:r>
-              <a:rPr lang="en-US" dirty="0" smtClean="0"/>
-              <a:t>Is this a reasonable metric for failure?</a:t>
+              <a:t>No </a:t>
+            </a:r>
+            <a:r>
+              <a:rPr lang="en-US" dirty="0" smtClean="0"/>
+              <a:t>answer</a:t>
             </a:r>
             <a:endParaRPr lang="en-US" dirty="0"/>
           </a:p>
@@ -25270,79 +25253,7 @@
   <p:timing>
     <p:tnLst>
       <p:par>
-        <p:cTn id="1" dur="indefinite" restart="never" nodeType="tmRoot">
-          <p:childTnLst>
-            <p:seq concurrent="1" nextAc="seek">
-              <p:cTn id="2" dur="indefinite" nodeType="mainSeq">
-                <p:childTnLst>
-                  <p:par>
-                    <p:cTn id="3" fill="hold">
-                      <p:stCondLst>
-                        <p:cond delay="indefinite"/>
-                      </p:stCondLst>
-                      <p:childTnLst>
-                        <p:par>
-                          <p:cTn id="4" fill="hold">
-                            <p:stCondLst>
-                              <p:cond delay="0"/>
-                            </p:stCondLst>
-                            <p:childTnLst>
-                              <p:par>
-                                <p:cTn id="5" presetID="1" presetClass="entr" presetSubtype="0" fill="hold" nodeType="clickEffect">
-                                  <p:stCondLst>
-                                    <p:cond delay="0"/>
-                                  </p:stCondLst>
-                                  <p:childTnLst>
-                                    <p:set>
-                                      <p:cBhvr>
-                                        <p:cTn id="6" dur="1" fill="hold">
-                                          <p:stCondLst>
-                                            <p:cond delay="0"/>
-                                          </p:stCondLst>
-                                        </p:cTn>
-                                        <p:tgtEl>
-                                          <p:spTgt spid="3">
-                                            <p:txEl>
-                                              <p:pRg st="6" end="6"/>
-                                            </p:txEl>
-                                          </p:spTgt>
-                                        </p:tgtEl>
-                                        <p:attrNameLst>
-                                          <p:attrName>style.visibility</p:attrName>
-                                        </p:attrNameLst>
-                                      </p:cBhvr>
-                                      <p:to>
-                                        <p:strVal val="visible"/>
-                                      </p:to>
-                                    </p:set>
-                                  </p:childTnLst>
-                                </p:cTn>
-                              </p:par>
-                            </p:childTnLst>
-                          </p:cTn>
-                        </p:par>
-                      </p:childTnLst>
-                    </p:cTn>
-                  </p:par>
-                </p:childTnLst>
-              </p:cTn>
-              <p:prevCondLst>
-                <p:cond evt="onPrev" delay="0">
-                  <p:tgtEl>
-                    <p:sldTgt/>
-                  </p:tgtEl>
-                </p:cond>
-              </p:prevCondLst>
-              <p:nextCondLst>
-                <p:cond evt="onNext" delay="0">
-                  <p:tgtEl>
-                    <p:sldTgt/>
-                  </p:tgtEl>
-                </p:cond>
-              </p:nextCondLst>
-            </p:seq>
-          </p:childTnLst>
-        </p:cTn>
+        <p:cTn id="1" dur="indefinite" restart="never" nodeType="tmRoot"/>
       </p:par>
     </p:tnLst>
   </p:timing>
@@ -25454,21 +25365,29 @@
             <a:pPr lvl="1"/>
             <a:r>
               <a:rPr lang="en-US" dirty="0" smtClean="0"/>
-              <a:t>High: &gt;100ms</a:t>
-            </a:r>
-          </a:p>
-          <a:p>
-            <a:r>
-              <a:rPr lang="en-US" dirty="0" smtClean="0"/>
-              <a:t>71%-99.2% of time is spent on high latency lookups, despite accounting for 0.5% to 12.9% of accesses</a:t>
-            </a:r>
-          </a:p>
-          <a:p>
-            <a:r>
-              <a:rPr lang="en-US" dirty="0" smtClean="0"/>
-              <a:t>Time spent on failure dominates overall lookup time</a:t>
-            </a:r>
-            <a:endParaRPr lang="en-US" dirty="0"/>
+              <a:t>High: &gt;</a:t>
+            </a:r>
+            <a:r>
+              <a:rPr lang="en-US" dirty="0" smtClean="0"/>
+              <a:t>100ms</a:t>
+            </a:r>
+          </a:p>
+          <a:p>
+            <a:r>
+              <a:rPr lang="en-US" dirty="0" smtClean="0"/>
+              <a:t>High latency lookups account for 0.5% to 12.9% of accesses</a:t>
+            </a:r>
+            <a:endParaRPr lang="en-US" dirty="0" smtClean="0"/>
+          </a:p>
+          <a:p>
+            <a:r>
+              <a:rPr lang="en-US" dirty="0" smtClean="0"/>
+              <a:t>71%-99.2% of time is spent on high latency </a:t>
+            </a:r>
+            <a:r>
+              <a:rPr lang="en-US" dirty="0" smtClean="0"/>
+              <a:t>lookups</a:t>
+            </a:r>
           </a:p>
         </p:txBody>
       </p:sp>

</xml_diff>